<commit_message>
BROKEN: adding vertex checking to findEnclosedSpheres
</commit_message>
<xml_diff>
--- a/Documents/VertexSkeletonClassLibrary.pptx
+++ b/Documents/VertexSkeletonClassLibrary.pptx
@@ -29,12 +29,15 @@
     <p:sldId id="536" r:id="rId23"/>
     <p:sldId id="537" r:id="rId24"/>
     <p:sldId id="523" r:id="rId25"/>
-    <p:sldId id="538" r:id="rId26"/>
-    <p:sldId id="544" r:id="rId27"/>
-    <p:sldId id="539" r:id="rId28"/>
-    <p:sldId id="541" r:id="rId29"/>
-    <p:sldId id="542" r:id="rId30"/>
-    <p:sldId id="540" r:id="rId31"/>
+    <p:sldId id="545" r:id="rId26"/>
+    <p:sldId id="546" r:id="rId27"/>
+    <p:sldId id="538" r:id="rId28"/>
+    <p:sldId id="544" r:id="rId29"/>
+    <p:sldId id="539" r:id="rId30"/>
+    <p:sldId id="541" r:id="rId31"/>
+    <p:sldId id="547" r:id="rId32"/>
+    <p:sldId id="548" r:id="rId33"/>
+    <p:sldId id="540" r:id="rId34"/>
   </p:sldIdLst>
   <p:sldSz cx="12192000" cy="6858000"/>
   <p:notesSz cx="6858000" cy="9144000"/>
@@ -174,11 +177,14 @@
             <p14:sldId id="536"/>
             <p14:sldId id="537"/>
             <p14:sldId id="523"/>
+            <p14:sldId id="545"/>
+            <p14:sldId id="546"/>
             <p14:sldId id="538"/>
             <p14:sldId id="544"/>
             <p14:sldId id="539"/>
             <p14:sldId id="541"/>
-            <p14:sldId id="542"/>
+            <p14:sldId id="547"/>
+            <p14:sldId id="548"/>
             <p14:sldId id="540"/>
           </p14:sldIdLst>
         </p14:section>
@@ -454,7 +460,7 @@
           <a:p>
             <a:fld id="{ADCEBF8C-22C0-4323-9BBB-9413232198F8}" type="datetimeFigureOut">
               <a:rPr lang="en-US" smtClean="0"/>
-              <a:t>5/1/2025</a:t>
+              <a:t>5/4/2025</a:t>
             </a:fld>
             <a:endParaRPr lang="en-US"/>
           </a:p>
@@ -652,7 +658,7 @@
           <a:p>
             <a:fld id="{ADCEBF8C-22C0-4323-9BBB-9413232198F8}" type="datetimeFigureOut">
               <a:rPr lang="en-US" smtClean="0"/>
-              <a:t>5/1/2025</a:t>
+              <a:t>5/4/2025</a:t>
             </a:fld>
             <a:endParaRPr lang="en-US"/>
           </a:p>
@@ -860,7 +866,7 @@
           <a:p>
             <a:fld id="{ADCEBF8C-22C0-4323-9BBB-9413232198F8}" type="datetimeFigureOut">
               <a:rPr lang="en-US" smtClean="0"/>
-              <a:t>5/1/2025</a:t>
+              <a:t>5/4/2025</a:t>
             </a:fld>
             <a:endParaRPr lang="en-US"/>
           </a:p>
@@ -1058,7 +1064,7 @@
           <a:p>
             <a:fld id="{ADCEBF8C-22C0-4323-9BBB-9413232198F8}" type="datetimeFigureOut">
               <a:rPr lang="en-US" smtClean="0"/>
-              <a:t>5/1/2025</a:t>
+              <a:t>5/4/2025</a:t>
             </a:fld>
             <a:endParaRPr lang="en-US"/>
           </a:p>
@@ -1333,7 +1339,7 @@
           <a:p>
             <a:fld id="{ADCEBF8C-22C0-4323-9BBB-9413232198F8}" type="datetimeFigureOut">
               <a:rPr lang="en-US" smtClean="0"/>
-              <a:t>5/1/2025</a:t>
+              <a:t>5/4/2025</a:t>
             </a:fld>
             <a:endParaRPr lang="en-US"/>
           </a:p>
@@ -1598,7 +1604,7 @@
           <a:p>
             <a:fld id="{ADCEBF8C-22C0-4323-9BBB-9413232198F8}" type="datetimeFigureOut">
               <a:rPr lang="en-US" smtClean="0"/>
-              <a:t>5/1/2025</a:t>
+              <a:t>5/4/2025</a:t>
             </a:fld>
             <a:endParaRPr lang="en-US"/>
           </a:p>
@@ -2010,7 +2016,7 @@
           <a:p>
             <a:fld id="{ADCEBF8C-22C0-4323-9BBB-9413232198F8}" type="datetimeFigureOut">
               <a:rPr lang="en-US" smtClean="0"/>
-              <a:t>5/1/2025</a:t>
+              <a:t>5/4/2025</a:t>
             </a:fld>
             <a:endParaRPr lang="en-US"/>
           </a:p>
@@ -2151,7 +2157,7 @@
           <a:p>
             <a:fld id="{ADCEBF8C-22C0-4323-9BBB-9413232198F8}" type="datetimeFigureOut">
               <a:rPr lang="en-US" smtClean="0"/>
-              <a:t>5/1/2025</a:t>
+              <a:t>5/4/2025</a:t>
             </a:fld>
             <a:endParaRPr lang="en-US"/>
           </a:p>
@@ -2264,7 +2270,7 @@
           <a:p>
             <a:fld id="{ADCEBF8C-22C0-4323-9BBB-9413232198F8}" type="datetimeFigureOut">
               <a:rPr lang="en-US" smtClean="0"/>
-              <a:t>5/1/2025</a:t>
+              <a:t>5/4/2025</a:t>
             </a:fld>
             <a:endParaRPr lang="en-US"/>
           </a:p>
@@ -2575,7 +2581,7 @@
           <a:p>
             <a:fld id="{ADCEBF8C-22C0-4323-9BBB-9413232198F8}" type="datetimeFigureOut">
               <a:rPr lang="en-US" smtClean="0"/>
-              <a:t>5/1/2025</a:t>
+              <a:t>5/4/2025</a:t>
             </a:fld>
             <a:endParaRPr lang="en-US"/>
           </a:p>
@@ -2863,7 +2869,7 @@
           <a:p>
             <a:fld id="{ADCEBF8C-22C0-4323-9BBB-9413232198F8}" type="datetimeFigureOut">
               <a:rPr lang="en-US" smtClean="0"/>
-              <a:t>5/1/2025</a:t>
+              <a:t>5/4/2025</a:t>
             </a:fld>
             <a:endParaRPr lang="en-US"/>
           </a:p>
@@ -3104,7 +3110,7 @@
           <a:p>
             <a:fld id="{ADCEBF8C-22C0-4323-9BBB-9413232198F8}" type="datetimeFigureOut">
               <a:rPr lang="en-US" smtClean="0"/>
-              <a:t>5/1/2025</a:t>
+              <a:t>5/4/2025</a:t>
             </a:fld>
             <a:endParaRPr lang="en-US"/>
           </a:p>
@@ -7931,9 +7937,10 @@
           <a:lstStyle/>
           <a:p>
             <a:r>
-              <a:rPr lang="en-US" dirty="0"/>
+              <a:rPr lang="en-US"/>
               <a:t>For non-convex polytopes, the previous method requires modification.</a:t>
             </a:r>
+            <a:endParaRPr lang="en-US" dirty="0"/>
           </a:p>
         </p:txBody>
       </p:sp>
@@ -7962,7 +7969,7 @@
               <a:buNone/>
             </a:pPr>
             <a:r>
-              <a:rPr lang="en-US" dirty="0"/>
+              <a:rPr lang="en-US"/>
               <a:t>Namely, in step 2, the intersections may include other sides</a:t>
             </a:r>
           </a:p>
@@ -7972,7 +7979,7 @@
               <a:buAutoNum type="arabicPeriod"/>
             </a:pPr>
             <a:r>
-              <a:rPr lang="en-US" dirty="0"/>
+              <a:rPr lang="en-US"/>
               <a:t>Calculates the vectors pointing inward, and angles they make relative to next segment (“half angles”)</a:t>
             </a:r>
           </a:p>
@@ -7982,7 +7989,7 @@
               <a:buAutoNum type="arabicPeriod"/>
             </a:pPr>
             <a:r>
-              <a:rPr lang="en-US" dirty="0">
+              <a:rPr lang="en-US">
                 <a:solidFill>
                   <a:srgbClr val="FF0000"/>
                 </a:solidFill>
@@ -7996,7 +8003,7 @@
               <a:buAutoNum type="arabicPeriod"/>
             </a:pPr>
             <a:r>
-              <a:rPr lang="en-US" dirty="0"/>
+              <a:rPr lang="en-US"/>
               <a:t>Finds the minimum distance of intersection</a:t>
             </a:r>
           </a:p>
@@ -8006,7 +8013,7 @@
               <a:buAutoNum type="arabicPeriod"/>
             </a:pPr>
             <a:r>
-              <a:rPr lang="en-US" dirty="0"/>
+              <a:rPr lang="en-US"/>
               <a:t>Merges vertices that come together</a:t>
             </a:r>
           </a:p>
@@ -8016,7 +8023,7 @@
               <a:buAutoNum type="arabicPeriod"/>
             </a:pPr>
             <a:r>
-              <a:rPr lang="en-US" dirty="0"/>
+              <a:rPr lang="en-US"/>
               <a:t>Repeats</a:t>
             </a:r>
           </a:p>
@@ -8025,7 +8032,7 @@
               <a:buFont typeface="+mj-lt"/>
               <a:buAutoNum type="arabicPeriod"/>
             </a:pPr>
-            <a:endParaRPr lang="en-US" dirty="0"/>
+            <a:endParaRPr lang="en-US"/>
           </a:p>
           <a:p>
             <a:pPr marL="514350" indent="-514350">
@@ -8118,7 +8125,12 @@
             <p:ph idx="1"/>
           </p:nvPr>
         </p:nvSpPr>
-        <p:spPr/>
+        <p:spPr>
+          <a:xfrm>
+            <a:off x="838200" y="1825625"/>
+            <a:ext cx="6064468" cy="4351338"/>
+          </a:xfrm>
+        </p:spPr>
         <p:txBody>
           <a:bodyPr>
             <a:normAutofit/>
@@ -8149,6 +8161,15 @@
             <a:r>
               <a:rPr lang="en-US" sz="2000" dirty="0"/>
               <a:t>Unit vectors inward at each vertex</a:t>
+            </a:r>
+          </a:p>
+          <a:p>
+            <a:pPr marL="0" indent="0">
+              <a:buNone/>
+            </a:pPr>
+            <a:r>
+              <a:rPr lang="en-US" sz="2000" dirty="0"/>
+              <a:t>Magnitude and direction vector defining vertex motion for a unit cut</a:t>
             </a:r>
           </a:p>
           <a:p>
@@ -8206,7 +8227,7 @@
         </p:nvSpPr>
         <p:spPr>
           <a:xfrm>
-            <a:off x="332706" y="4719761"/>
+            <a:off x="438842" y="5850235"/>
             <a:ext cx="6569962" cy="461665"/>
           </a:xfrm>
           <a:prstGeom prst="rect">
@@ -8353,6 +8374,1451 @@
 </file>
 
 <file path=ppt/slides/slide25.xml><?xml version="1.0" encoding="utf-8"?>
+<p:sld xmlns:a="http://schemas.openxmlformats.org/drawingml/2006/main" xmlns:r="http://schemas.openxmlformats.org/officeDocument/2006/relationships" xmlns:p="http://schemas.openxmlformats.org/presentationml/2006/main">
+  <p:cSld>
+    <p:spTree>
+      <p:nvGrpSpPr>
+        <p:cNvPr id="1" name="">
+          <a:extLst>
+            <a:ext uri="{FF2B5EF4-FFF2-40B4-BE49-F238E27FC236}">
+              <a16:creationId xmlns:a16="http://schemas.microsoft.com/office/drawing/2014/main" id="{49BB3D00-1AA9-178D-003D-D44FE67B1715}"/>
+            </a:ext>
+          </a:extLst>
+        </p:cNvPr>
+        <p:cNvGrpSpPr/>
+        <p:nvPr/>
+      </p:nvGrpSpPr>
+      <p:grpSpPr>
+        <a:xfrm>
+          <a:off x="0" y="0"/>
+          <a:ext cx="0" cy="0"/>
+          <a:chOff x="0" y="0"/>
+          <a:chExt cx="0" cy="0"/>
+        </a:xfrm>
+      </p:grpSpPr>
+      <p:sp>
+        <p:nvSpPr>
+          <p:cNvPr id="4" name="Content Placeholder 3">
+            <a:extLst>
+              <a:ext uri="{FF2B5EF4-FFF2-40B4-BE49-F238E27FC236}">
+                <a16:creationId xmlns:a16="http://schemas.microsoft.com/office/drawing/2014/main" id="{26F3DE35-F96D-3707-380B-87848458E841}"/>
+              </a:ext>
+            </a:extLst>
+          </p:cNvPr>
+          <p:cNvSpPr>
+            <a:spLocks noGrp="1"/>
+          </p:cNvSpPr>
+          <p:nvPr>
+            <p:ph idx="1"/>
+          </p:nvPr>
+        </p:nvSpPr>
+        <p:spPr>
+          <a:xfrm>
+            <a:off x="838200" y="1825625"/>
+            <a:ext cx="6064468" cy="4351338"/>
+          </a:xfrm>
+        </p:spPr>
+        <p:txBody>
+          <a:bodyPr>
+            <a:normAutofit/>
+          </a:bodyPr>
+          <a:lstStyle/>
+          <a:p>
+            <a:pPr marL="0" indent="0">
+              <a:buNone/>
+            </a:pPr>
+            <a:r>
+              <a:rPr lang="en-US" sz="2000" dirty="0"/>
+              <a:t>Given:</a:t>
+            </a:r>
+          </a:p>
+          <a:p>
+            <a:pPr marL="0" indent="0">
+              <a:buNone/>
+            </a:pPr>
+            <a:r>
+              <a:rPr lang="en-US" sz="2000" dirty="0"/>
+              <a:t>Unit normal for segment ahead of each vertex</a:t>
+            </a:r>
+          </a:p>
+          <a:p>
+            <a:pPr marL="0" indent="0">
+              <a:buNone/>
+            </a:pPr>
+            <a:r>
+              <a:rPr lang="en-US" sz="2000" dirty="0"/>
+              <a:t>Unit vectors inward at each vertex</a:t>
+            </a:r>
+          </a:p>
+          <a:p>
+            <a:pPr marL="0" indent="0">
+              <a:buNone/>
+            </a:pPr>
+            <a:endParaRPr lang="en-US" sz="2000" dirty="0"/>
+          </a:p>
+          <a:p>
+            <a:pPr marL="0" indent="0">
+              <a:buNone/>
+            </a:pPr>
+            <a:r>
+              <a:rPr lang="en-US" sz="2000" dirty="0"/>
+              <a:t>For a unit travel in direction </a:t>
+            </a:r>
+            <a:r>
+              <a:rPr lang="en-US" sz="2000" dirty="0" err="1"/>
+              <a:t>n_i</a:t>
+            </a:r>
+            <a:r>
+              <a:rPr lang="en-US" sz="2000" dirty="0"/>
+              <a:t>:</a:t>
+            </a:r>
+          </a:p>
+          <a:p>
+            <a:pPr marL="0" indent="0">
+              <a:buNone/>
+            </a:pPr>
+            <a:endParaRPr lang="en-US" sz="2000" dirty="0"/>
+          </a:p>
+          <a:p>
+            <a:pPr marL="0" indent="0">
+              <a:buNone/>
+            </a:pPr>
+            <a:endParaRPr lang="en-US" sz="2000" dirty="0"/>
+          </a:p>
+          <a:p>
+            <a:pPr marL="0" indent="0">
+              <a:buNone/>
+            </a:pPr>
+            <a:endParaRPr lang="en-US" sz="2000" dirty="0"/>
+          </a:p>
+          <a:p>
+            <a:pPr marL="0" indent="0">
+              <a:buNone/>
+            </a:pPr>
+            <a:r>
+              <a:rPr lang="en-US" sz="2000" dirty="0"/>
+              <a:t>And projection vector for unit cut is given by:</a:t>
+            </a:r>
+          </a:p>
+          <a:p>
+            <a:pPr marL="0" indent="0">
+              <a:buNone/>
+            </a:pPr>
+            <a:endParaRPr lang="en-US" sz="1400" b="0" i="1" dirty="0">
+              <a:latin typeface="Cambria Math" panose="02040503050406030204" pitchFamily="18" charset="0"/>
+            </a:endParaRPr>
+          </a:p>
+          <a:p>
+            <a:pPr marL="0" indent="0">
+              <a:buNone/>
+            </a:pPr>
+            <a:endParaRPr lang="en-US" sz="2000" dirty="0"/>
+          </a:p>
+        </p:txBody>
+      </p:sp>
+      <p:sp>
+        <p:nvSpPr>
+          <p:cNvPr id="2" name="Title 1">
+            <a:extLst>
+              <a:ext uri="{FF2B5EF4-FFF2-40B4-BE49-F238E27FC236}">
+                <a16:creationId xmlns:a16="http://schemas.microsoft.com/office/drawing/2014/main" id="{DBA1B8AB-F900-2747-EB6A-118CC8B36037}"/>
+              </a:ext>
+            </a:extLst>
+          </p:cNvPr>
+          <p:cNvSpPr>
+            <a:spLocks noGrp="1"/>
+          </p:cNvSpPr>
+          <p:nvPr>
+            <p:ph type="title"/>
+          </p:nvPr>
+        </p:nvSpPr>
+        <p:spPr/>
+        <p:txBody>
+          <a:bodyPr>
+            <a:noAutofit/>
+          </a:bodyPr>
+          <a:lstStyle/>
+          <a:p>
+            <a:r>
+              <a:rPr lang="en-US" sz="3600" dirty="0"/>
+              <a:t>The magnitude of vertex motion for a unit cut can be found via the following</a:t>
+            </a:r>
+          </a:p>
+        </p:txBody>
+      </p:sp>
+      <p:sp>
+        <p:nvSpPr>
+          <p:cNvPr id="6" name="Rectangle 5">
+            <a:extLst>
+              <a:ext uri="{FF2B5EF4-FFF2-40B4-BE49-F238E27FC236}">
+                <a16:creationId xmlns:a16="http://schemas.microsoft.com/office/drawing/2014/main" id="{9DC9F0FC-CF50-BFE9-2064-4564A680FA6A}"/>
+              </a:ext>
+            </a:extLst>
+          </p:cNvPr>
+          <p:cNvSpPr/>
+          <p:nvPr/>
+        </p:nvSpPr>
+        <p:spPr>
+          <a:xfrm>
+            <a:off x="1606940" y="5946130"/>
+            <a:ext cx="6569962" cy="646331"/>
+          </a:xfrm>
+          <a:prstGeom prst="rect">
+            <a:avLst/>
+          </a:prstGeom>
+          <a:solidFill>
+            <a:schemeClr val="accent4">
+              <a:lumMod val="20000"/>
+              <a:lumOff val="80000"/>
+            </a:schemeClr>
+          </a:solidFill>
+        </p:spPr>
+        <p:txBody>
+          <a:bodyPr wrap="square" lIns="91440" tIns="45720" rIns="91440" bIns="45720" anchor="t">
+            <a:spAutoFit/>
+          </a:bodyPr>
+          <a:lstStyle/>
+          <a:p>
+            <a:r>
+              <a:rPr lang="en-US" sz="1200" b="0" i="0" u="none" strike="noStrike" baseline="0" dirty="0">
+                <a:solidFill>
+                  <a:srgbClr val="000000"/>
+                </a:solidFill>
+                <a:latin typeface="Courier New" panose="02070309020205020404" pitchFamily="49" charset="0"/>
+              </a:rPr>
+              <a:t>[</a:t>
+            </a:r>
+            <a:r>
+              <a:rPr lang="en-US" sz="1200" b="0" i="0" u="none" strike="noStrike" baseline="0" dirty="0" err="1">
+                <a:solidFill>
+                  <a:srgbClr val="000000"/>
+                </a:solidFill>
+                <a:latin typeface="Courier New" panose="02070309020205020404" pitchFamily="49" charset="0"/>
+              </a:rPr>
+              <a:t>unit_normal_vectors</a:t>
+            </a:r>
+            <a:r>
+              <a:rPr lang="en-US" sz="1200" b="0" i="0" u="none" strike="noStrike" baseline="0" dirty="0">
+                <a:solidFill>
+                  <a:srgbClr val="000000"/>
+                </a:solidFill>
+                <a:latin typeface="Courier New" panose="02070309020205020404" pitchFamily="49" charset="0"/>
+              </a:rPr>
+              <a:t>, </a:t>
+            </a:r>
+            <a:r>
+              <a:rPr lang="en-US" sz="1200" b="0" i="0" u="none" strike="noStrike" baseline="0" dirty="0" err="1">
+                <a:solidFill>
+                  <a:srgbClr val="000000"/>
+                </a:solidFill>
+                <a:latin typeface="Courier New" panose="02070309020205020404" pitchFamily="49" charset="0"/>
+              </a:rPr>
+              <a:t>unit_vertex_projection_vectors</a:t>
+            </a:r>
+            <a:r>
+              <a:rPr lang="en-US" sz="1200" b="0" i="0" u="none" strike="noStrike" baseline="0" dirty="0">
+                <a:solidFill>
+                  <a:srgbClr val="000000"/>
+                </a:solidFill>
+                <a:latin typeface="Courier New" panose="02070309020205020404" pitchFamily="49" charset="0"/>
+              </a:rPr>
+              <a:t>, </a:t>
+            </a:r>
+            <a:r>
+              <a:rPr lang="en-US" sz="1200" b="0" i="0" u="none" strike="noStrike" baseline="0" dirty="0" err="1">
+                <a:solidFill>
+                  <a:srgbClr val="000000"/>
+                </a:solidFill>
+                <a:latin typeface="Courier New" panose="02070309020205020404" pitchFamily="49" charset="0"/>
+              </a:rPr>
+              <a:t>vector_direction_of_unit_cut</a:t>
+            </a:r>
+            <a:r>
+              <a:rPr lang="en-US" sz="1200" b="0" i="0" u="none" strike="noStrike" baseline="0" dirty="0">
+                <a:solidFill>
+                  <a:srgbClr val="000000"/>
+                </a:solidFill>
+                <a:latin typeface="Courier New" panose="02070309020205020404" pitchFamily="49" charset="0"/>
+              </a:rPr>
+              <a:t>] = ...</a:t>
+            </a:r>
+          </a:p>
+          <a:p>
+            <a:r>
+              <a:rPr lang="en-US" sz="1200" b="0" i="0" u="none" strike="noStrike" baseline="0" dirty="0">
+                <a:solidFill>
+                  <a:srgbClr val="000000"/>
+                </a:solidFill>
+                <a:latin typeface="Courier New" panose="02070309020205020404" pitchFamily="49" charset="0"/>
+              </a:rPr>
+              <a:t>    </a:t>
+            </a:r>
+            <a:r>
+              <a:rPr lang="en-US" sz="1200" b="0" i="0" u="none" strike="noStrike" baseline="0" dirty="0" err="1">
+                <a:solidFill>
+                  <a:srgbClr val="000000"/>
+                </a:solidFill>
+                <a:latin typeface="Courier New" panose="02070309020205020404" pitchFamily="49" charset="0"/>
+              </a:rPr>
+              <a:t>fcn_VSkel_fcn_polytopeFindUnitDirectionVectors</a:t>
+            </a:r>
+            <a:r>
+              <a:rPr lang="en-US" sz="1200" b="0" i="0" u="none" strike="noStrike" baseline="0" dirty="0">
+                <a:solidFill>
+                  <a:srgbClr val="000000"/>
+                </a:solidFill>
+                <a:latin typeface="Courier New" panose="02070309020205020404" pitchFamily="49" charset="0"/>
+              </a:rPr>
+              <a:t>(</a:t>
+            </a:r>
+            <a:r>
+              <a:rPr lang="en-US" sz="1200" b="0" i="0" u="none" strike="noStrike" baseline="0" dirty="0" err="1">
+                <a:solidFill>
+                  <a:srgbClr val="000000"/>
+                </a:solidFill>
+                <a:latin typeface="Courier New" panose="02070309020205020404" pitchFamily="49" charset="0"/>
+              </a:rPr>
+              <a:t>vertices,fig_num</a:t>
+            </a:r>
+            <a:r>
+              <a:rPr lang="en-US" sz="1200" b="0" i="0" u="none" strike="noStrike" baseline="0" dirty="0">
+                <a:solidFill>
+                  <a:srgbClr val="000000"/>
+                </a:solidFill>
+                <a:latin typeface="Courier New" panose="02070309020205020404" pitchFamily="49" charset="0"/>
+              </a:rPr>
+              <a:t>);</a:t>
+            </a:r>
+          </a:p>
+        </p:txBody>
+      </p:sp>
+      <p:cxnSp>
+        <p:nvCxnSpPr>
+          <p:cNvPr id="3" name="Straight Connector 2">
+            <a:extLst>
+              <a:ext uri="{FF2B5EF4-FFF2-40B4-BE49-F238E27FC236}">
+                <a16:creationId xmlns:a16="http://schemas.microsoft.com/office/drawing/2014/main" id="{2D2E098F-BF7B-0406-DC24-61FB43DF6B57}"/>
+              </a:ext>
+            </a:extLst>
+          </p:cNvPr>
+          <p:cNvCxnSpPr>
+            <a:cxnSpLocks/>
+          </p:cNvCxnSpPr>
+          <p:nvPr/>
+        </p:nvCxnSpPr>
+        <p:spPr>
+          <a:xfrm flipV="1">
+            <a:off x="6096000" y="3429000"/>
+            <a:ext cx="1426321" cy="1458135"/>
+          </a:xfrm>
+          <a:prstGeom prst="line">
+            <a:avLst/>
+          </a:prstGeom>
+          <a:ln w="38100"/>
+        </p:spPr>
+        <p:style>
+          <a:lnRef idx="1">
+            <a:schemeClr val="accent1"/>
+          </a:lnRef>
+          <a:fillRef idx="0">
+            <a:schemeClr val="accent1"/>
+          </a:fillRef>
+          <a:effectRef idx="0">
+            <a:schemeClr val="accent1"/>
+          </a:effectRef>
+          <a:fontRef idx="minor">
+            <a:schemeClr val="tx1"/>
+          </a:fontRef>
+        </p:style>
+      </p:cxnSp>
+      <p:cxnSp>
+        <p:nvCxnSpPr>
+          <p:cNvPr id="5" name="Straight Connector 4">
+            <a:extLst>
+              <a:ext uri="{FF2B5EF4-FFF2-40B4-BE49-F238E27FC236}">
+                <a16:creationId xmlns:a16="http://schemas.microsoft.com/office/drawing/2014/main" id="{6F121AD1-B3FB-EED7-71A3-107AD547483E}"/>
+              </a:ext>
+            </a:extLst>
+          </p:cNvPr>
+          <p:cNvCxnSpPr>
+            <a:cxnSpLocks/>
+          </p:cNvCxnSpPr>
+          <p:nvPr/>
+        </p:nvCxnSpPr>
+        <p:spPr>
+          <a:xfrm flipH="1" flipV="1">
+            <a:off x="7522321" y="3429000"/>
+            <a:ext cx="1309163" cy="1325275"/>
+          </a:xfrm>
+          <a:prstGeom prst="line">
+            <a:avLst/>
+          </a:prstGeom>
+          <a:ln w="38100"/>
+        </p:spPr>
+        <p:style>
+          <a:lnRef idx="1">
+            <a:schemeClr val="accent1"/>
+          </a:lnRef>
+          <a:fillRef idx="0">
+            <a:schemeClr val="accent1"/>
+          </a:fillRef>
+          <a:effectRef idx="0">
+            <a:schemeClr val="accent1"/>
+          </a:effectRef>
+          <a:fontRef idx="minor">
+            <a:schemeClr val="tx1"/>
+          </a:fontRef>
+        </p:style>
+      </p:cxnSp>
+      <p:grpSp>
+        <p:nvGrpSpPr>
+          <p:cNvPr id="7" name="Group 6">
+            <a:extLst>
+              <a:ext uri="{FF2B5EF4-FFF2-40B4-BE49-F238E27FC236}">
+                <a16:creationId xmlns:a16="http://schemas.microsoft.com/office/drawing/2014/main" id="{100BBF5D-3C17-DC10-4215-40B69CB68AD8}"/>
+              </a:ext>
+            </a:extLst>
+          </p:cNvPr>
+          <p:cNvGrpSpPr/>
+          <p:nvPr/>
+        </p:nvGrpSpPr>
+        <p:grpSpPr>
+          <a:xfrm>
+            <a:off x="7409494" y="2584565"/>
+            <a:ext cx="250325" cy="844435"/>
+            <a:chOff x="6972766" y="3719509"/>
+            <a:chExt cx="250325" cy="844435"/>
+          </a:xfrm>
+        </p:grpSpPr>
+        <p:cxnSp>
+          <p:nvCxnSpPr>
+            <p:cNvPr id="9" name="Straight Connector 8">
+              <a:extLst>
+                <a:ext uri="{FF2B5EF4-FFF2-40B4-BE49-F238E27FC236}">
+                  <a16:creationId xmlns:a16="http://schemas.microsoft.com/office/drawing/2014/main" id="{DD763962-7B46-F506-42D0-4F820620D3E3}"/>
+                </a:ext>
+              </a:extLst>
+            </p:cNvPr>
+            <p:cNvCxnSpPr>
+              <a:cxnSpLocks/>
+            </p:cNvCxnSpPr>
+            <p:nvPr/>
+          </p:nvCxnSpPr>
+          <p:spPr>
+            <a:xfrm flipV="1">
+              <a:off x="7079970" y="4063977"/>
+              <a:ext cx="17959" cy="499967"/>
+            </a:xfrm>
+            <a:prstGeom prst="line">
+              <a:avLst/>
+            </a:prstGeom>
+            <a:ln w="31750">
+              <a:tailEnd type="triangle"/>
+            </a:ln>
+          </p:spPr>
+          <p:style>
+            <a:lnRef idx="1">
+              <a:schemeClr val="accent1"/>
+            </a:lnRef>
+            <a:fillRef idx="0">
+              <a:schemeClr val="accent1"/>
+            </a:fillRef>
+            <a:effectRef idx="0">
+              <a:schemeClr val="accent1"/>
+            </a:effectRef>
+            <a:fontRef idx="minor">
+              <a:schemeClr val="tx1"/>
+            </a:fontRef>
+          </p:style>
+        </p:cxnSp>
+        <mc:AlternateContent xmlns:mc="http://schemas.openxmlformats.org/markup-compatibility/2006" xmlns:a14="http://schemas.microsoft.com/office/drawing/2010/main">
+          <mc:Choice Requires="a14">
+            <p:sp>
+              <p:nvSpPr>
+                <p:cNvPr id="10" name="TextBox 9">
+                  <a:extLst>
+                    <a:ext uri="{FF2B5EF4-FFF2-40B4-BE49-F238E27FC236}">
+                      <a16:creationId xmlns:a16="http://schemas.microsoft.com/office/drawing/2014/main" id="{E9A75DCA-C84D-A7B5-883D-2AB47031510A}"/>
+                    </a:ext>
+                  </a:extLst>
+                </p:cNvPr>
+                <p:cNvSpPr txBox="1"/>
+                <p:nvPr/>
+              </p:nvSpPr>
+              <p:spPr>
+                <a:xfrm>
+                  <a:off x="6972766" y="3719509"/>
+                  <a:ext cx="250325" cy="276999"/>
+                </a:xfrm>
+                <a:prstGeom prst="rect">
+                  <a:avLst/>
+                </a:prstGeom>
+                <a:noFill/>
+              </p:spPr>
+              <p:txBody>
+                <a:bodyPr wrap="none" lIns="0" tIns="0" rIns="0" bIns="0" rtlCol="0">
+                  <a:spAutoFit/>
+                </a:bodyPr>
+                <a:lstStyle/>
+                <a:p>
+                  <a:pPr/>
+                  <a14:m>
+                    <m:oMathPara xmlns:m="http://schemas.openxmlformats.org/officeDocument/2006/math">
+                      <m:oMathParaPr>
+                        <m:jc m:val="centerGroup"/>
+                      </m:oMathParaPr>
+                      <m:oMath xmlns:m="http://schemas.openxmlformats.org/officeDocument/2006/math">
+                        <m:acc>
+                          <m:accPr>
+                            <m:chr m:val="̂"/>
+                            <m:ctrlPr>
+                              <a:rPr lang="en-US" b="0" i="1" smtClean="0">
+                                <a:latin typeface="Cambria Math" panose="02040503050406030204" pitchFamily="18" charset="0"/>
+                              </a:rPr>
+                            </m:ctrlPr>
+                          </m:accPr>
+                          <m:e>
+                            <m:sSub>
+                              <m:sSubPr>
+                                <m:ctrlPr>
+                                  <a:rPr lang="en-US" b="0" i="1" smtClean="0">
+                                    <a:latin typeface="Cambria Math" panose="02040503050406030204" pitchFamily="18" charset="0"/>
+                                  </a:rPr>
+                                </m:ctrlPr>
+                              </m:sSubPr>
+                              <m:e>
+                                <m:r>
+                                  <a:rPr lang="en-US" b="0" i="1" smtClean="0">
+                                    <a:latin typeface="Cambria Math" panose="02040503050406030204" pitchFamily="18" charset="0"/>
+                                  </a:rPr>
+                                  <m:t>𝑣</m:t>
+                                </m:r>
+                              </m:e>
+                              <m:sub>
+                                <m:r>
+                                  <a:rPr lang="en-US" b="0" i="1" smtClean="0">
+                                    <a:latin typeface="Cambria Math" panose="02040503050406030204" pitchFamily="18" charset="0"/>
+                                  </a:rPr>
+                                  <m:t>𝑖</m:t>
+                                </m:r>
+                              </m:sub>
+                            </m:sSub>
+                          </m:e>
+                        </m:acc>
+                      </m:oMath>
+                    </m:oMathPara>
+                  </a14:m>
+                  <a:endParaRPr lang="en-US" b="0" dirty="0"/>
+                </a:p>
+              </p:txBody>
+            </p:sp>
+          </mc:Choice>
+          <mc:Fallback xmlns="">
+            <p:sp>
+              <p:nvSpPr>
+                <p:cNvPr id="14" name="TextBox 13">
+                  <a:extLst>
+                    <a:ext uri="{FF2B5EF4-FFF2-40B4-BE49-F238E27FC236}">
+                      <a16:creationId xmlns:a16="http://schemas.microsoft.com/office/drawing/2014/main" id="{F7FCBA7A-D404-50E4-E61A-710C042C12CF}"/>
+                    </a:ext>
+                  </a:extLst>
+                </p:cNvPr>
+                <p:cNvSpPr txBox="1">
+                  <a:spLocks noRot="1" noChangeAspect="1" noMove="1" noResize="1" noEditPoints="1" noAdjustHandles="1" noChangeArrowheads="1" noChangeShapeType="1" noTextEdit="1"/>
+                </p:cNvSpPr>
+                <p:nvPr/>
+              </p:nvSpPr>
+              <p:spPr>
+                <a:xfrm>
+                  <a:off x="6972766" y="3719509"/>
+                  <a:ext cx="250325" cy="276999"/>
+                </a:xfrm>
+                <a:prstGeom prst="rect">
+                  <a:avLst/>
+                </a:prstGeom>
+                <a:blipFill>
+                  <a:blip r:embed="rId2"/>
+                  <a:stretch>
+                    <a:fillRect l="-14634" t="-23913" r="-56098" b="-17391"/>
+                  </a:stretch>
+                </a:blipFill>
+              </p:spPr>
+              <p:txBody>
+                <a:bodyPr/>
+                <a:lstStyle/>
+                <a:p>
+                  <a:r>
+                    <a:rPr lang="en-US">
+                      <a:noFill/>
+                    </a:rPr>
+                    <a:t> </a:t>
+                  </a:r>
+                </a:p>
+              </p:txBody>
+            </p:sp>
+          </mc:Fallback>
+        </mc:AlternateContent>
+      </p:grpSp>
+      <mc:AlternateContent xmlns:mc="http://schemas.openxmlformats.org/markup-compatibility/2006" xmlns:a14="http://schemas.microsoft.com/office/drawing/2010/main">
+        <mc:Choice Requires="a14">
+          <p:sp>
+            <p:nvSpPr>
+              <p:cNvPr id="11" name="TextBox 10">
+                <a:extLst>
+                  <a:ext uri="{FF2B5EF4-FFF2-40B4-BE49-F238E27FC236}">
+                    <a16:creationId xmlns:a16="http://schemas.microsoft.com/office/drawing/2014/main" id="{34A25BD1-0690-4FDD-1804-F291230614FA}"/>
+                  </a:ext>
+                </a:extLst>
+              </p:cNvPr>
+              <p:cNvSpPr txBox="1"/>
+              <p:nvPr/>
+            </p:nvSpPr>
+            <p:spPr>
+              <a:xfrm>
+                <a:off x="7590429" y="3290500"/>
+                <a:ext cx="248465" cy="276999"/>
+              </a:xfrm>
+              <a:prstGeom prst="rect">
+                <a:avLst/>
+              </a:prstGeom>
+              <a:noFill/>
+            </p:spPr>
+            <p:txBody>
+              <a:bodyPr wrap="square" lIns="0" tIns="0" rIns="0" bIns="0" rtlCol="0">
+                <a:spAutoFit/>
+              </a:bodyPr>
+              <a:lstStyle/>
+              <a:p>
+                <a:pPr/>
+                <a14:m>
+                  <m:oMathPara xmlns:m="http://schemas.openxmlformats.org/officeDocument/2006/math">
+                    <m:oMathParaPr>
+                      <m:jc m:val="centerGroup"/>
+                    </m:oMathParaPr>
+                    <m:oMath xmlns:m="http://schemas.openxmlformats.org/officeDocument/2006/math">
+                      <m:sSub>
+                        <m:sSubPr>
+                          <m:ctrlPr>
+                            <a:rPr lang="en-US" b="0" i="1" smtClean="0">
+                              <a:latin typeface="Cambria Math" panose="02040503050406030204" pitchFamily="18" charset="0"/>
+                            </a:rPr>
+                          </m:ctrlPr>
+                        </m:sSubPr>
+                        <m:e>
+                          <m:r>
+                            <a:rPr lang="en-US" b="0" i="1" smtClean="0">
+                              <a:latin typeface="Cambria Math" panose="02040503050406030204" pitchFamily="18" charset="0"/>
+                            </a:rPr>
+                            <m:t>𝑝</m:t>
+                          </m:r>
+                        </m:e>
+                        <m:sub>
+                          <m:r>
+                            <a:rPr lang="en-US" b="0" i="1" smtClean="0">
+                              <a:latin typeface="Cambria Math" panose="02040503050406030204" pitchFamily="18" charset="0"/>
+                            </a:rPr>
+                            <m:t>𝑖</m:t>
+                          </m:r>
+                        </m:sub>
+                      </m:sSub>
+                    </m:oMath>
+                  </m:oMathPara>
+                </a14:m>
+                <a:endParaRPr lang="en-US" dirty="0"/>
+              </a:p>
+            </p:txBody>
+          </p:sp>
+        </mc:Choice>
+        <mc:Fallback xmlns="">
+          <p:sp>
+            <p:nvSpPr>
+              <p:cNvPr id="11" name="TextBox 10">
+                <a:extLst>
+                  <a:ext uri="{FF2B5EF4-FFF2-40B4-BE49-F238E27FC236}">
+                    <a16:creationId xmlns:a16="http://schemas.microsoft.com/office/drawing/2014/main" id="{34A25BD1-0690-4FDD-1804-F291230614FA}"/>
+                  </a:ext>
+                </a:extLst>
+              </p:cNvPr>
+              <p:cNvSpPr txBox="1">
+                <a:spLocks noRot="1" noChangeAspect="1" noMove="1" noResize="1" noEditPoints="1" noAdjustHandles="1" noChangeArrowheads="1" noChangeShapeType="1" noTextEdit="1"/>
+              </p:cNvSpPr>
+              <p:nvPr/>
+            </p:nvSpPr>
+            <p:spPr>
+              <a:xfrm>
+                <a:off x="7590429" y="3290500"/>
+                <a:ext cx="248465" cy="276999"/>
+              </a:xfrm>
+              <a:prstGeom prst="rect">
+                <a:avLst/>
+              </a:prstGeom>
+              <a:blipFill>
+                <a:blip r:embed="rId3"/>
+                <a:stretch>
+                  <a:fillRect l="-24390" r="-9756" b="-26667"/>
+                </a:stretch>
+              </a:blipFill>
+            </p:spPr>
+            <p:txBody>
+              <a:bodyPr/>
+              <a:lstStyle/>
+              <a:p>
+                <a:r>
+                  <a:rPr lang="en-US">
+                    <a:noFill/>
+                  </a:rPr>
+                  <a:t> </a:t>
+                </a:r>
+              </a:p>
+            </p:txBody>
+          </p:sp>
+        </mc:Fallback>
+      </mc:AlternateContent>
+      <p:cxnSp>
+        <p:nvCxnSpPr>
+          <p:cNvPr id="12" name="Straight Connector 11">
+            <a:extLst>
+              <a:ext uri="{FF2B5EF4-FFF2-40B4-BE49-F238E27FC236}">
+                <a16:creationId xmlns:a16="http://schemas.microsoft.com/office/drawing/2014/main" id="{21760814-3F2B-D19D-20CA-93398DC0A607}"/>
+              </a:ext>
+            </a:extLst>
+          </p:cNvPr>
+          <p:cNvCxnSpPr>
+            <a:cxnSpLocks/>
+          </p:cNvCxnSpPr>
+          <p:nvPr/>
+        </p:nvCxnSpPr>
+        <p:spPr>
+          <a:xfrm flipV="1">
+            <a:off x="8246853" y="3846489"/>
+            <a:ext cx="223857" cy="288446"/>
+          </a:xfrm>
+          <a:prstGeom prst="line">
+            <a:avLst/>
+          </a:prstGeom>
+          <a:ln w="31750">
+            <a:tailEnd type="triangle"/>
+          </a:ln>
+        </p:spPr>
+        <p:style>
+          <a:lnRef idx="1">
+            <a:schemeClr val="accent1"/>
+          </a:lnRef>
+          <a:fillRef idx="0">
+            <a:schemeClr val="accent1"/>
+          </a:fillRef>
+          <a:effectRef idx="0">
+            <a:schemeClr val="accent1"/>
+          </a:effectRef>
+          <a:fontRef idx="minor">
+            <a:schemeClr val="tx1"/>
+          </a:fontRef>
+        </p:style>
+      </p:cxnSp>
+      <mc:AlternateContent xmlns:mc="http://schemas.openxmlformats.org/markup-compatibility/2006" xmlns:a14="http://schemas.microsoft.com/office/drawing/2010/main">
+        <mc:Choice Requires="a14">
+          <p:sp>
+            <p:nvSpPr>
+              <p:cNvPr id="13" name="TextBox 12">
+                <a:extLst>
+                  <a:ext uri="{FF2B5EF4-FFF2-40B4-BE49-F238E27FC236}">
+                    <a16:creationId xmlns:a16="http://schemas.microsoft.com/office/drawing/2014/main" id="{23249F55-6931-34DD-4F85-909EC42DA5C5}"/>
+                  </a:ext>
+                </a:extLst>
+              </p:cNvPr>
+              <p:cNvSpPr txBox="1"/>
+              <p:nvPr/>
+            </p:nvSpPr>
+            <p:spPr>
+              <a:xfrm>
+                <a:off x="8139649" y="3290500"/>
+                <a:ext cx="260584" cy="276999"/>
+              </a:xfrm>
+              <a:prstGeom prst="rect">
+                <a:avLst/>
+              </a:prstGeom>
+              <a:noFill/>
+            </p:spPr>
+            <p:txBody>
+              <a:bodyPr wrap="none" lIns="0" tIns="0" rIns="0" bIns="0" rtlCol="0">
+                <a:spAutoFit/>
+              </a:bodyPr>
+              <a:lstStyle/>
+              <a:p>
+                <a:pPr/>
+                <a14:m>
+                  <m:oMathPara xmlns:m="http://schemas.openxmlformats.org/officeDocument/2006/math">
+                    <m:oMathParaPr>
+                      <m:jc m:val="centerGroup"/>
+                    </m:oMathParaPr>
+                    <m:oMath xmlns:m="http://schemas.openxmlformats.org/officeDocument/2006/math">
+                      <m:acc>
+                        <m:accPr>
+                          <m:chr m:val="̂"/>
+                          <m:ctrlPr>
+                            <a:rPr lang="en-US" b="0" i="1" smtClean="0">
+                              <a:latin typeface="Cambria Math" panose="02040503050406030204" pitchFamily="18" charset="0"/>
+                            </a:rPr>
+                          </m:ctrlPr>
+                        </m:accPr>
+                        <m:e>
+                          <m:sSub>
+                            <m:sSubPr>
+                              <m:ctrlPr>
+                                <a:rPr lang="en-US" b="0" i="1" smtClean="0">
+                                  <a:latin typeface="Cambria Math" panose="02040503050406030204" pitchFamily="18" charset="0"/>
+                                </a:rPr>
+                              </m:ctrlPr>
+                            </m:sSubPr>
+                            <m:e>
+                              <m:r>
+                                <a:rPr lang="en-US" b="0" i="1" smtClean="0">
+                                  <a:latin typeface="Cambria Math" panose="02040503050406030204" pitchFamily="18" charset="0"/>
+                                </a:rPr>
+                                <m:t>𝑛</m:t>
+                              </m:r>
+                            </m:e>
+                            <m:sub>
+                              <m:r>
+                                <a:rPr lang="en-US" b="0" i="1" smtClean="0">
+                                  <a:latin typeface="Cambria Math" panose="02040503050406030204" pitchFamily="18" charset="0"/>
+                                </a:rPr>
+                                <m:t>𝑖</m:t>
+                              </m:r>
+                            </m:sub>
+                          </m:sSub>
+                        </m:e>
+                      </m:acc>
+                    </m:oMath>
+                  </m:oMathPara>
+                </a14:m>
+                <a:endParaRPr lang="en-US" b="0" dirty="0"/>
+              </a:p>
+            </p:txBody>
+          </p:sp>
+        </mc:Choice>
+        <mc:Fallback xmlns="">
+          <p:sp>
+            <p:nvSpPr>
+              <p:cNvPr id="13" name="TextBox 12">
+                <a:extLst>
+                  <a:ext uri="{FF2B5EF4-FFF2-40B4-BE49-F238E27FC236}">
+                    <a16:creationId xmlns:a16="http://schemas.microsoft.com/office/drawing/2014/main" id="{23249F55-6931-34DD-4F85-909EC42DA5C5}"/>
+                  </a:ext>
+                </a:extLst>
+              </p:cNvPr>
+              <p:cNvSpPr txBox="1">
+                <a:spLocks noRot="1" noChangeAspect="1" noMove="1" noResize="1" noEditPoints="1" noAdjustHandles="1" noChangeArrowheads="1" noChangeShapeType="1" noTextEdit="1"/>
+              </p:cNvSpPr>
+              <p:nvPr/>
+            </p:nvSpPr>
+            <p:spPr>
+              <a:xfrm>
+                <a:off x="8139649" y="3290500"/>
+                <a:ext cx="260584" cy="276999"/>
+              </a:xfrm>
+              <a:prstGeom prst="rect">
+                <a:avLst/>
+              </a:prstGeom>
+              <a:blipFill>
+                <a:blip r:embed="rId4"/>
+                <a:stretch>
+                  <a:fillRect l="-13953" t="-26667" r="-58140" b="-17778"/>
+                </a:stretch>
+              </a:blipFill>
+            </p:spPr>
+            <p:txBody>
+              <a:bodyPr/>
+              <a:lstStyle/>
+              <a:p>
+                <a:r>
+                  <a:rPr lang="en-US">
+                    <a:noFill/>
+                  </a:rPr>
+                  <a:t> </a:t>
+                </a:r>
+              </a:p>
+            </p:txBody>
+          </p:sp>
+        </mc:Fallback>
+      </mc:AlternateContent>
+      <mc:AlternateContent xmlns:mc="http://schemas.openxmlformats.org/markup-compatibility/2006" xmlns:a14="http://schemas.microsoft.com/office/drawing/2010/main">
+        <mc:Choice Requires="a14">
+          <p:sp>
+            <p:nvSpPr>
+              <p:cNvPr id="15" name="TextBox 14">
+                <a:extLst>
+                  <a:ext uri="{FF2B5EF4-FFF2-40B4-BE49-F238E27FC236}">
+                    <a16:creationId xmlns:a16="http://schemas.microsoft.com/office/drawing/2014/main" id="{A8DCD132-4A80-26FB-EEFD-F84BDEDA7607}"/>
+                  </a:ext>
+                </a:extLst>
+              </p:cNvPr>
+              <p:cNvSpPr txBox="1"/>
+              <p:nvPr/>
+            </p:nvSpPr>
+            <p:spPr>
+              <a:xfrm>
+                <a:off x="1572346" y="3846489"/>
+                <a:ext cx="2517962" cy="1216551"/>
+              </a:xfrm>
+              <a:prstGeom prst="rect">
+                <a:avLst/>
+              </a:prstGeom>
+              <a:noFill/>
+            </p:spPr>
+            <p:txBody>
+              <a:bodyPr wrap="square">
+                <a:spAutoFit/>
+              </a:bodyPr>
+              <a:lstStyle/>
+              <a:p>
+                <a:pPr/>
+                <a14:m>
+                  <m:oMathPara xmlns:m="http://schemas.openxmlformats.org/officeDocument/2006/math">
+                    <m:oMathParaPr>
+                      <m:jc m:val="centerGroup"/>
+                    </m:oMathParaPr>
+                    <m:oMath xmlns:m="http://schemas.openxmlformats.org/officeDocument/2006/math">
+                      <m:r>
+                        <a:rPr lang="en-US" b="0" i="1" smtClean="0">
+                          <a:latin typeface="Cambria Math" panose="02040503050406030204" pitchFamily="18" charset="0"/>
+                        </a:rPr>
+                        <m:t>𝑑</m:t>
+                      </m:r>
+                      <m:r>
+                        <a:rPr lang="en-US" b="0" i="1" smtClean="0">
+                          <a:latin typeface="Cambria Math" panose="02040503050406030204" pitchFamily="18" charset="0"/>
+                        </a:rPr>
+                        <m:t>⋅</m:t>
+                      </m:r>
+                      <m:acc>
+                        <m:accPr>
+                          <m:chr m:val="̂"/>
+                          <m:ctrlPr>
+                            <a:rPr lang="en-US" b="0" i="1" smtClean="0">
+                              <a:latin typeface="Cambria Math" panose="02040503050406030204" pitchFamily="18" charset="0"/>
+                            </a:rPr>
+                          </m:ctrlPr>
+                        </m:accPr>
+                        <m:e>
+                          <m:sSub>
+                            <m:sSubPr>
+                              <m:ctrlPr>
+                                <a:rPr lang="en-US" i="1">
+                                  <a:latin typeface="Cambria Math" panose="02040503050406030204" pitchFamily="18" charset="0"/>
+                                </a:rPr>
+                              </m:ctrlPr>
+                            </m:sSubPr>
+                            <m:e>
+                              <m:r>
+                                <a:rPr lang="en-US" i="1">
+                                  <a:latin typeface="Cambria Math" panose="02040503050406030204" pitchFamily="18" charset="0"/>
+                                </a:rPr>
+                                <m:t>𝑣</m:t>
+                              </m:r>
+                            </m:e>
+                            <m:sub>
+                              <m:r>
+                                <a:rPr lang="en-US" i="1">
+                                  <a:latin typeface="Cambria Math" panose="02040503050406030204" pitchFamily="18" charset="0"/>
+                                </a:rPr>
+                                <m:t>𝑖</m:t>
+                              </m:r>
+                            </m:sub>
+                          </m:sSub>
+                        </m:e>
+                      </m:acc>
+                      <m:r>
+                        <a:rPr lang="en-US" b="0" i="1" smtClean="0">
+                          <a:latin typeface="Cambria Math" panose="02040503050406030204" pitchFamily="18" charset="0"/>
+                        </a:rPr>
+                        <m:t>⋅</m:t>
+                      </m:r>
+                      <m:acc>
+                        <m:accPr>
+                          <m:chr m:val="̂"/>
+                          <m:ctrlPr>
+                            <a:rPr lang="en-US" i="1">
+                              <a:latin typeface="Cambria Math" panose="02040503050406030204" pitchFamily="18" charset="0"/>
+                            </a:rPr>
+                          </m:ctrlPr>
+                        </m:accPr>
+                        <m:e>
+                          <m:sSub>
+                            <m:sSubPr>
+                              <m:ctrlPr>
+                                <a:rPr lang="en-US" i="1">
+                                  <a:latin typeface="Cambria Math" panose="02040503050406030204" pitchFamily="18" charset="0"/>
+                                </a:rPr>
+                              </m:ctrlPr>
+                            </m:sSubPr>
+                            <m:e>
+                              <m:r>
+                                <a:rPr lang="en-US" b="0" i="1" smtClean="0">
+                                  <a:latin typeface="Cambria Math" panose="02040503050406030204" pitchFamily="18" charset="0"/>
+                                </a:rPr>
+                                <m:t>𝑛</m:t>
+                              </m:r>
+                            </m:e>
+                            <m:sub>
+                              <m:r>
+                                <a:rPr lang="en-US" i="1">
+                                  <a:latin typeface="Cambria Math" panose="02040503050406030204" pitchFamily="18" charset="0"/>
+                                </a:rPr>
+                                <m:t>𝑖</m:t>
+                              </m:r>
+                            </m:sub>
+                          </m:sSub>
+                        </m:e>
+                      </m:acc>
+                      <m:r>
+                        <a:rPr lang="en-US" b="0" i="1" smtClean="0">
+                          <a:latin typeface="Cambria Math" panose="02040503050406030204" pitchFamily="18" charset="0"/>
+                        </a:rPr>
+                        <m:t>=1</m:t>
+                      </m:r>
+                    </m:oMath>
+                  </m:oMathPara>
+                </a14:m>
+                <a:endParaRPr lang="en-US" b="0" dirty="0"/>
+              </a:p>
+              <a:p>
+                <a:endParaRPr lang="en-US" b="0" dirty="0"/>
+              </a:p>
+              <a:p>
+                <a:pPr/>
+                <a14:m>
+                  <m:oMathPara xmlns:m="http://schemas.openxmlformats.org/officeDocument/2006/math">
+                    <m:oMathParaPr>
+                      <m:jc m:val="centerGroup"/>
+                    </m:oMathParaPr>
+                    <m:oMath xmlns:m="http://schemas.openxmlformats.org/officeDocument/2006/math">
+                      <m:r>
+                        <a:rPr lang="en-US" b="0" i="1" smtClean="0">
+                          <a:latin typeface="Cambria Math" panose="02040503050406030204" pitchFamily="18" charset="0"/>
+                        </a:rPr>
+                        <m:t>𝑑</m:t>
+                      </m:r>
+                      <m:r>
+                        <a:rPr lang="en-US" b="0" i="1" smtClean="0">
+                          <a:latin typeface="Cambria Math" panose="02040503050406030204" pitchFamily="18" charset="0"/>
+                        </a:rPr>
+                        <m:t>=1/(</m:t>
+                      </m:r>
+                      <m:acc>
+                        <m:accPr>
+                          <m:chr m:val="̂"/>
+                          <m:ctrlPr>
+                            <a:rPr lang="en-US" i="1">
+                              <a:latin typeface="Cambria Math" panose="02040503050406030204" pitchFamily="18" charset="0"/>
+                            </a:rPr>
+                          </m:ctrlPr>
+                        </m:accPr>
+                        <m:e>
+                          <m:sSub>
+                            <m:sSubPr>
+                              <m:ctrlPr>
+                                <a:rPr lang="en-US" i="1">
+                                  <a:latin typeface="Cambria Math" panose="02040503050406030204" pitchFamily="18" charset="0"/>
+                                </a:rPr>
+                              </m:ctrlPr>
+                            </m:sSubPr>
+                            <m:e>
+                              <m:r>
+                                <a:rPr lang="en-US" i="1">
+                                  <a:latin typeface="Cambria Math" panose="02040503050406030204" pitchFamily="18" charset="0"/>
+                                </a:rPr>
+                                <m:t>𝑣</m:t>
+                              </m:r>
+                            </m:e>
+                            <m:sub>
+                              <m:r>
+                                <a:rPr lang="en-US" i="1">
+                                  <a:latin typeface="Cambria Math" panose="02040503050406030204" pitchFamily="18" charset="0"/>
+                                </a:rPr>
+                                <m:t>𝑖</m:t>
+                              </m:r>
+                            </m:sub>
+                          </m:sSub>
+                        </m:e>
+                      </m:acc>
+                      <m:r>
+                        <a:rPr lang="en-US" i="1">
+                          <a:latin typeface="Cambria Math" panose="02040503050406030204" pitchFamily="18" charset="0"/>
+                        </a:rPr>
+                        <m:t>⋅</m:t>
+                      </m:r>
+                      <m:acc>
+                        <m:accPr>
+                          <m:chr m:val="̂"/>
+                          <m:ctrlPr>
+                            <a:rPr lang="en-US" i="1">
+                              <a:latin typeface="Cambria Math" panose="02040503050406030204" pitchFamily="18" charset="0"/>
+                            </a:rPr>
+                          </m:ctrlPr>
+                        </m:accPr>
+                        <m:e>
+                          <m:sSub>
+                            <m:sSubPr>
+                              <m:ctrlPr>
+                                <a:rPr lang="en-US" i="1">
+                                  <a:latin typeface="Cambria Math" panose="02040503050406030204" pitchFamily="18" charset="0"/>
+                                </a:rPr>
+                              </m:ctrlPr>
+                            </m:sSubPr>
+                            <m:e>
+                              <m:r>
+                                <a:rPr lang="en-US" i="1">
+                                  <a:latin typeface="Cambria Math" panose="02040503050406030204" pitchFamily="18" charset="0"/>
+                                </a:rPr>
+                                <m:t>𝑛</m:t>
+                              </m:r>
+                            </m:e>
+                            <m:sub>
+                              <m:r>
+                                <a:rPr lang="en-US" i="1">
+                                  <a:latin typeface="Cambria Math" panose="02040503050406030204" pitchFamily="18" charset="0"/>
+                                </a:rPr>
+                                <m:t>𝑖</m:t>
+                              </m:r>
+                            </m:sub>
+                          </m:sSub>
+                        </m:e>
+                      </m:acc>
+                      <m:r>
+                        <a:rPr lang="en-US" b="0" i="1" smtClean="0">
+                          <a:latin typeface="Cambria Math" panose="02040503050406030204" pitchFamily="18" charset="0"/>
+                        </a:rPr>
+                        <m:t>)</m:t>
+                      </m:r>
+                    </m:oMath>
+                  </m:oMathPara>
+                </a14:m>
+                <a:endParaRPr lang="en-US" b="0" dirty="0"/>
+              </a:p>
+              <a:p>
+                <a:endParaRPr lang="en-US" b="0" dirty="0"/>
+              </a:p>
+            </p:txBody>
+          </p:sp>
+        </mc:Choice>
+        <mc:Fallback xmlns="">
+          <p:sp>
+            <p:nvSpPr>
+              <p:cNvPr id="15" name="TextBox 14">
+                <a:extLst>
+                  <a:ext uri="{FF2B5EF4-FFF2-40B4-BE49-F238E27FC236}">
+                    <a16:creationId xmlns:a16="http://schemas.microsoft.com/office/drawing/2014/main" id="{A8DCD132-4A80-26FB-EEFD-F84BDEDA7607}"/>
+                  </a:ext>
+                </a:extLst>
+              </p:cNvPr>
+              <p:cNvSpPr txBox="1">
+                <a:spLocks noRot="1" noChangeAspect="1" noMove="1" noResize="1" noEditPoints="1" noAdjustHandles="1" noChangeArrowheads="1" noChangeShapeType="1" noTextEdit="1"/>
+              </p:cNvSpPr>
+              <p:nvPr/>
+            </p:nvSpPr>
+            <p:spPr>
+              <a:xfrm>
+                <a:off x="1572346" y="3846489"/>
+                <a:ext cx="2517962" cy="1216551"/>
+              </a:xfrm>
+              <a:prstGeom prst="rect">
+                <a:avLst/>
+              </a:prstGeom>
+              <a:blipFill>
+                <a:blip r:embed="rId5"/>
+                <a:stretch>
+                  <a:fillRect t="-2000"/>
+                </a:stretch>
+              </a:blipFill>
+            </p:spPr>
+            <p:txBody>
+              <a:bodyPr/>
+              <a:lstStyle/>
+              <a:p>
+                <a:r>
+                  <a:rPr lang="en-US">
+                    <a:noFill/>
+                  </a:rPr>
+                  <a:t> </a:t>
+                </a:r>
+              </a:p>
+            </p:txBody>
+          </p:sp>
+        </mc:Fallback>
+      </mc:AlternateContent>
+      <mc:AlternateContent xmlns:mc="http://schemas.openxmlformats.org/markup-compatibility/2006" xmlns:a14="http://schemas.microsoft.com/office/drawing/2010/main">
+        <mc:Choice Requires="a14">
+          <p:sp>
+            <p:nvSpPr>
+              <p:cNvPr id="17" name="TextBox 16">
+                <a:extLst>
+                  <a:ext uri="{FF2B5EF4-FFF2-40B4-BE49-F238E27FC236}">
+                    <a16:creationId xmlns:a16="http://schemas.microsoft.com/office/drawing/2014/main" id="{0E53E8ED-1630-652D-7FCC-14B6203C068F}"/>
+                  </a:ext>
+                </a:extLst>
+              </p:cNvPr>
+              <p:cNvSpPr txBox="1"/>
+              <p:nvPr/>
+            </p:nvSpPr>
+            <p:spPr>
+              <a:xfrm>
+                <a:off x="-215992" y="5345966"/>
+                <a:ext cx="6094638" cy="369332"/>
+              </a:xfrm>
+              <a:prstGeom prst="rect">
+                <a:avLst/>
+              </a:prstGeom>
+              <a:noFill/>
+            </p:spPr>
+            <p:txBody>
+              <a:bodyPr wrap="square">
+                <a:spAutoFit/>
+              </a:bodyPr>
+              <a:lstStyle/>
+              <a:p>
+                <a:pPr/>
+                <a14:m>
+                  <m:oMathPara xmlns:m="http://schemas.openxmlformats.org/officeDocument/2006/math">
+                    <m:oMathParaPr>
+                      <m:jc m:val="centerGroup"/>
+                    </m:oMathParaPr>
+                    <m:oMath xmlns:m="http://schemas.openxmlformats.org/officeDocument/2006/math">
+                      <m:sSub>
+                        <m:sSubPr>
+                          <m:ctrlPr>
+                            <a:rPr lang="en-US" sz="1800" b="0" i="1" smtClean="0">
+                              <a:latin typeface="Cambria Math" panose="02040503050406030204" pitchFamily="18" charset="0"/>
+                            </a:rPr>
+                          </m:ctrlPr>
+                        </m:sSubPr>
+                        <m:e>
+                          <m:r>
+                            <a:rPr lang="en-US" sz="1800" b="0" i="1" smtClean="0">
+                              <a:latin typeface="Cambria Math" panose="02040503050406030204" pitchFamily="18" charset="0"/>
+                            </a:rPr>
+                            <m:t>𝑣</m:t>
+                          </m:r>
+                        </m:e>
+                        <m:sub>
+                          <m:r>
+                            <a:rPr lang="en-US" sz="1800" b="0" i="1" smtClean="0">
+                              <a:latin typeface="Cambria Math" panose="02040503050406030204" pitchFamily="18" charset="0"/>
+                            </a:rPr>
+                            <m:t>𝑖</m:t>
+                          </m:r>
+                        </m:sub>
+                      </m:sSub>
+                      <m:r>
+                        <a:rPr lang="en-US" sz="1800" b="0" i="1" smtClean="0">
+                          <a:latin typeface="Cambria Math" panose="02040503050406030204" pitchFamily="18" charset="0"/>
+                        </a:rPr>
+                        <m:t>=</m:t>
+                      </m:r>
+                      <m:r>
+                        <a:rPr lang="en-US" sz="1800" b="0" i="1" smtClean="0">
+                          <a:latin typeface="Cambria Math" panose="02040503050406030204" pitchFamily="18" charset="0"/>
+                        </a:rPr>
+                        <m:t>𝑑</m:t>
+                      </m:r>
+                      <m:r>
+                        <a:rPr lang="en-US" sz="1800" b="0" i="1" smtClean="0">
+                          <a:latin typeface="Cambria Math" panose="02040503050406030204" pitchFamily="18" charset="0"/>
+                        </a:rPr>
+                        <m:t>⋅</m:t>
+                      </m:r>
+                      <m:acc>
+                        <m:accPr>
+                          <m:chr m:val="̂"/>
+                          <m:ctrlPr>
+                            <a:rPr lang="en-US" sz="1800" b="0" i="1" smtClean="0">
+                              <a:latin typeface="Cambria Math" panose="02040503050406030204" pitchFamily="18" charset="0"/>
+                            </a:rPr>
+                          </m:ctrlPr>
+                        </m:accPr>
+                        <m:e>
+                          <m:sSub>
+                            <m:sSubPr>
+                              <m:ctrlPr>
+                                <a:rPr lang="en-US" sz="1800" i="1">
+                                  <a:latin typeface="Cambria Math" panose="02040503050406030204" pitchFamily="18" charset="0"/>
+                                </a:rPr>
+                              </m:ctrlPr>
+                            </m:sSubPr>
+                            <m:e>
+                              <m:r>
+                                <a:rPr lang="en-US" sz="1800" i="1">
+                                  <a:latin typeface="Cambria Math" panose="02040503050406030204" pitchFamily="18" charset="0"/>
+                                </a:rPr>
+                                <m:t>𝑣</m:t>
+                              </m:r>
+                            </m:e>
+                            <m:sub>
+                              <m:r>
+                                <a:rPr lang="en-US" sz="1800" i="1">
+                                  <a:latin typeface="Cambria Math" panose="02040503050406030204" pitchFamily="18" charset="0"/>
+                                </a:rPr>
+                                <m:t>𝑖</m:t>
+                              </m:r>
+                            </m:sub>
+                          </m:sSub>
+                        </m:e>
+                      </m:acc>
+                    </m:oMath>
+                  </m:oMathPara>
+                </a14:m>
+                <a:endParaRPr lang="en-US" dirty="0"/>
+              </a:p>
+            </p:txBody>
+          </p:sp>
+        </mc:Choice>
+        <mc:Fallback xmlns="">
+          <p:sp>
+            <p:nvSpPr>
+              <p:cNvPr id="17" name="TextBox 16">
+                <a:extLst>
+                  <a:ext uri="{FF2B5EF4-FFF2-40B4-BE49-F238E27FC236}">
+                    <a16:creationId xmlns:a16="http://schemas.microsoft.com/office/drawing/2014/main" id="{0E53E8ED-1630-652D-7FCC-14B6203C068F}"/>
+                  </a:ext>
+                </a:extLst>
+              </p:cNvPr>
+              <p:cNvSpPr txBox="1">
+                <a:spLocks noRot="1" noChangeAspect="1" noMove="1" noResize="1" noEditPoints="1" noAdjustHandles="1" noChangeArrowheads="1" noChangeShapeType="1" noTextEdit="1"/>
+              </p:cNvSpPr>
+              <p:nvPr/>
+            </p:nvSpPr>
+            <p:spPr>
+              <a:xfrm>
+                <a:off x="-215992" y="5345966"/>
+                <a:ext cx="6094638" cy="369332"/>
+              </a:xfrm>
+              <a:prstGeom prst="rect">
+                <a:avLst/>
+              </a:prstGeom>
+              <a:blipFill>
+                <a:blip r:embed="rId6"/>
+                <a:stretch>
+                  <a:fillRect t="-6557"/>
+                </a:stretch>
+              </a:blipFill>
+            </p:spPr>
+            <p:txBody>
+              <a:bodyPr/>
+              <a:lstStyle/>
+              <a:p>
+                <a:r>
+                  <a:rPr lang="en-US">
+                    <a:noFill/>
+                  </a:rPr>
+                  <a:t> </a:t>
+                </a:r>
+              </a:p>
+            </p:txBody>
+          </p:sp>
+        </mc:Fallback>
+      </mc:AlternateContent>
+    </p:spTree>
+    <p:extLst>
+      <p:ext uri="{BB962C8B-B14F-4D97-AF65-F5344CB8AC3E}">
+        <p14:creationId xmlns:p14="http://schemas.microsoft.com/office/powerpoint/2010/main" val="3903472698"/>
+      </p:ext>
+    </p:extLst>
+  </p:cSld>
+  <p:clrMapOvr>
+    <a:masterClrMapping/>
+  </p:clrMapOvr>
+</p:sld>
+</file>
+
+<file path=ppt/slides/slide26.xml><?xml version="1.0" encoding="utf-8"?>
+<p:sld xmlns:a="http://schemas.openxmlformats.org/drawingml/2006/main" xmlns:r="http://schemas.openxmlformats.org/officeDocument/2006/relationships" xmlns:p="http://schemas.openxmlformats.org/presentationml/2006/main">
+  <p:cSld>
+    <p:spTree>
+      <p:nvGrpSpPr>
+        <p:cNvPr id="1" name=""/>
+        <p:cNvGrpSpPr/>
+        <p:nvPr/>
+      </p:nvGrpSpPr>
+      <p:grpSpPr>
+        <a:xfrm>
+          <a:off x="0" y="0"/>
+          <a:ext cx="0" cy="0"/>
+          <a:chOff x="0" y="0"/>
+          <a:chExt cx="0" cy="0"/>
+        </a:xfrm>
+      </p:grpSpPr>
+      <p:sp>
+        <p:nvSpPr>
+          <p:cNvPr id="2" name="Title 1">
+            <a:extLst>
+              <a:ext uri="{FF2B5EF4-FFF2-40B4-BE49-F238E27FC236}">
+                <a16:creationId xmlns:a16="http://schemas.microsoft.com/office/drawing/2014/main" id="{EB0AD418-3698-1169-7A54-6B0EE3336504}"/>
+              </a:ext>
+            </a:extLst>
+          </p:cNvPr>
+          <p:cNvSpPr>
+            <a:spLocks noGrp="1"/>
+          </p:cNvSpPr>
+          <p:nvPr>
+            <p:ph type="title"/>
+          </p:nvPr>
+        </p:nvSpPr>
+        <p:spPr/>
+        <p:txBody>
+          <a:bodyPr/>
+          <a:lstStyle/>
+          <a:p>
+            <a:r>
+              <a:rPr lang="en-US" dirty="0"/>
+              <a:t>Some example results from Step 1</a:t>
+            </a:r>
+          </a:p>
+        </p:txBody>
+      </p:sp>
+      <p:pic>
+        <p:nvPicPr>
+          <p:cNvPr id="5" name="Picture 4">
+            <a:extLst>
+              <a:ext uri="{FF2B5EF4-FFF2-40B4-BE49-F238E27FC236}">
+                <a16:creationId xmlns:a16="http://schemas.microsoft.com/office/drawing/2014/main" id="{0CD27793-6947-92FD-C529-A35B314F6A2B}"/>
+              </a:ext>
+            </a:extLst>
+          </p:cNvPr>
+          <p:cNvPicPr>
+            <a:picLocks noChangeAspect="1"/>
+          </p:cNvPicPr>
+          <p:nvPr/>
+        </p:nvPicPr>
+        <p:blipFill>
+          <a:blip r:embed="rId2"/>
+          <a:stretch>
+            <a:fillRect/>
+          </a:stretch>
+        </p:blipFill>
+        <p:spPr>
+          <a:xfrm>
+            <a:off x="4171950" y="2237015"/>
+            <a:ext cx="5334000" cy="4000500"/>
+          </a:xfrm>
+          <a:prstGeom prst="rect">
+            <a:avLst/>
+          </a:prstGeom>
+        </p:spPr>
+      </p:pic>
+    </p:spTree>
+    <p:extLst>
+      <p:ext uri="{BB962C8B-B14F-4D97-AF65-F5344CB8AC3E}">
+        <p14:creationId xmlns:p14="http://schemas.microsoft.com/office/powerpoint/2010/main" val="3807234391"/>
+      </p:ext>
+    </p:extLst>
+  </p:cSld>
+  <p:clrMapOvr>
+    <a:masterClrMapping/>
+  </p:clrMapOvr>
+</p:sld>
+</file>
+
+<file path=ppt/slides/slide27.xml><?xml version="1.0" encoding="utf-8"?>
 <p:sld xmlns:a="http://schemas.openxmlformats.org/drawingml/2006/main" xmlns:r="http://schemas.openxmlformats.org/officeDocument/2006/relationships" xmlns:p="http://schemas.openxmlformats.org/presentationml/2006/main">
   <p:cSld>
     <p:spTree>
@@ -9411,8 +10877,8 @@
           </p:sp>
         </mc:Fallback>
       </mc:AlternateContent>
-      <mc:AlternateContent xmlns:mc="http://schemas.openxmlformats.org/markup-compatibility/2006">
-        <mc:Choice xmlns:a14="http://schemas.microsoft.com/office/drawing/2010/main" Requires="a14">
+      <mc:AlternateContent xmlns:mc="http://schemas.openxmlformats.org/markup-compatibility/2006" xmlns:a14="http://schemas.microsoft.com/office/drawing/2010/main">
+        <mc:Choice Requires="a14">
           <p:sp>
             <p:nvSpPr>
               <p:cNvPr id="35" name="TextBox 34">
@@ -9733,7 +11199,7 @@
             </p:txBody>
           </p:sp>
         </mc:Choice>
-        <mc:Fallback>
+        <mc:Fallback xmlns="">
           <p:sp>
             <p:nvSpPr>
               <p:cNvPr id="35" name="TextBox 34">
@@ -9873,7 +11339,7 @@
 </p:sld>
 </file>
 
-<file path=ppt/slides/slide26.xml><?xml version="1.0" encoding="utf-8"?>
+<file path=ppt/slides/slide28.xml><?xml version="1.0" encoding="utf-8"?>
 <p:sld xmlns:a="http://schemas.openxmlformats.org/drawingml/2006/main" xmlns:r="http://schemas.openxmlformats.org/officeDocument/2006/relationships" xmlns:p="http://schemas.openxmlformats.org/presentationml/2006/main">
   <p:cSld>
     <p:spTree>
@@ -9998,8 +11464,8 @@
           </a:p>
         </p:txBody>
       </p:sp>
-      <mc:AlternateContent xmlns:mc="http://schemas.openxmlformats.org/markup-compatibility/2006">
-        <mc:Choice xmlns:a14="http://schemas.microsoft.com/office/drawing/2010/main" Requires="a14">
+      <mc:AlternateContent xmlns:mc="http://schemas.openxmlformats.org/markup-compatibility/2006" xmlns:a14="http://schemas.microsoft.com/office/drawing/2010/main">
+        <mc:Choice Requires="a14">
           <p:sp>
             <p:nvSpPr>
               <p:cNvPr id="4" name="TextBox 3">
@@ -10315,6 +11781,7 @@
                 <a:endParaRPr lang="en-US" b="0" dirty="0"/>
               </a:p>
               <a:p>
+                <a:pPr/>
                 <a14:m>
                   <m:oMathPara xmlns:m="http://schemas.openxmlformats.org/officeDocument/2006/math">
                     <m:oMathParaPr>
@@ -10618,6 +12085,7 @@
                 <a:endParaRPr lang="en-US" b="0" dirty="0"/>
               </a:p>
               <a:p>
+                <a:pPr/>
                 <a14:m>
                   <m:oMathPara xmlns:m="http://schemas.openxmlformats.org/officeDocument/2006/math">
                     <m:oMathParaPr>
@@ -10947,6 +12415,7 @@
                 <a:endParaRPr lang="en-US" b="0" dirty="0"/>
               </a:p>
               <a:p>
+                <a:pPr/>
                 <a14:m>
                   <m:oMathPara xmlns:m="http://schemas.openxmlformats.org/officeDocument/2006/math">
                     <m:oMathParaPr>
@@ -11264,6 +12733,7 @@
                 <a:endParaRPr lang="en-US" b="0" dirty="0"/>
               </a:p>
               <a:p>
+                <a:pPr/>
                 <a14:m>
                   <m:oMathPara xmlns:m="http://schemas.openxmlformats.org/officeDocument/2006/math">
                     <m:oMathParaPr>
@@ -11538,6 +13008,7 @@
                 <a:endParaRPr lang="en-US" b="0" dirty="0"/>
               </a:p>
               <a:p>
+                <a:pPr/>
                 <a14:m>
                   <m:oMathPara xmlns:m="http://schemas.openxmlformats.org/officeDocument/2006/math">
                     <m:oMathParaPr>
@@ -11822,7 +13293,6 @@
                 <a:endParaRPr lang="en-US" b="0" dirty="0"/>
               </a:p>
               <a:p>
-                <a:pPr/>
                 <a:endParaRPr lang="en-US" b="0" dirty="0"/>
               </a:p>
               <a:p>
@@ -11831,7 +13301,7 @@
             </p:txBody>
           </p:sp>
         </mc:Choice>
-        <mc:Fallback>
+        <mc:Fallback xmlns="">
           <p:sp>
             <p:nvSpPr>
               <p:cNvPr id="4" name="TextBox 3">
@@ -11876,8 +13346,8 @@
           </p:sp>
         </mc:Fallback>
       </mc:AlternateContent>
-      <mc:AlternateContent xmlns:mc="http://schemas.openxmlformats.org/markup-compatibility/2006">
-        <mc:Choice xmlns:a14="http://schemas.microsoft.com/office/drawing/2010/main" Requires="a14">
+      <mc:AlternateContent xmlns:mc="http://schemas.openxmlformats.org/markup-compatibility/2006" xmlns:a14="http://schemas.microsoft.com/office/drawing/2010/main">
+        <mc:Choice Requires="a14">
           <p:sp>
             <p:nvSpPr>
               <p:cNvPr id="6" name="TextBox 5">
@@ -12044,7 +13514,7 @@
             </p:txBody>
           </p:sp>
         </mc:Choice>
-        <mc:Fallback>
+        <mc:Fallback xmlns="">
           <p:sp>
             <p:nvSpPr>
               <p:cNvPr id="6" name="TextBox 5">
@@ -12102,7 +13572,7 @@
 </p:sld>
 </file>
 
-<file path=ppt/slides/slide27.xml><?xml version="1.0" encoding="utf-8"?>
+<file path=ppt/slides/slide29.xml><?xml version="1.0" encoding="utf-8"?>
 <p:sld xmlns:a="http://schemas.openxmlformats.org/drawingml/2006/main" xmlns:r="http://schemas.openxmlformats.org/officeDocument/2006/relationships" xmlns:p="http://schemas.openxmlformats.org/presentationml/2006/main">
   <p:cSld>
     <p:spTree>
@@ -13141,7 +14611,649 @@
 </p:sld>
 </file>
 
-<file path=ppt/slides/slide28.xml><?xml version="1.0" encoding="utf-8"?>
+<file path=ppt/slides/slide3.xml><?xml version="1.0" encoding="utf-8"?>
+<p:sld xmlns:a="http://schemas.openxmlformats.org/drawingml/2006/main" xmlns:r="http://schemas.openxmlformats.org/officeDocument/2006/relationships" xmlns:p="http://schemas.openxmlformats.org/presentationml/2006/main">
+  <p:cSld>
+    <p:spTree>
+      <p:nvGrpSpPr>
+        <p:cNvPr id="1" name=""/>
+        <p:cNvGrpSpPr/>
+        <p:nvPr/>
+      </p:nvGrpSpPr>
+      <p:grpSpPr>
+        <a:xfrm>
+          <a:off x="0" y="0"/>
+          <a:ext cx="0" cy="0"/>
+          <a:chOff x="0" y="0"/>
+          <a:chExt cx="0" cy="0"/>
+        </a:xfrm>
+      </p:grpSpPr>
+      <p:sp>
+        <p:nvSpPr>
+          <p:cNvPr id="2" name="Title 1">
+            <a:extLst>
+              <a:ext uri="{FF2B5EF4-FFF2-40B4-BE49-F238E27FC236}">
+                <a16:creationId xmlns:a16="http://schemas.microsoft.com/office/drawing/2014/main" id="{F61BB289-6F7D-4E26-9549-A418B0B98DBB}"/>
+              </a:ext>
+            </a:extLst>
+          </p:cNvPr>
+          <p:cNvSpPr>
+            <a:spLocks noGrp="1"/>
+          </p:cNvSpPr>
+          <p:nvPr>
+            <p:ph type="title"/>
+          </p:nvPr>
+        </p:nvSpPr>
+        <p:spPr/>
+        <p:txBody>
+          <a:bodyPr>
+            <a:normAutofit/>
+          </a:bodyPr>
+          <a:lstStyle/>
+          <a:p>
+            <a:r>
+              <a:rPr lang="en-US" dirty="0"/>
+              <a:t>Each function uses a class-specific argument check function</a:t>
+            </a:r>
+          </a:p>
+        </p:txBody>
+      </p:sp>
+      <p:sp>
+        <p:nvSpPr>
+          <p:cNvPr id="5" name="Rectangle 4">
+            <a:extLst>
+              <a:ext uri="{FF2B5EF4-FFF2-40B4-BE49-F238E27FC236}">
+                <a16:creationId xmlns:a16="http://schemas.microsoft.com/office/drawing/2014/main" id="{F0CB9B29-E4C5-4A4F-9118-99BC76FA2AD9}"/>
+              </a:ext>
+            </a:extLst>
+          </p:cNvPr>
+          <p:cNvSpPr/>
+          <p:nvPr/>
+        </p:nvSpPr>
+        <p:spPr>
+          <a:xfrm>
+            <a:off x="374433" y="2022133"/>
+            <a:ext cx="5909136" cy="3554819"/>
+          </a:xfrm>
+          <a:prstGeom prst="rect">
+            <a:avLst/>
+          </a:prstGeom>
+          <a:solidFill>
+            <a:schemeClr val="accent4">
+              <a:lumMod val="20000"/>
+              <a:lumOff val="80000"/>
+            </a:schemeClr>
+          </a:solidFill>
+        </p:spPr>
+        <p:txBody>
+          <a:bodyPr wrap="square">
+            <a:spAutoFit/>
+          </a:bodyPr>
+          <a:lstStyle/>
+          <a:p>
+            <a:r>
+              <a:rPr lang="en-US" sz="900" dirty="0">
+                <a:solidFill>
+                  <a:srgbClr val="0E00FF"/>
+                </a:solidFill>
+                <a:latin typeface="Courier New" panose="02070309020205020404" pitchFamily="49" charset="0"/>
+              </a:rPr>
+              <a:t>function</a:t>
+            </a:r>
+            <a:r>
+              <a:rPr lang="en-US" sz="900" dirty="0">
+                <a:solidFill>
+                  <a:srgbClr val="000000"/>
+                </a:solidFill>
+                <a:latin typeface="Courier New" panose="02070309020205020404" pitchFamily="49" charset="0"/>
+              </a:rPr>
+              <a:t> </a:t>
+            </a:r>
+            <a:r>
+              <a:rPr lang="en-US" sz="900" dirty="0" err="1">
+                <a:solidFill>
+                  <a:srgbClr val="000000"/>
+                </a:solidFill>
+                <a:latin typeface="Courier New" panose="02070309020205020404" pitchFamily="49" charset="0"/>
+              </a:rPr>
+              <a:t>fcn_MapGen_checkInputsToFunctions</a:t>
+            </a:r>
+            <a:r>
+              <a:rPr lang="en-US" sz="900" dirty="0">
+                <a:solidFill>
+                  <a:srgbClr val="000000"/>
+                </a:solidFill>
+                <a:latin typeface="Courier New" panose="02070309020205020404" pitchFamily="49" charset="0"/>
+              </a:rPr>
+              <a:t>(</a:t>
+            </a:r>
+            <a:r>
+              <a:rPr lang="en-US" sz="900" dirty="0">
+                <a:solidFill>
+                  <a:srgbClr val="0E00FF"/>
+                </a:solidFill>
+                <a:latin typeface="Courier New" panose="02070309020205020404" pitchFamily="49" charset="0"/>
+              </a:rPr>
+              <a:t>...</a:t>
+            </a:r>
+          </a:p>
+          <a:p>
+            <a:r>
+              <a:rPr lang="en-US" sz="900" dirty="0">
+                <a:solidFill>
+                  <a:srgbClr val="000000"/>
+                </a:solidFill>
+                <a:latin typeface="Courier New" panose="02070309020205020404" pitchFamily="49" charset="0"/>
+              </a:rPr>
+              <a:t>    </a:t>
+            </a:r>
+            <a:r>
+              <a:rPr lang="en-US" sz="900" dirty="0" err="1">
+                <a:solidFill>
+                  <a:srgbClr val="000000"/>
+                </a:solidFill>
+                <a:latin typeface="Courier New" panose="02070309020205020404" pitchFamily="49" charset="0"/>
+              </a:rPr>
+              <a:t>variable,variable_type_string,varargin</a:t>
+            </a:r>
+            <a:r>
+              <a:rPr lang="en-US" sz="900" dirty="0">
+                <a:solidFill>
+                  <a:srgbClr val="000000"/>
+                </a:solidFill>
+                <a:latin typeface="Courier New" panose="02070309020205020404" pitchFamily="49" charset="0"/>
+              </a:rPr>
+              <a:t>)</a:t>
+            </a:r>
+          </a:p>
+          <a:p>
+            <a:r>
+              <a:rPr lang="en-US" sz="900" dirty="0">
+                <a:solidFill>
+                  <a:srgbClr val="000000"/>
+                </a:solidFill>
+                <a:latin typeface="Courier New" panose="02070309020205020404" pitchFamily="49" charset="0"/>
+              </a:rPr>
+              <a:t> </a:t>
+            </a:r>
+          </a:p>
+          <a:p>
+            <a:r>
+              <a:rPr lang="en-US" sz="900" dirty="0">
+                <a:solidFill>
+                  <a:srgbClr val="028009"/>
+                </a:solidFill>
+                <a:latin typeface="Courier New" panose="02070309020205020404" pitchFamily="49" charset="0"/>
+              </a:rPr>
+              <a:t>% </a:t>
+            </a:r>
+            <a:r>
+              <a:rPr lang="en-US" sz="900" dirty="0" err="1">
+                <a:solidFill>
+                  <a:srgbClr val="028009"/>
+                </a:solidFill>
+                <a:latin typeface="Courier New" panose="02070309020205020404" pitchFamily="49" charset="0"/>
+              </a:rPr>
+              <a:t>fcn_MapGen_checkInputsToFunctions</a:t>
+            </a:r>
+            <a:endParaRPr lang="en-US" sz="900" dirty="0">
+              <a:solidFill>
+                <a:srgbClr val="028009"/>
+              </a:solidFill>
+              <a:latin typeface="Courier New" panose="02070309020205020404" pitchFamily="49" charset="0"/>
+            </a:endParaRPr>
+          </a:p>
+          <a:p>
+            <a:r>
+              <a:rPr lang="en-US" sz="900" dirty="0">
+                <a:solidFill>
+                  <a:srgbClr val="028009"/>
+                </a:solidFill>
+                <a:latin typeface="Courier New" panose="02070309020205020404" pitchFamily="49" charset="0"/>
+              </a:rPr>
+              <a:t>% Checks the variable types commonly used in the </a:t>
+            </a:r>
+            <a:r>
+              <a:rPr lang="en-US" sz="900" dirty="0" err="1">
+                <a:solidFill>
+                  <a:srgbClr val="028009"/>
+                </a:solidFill>
+                <a:latin typeface="Courier New" panose="02070309020205020404" pitchFamily="49" charset="0"/>
+              </a:rPr>
+              <a:t>MapGen</a:t>
+            </a:r>
+            <a:r>
+              <a:rPr lang="en-US" sz="900" dirty="0">
+                <a:solidFill>
+                  <a:srgbClr val="028009"/>
+                </a:solidFill>
+                <a:latin typeface="Courier New" panose="02070309020205020404" pitchFamily="49" charset="0"/>
+              </a:rPr>
+              <a:t> codes to</a:t>
+            </a:r>
+          </a:p>
+          <a:p>
+            <a:r>
+              <a:rPr lang="en-US" sz="900" dirty="0">
+                <a:solidFill>
+                  <a:srgbClr val="028009"/>
+                </a:solidFill>
+                <a:latin typeface="Courier New" panose="02070309020205020404" pitchFamily="49" charset="0"/>
+              </a:rPr>
+              <a:t>% ensure they are correctly formed.</a:t>
+            </a:r>
+          </a:p>
+          <a:p>
+            <a:r>
+              <a:rPr lang="en-US" sz="900" dirty="0">
+                <a:solidFill>
+                  <a:srgbClr val="028009"/>
+                </a:solidFill>
+                <a:latin typeface="Courier New" panose="02070309020205020404" pitchFamily="49" charset="0"/>
+              </a:rPr>
+              <a:t>%</a:t>
+            </a:r>
+          </a:p>
+          <a:p>
+            <a:r>
+              <a:rPr lang="en-US" sz="900" dirty="0">
+                <a:solidFill>
+                  <a:srgbClr val="028009"/>
+                </a:solidFill>
+                <a:latin typeface="Courier New" panose="02070309020205020404" pitchFamily="49" charset="0"/>
+              </a:rPr>
+              <a:t>% This function is typically called at the top of most functions. The input</a:t>
+            </a:r>
+          </a:p>
+          <a:p>
+            <a:r>
+              <a:rPr lang="en-US" sz="900" dirty="0">
+                <a:solidFill>
+                  <a:srgbClr val="028009"/>
+                </a:solidFill>
+                <a:latin typeface="Courier New" panose="02070309020205020404" pitchFamily="49" charset="0"/>
+              </a:rPr>
+              <a:t>% is a variable and a string defining the "type" of the variable. This</a:t>
+            </a:r>
+          </a:p>
+          <a:p>
+            <a:r>
+              <a:rPr lang="en-US" sz="900" dirty="0">
+                <a:solidFill>
+                  <a:srgbClr val="028009"/>
+                </a:solidFill>
+                <a:latin typeface="Courier New" panose="02070309020205020404" pitchFamily="49" charset="0"/>
+              </a:rPr>
+              <a:t>% function checks to see that they are compatible. For example, say there</a:t>
+            </a:r>
+          </a:p>
+          <a:p>
+            <a:r>
+              <a:rPr lang="en-US" sz="900" dirty="0">
+                <a:solidFill>
+                  <a:srgbClr val="028009"/>
+                </a:solidFill>
+                <a:latin typeface="Courier New" panose="02070309020205020404" pitchFamily="49" charset="0"/>
+              </a:rPr>
+              <a:t>% '</a:t>
+            </a:r>
+            <a:r>
+              <a:rPr lang="en-US" sz="900" dirty="0" err="1">
+                <a:solidFill>
+                  <a:srgbClr val="028009"/>
+                </a:solidFill>
+                <a:latin typeface="Courier New" panose="02070309020205020404" pitchFamily="49" charset="0"/>
+              </a:rPr>
+              <a:t>column_vector</a:t>
+            </a:r>
+            <a:r>
+              <a:rPr lang="en-US" sz="900" dirty="0">
+                <a:solidFill>
+                  <a:srgbClr val="028009"/>
+                </a:solidFill>
+                <a:latin typeface="Courier New" panose="02070309020205020404" pitchFamily="49" charset="0"/>
+              </a:rPr>
+              <a:t>' type of variables used in the function that is always a N</a:t>
+            </a:r>
+          </a:p>
+          <a:p>
+            <a:r>
+              <a:rPr lang="en-US" sz="900" dirty="0">
+                <a:solidFill>
+                  <a:srgbClr val="028009"/>
+                </a:solidFill>
+                <a:latin typeface="Courier New" panose="02070309020205020404" pitchFamily="49" charset="0"/>
+              </a:rPr>
+              <a:t>% x 1 array; if someone had a variable called "</a:t>
+            </a:r>
+            <a:r>
+              <a:rPr lang="en-US" sz="900" dirty="0" err="1">
+                <a:solidFill>
+                  <a:srgbClr val="028009"/>
+                </a:solidFill>
+                <a:latin typeface="Courier New" panose="02070309020205020404" pitchFamily="49" charset="0"/>
+              </a:rPr>
+              <a:t>test_example</a:t>
+            </a:r>
+            <a:r>
+              <a:rPr lang="en-US" sz="900" dirty="0">
+                <a:solidFill>
+                  <a:srgbClr val="028009"/>
+                </a:solidFill>
+                <a:latin typeface="Courier New" panose="02070309020205020404" pitchFamily="49" charset="0"/>
+              </a:rPr>
+              <a:t>", they could</a:t>
+            </a:r>
+          </a:p>
+          <a:p>
+            <a:r>
+              <a:rPr lang="en-US" sz="900" dirty="0">
+                <a:solidFill>
+                  <a:srgbClr val="028009"/>
+                </a:solidFill>
+                <a:latin typeface="Courier New" panose="02070309020205020404" pitchFamily="49" charset="0"/>
+              </a:rPr>
+              <a:t>% check that this fit the '</a:t>
+            </a:r>
+            <a:r>
+              <a:rPr lang="en-US" sz="900" dirty="0" err="1">
+                <a:solidFill>
+                  <a:srgbClr val="028009"/>
+                </a:solidFill>
+                <a:latin typeface="Courier New" panose="02070309020205020404" pitchFamily="49" charset="0"/>
+              </a:rPr>
+              <a:t>column_vector</a:t>
+            </a:r>
+            <a:r>
+              <a:rPr lang="en-US" sz="900" dirty="0">
+                <a:solidFill>
+                  <a:srgbClr val="028009"/>
+                </a:solidFill>
+                <a:latin typeface="Courier New" panose="02070309020205020404" pitchFamily="49" charset="0"/>
+              </a:rPr>
+              <a:t>' type by calling</a:t>
+            </a:r>
+          </a:p>
+          <a:p>
+            <a:r>
+              <a:rPr lang="en-US" sz="900" dirty="0">
+                <a:solidFill>
+                  <a:srgbClr val="028009"/>
+                </a:solidFill>
+                <a:latin typeface="Courier New" panose="02070309020205020404" pitchFamily="49" charset="0"/>
+              </a:rPr>
+              <a:t>% </a:t>
+            </a:r>
+            <a:r>
+              <a:rPr lang="en-US" sz="900" dirty="0" err="1">
+                <a:solidFill>
+                  <a:srgbClr val="028009"/>
+                </a:solidFill>
+                <a:latin typeface="Courier New" panose="02070309020205020404" pitchFamily="49" charset="0"/>
+              </a:rPr>
+              <a:t>fcn_MapGen_checkInputsToFunctions</a:t>
+            </a:r>
+            <a:r>
+              <a:rPr lang="en-US" sz="900" dirty="0">
+                <a:solidFill>
+                  <a:srgbClr val="028009"/>
+                </a:solidFill>
+                <a:latin typeface="Courier New" panose="02070309020205020404" pitchFamily="49" charset="0"/>
+              </a:rPr>
+              <a:t>(test_example,'</a:t>
+            </a:r>
+            <a:r>
+              <a:rPr lang="en-US" sz="900" dirty="0" err="1">
+                <a:solidFill>
+                  <a:srgbClr val="028009"/>
+                </a:solidFill>
+                <a:latin typeface="Courier New" panose="02070309020205020404" pitchFamily="49" charset="0"/>
+              </a:rPr>
+              <a:t>column_vector</a:t>
+            </a:r>
+            <a:r>
+              <a:rPr lang="en-US" sz="900" dirty="0">
+                <a:solidFill>
+                  <a:srgbClr val="028009"/>
+                </a:solidFill>
+                <a:latin typeface="Courier New" panose="02070309020205020404" pitchFamily="49" charset="0"/>
+              </a:rPr>
+              <a:t>').</a:t>
+            </a:r>
+          </a:p>
+          <a:p>
+            <a:r>
+              <a:rPr lang="en-US" sz="900" dirty="0">
+                <a:solidFill>
+                  <a:srgbClr val="028009"/>
+                </a:solidFill>
+                <a:latin typeface="Courier New" panose="02070309020205020404" pitchFamily="49" charset="0"/>
+              </a:rPr>
+              <a:t>% This function would then check that the array was N x 1, and if it was</a:t>
+            </a:r>
+          </a:p>
+          <a:p>
+            <a:r>
+              <a:rPr lang="en-US" sz="900" dirty="0">
+                <a:solidFill>
+                  <a:srgbClr val="028009"/>
+                </a:solidFill>
+                <a:latin typeface="Courier New" panose="02070309020205020404" pitchFamily="49" charset="0"/>
+              </a:rPr>
+              <a:t>% not, it would send out an error warning.</a:t>
+            </a:r>
+          </a:p>
+          <a:p>
+            <a:r>
+              <a:rPr lang="en-US" sz="900" dirty="0">
+                <a:solidFill>
+                  <a:srgbClr val="028009"/>
+                </a:solidFill>
+                <a:latin typeface="Courier New" panose="02070309020205020404" pitchFamily="49" charset="0"/>
+              </a:rPr>
+              <a:t>%</a:t>
+            </a:r>
+          </a:p>
+          <a:p>
+            <a:r>
+              <a:rPr lang="en-US" sz="900" dirty="0">
+                <a:solidFill>
+                  <a:srgbClr val="028009"/>
+                </a:solidFill>
+                <a:latin typeface="Courier New" panose="02070309020205020404" pitchFamily="49" charset="0"/>
+              </a:rPr>
+              <a:t>% FORMAT:</a:t>
+            </a:r>
+          </a:p>
+          <a:p>
+            <a:r>
+              <a:rPr lang="en-US" sz="900" dirty="0">
+                <a:solidFill>
+                  <a:srgbClr val="028009"/>
+                </a:solidFill>
+                <a:latin typeface="Courier New" panose="02070309020205020404" pitchFamily="49" charset="0"/>
+              </a:rPr>
+              <a:t>%</a:t>
+            </a:r>
+          </a:p>
+          <a:p>
+            <a:r>
+              <a:rPr lang="en-US" sz="900" dirty="0">
+                <a:solidFill>
+                  <a:srgbClr val="028009"/>
+                </a:solidFill>
+                <a:latin typeface="Courier New" panose="02070309020205020404" pitchFamily="49" charset="0"/>
+              </a:rPr>
+              <a:t>%      </a:t>
+            </a:r>
+            <a:r>
+              <a:rPr lang="en-US" sz="900" dirty="0" err="1">
+                <a:solidFill>
+                  <a:srgbClr val="028009"/>
+                </a:solidFill>
+                <a:latin typeface="Courier New" panose="02070309020205020404" pitchFamily="49" charset="0"/>
+              </a:rPr>
+              <a:t>fcn_MapGen_checkInputsToFunctions</a:t>
+            </a:r>
+            <a:r>
+              <a:rPr lang="en-US" sz="900" dirty="0">
+                <a:solidFill>
+                  <a:srgbClr val="028009"/>
+                </a:solidFill>
+                <a:latin typeface="Courier New" panose="02070309020205020404" pitchFamily="49" charset="0"/>
+              </a:rPr>
+              <a:t>(...</a:t>
+            </a:r>
+          </a:p>
+          <a:p>
+            <a:r>
+              <a:rPr lang="en-US" sz="900" dirty="0">
+                <a:solidFill>
+                  <a:srgbClr val="028009"/>
+                </a:solidFill>
+                <a:latin typeface="Courier New" panose="02070309020205020404" pitchFamily="49" charset="0"/>
+              </a:rPr>
+              <a:t>%      </a:t>
+            </a:r>
+            <a:r>
+              <a:rPr lang="en-US" sz="900" dirty="0" err="1">
+                <a:solidFill>
+                  <a:srgbClr val="028009"/>
+                </a:solidFill>
+                <a:latin typeface="Courier New" panose="02070309020205020404" pitchFamily="49" charset="0"/>
+              </a:rPr>
+              <a:t>variable,variable_type_string</a:t>
+            </a:r>
+            <a:r>
+              <a:rPr lang="en-US" sz="900" dirty="0">
+                <a:solidFill>
+                  <a:srgbClr val="028009"/>
+                </a:solidFill>
+                <a:latin typeface="Courier New" panose="02070309020205020404" pitchFamily="49" charset="0"/>
+              </a:rPr>
+              <a:t>,(</a:t>
+            </a:r>
+            <a:r>
+              <a:rPr lang="en-US" sz="900" dirty="0" err="1">
+                <a:solidFill>
+                  <a:srgbClr val="028009"/>
+                </a:solidFill>
+                <a:latin typeface="Courier New" panose="02070309020205020404" pitchFamily="49" charset="0"/>
+              </a:rPr>
+              <a:t>optional_arguments</a:t>
+            </a:r>
+            <a:r>
+              <a:rPr lang="en-US" sz="900" dirty="0">
+                <a:solidFill>
+                  <a:srgbClr val="028009"/>
+                </a:solidFill>
+                <a:latin typeface="Courier New" panose="02070309020205020404" pitchFamily="49" charset="0"/>
+              </a:rPr>
+              <a:t>))</a:t>
+            </a:r>
+          </a:p>
+          <a:p>
+            <a:r>
+              <a:rPr lang="en-US" sz="900" dirty="0">
+                <a:solidFill>
+                  <a:srgbClr val="028009"/>
+                </a:solidFill>
+                <a:latin typeface="Courier New" panose="02070309020205020404" pitchFamily="49" charset="0"/>
+              </a:rPr>
+              <a:t>%</a:t>
+            </a:r>
+          </a:p>
+          <a:p>
+            <a:r>
+              <a:rPr lang="en-US" sz="900" dirty="0">
+                <a:solidFill>
+                  <a:srgbClr val="028009"/>
+                </a:solidFill>
+                <a:latin typeface="Courier New" panose="02070309020205020404" pitchFamily="49" charset="0"/>
+              </a:rPr>
+              <a:t>% INPUTS:</a:t>
+            </a:r>
+          </a:p>
+          <a:p>
+            <a:r>
+              <a:rPr lang="en-US" sz="900" dirty="0">
+                <a:solidFill>
+                  <a:srgbClr val="028009"/>
+                </a:solidFill>
+                <a:latin typeface="Courier New" panose="02070309020205020404" pitchFamily="49" charset="0"/>
+              </a:rPr>
+              <a:t>%</a:t>
+            </a:r>
+          </a:p>
+          <a:p>
+            <a:r>
+              <a:rPr lang="en-US" sz="900" dirty="0">
+                <a:solidFill>
+                  <a:srgbClr val="028009"/>
+                </a:solidFill>
+                <a:latin typeface="Courier New" panose="02070309020205020404" pitchFamily="49" charset="0"/>
+              </a:rPr>
+              <a:t>%      variable: the variable to check</a:t>
+            </a:r>
+          </a:p>
+        </p:txBody>
+      </p:sp>
+      <p:sp>
+        <p:nvSpPr>
+          <p:cNvPr id="3" name="Rectangle 2">
+            <a:extLst>
+              <a:ext uri="{FF2B5EF4-FFF2-40B4-BE49-F238E27FC236}">
+                <a16:creationId xmlns:a16="http://schemas.microsoft.com/office/drawing/2014/main" id="{75616B01-3EEF-43F9-B062-A030413183B5}"/>
+              </a:ext>
+            </a:extLst>
+          </p:cNvPr>
+          <p:cNvSpPr/>
+          <p:nvPr/>
+        </p:nvSpPr>
+        <p:spPr>
+          <a:xfrm>
+            <a:off x="3692063" y="6308209"/>
+            <a:ext cx="7414594" cy="369332"/>
+          </a:xfrm>
+          <a:prstGeom prst="rect">
+            <a:avLst/>
+          </a:prstGeom>
+        </p:spPr>
+        <p:txBody>
+          <a:bodyPr wrap="none">
+            <a:spAutoFit/>
+          </a:bodyPr>
+          <a:lstStyle/>
+          <a:p>
+            <a:r>
+              <a:rPr lang="en-US" dirty="0"/>
+              <a:t>See: </a:t>
+            </a:r>
+            <a:r>
+              <a:rPr lang="en-US" dirty="0" err="1"/>
+              <a:t>script_test_fcn_MapGen_checkInputsToFunctions.m</a:t>
+            </a:r>
+            <a:r>
+              <a:rPr lang="en-US" dirty="0"/>
+              <a:t> for example usages</a:t>
+            </a:r>
+          </a:p>
+        </p:txBody>
+      </p:sp>
+    </p:spTree>
+    <p:extLst>
+      <p:ext uri="{BB962C8B-B14F-4D97-AF65-F5344CB8AC3E}">
+        <p14:creationId xmlns:p14="http://schemas.microsoft.com/office/powerpoint/2010/main" val="3283178281"/>
+      </p:ext>
+    </p:extLst>
+  </p:cSld>
+  <p:clrMapOvr>
+    <a:masterClrMapping/>
+  </p:clrMapOvr>
+</p:sld>
+</file>
+
+<file path=ppt/slides/slide30.xml><?xml version="1.0" encoding="utf-8"?>
 <p:sld xmlns:a="http://schemas.openxmlformats.org/drawingml/2006/main" xmlns:r="http://schemas.openxmlformats.org/officeDocument/2006/relationships" xmlns:p="http://schemas.openxmlformats.org/presentationml/2006/main">
   <p:cSld>
     <p:spTree>
@@ -13210,7 +15322,7 @@
         </p:spPr>
         <p:txBody>
           <a:bodyPr>
-            <a:normAutofit/>
+            <a:normAutofit lnSpcReduction="10000"/>
           </a:bodyPr>
           <a:lstStyle/>
           <a:p>
@@ -13219,13 +15331,8 @@
             </a:pPr>
             <a:r>
               <a:rPr lang="en-US" dirty="0"/>
-              <a:t>The circle center, after it is found, can be projected in the opposite direction of the edge’s unit normal vector, by a radius distance. This projection MUST be on the edge for the point to </a:t>
-            </a:r>
-            <a:r>
-              <a:rPr lang="en-US"/>
-              <a:t>be valid.</a:t>
-            </a:r>
-            <a:endParaRPr lang="en-US" dirty="0"/>
+              <a:t>The circle center, after it is found, can be projected in the opposite direction of the edge’s unit normal vector, by a radius distance. This projection must either be on the edge for the point to be valid, or the projection must be inside of the “apex” triangle created by the vertex.</a:t>
+            </a:r>
           </a:p>
         </p:txBody>
       </p:sp>
@@ -14054,7 +16161,7 @@
 </p:sld>
 </file>
 
-<file path=ppt/slides/slide29.xml><?xml version="1.0" encoding="utf-8"?>
+<file path=ppt/slides/slide31.xml><?xml version="1.0" encoding="utf-8"?>
 <p:sld xmlns:a="http://schemas.openxmlformats.org/drawingml/2006/main" xmlns:r="http://schemas.openxmlformats.org/officeDocument/2006/relationships" xmlns:p="http://schemas.openxmlformats.org/presentationml/2006/main">
   <p:cSld>
     <p:spTree>
@@ -14076,7 +16183,7 @@
           <p:cNvPr id="2" name="Title 1">
             <a:extLst>
               <a:ext uri="{FF2B5EF4-FFF2-40B4-BE49-F238E27FC236}">
-                <a16:creationId xmlns:a16="http://schemas.microsoft.com/office/drawing/2014/main" id="{2EC18456-FE65-117C-A754-596E594E63C8}"/>
+                <a16:creationId xmlns:a16="http://schemas.microsoft.com/office/drawing/2014/main" id="{76211925-55EA-16D9-9573-52C1955BFAA0}"/>
               </a:ext>
             </a:extLst>
           </p:cNvPr>
@@ -14094,1523 +16201,45 @@
           <a:p>
             <a:r>
               <a:rPr lang="en-US" dirty="0"/>
-              <a:t>How to find if the center is “enclosed” by the projected plane? </a:t>
+              <a:t>Some results from Step 2</a:t>
             </a:r>
           </a:p>
         </p:txBody>
       </p:sp>
-      <p:sp>
-        <p:nvSpPr>
-          <p:cNvPr id="3" name="Content Placeholder 2">
+      <p:pic>
+        <p:nvPicPr>
+          <p:cNvPr id="5" name="Picture 4">
             <a:extLst>
               <a:ext uri="{FF2B5EF4-FFF2-40B4-BE49-F238E27FC236}">
-                <a16:creationId xmlns:a16="http://schemas.microsoft.com/office/drawing/2014/main" id="{5A82A140-D2C8-7EE0-F8B5-930900879F40}"/>
+                <a16:creationId xmlns:a16="http://schemas.microsoft.com/office/drawing/2014/main" id="{B1BC2D17-9947-076D-04EA-7BD39BA2A160}"/>
               </a:ext>
             </a:extLst>
           </p:cNvPr>
-          <p:cNvSpPr>
-            <a:spLocks noGrp="1"/>
-          </p:cNvSpPr>
-          <p:nvPr>
-            <p:ph idx="1"/>
-          </p:nvPr>
-        </p:nvSpPr>
-        <p:spPr/>
-        <p:txBody>
-          <a:bodyPr/>
-          <a:lstStyle/>
-          <a:p>
-            <a:pPr marL="0" indent="0">
-              <a:buNone/>
-            </a:pPr>
-            <a:r>
-              <a:rPr lang="en-US" dirty="0"/>
-              <a:t>Knowing the projection distance, d, we can calculate the projection distance of each unit vector vertex using:</a:t>
-            </a:r>
-          </a:p>
-          <a:p>
-            <a:pPr marL="0" indent="0">
-              <a:buNone/>
-            </a:pPr>
-            <a:endParaRPr lang="en-US" dirty="0"/>
-          </a:p>
-          <a:p>
-            <a:pPr marL="0" indent="0">
-              <a:buNone/>
-            </a:pPr>
-            <a:endParaRPr lang="en-US" dirty="0"/>
-          </a:p>
-          <a:p>
-            <a:pPr marL="0" indent="0">
-              <a:buNone/>
-            </a:pPr>
-            <a:endParaRPr lang="en-US" dirty="0"/>
-          </a:p>
-          <a:p>
-            <a:pPr marL="0" indent="0">
-              <a:buNone/>
-            </a:pPr>
-            <a:endParaRPr lang="en-US" dirty="0"/>
-          </a:p>
-          <a:p>
-            <a:pPr marL="0" indent="0">
-              <a:buNone/>
-            </a:pPr>
-            <a:endParaRPr lang="en-US" dirty="0"/>
-          </a:p>
-          <a:p>
-            <a:pPr marL="0" indent="0">
-              <a:buNone/>
-            </a:pPr>
-            <a:r>
-              <a:rPr lang="en-US" dirty="0"/>
-              <a:t>Each point of the vertex, defined by the point </a:t>
-            </a:r>
-            <a:r>
-              <a:rPr lang="en-US" dirty="0" err="1"/>
-              <a:t>Pj</a:t>
-            </a:r>
-            <a:r>
-              <a:rPr lang="en-US" dirty="0"/>
-              <a:t> projected outward to </a:t>
-            </a:r>
-            <a:r>
-              <a:rPr lang="en-US" dirty="0" err="1"/>
-              <a:t>Pj</a:t>
-            </a:r>
-            <a:r>
-              <a:rPr lang="en-US" dirty="0"/>
-              <a:t>’, creates an encirclement criterion </a:t>
-            </a:r>
-          </a:p>
-        </p:txBody>
-      </p:sp>
-      <p:grpSp>
-        <p:nvGrpSpPr>
-          <p:cNvPr id="4" name="Group 3">
-            <a:extLst>
-              <a:ext uri="{FF2B5EF4-FFF2-40B4-BE49-F238E27FC236}">
-                <a16:creationId xmlns:a16="http://schemas.microsoft.com/office/drawing/2014/main" id="{02B621B5-45BD-DE58-B78E-D164000E107F}"/>
-              </a:ext>
-            </a:extLst>
-          </p:cNvPr>
-          <p:cNvGrpSpPr/>
+          <p:cNvPicPr>
+            <a:picLocks noChangeAspect="1"/>
+          </p:cNvPicPr>
           <p:nvPr/>
-        </p:nvGrpSpPr>
-        <p:grpSpPr>
-          <a:xfrm rot="8193490">
-            <a:off x="6952057" y="2781166"/>
-            <a:ext cx="459744" cy="580060"/>
-            <a:chOff x="7558295" y="1666605"/>
-            <a:chExt cx="1309163" cy="1673737"/>
+        </p:nvPicPr>
+        <p:blipFill>
+          <a:blip r:embed="rId2"/>
+          <a:stretch>
+            <a:fillRect/>
+          </a:stretch>
+        </p:blipFill>
+        <p:spPr>
+          <a:xfrm>
+            <a:off x="0" y="1879169"/>
+            <a:ext cx="12192000" cy="3099661"/>
           </a:xfrm>
-        </p:grpSpPr>
-        <p:cxnSp>
-          <p:nvCxnSpPr>
-            <p:cNvPr id="5" name="Straight Connector 4">
-              <a:extLst>
-                <a:ext uri="{FF2B5EF4-FFF2-40B4-BE49-F238E27FC236}">
-                  <a16:creationId xmlns:a16="http://schemas.microsoft.com/office/drawing/2014/main" id="{F1FD2CDC-18EE-FB3A-A54D-142611CFA967}"/>
-                </a:ext>
-              </a:extLst>
-            </p:cNvPr>
-            <p:cNvCxnSpPr>
-              <a:cxnSpLocks/>
-            </p:cNvCxnSpPr>
-            <p:nvPr/>
-          </p:nvCxnSpPr>
-          <p:spPr>
-            <a:xfrm flipH="1" flipV="1">
-              <a:off x="7558295" y="2015067"/>
-              <a:ext cx="1309163" cy="1325275"/>
-            </a:xfrm>
-            <a:prstGeom prst="line">
-              <a:avLst/>
-            </a:prstGeom>
-            <a:ln w="38100"/>
-          </p:spPr>
-          <p:style>
-            <a:lnRef idx="1">
-              <a:schemeClr val="accent1"/>
-            </a:lnRef>
-            <a:fillRef idx="0">
-              <a:schemeClr val="accent1"/>
-            </a:fillRef>
-            <a:effectRef idx="0">
-              <a:schemeClr val="accent1"/>
-            </a:effectRef>
-            <a:fontRef idx="minor">
-              <a:schemeClr val="tx1"/>
-            </a:fontRef>
-          </p:style>
-        </p:cxnSp>
-        <p:cxnSp>
-          <p:nvCxnSpPr>
-            <p:cNvPr id="6" name="Straight Connector 5">
-              <a:extLst>
-                <a:ext uri="{FF2B5EF4-FFF2-40B4-BE49-F238E27FC236}">
-                  <a16:creationId xmlns:a16="http://schemas.microsoft.com/office/drawing/2014/main" id="{0E012661-90C1-C36F-D889-F51953FF2858}"/>
-                </a:ext>
-              </a:extLst>
-            </p:cNvPr>
-            <p:cNvCxnSpPr>
-              <a:cxnSpLocks/>
-            </p:cNvCxnSpPr>
-            <p:nvPr/>
-          </p:nvCxnSpPr>
-          <p:spPr>
-            <a:xfrm rot="13406510" flipH="1">
-              <a:off x="8698972" y="1666605"/>
-              <a:ext cx="111648" cy="1266617"/>
-            </a:xfrm>
-            <a:prstGeom prst="line">
-              <a:avLst/>
-            </a:prstGeom>
-            <a:ln w="38100">
-              <a:tailEnd type="triangle"/>
-            </a:ln>
-          </p:spPr>
-          <p:style>
-            <a:lnRef idx="1">
-              <a:schemeClr val="accent1"/>
-            </a:lnRef>
-            <a:fillRef idx="0">
-              <a:schemeClr val="accent1"/>
-            </a:fillRef>
-            <a:effectRef idx="0">
-              <a:schemeClr val="accent1"/>
-            </a:effectRef>
-            <a:fontRef idx="minor">
-              <a:schemeClr val="tx1"/>
-            </a:fontRef>
-          </p:style>
-        </p:cxnSp>
-      </p:grpSp>
-      <p:cxnSp>
-        <p:nvCxnSpPr>
-          <p:cNvPr id="7" name="Straight Connector 6">
-            <a:extLst>
-              <a:ext uri="{FF2B5EF4-FFF2-40B4-BE49-F238E27FC236}">
-                <a16:creationId xmlns:a16="http://schemas.microsoft.com/office/drawing/2014/main" id="{8BF8D311-EF46-EDE5-1052-946C0FC79B4E}"/>
-              </a:ext>
-            </a:extLst>
-          </p:cNvPr>
-          <p:cNvCxnSpPr>
-            <a:cxnSpLocks/>
-          </p:cNvCxnSpPr>
-          <p:nvPr/>
-        </p:nvCxnSpPr>
-        <p:spPr>
-          <a:xfrm flipH="1" flipV="1">
-            <a:off x="7465223" y="3031091"/>
-            <a:ext cx="626986" cy="713994"/>
-          </a:xfrm>
-          <a:prstGeom prst="line">
+          <a:prstGeom prst="rect">
             <a:avLst/>
           </a:prstGeom>
-          <a:ln>
-            <a:prstDash val="sysDot"/>
-          </a:ln>
         </p:spPr>
-        <p:style>
-          <a:lnRef idx="1">
-            <a:schemeClr val="accent1"/>
-          </a:lnRef>
-          <a:fillRef idx="0">
-            <a:schemeClr val="accent1"/>
-          </a:fillRef>
-          <a:effectRef idx="0">
-            <a:schemeClr val="accent1"/>
-          </a:effectRef>
-          <a:fontRef idx="minor">
-            <a:schemeClr val="tx1"/>
-          </a:fontRef>
-        </p:style>
-      </p:cxnSp>
-      <p:cxnSp>
-        <p:nvCxnSpPr>
-          <p:cNvPr id="8" name="Straight Connector 7">
-            <a:extLst>
-              <a:ext uri="{FF2B5EF4-FFF2-40B4-BE49-F238E27FC236}">
-                <a16:creationId xmlns:a16="http://schemas.microsoft.com/office/drawing/2014/main" id="{06127B8B-03AB-5375-31B7-CA0F7ABF2B88}"/>
-              </a:ext>
-            </a:extLst>
-          </p:cNvPr>
-          <p:cNvCxnSpPr>
-            <a:cxnSpLocks/>
-          </p:cNvCxnSpPr>
-          <p:nvPr/>
-        </p:nvCxnSpPr>
-        <p:spPr>
-          <a:xfrm flipV="1">
-            <a:off x="6520513" y="3043594"/>
-            <a:ext cx="312098" cy="836258"/>
-          </a:xfrm>
-          <a:prstGeom prst="line">
-            <a:avLst/>
-          </a:prstGeom>
-          <a:ln>
-            <a:prstDash val="sysDot"/>
-          </a:ln>
-        </p:spPr>
-        <p:style>
-          <a:lnRef idx="1">
-            <a:schemeClr val="accent1"/>
-          </a:lnRef>
-          <a:fillRef idx="0">
-            <a:schemeClr val="accent1"/>
-          </a:fillRef>
-          <a:effectRef idx="0">
-            <a:schemeClr val="accent1"/>
-          </a:effectRef>
-          <a:fontRef idx="minor">
-            <a:schemeClr val="tx1"/>
-          </a:fontRef>
-        </p:style>
-      </p:cxnSp>
-      <p:sp>
-        <p:nvSpPr>
-          <p:cNvPr id="9" name="Connecteur droit 20">
-            <a:extLst>
-              <a:ext uri="{FF2B5EF4-FFF2-40B4-BE49-F238E27FC236}">
-                <a16:creationId xmlns:a16="http://schemas.microsoft.com/office/drawing/2014/main" id="{662C6EA7-A350-C68A-CD99-4C37221CFA49}"/>
-              </a:ext>
-            </a:extLst>
-          </p:cNvPr>
-          <p:cNvSpPr/>
-          <p:nvPr/>
-        </p:nvSpPr>
-        <p:spPr>
-          <a:xfrm rot="2930468">
-            <a:off x="7351622" y="3245002"/>
-            <a:ext cx="548640" cy="0"/>
-          </a:xfrm>
-          <a:prstGeom prst="line">
-            <a:avLst/>
-          </a:prstGeom>
-          <a:solidFill>
-            <a:srgbClr val="000000">
-              <a:alpha val="5000"/>
-            </a:srgbClr>
-          </a:solidFill>
-          <a:ln w="12600">
-            <a:solidFill>
-              <a:srgbClr val="000000"/>
-            </a:solidFill>
-            <a:tailEnd type="triangle"/>
-          </a:ln>
-        </p:spPr>
-        <p:style>
-          <a:lnRef idx="1">
-            <a:schemeClr val="accent1"/>
-          </a:lnRef>
-          <a:fillRef idx="0">
-            <a:schemeClr val="accent1"/>
-          </a:fillRef>
-          <a:effectRef idx="0">
-            <a:schemeClr val="accent1"/>
-          </a:effectRef>
-          <a:fontRef idx="minor">
-            <a:schemeClr val="tx1"/>
-          </a:fontRef>
-        </p:style>
-        <p:txBody>
-          <a:bodyPr wrap="none" rtlCol="0" anchor="ctr" anchorCtr="1"/>
-          <a:lstStyle/>
-          <a:p>
-            <a:endParaRPr lang="en-US">
-              <a:solidFill>
-                <a:srgbClr val="000000"/>
-              </a:solidFill>
-            </a:endParaRPr>
-          </a:p>
-        </p:txBody>
-      </p:sp>
-      <p:sp>
-        <p:nvSpPr>
-          <p:cNvPr id="10" name="Connecteur droit 20">
-            <a:extLst>
-              <a:ext uri="{FF2B5EF4-FFF2-40B4-BE49-F238E27FC236}">
-                <a16:creationId xmlns:a16="http://schemas.microsoft.com/office/drawing/2014/main" id="{30DAE494-4BDB-9A71-E195-658F97571936}"/>
-              </a:ext>
-            </a:extLst>
-          </p:cNvPr>
-          <p:cNvSpPr/>
-          <p:nvPr/>
-        </p:nvSpPr>
-        <p:spPr>
-          <a:xfrm rot="2930468">
-            <a:off x="6619944" y="3041861"/>
-            <a:ext cx="239638" cy="410926"/>
-          </a:xfrm>
-          <a:prstGeom prst="line">
-            <a:avLst/>
-          </a:prstGeom>
-          <a:solidFill>
-            <a:srgbClr val="000000">
-              <a:alpha val="5000"/>
-            </a:srgbClr>
-          </a:solidFill>
-          <a:ln w="12600">
-            <a:solidFill>
-              <a:srgbClr val="000000"/>
-            </a:solidFill>
-            <a:tailEnd type="triangle"/>
-          </a:ln>
-        </p:spPr>
-        <p:style>
-          <a:lnRef idx="1">
-            <a:schemeClr val="accent1"/>
-          </a:lnRef>
-          <a:fillRef idx="0">
-            <a:schemeClr val="accent1"/>
-          </a:fillRef>
-          <a:effectRef idx="0">
-            <a:schemeClr val="accent1"/>
-          </a:effectRef>
-          <a:fontRef idx="minor">
-            <a:schemeClr val="tx1"/>
-          </a:fontRef>
-        </p:style>
-        <p:txBody>
-          <a:bodyPr wrap="none" rtlCol="0" anchor="ctr" anchorCtr="1"/>
-          <a:lstStyle/>
-          <a:p>
-            <a:endParaRPr lang="en-US">
-              <a:solidFill>
-                <a:srgbClr val="000000"/>
-              </a:solidFill>
-            </a:endParaRPr>
-          </a:p>
-        </p:txBody>
-      </p:sp>
-      <p:sp>
-        <p:nvSpPr>
-          <p:cNvPr id="11" name="Conector recto 26">
-            <a:extLst>
-              <a:ext uri="{FF2B5EF4-FFF2-40B4-BE49-F238E27FC236}">
-                <a16:creationId xmlns:a16="http://schemas.microsoft.com/office/drawing/2014/main" id="{FE822832-0058-12F7-3391-21F3CCD1CC9E}"/>
-              </a:ext>
-            </a:extLst>
-          </p:cNvPr>
-          <p:cNvSpPr/>
-          <p:nvPr/>
-        </p:nvSpPr>
-        <p:spPr>
-          <a:xfrm>
-            <a:off x="6690240" y="3459960"/>
-            <a:ext cx="1097280" cy="0"/>
-          </a:xfrm>
-          <a:prstGeom prst="line">
-            <a:avLst/>
-          </a:prstGeom>
-          <a:solidFill>
-            <a:srgbClr val="E71224">
-              <a:alpha val="5000"/>
-            </a:srgbClr>
-          </a:solidFill>
-          <a:ln w="57150">
-            <a:solidFill>
-              <a:srgbClr val="E71224"/>
-            </a:solidFill>
-          </a:ln>
-        </p:spPr>
-        <p:style>
-          <a:lnRef idx="1">
-            <a:schemeClr val="accent1"/>
-          </a:lnRef>
-          <a:fillRef idx="0">
-            <a:schemeClr val="accent1"/>
-          </a:fillRef>
-          <a:effectRef idx="0">
-            <a:schemeClr val="accent1"/>
-          </a:effectRef>
-          <a:fontRef idx="minor">
-            <a:schemeClr val="tx1"/>
-          </a:fontRef>
-        </p:style>
-        <p:txBody>
-          <a:bodyPr wrap="none" rtlCol="0" anchor="ctr" anchorCtr="1"/>
-          <a:lstStyle/>
-          <a:p>
-            <a:endParaRPr lang="en-US" dirty="0">
-              <a:solidFill>
-                <a:srgbClr val="E71224"/>
-              </a:solidFill>
-            </a:endParaRPr>
-          </a:p>
-        </p:txBody>
-      </p:sp>
-      <mc:AlternateContent xmlns:mc="http://schemas.openxmlformats.org/markup-compatibility/2006" xmlns:a14="http://schemas.microsoft.com/office/drawing/2010/main">
-        <mc:Choice Requires="a14">
-          <p:sp>
-            <p:nvSpPr>
-              <p:cNvPr id="12" name="TextBox 11">
-                <a:extLst>
-                  <a:ext uri="{FF2B5EF4-FFF2-40B4-BE49-F238E27FC236}">
-                    <a16:creationId xmlns:a16="http://schemas.microsoft.com/office/drawing/2014/main" id="{E14DBCDD-05B8-C092-698A-B7AEF24A5AF9}"/>
-                  </a:ext>
-                </a:extLst>
-              </p:cNvPr>
-              <p:cNvSpPr txBox="1"/>
-              <p:nvPr/>
-            </p:nvSpPr>
-            <p:spPr>
-              <a:xfrm>
-                <a:off x="1587239" y="3038469"/>
-                <a:ext cx="4693228" cy="1458733"/>
-              </a:xfrm>
-              <a:prstGeom prst="rect">
-                <a:avLst/>
-              </a:prstGeom>
-              <a:noFill/>
-            </p:spPr>
-            <p:txBody>
-              <a:bodyPr wrap="square">
-                <a:spAutoFit/>
-              </a:bodyPr>
-              <a:lstStyle/>
-              <a:p>
-                <a:pPr algn="ctr"/>
-                <a14:m>
-                  <m:oMathPara xmlns:m="http://schemas.openxmlformats.org/officeDocument/2006/math">
-                    <m:oMathParaPr>
-                      <m:jc m:val="centerGroup"/>
-                    </m:oMathParaPr>
-                    <m:oMath xmlns:m="http://schemas.openxmlformats.org/officeDocument/2006/math">
-                      <m:r>
-                        <a:rPr lang="en-US" b="0" i="1" smtClean="0">
-                          <a:latin typeface="Cambria Math" panose="02040503050406030204" pitchFamily="18" charset="0"/>
-                        </a:rPr>
-                        <m:t>𝑑</m:t>
-                      </m:r>
-                      <m:r>
-                        <a:rPr lang="en-US" b="0" i="1" smtClean="0">
-                          <a:latin typeface="Cambria Math" panose="02040503050406030204" pitchFamily="18" charset="0"/>
-                        </a:rPr>
-                        <m:t>=</m:t>
-                      </m:r>
-                      <m:sSub>
-                        <m:sSubPr>
-                          <m:ctrlPr>
-                            <a:rPr lang="en-US" b="0" i="1" smtClean="0">
-                              <a:latin typeface="Cambria Math" panose="02040503050406030204" pitchFamily="18" charset="0"/>
-                            </a:rPr>
-                          </m:ctrlPr>
-                        </m:sSubPr>
-                        <m:e>
-                          <m:r>
-                            <a:rPr lang="en-US" b="0" i="1" smtClean="0">
-                              <a:latin typeface="Cambria Math" panose="02040503050406030204" pitchFamily="18" charset="0"/>
-                            </a:rPr>
-                            <m:t>𝑙</m:t>
-                          </m:r>
-                        </m:e>
-                        <m:sub>
-                          <m:r>
-                            <a:rPr lang="en-US" b="0" i="1" smtClean="0">
-                              <a:latin typeface="Cambria Math" panose="02040503050406030204" pitchFamily="18" charset="0"/>
-                            </a:rPr>
-                            <m:t>𝑗</m:t>
-                          </m:r>
-                        </m:sub>
-                      </m:sSub>
-                      <m:r>
-                        <a:rPr lang="en-US" i="1">
-                          <a:latin typeface="Cambria Math" panose="02040503050406030204" pitchFamily="18" charset="0"/>
-                        </a:rPr>
-                        <m:t>⋅</m:t>
-                      </m:r>
-                      <m:acc>
-                        <m:accPr>
-                          <m:chr m:val="̂"/>
-                          <m:ctrlPr>
-                            <a:rPr lang="en-US" i="1">
-                              <a:latin typeface="Cambria Math" panose="02040503050406030204" pitchFamily="18" charset="0"/>
-                            </a:rPr>
-                          </m:ctrlPr>
-                        </m:accPr>
-                        <m:e>
-                          <m:sSub>
-                            <m:sSubPr>
-                              <m:ctrlPr>
-                                <a:rPr lang="en-US" i="1">
-                                  <a:latin typeface="Cambria Math" panose="02040503050406030204" pitchFamily="18" charset="0"/>
-                                </a:rPr>
-                              </m:ctrlPr>
-                            </m:sSubPr>
-                            <m:e>
-                              <m:r>
-                                <a:rPr lang="en-US" i="1">
-                                  <a:latin typeface="Cambria Math" panose="02040503050406030204" pitchFamily="18" charset="0"/>
-                                </a:rPr>
-                                <m:t>𝑣</m:t>
-                              </m:r>
-                            </m:e>
-                            <m:sub>
-                              <m:r>
-                                <a:rPr lang="en-US" b="0" i="1" smtClean="0">
-                                  <a:latin typeface="Cambria Math" panose="02040503050406030204" pitchFamily="18" charset="0"/>
-                                </a:rPr>
-                                <m:t>𝑗</m:t>
-                              </m:r>
-                            </m:sub>
-                          </m:sSub>
-                        </m:e>
-                      </m:acc>
-                      <m:r>
-                        <a:rPr lang="en-US" i="1">
-                          <a:latin typeface="Cambria Math" panose="02040503050406030204" pitchFamily="18" charset="0"/>
-                        </a:rPr>
-                        <m:t>⋅</m:t>
-                      </m:r>
-                      <m:acc>
-                        <m:accPr>
-                          <m:chr m:val="̂"/>
-                          <m:ctrlPr>
-                            <a:rPr lang="en-US" i="1">
-                              <a:latin typeface="Cambria Math" panose="02040503050406030204" pitchFamily="18" charset="0"/>
-                            </a:rPr>
-                          </m:ctrlPr>
-                        </m:accPr>
-                        <m:e>
-                          <m:sSub>
-                            <m:sSubPr>
-                              <m:ctrlPr>
-                                <a:rPr lang="en-US" i="1">
-                                  <a:latin typeface="Cambria Math" panose="02040503050406030204" pitchFamily="18" charset="0"/>
-                                </a:rPr>
-                              </m:ctrlPr>
-                            </m:sSubPr>
-                            <m:e>
-                              <m:r>
-                                <a:rPr lang="en-US" i="1">
-                                  <a:latin typeface="Cambria Math" panose="02040503050406030204" pitchFamily="18" charset="0"/>
-                                </a:rPr>
-                                <m:t>𝑛</m:t>
-                              </m:r>
-                            </m:e>
-                            <m:sub>
-                              <m:r>
-                                <a:rPr lang="en-US" b="0" i="1" smtClean="0">
-                                  <a:latin typeface="Cambria Math" panose="02040503050406030204" pitchFamily="18" charset="0"/>
-                                </a:rPr>
-                                <m:t>𝑗</m:t>
-                              </m:r>
-                            </m:sub>
-                          </m:sSub>
-                        </m:e>
-                      </m:acc>
-                    </m:oMath>
-                  </m:oMathPara>
-                </a14:m>
-                <a:endParaRPr lang="en-US" dirty="0"/>
-              </a:p>
-              <a:p>
-                <a:pPr algn="ctr"/>
-                <a14:m>
-                  <m:oMathPara xmlns:m="http://schemas.openxmlformats.org/officeDocument/2006/math">
-                    <m:oMathParaPr>
-                      <m:jc m:val="centerGroup"/>
-                    </m:oMathParaPr>
-                    <m:oMath xmlns:m="http://schemas.openxmlformats.org/officeDocument/2006/math">
-                      <m:f>
-                        <m:fPr>
-                          <m:ctrlPr>
-                            <a:rPr lang="en-US" b="0" i="1" smtClean="0">
-                              <a:latin typeface="Cambria Math" panose="02040503050406030204" pitchFamily="18" charset="0"/>
-                            </a:rPr>
-                          </m:ctrlPr>
-                        </m:fPr>
-                        <m:num>
-                          <m:r>
-                            <a:rPr lang="en-US" b="0" i="1" smtClean="0">
-                              <a:latin typeface="Cambria Math" panose="02040503050406030204" pitchFamily="18" charset="0"/>
-                            </a:rPr>
-                            <m:t>𝑑</m:t>
-                          </m:r>
-                        </m:num>
-                        <m:den>
-                          <m:acc>
-                            <m:accPr>
-                              <m:chr m:val="̂"/>
-                              <m:ctrlPr>
-                                <a:rPr lang="en-US" i="1">
-                                  <a:latin typeface="Cambria Math" panose="02040503050406030204" pitchFamily="18" charset="0"/>
-                                </a:rPr>
-                              </m:ctrlPr>
-                            </m:accPr>
-                            <m:e>
-                              <m:sSub>
-                                <m:sSubPr>
-                                  <m:ctrlPr>
-                                    <a:rPr lang="en-US" i="1">
-                                      <a:latin typeface="Cambria Math" panose="02040503050406030204" pitchFamily="18" charset="0"/>
-                                    </a:rPr>
-                                  </m:ctrlPr>
-                                </m:sSubPr>
-                                <m:e>
-                                  <m:r>
-                                    <a:rPr lang="en-US" i="1">
-                                      <a:latin typeface="Cambria Math" panose="02040503050406030204" pitchFamily="18" charset="0"/>
-                                    </a:rPr>
-                                    <m:t>𝑣</m:t>
-                                  </m:r>
-                                </m:e>
-                                <m:sub>
-                                  <m:r>
-                                    <a:rPr lang="en-US" i="1">
-                                      <a:latin typeface="Cambria Math" panose="02040503050406030204" pitchFamily="18" charset="0"/>
-                                    </a:rPr>
-                                    <m:t>𝑗</m:t>
-                                  </m:r>
-                                </m:sub>
-                              </m:sSub>
-                            </m:e>
-                          </m:acc>
-                          <m:r>
-                            <a:rPr lang="en-US" i="1">
-                              <a:latin typeface="Cambria Math" panose="02040503050406030204" pitchFamily="18" charset="0"/>
-                            </a:rPr>
-                            <m:t>⋅</m:t>
-                          </m:r>
-                          <m:acc>
-                            <m:accPr>
-                              <m:chr m:val="̂"/>
-                              <m:ctrlPr>
-                                <a:rPr lang="en-US" i="1">
-                                  <a:latin typeface="Cambria Math" panose="02040503050406030204" pitchFamily="18" charset="0"/>
-                                </a:rPr>
-                              </m:ctrlPr>
-                            </m:accPr>
-                            <m:e>
-                              <m:sSub>
-                                <m:sSubPr>
-                                  <m:ctrlPr>
-                                    <a:rPr lang="en-US" i="1">
-                                      <a:latin typeface="Cambria Math" panose="02040503050406030204" pitchFamily="18" charset="0"/>
-                                    </a:rPr>
-                                  </m:ctrlPr>
-                                </m:sSubPr>
-                                <m:e>
-                                  <m:r>
-                                    <a:rPr lang="en-US" i="1">
-                                      <a:latin typeface="Cambria Math" panose="02040503050406030204" pitchFamily="18" charset="0"/>
-                                    </a:rPr>
-                                    <m:t>𝑛</m:t>
-                                  </m:r>
-                                </m:e>
-                                <m:sub>
-                                  <m:r>
-                                    <a:rPr lang="en-US" i="1">
-                                      <a:latin typeface="Cambria Math" panose="02040503050406030204" pitchFamily="18" charset="0"/>
-                                    </a:rPr>
-                                    <m:t>𝑗</m:t>
-                                  </m:r>
-                                </m:sub>
-                              </m:sSub>
-                            </m:e>
-                          </m:acc>
-                        </m:den>
-                      </m:f>
-                      <m:r>
-                        <a:rPr lang="en-US" b="0" i="1" smtClean="0">
-                          <a:latin typeface="Cambria Math" panose="02040503050406030204" pitchFamily="18" charset="0"/>
-                        </a:rPr>
-                        <m:t>=</m:t>
-                      </m:r>
-                      <m:sSub>
-                        <m:sSubPr>
-                          <m:ctrlPr>
-                            <a:rPr lang="en-US" b="0" i="1" smtClean="0">
-                              <a:latin typeface="Cambria Math" panose="02040503050406030204" pitchFamily="18" charset="0"/>
-                            </a:rPr>
-                          </m:ctrlPr>
-                        </m:sSubPr>
-                        <m:e>
-                          <m:r>
-                            <a:rPr lang="en-US" b="0" i="1" smtClean="0">
-                              <a:latin typeface="Cambria Math" panose="02040503050406030204" pitchFamily="18" charset="0"/>
-                            </a:rPr>
-                            <m:t>𝑙</m:t>
-                          </m:r>
-                        </m:e>
-                        <m:sub>
-                          <m:r>
-                            <a:rPr lang="en-US" b="0" i="1" smtClean="0">
-                              <a:latin typeface="Cambria Math" panose="02040503050406030204" pitchFamily="18" charset="0"/>
-                            </a:rPr>
-                            <m:t>𝑗</m:t>
-                          </m:r>
-                        </m:sub>
-                      </m:sSub>
-                    </m:oMath>
-                  </m:oMathPara>
-                </a14:m>
-                <a:endParaRPr lang="en-US" dirty="0"/>
-              </a:p>
-              <a:p>
-                <a:pPr algn="ctr"/>
-                <a14:m>
-                  <m:oMath xmlns:m="http://schemas.openxmlformats.org/officeDocument/2006/math">
-                    <m:sSub>
-                      <m:sSubPr>
-                        <m:ctrlPr>
-                          <a:rPr lang="en-US" b="0" i="1" smtClean="0">
-                            <a:latin typeface="Cambria Math" panose="02040503050406030204" pitchFamily="18" charset="0"/>
-                          </a:rPr>
-                        </m:ctrlPr>
-                      </m:sSubPr>
-                      <m:e>
-                        <m:r>
-                          <a:rPr lang="en-US" b="0" i="1" smtClean="0">
-                            <a:latin typeface="Cambria Math" panose="02040503050406030204" pitchFamily="18" charset="0"/>
-                          </a:rPr>
-                          <m:t>𝑃</m:t>
-                        </m:r>
-                      </m:e>
-                      <m:sub>
-                        <m:r>
-                          <a:rPr lang="en-US" b="0" i="1" smtClean="0">
-                            <a:latin typeface="Cambria Math" panose="02040503050406030204" pitchFamily="18" charset="0"/>
-                          </a:rPr>
-                          <m:t>𝑗</m:t>
-                        </m:r>
-                        <m:r>
-                          <a:rPr lang="en-US" b="0" i="1" smtClean="0">
-                            <a:latin typeface="Cambria Math" panose="02040503050406030204" pitchFamily="18" charset="0"/>
-                          </a:rPr>
-                          <m:t>′</m:t>
-                        </m:r>
-                      </m:sub>
-                    </m:sSub>
-                    <m:r>
-                      <a:rPr lang="en-US" b="0" i="1" smtClean="0">
-                        <a:latin typeface="Cambria Math" panose="02040503050406030204" pitchFamily="18" charset="0"/>
-                      </a:rPr>
-                      <m:t>=</m:t>
-                    </m:r>
-                    <m:sSub>
-                      <m:sSubPr>
-                        <m:ctrlPr>
-                          <a:rPr lang="en-US" b="0" i="1" smtClean="0">
-                            <a:latin typeface="Cambria Math" panose="02040503050406030204" pitchFamily="18" charset="0"/>
-                          </a:rPr>
-                        </m:ctrlPr>
-                      </m:sSubPr>
-                      <m:e>
-                        <m:r>
-                          <a:rPr lang="en-US" b="0" i="1" smtClean="0">
-                            <a:latin typeface="Cambria Math" panose="02040503050406030204" pitchFamily="18" charset="0"/>
-                          </a:rPr>
-                          <m:t>𝑃</m:t>
-                        </m:r>
-                      </m:e>
-                      <m:sub>
-                        <m:r>
-                          <a:rPr lang="en-US" b="0" i="1" smtClean="0">
-                            <a:latin typeface="Cambria Math" panose="02040503050406030204" pitchFamily="18" charset="0"/>
-                          </a:rPr>
-                          <m:t>𝑗</m:t>
-                        </m:r>
-                      </m:sub>
-                    </m:sSub>
-                    <m:r>
-                      <a:rPr lang="en-US" b="0" i="1" smtClean="0">
-                        <a:latin typeface="Cambria Math" panose="02040503050406030204" pitchFamily="18" charset="0"/>
-                      </a:rPr>
-                      <m:t>+</m:t>
-                    </m:r>
-                    <m:sSub>
-                      <m:sSubPr>
-                        <m:ctrlPr>
-                          <a:rPr lang="en-US" b="0" i="1" smtClean="0">
-                            <a:latin typeface="Cambria Math" panose="02040503050406030204" pitchFamily="18" charset="0"/>
-                          </a:rPr>
-                        </m:ctrlPr>
-                      </m:sSubPr>
-                      <m:e>
-                        <m:r>
-                          <a:rPr lang="en-US" b="0" i="1" smtClean="0">
-                            <a:latin typeface="Cambria Math" panose="02040503050406030204" pitchFamily="18" charset="0"/>
-                          </a:rPr>
-                          <m:t>𝑙</m:t>
-                        </m:r>
-                      </m:e>
-                      <m:sub>
-                        <m:r>
-                          <a:rPr lang="en-US" b="0" i="1" smtClean="0">
-                            <a:latin typeface="Cambria Math" panose="02040503050406030204" pitchFamily="18" charset="0"/>
-                          </a:rPr>
-                          <m:t>𝑗</m:t>
-                        </m:r>
-                      </m:sub>
-                    </m:sSub>
-                    <m:r>
-                      <a:rPr lang="en-US" b="0" i="1" smtClean="0">
-                        <a:latin typeface="Cambria Math" panose="02040503050406030204" pitchFamily="18" charset="0"/>
-                      </a:rPr>
-                      <m:t>⋅</m:t>
-                    </m:r>
-                    <m:acc>
-                      <m:accPr>
-                        <m:chr m:val="̂"/>
-                        <m:ctrlPr>
-                          <a:rPr lang="en-US" i="1">
-                            <a:latin typeface="Cambria Math" panose="02040503050406030204" pitchFamily="18" charset="0"/>
-                          </a:rPr>
-                        </m:ctrlPr>
-                      </m:accPr>
-                      <m:e>
-                        <m:sSub>
-                          <m:sSubPr>
-                            <m:ctrlPr>
-                              <a:rPr lang="en-US" i="1">
-                                <a:latin typeface="Cambria Math" panose="02040503050406030204" pitchFamily="18" charset="0"/>
-                              </a:rPr>
-                            </m:ctrlPr>
-                          </m:sSubPr>
-                          <m:e>
-                            <m:r>
-                              <a:rPr lang="en-US" i="1">
-                                <a:latin typeface="Cambria Math" panose="02040503050406030204" pitchFamily="18" charset="0"/>
-                              </a:rPr>
-                              <m:t>𝑣</m:t>
-                            </m:r>
-                          </m:e>
-                          <m:sub>
-                            <m:r>
-                              <a:rPr lang="en-US" i="1">
-                                <a:latin typeface="Cambria Math" panose="02040503050406030204" pitchFamily="18" charset="0"/>
-                              </a:rPr>
-                              <m:t>𝑗</m:t>
-                            </m:r>
-                          </m:sub>
-                        </m:sSub>
-                      </m:e>
-                    </m:acc>
-                    <m:r>
-                      <a:rPr lang="en-US" b="0" i="1" smtClean="0">
-                        <a:latin typeface="Cambria Math" panose="02040503050406030204" pitchFamily="18" charset="0"/>
-                      </a:rPr>
-                      <m:t>=</m:t>
-                    </m:r>
-                  </m:oMath>
-                </a14:m>
-                <a:r>
-                  <a:rPr lang="en-US" dirty="0"/>
-                  <a:t> </a:t>
-                </a:r>
-                <a14:m>
-                  <m:oMath xmlns:m="http://schemas.openxmlformats.org/officeDocument/2006/math">
-                    <m:sSub>
-                      <m:sSubPr>
-                        <m:ctrlPr>
-                          <a:rPr lang="en-US" i="1">
-                            <a:latin typeface="Cambria Math" panose="02040503050406030204" pitchFamily="18" charset="0"/>
-                          </a:rPr>
-                        </m:ctrlPr>
-                      </m:sSubPr>
-                      <m:e>
-                        <m:r>
-                          <a:rPr lang="en-US" i="1">
-                            <a:latin typeface="Cambria Math" panose="02040503050406030204" pitchFamily="18" charset="0"/>
-                          </a:rPr>
-                          <m:t>𝑃</m:t>
-                        </m:r>
-                      </m:e>
-                      <m:sub>
-                        <m:r>
-                          <a:rPr lang="en-US" i="1">
-                            <a:latin typeface="Cambria Math" panose="02040503050406030204" pitchFamily="18" charset="0"/>
-                          </a:rPr>
-                          <m:t>𝑗</m:t>
-                        </m:r>
-                      </m:sub>
-                    </m:sSub>
-                    <m:r>
-                      <a:rPr lang="en-US" i="1">
-                        <a:latin typeface="Cambria Math" panose="02040503050406030204" pitchFamily="18" charset="0"/>
-                      </a:rPr>
-                      <m:t>+</m:t>
-                    </m:r>
-                    <m:f>
-                      <m:fPr>
-                        <m:ctrlPr>
-                          <a:rPr lang="en-US" i="1">
-                            <a:latin typeface="Cambria Math" panose="02040503050406030204" pitchFamily="18" charset="0"/>
-                          </a:rPr>
-                        </m:ctrlPr>
-                      </m:fPr>
-                      <m:num>
-                        <m:r>
-                          <a:rPr lang="en-US" i="1">
-                            <a:latin typeface="Cambria Math" panose="02040503050406030204" pitchFamily="18" charset="0"/>
-                          </a:rPr>
-                          <m:t>𝑑</m:t>
-                        </m:r>
-                      </m:num>
-                      <m:den>
-                        <m:acc>
-                          <m:accPr>
-                            <m:chr m:val="̂"/>
-                            <m:ctrlPr>
-                              <a:rPr lang="en-US" i="1">
-                                <a:latin typeface="Cambria Math" panose="02040503050406030204" pitchFamily="18" charset="0"/>
-                              </a:rPr>
-                            </m:ctrlPr>
-                          </m:accPr>
-                          <m:e>
-                            <m:sSub>
-                              <m:sSubPr>
-                                <m:ctrlPr>
-                                  <a:rPr lang="en-US" i="1">
-                                    <a:latin typeface="Cambria Math" panose="02040503050406030204" pitchFamily="18" charset="0"/>
-                                  </a:rPr>
-                                </m:ctrlPr>
-                              </m:sSubPr>
-                              <m:e>
-                                <m:r>
-                                  <a:rPr lang="en-US" i="1">
-                                    <a:latin typeface="Cambria Math" panose="02040503050406030204" pitchFamily="18" charset="0"/>
-                                  </a:rPr>
-                                  <m:t>𝑛</m:t>
-                                </m:r>
-                              </m:e>
-                              <m:sub>
-                                <m:r>
-                                  <a:rPr lang="en-US" i="1">
-                                    <a:latin typeface="Cambria Math" panose="02040503050406030204" pitchFamily="18" charset="0"/>
-                                  </a:rPr>
-                                  <m:t>𝑗</m:t>
-                                </m:r>
-                              </m:sub>
-                            </m:sSub>
-                          </m:e>
-                        </m:acc>
-                      </m:den>
-                    </m:f>
-                  </m:oMath>
-                </a14:m>
-                <a:endParaRPr lang="en-US" dirty="0"/>
-              </a:p>
-            </p:txBody>
-          </p:sp>
-        </mc:Choice>
-        <mc:Fallback xmlns="">
-          <p:sp>
-            <p:nvSpPr>
-              <p:cNvPr id="12" name="TextBox 11">
-                <a:extLst>
-                  <a:ext uri="{FF2B5EF4-FFF2-40B4-BE49-F238E27FC236}">
-                    <a16:creationId xmlns:a16="http://schemas.microsoft.com/office/drawing/2014/main" id="{E14DBCDD-05B8-C092-698A-B7AEF24A5AF9}"/>
-                  </a:ext>
-                </a:extLst>
-              </p:cNvPr>
-              <p:cNvSpPr txBox="1">
-                <a:spLocks noRot="1" noChangeAspect="1" noMove="1" noResize="1" noEditPoints="1" noAdjustHandles="1" noChangeArrowheads="1" noChangeShapeType="1" noTextEdit="1"/>
-              </p:cNvSpPr>
-              <p:nvPr/>
-            </p:nvSpPr>
-            <p:spPr>
-              <a:xfrm>
-                <a:off x="1587239" y="3038469"/>
-                <a:ext cx="4693228" cy="1458733"/>
-              </a:xfrm>
-              <a:prstGeom prst="rect">
-                <a:avLst/>
-              </a:prstGeom>
-              <a:blipFill>
-                <a:blip r:embed="rId2"/>
-                <a:stretch>
-                  <a:fillRect t="-1250" b="-417"/>
-                </a:stretch>
-              </a:blipFill>
-            </p:spPr>
-            <p:txBody>
-              <a:bodyPr/>
-              <a:lstStyle/>
-              <a:p>
-                <a:r>
-                  <a:rPr lang="en-US">
-                    <a:noFill/>
-                  </a:rPr>
-                  <a:t> </a:t>
-                </a:r>
-              </a:p>
-            </p:txBody>
-          </p:sp>
-        </mc:Fallback>
-      </mc:AlternateContent>
-      <mc:AlternateContent xmlns:mc="http://schemas.openxmlformats.org/markup-compatibility/2006" xmlns:a14="http://schemas.microsoft.com/office/drawing/2010/main">
-        <mc:Choice Requires="a14">
-          <p:sp>
-            <p:nvSpPr>
-              <p:cNvPr id="14" name="TextBox 13">
-                <a:extLst>
-                  <a:ext uri="{FF2B5EF4-FFF2-40B4-BE49-F238E27FC236}">
-                    <a16:creationId xmlns:a16="http://schemas.microsoft.com/office/drawing/2014/main" id="{22101277-4EEF-32F3-34BA-42DFFBCA2A76}"/>
-                  </a:ext>
-                </a:extLst>
-              </p:cNvPr>
-              <p:cNvSpPr txBox="1"/>
-              <p:nvPr/>
-            </p:nvSpPr>
-            <p:spPr>
-              <a:xfrm>
-                <a:off x="6366774" y="2712821"/>
-                <a:ext cx="577755" cy="391646"/>
-              </a:xfrm>
-              <a:prstGeom prst="rect">
-                <a:avLst/>
-              </a:prstGeom>
-              <a:noFill/>
-            </p:spPr>
-            <p:txBody>
-              <a:bodyPr wrap="square">
-                <a:spAutoFit/>
-              </a:bodyPr>
-              <a:lstStyle/>
-              <a:p>
-                <a:pPr/>
-                <a14:m>
-                  <m:oMathPara xmlns:m="http://schemas.openxmlformats.org/officeDocument/2006/math">
-                    <m:oMathParaPr>
-                      <m:jc m:val="centerGroup"/>
-                    </m:oMathParaPr>
-                    <m:oMath xmlns:m="http://schemas.openxmlformats.org/officeDocument/2006/math">
-                      <m:acc>
-                        <m:accPr>
-                          <m:chr m:val="̂"/>
-                          <m:ctrlPr>
-                            <a:rPr lang="en-US" b="0" i="1" smtClean="0">
-                              <a:latin typeface="Cambria Math" panose="02040503050406030204" pitchFamily="18" charset="0"/>
-                            </a:rPr>
-                          </m:ctrlPr>
-                        </m:accPr>
-                        <m:e>
-                          <m:sSub>
-                            <m:sSubPr>
-                              <m:ctrlPr>
-                                <a:rPr lang="en-US" i="1">
-                                  <a:latin typeface="Cambria Math" panose="02040503050406030204" pitchFamily="18" charset="0"/>
-                                </a:rPr>
-                              </m:ctrlPr>
-                            </m:sSubPr>
-                            <m:e>
-                              <m:r>
-                                <a:rPr lang="en-US" i="1">
-                                  <a:latin typeface="Cambria Math" panose="02040503050406030204" pitchFamily="18" charset="0"/>
-                                </a:rPr>
-                                <m:t>𝑣</m:t>
-                              </m:r>
-                            </m:e>
-                            <m:sub>
-                              <m:r>
-                                <a:rPr lang="en-US" b="0" i="1" smtClean="0">
-                                  <a:latin typeface="Cambria Math" panose="02040503050406030204" pitchFamily="18" charset="0"/>
-                                </a:rPr>
-                                <m:t>𝑗</m:t>
-                              </m:r>
-                            </m:sub>
-                          </m:sSub>
-                        </m:e>
-                      </m:acc>
-                    </m:oMath>
-                  </m:oMathPara>
-                </a14:m>
-                <a:endParaRPr lang="en-US" dirty="0"/>
-              </a:p>
-            </p:txBody>
-          </p:sp>
-        </mc:Choice>
-        <mc:Fallback xmlns="">
-          <p:sp>
-            <p:nvSpPr>
-              <p:cNvPr id="14" name="TextBox 13">
-                <a:extLst>
-                  <a:ext uri="{FF2B5EF4-FFF2-40B4-BE49-F238E27FC236}">
-                    <a16:creationId xmlns:a16="http://schemas.microsoft.com/office/drawing/2014/main" id="{22101277-4EEF-32F3-34BA-42DFFBCA2A76}"/>
-                  </a:ext>
-                </a:extLst>
-              </p:cNvPr>
-              <p:cNvSpPr txBox="1">
-                <a:spLocks noRot="1" noChangeAspect="1" noMove="1" noResize="1" noEditPoints="1" noAdjustHandles="1" noChangeArrowheads="1" noChangeShapeType="1" noTextEdit="1"/>
-              </p:cNvSpPr>
-              <p:nvPr/>
-            </p:nvSpPr>
-            <p:spPr>
-              <a:xfrm>
-                <a:off x="6366774" y="2712821"/>
-                <a:ext cx="577755" cy="391646"/>
-              </a:xfrm>
-              <a:prstGeom prst="rect">
-                <a:avLst/>
-              </a:prstGeom>
-              <a:blipFill>
-                <a:blip r:embed="rId3"/>
-                <a:stretch>
-                  <a:fillRect t="-4688" r="-22105" b="-9375"/>
-                </a:stretch>
-              </a:blipFill>
-            </p:spPr>
-            <p:txBody>
-              <a:bodyPr/>
-              <a:lstStyle/>
-              <a:p>
-                <a:r>
-                  <a:rPr lang="en-US">
-                    <a:noFill/>
-                  </a:rPr>
-                  <a:t> </a:t>
-                </a:r>
-              </a:p>
-            </p:txBody>
-          </p:sp>
-        </mc:Fallback>
-      </mc:AlternateContent>
-      <mc:AlternateContent xmlns:mc="http://schemas.openxmlformats.org/markup-compatibility/2006" xmlns:a14="http://schemas.microsoft.com/office/drawing/2010/main">
-        <mc:Choice Requires="a14">
-          <p:sp>
-            <p:nvSpPr>
-              <p:cNvPr id="16" name="TextBox 15">
-                <a:extLst>
-                  <a:ext uri="{FF2B5EF4-FFF2-40B4-BE49-F238E27FC236}">
-                    <a16:creationId xmlns:a16="http://schemas.microsoft.com/office/drawing/2014/main" id="{81F70075-E495-0782-6385-14BEB3262BA0}"/>
-                  </a:ext>
-                </a:extLst>
-              </p:cNvPr>
-              <p:cNvSpPr txBox="1"/>
-              <p:nvPr/>
-            </p:nvSpPr>
-            <p:spPr>
-              <a:xfrm>
-                <a:off x="6905273" y="3032490"/>
-                <a:ext cx="763066" cy="391646"/>
-              </a:xfrm>
-              <a:prstGeom prst="rect">
-                <a:avLst/>
-              </a:prstGeom>
-              <a:noFill/>
-            </p:spPr>
-            <p:txBody>
-              <a:bodyPr wrap="square">
-                <a:spAutoFit/>
-              </a:bodyPr>
-              <a:lstStyle/>
-              <a:p>
-                <a:pPr/>
-                <a14:m>
-                  <m:oMathPara xmlns:m="http://schemas.openxmlformats.org/officeDocument/2006/math">
-                    <m:oMathParaPr>
-                      <m:jc m:val="centerGroup"/>
-                    </m:oMathParaPr>
-                    <m:oMath xmlns:m="http://schemas.openxmlformats.org/officeDocument/2006/math">
-                      <m:acc>
-                        <m:accPr>
-                          <m:chr m:val="̂"/>
-                          <m:ctrlPr>
-                            <a:rPr lang="en-US" i="1" smtClean="0">
-                              <a:latin typeface="Cambria Math" panose="02040503050406030204" pitchFamily="18" charset="0"/>
-                            </a:rPr>
-                          </m:ctrlPr>
-                        </m:accPr>
-                        <m:e>
-                          <m:sSub>
-                            <m:sSubPr>
-                              <m:ctrlPr>
-                                <a:rPr lang="en-US" i="1">
-                                  <a:latin typeface="Cambria Math" panose="02040503050406030204" pitchFamily="18" charset="0"/>
-                                </a:rPr>
-                              </m:ctrlPr>
-                            </m:sSubPr>
-                            <m:e>
-                              <m:r>
-                                <a:rPr lang="en-US" i="1">
-                                  <a:latin typeface="Cambria Math" panose="02040503050406030204" pitchFamily="18" charset="0"/>
-                                </a:rPr>
-                                <m:t>𝑛</m:t>
-                              </m:r>
-                            </m:e>
-                            <m:sub>
-                              <m:r>
-                                <a:rPr lang="en-US" b="0" i="1" smtClean="0">
-                                  <a:latin typeface="Cambria Math" panose="02040503050406030204" pitchFamily="18" charset="0"/>
-                                </a:rPr>
-                                <m:t>𝑗</m:t>
-                              </m:r>
-                            </m:sub>
-                          </m:sSub>
-                        </m:e>
-                      </m:acc>
-                    </m:oMath>
-                  </m:oMathPara>
-                </a14:m>
-                <a:endParaRPr lang="en-US" dirty="0"/>
-              </a:p>
-            </p:txBody>
-          </p:sp>
-        </mc:Choice>
-        <mc:Fallback xmlns="">
-          <p:sp>
-            <p:nvSpPr>
-              <p:cNvPr id="16" name="TextBox 15">
-                <a:extLst>
-                  <a:ext uri="{FF2B5EF4-FFF2-40B4-BE49-F238E27FC236}">
-                    <a16:creationId xmlns:a16="http://schemas.microsoft.com/office/drawing/2014/main" id="{81F70075-E495-0782-6385-14BEB3262BA0}"/>
-                  </a:ext>
-                </a:extLst>
-              </p:cNvPr>
-              <p:cNvSpPr txBox="1">
-                <a:spLocks noRot="1" noChangeAspect="1" noMove="1" noResize="1" noEditPoints="1" noAdjustHandles="1" noChangeArrowheads="1" noChangeShapeType="1" noTextEdit="1"/>
-              </p:cNvSpPr>
-              <p:nvPr/>
-            </p:nvSpPr>
-            <p:spPr>
-              <a:xfrm>
-                <a:off x="6905273" y="3032490"/>
-                <a:ext cx="763066" cy="391646"/>
-              </a:xfrm>
-              <a:prstGeom prst="rect">
-                <a:avLst/>
-              </a:prstGeom>
-              <a:blipFill>
-                <a:blip r:embed="rId4"/>
-                <a:stretch>
-                  <a:fillRect t="-4615" r="-23200" b="-7692"/>
-                </a:stretch>
-              </a:blipFill>
-            </p:spPr>
-            <p:txBody>
-              <a:bodyPr/>
-              <a:lstStyle/>
-              <a:p>
-                <a:r>
-                  <a:rPr lang="en-US">
-                    <a:noFill/>
-                  </a:rPr>
-                  <a:t> </a:t>
-                </a:r>
-              </a:p>
-            </p:txBody>
-          </p:sp>
-        </mc:Fallback>
-      </mc:AlternateContent>
-      <mc:AlternateContent xmlns:mc="http://schemas.openxmlformats.org/markup-compatibility/2006" xmlns:a14="http://schemas.microsoft.com/office/drawing/2010/main">
-        <mc:Choice Requires="a14">
-          <p:sp>
-            <p:nvSpPr>
-              <p:cNvPr id="18" name="TextBox 17">
-                <a:extLst>
-                  <a:ext uri="{FF2B5EF4-FFF2-40B4-BE49-F238E27FC236}">
-                    <a16:creationId xmlns:a16="http://schemas.microsoft.com/office/drawing/2014/main" id="{5D77E69E-9C8B-A856-9753-39943AC56ED6}"/>
-                  </a:ext>
-                </a:extLst>
-              </p:cNvPr>
-              <p:cNvSpPr txBox="1"/>
-              <p:nvPr/>
-            </p:nvSpPr>
-            <p:spPr>
-              <a:xfrm>
-                <a:off x="6369664" y="3021888"/>
-                <a:ext cx="468573" cy="391646"/>
-              </a:xfrm>
-              <a:prstGeom prst="rect">
-                <a:avLst/>
-              </a:prstGeom>
-              <a:noFill/>
-            </p:spPr>
-            <p:txBody>
-              <a:bodyPr wrap="square">
-                <a:spAutoFit/>
-              </a:bodyPr>
-              <a:lstStyle/>
-              <a:p>
-                <a:pPr/>
-                <a14:m>
-                  <m:oMathPara xmlns:m="http://schemas.openxmlformats.org/officeDocument/2006/math">
-                    <m:oMathParaPr>
-                      <m:jc m:val="centerGroup"/>
-                    </m:oMathParaPr>
-                    <m:oMath xmlns:m="http://schemas.openxmlformats.org/officeDocument/2006/math">
-                      <m:sSub>
-                        <m:sSubPr>
-                          <m:ctrlPr>
-                            <a:rPr lang="en-US" b="0" i="1" smtClean="0">
-                              <a:latin typeface="Cambria Math" panose="02040503050406030204" pitchFamily="18" charset="0"/>
-                            </a:rPr>
-                          </m:ctrlPr>
-                        </m:sSubPr>
-                        <m:e>
-                          <m:r>
-                            <a:rPr lang="en-US" b="0" i="1" smtClean="0">
-                              <a:latin typeface="Cambria Math" panose="02040503050406030204" pitchFamily="18" charset="0"/>
-                            </a:rPr>
-                            <m:t>𝑙</m:t>
-                          </m:r>
-                        </m:e>
-                        <m:sub>
-                          <m:r>
-                            <a:rPr lang="en-US" b="0" i="1" smtClean="0">
-                              <a:latin typeface="Cambria Math" panose="02040503050406030204" pitchFamily="18" charset="0"/>
-                            </a:rPr>
-                            <m:t>𝑗</m:t>
-                          </m:r>
-                        </m:sub>
-                      </m:sSub>
-                    </m:oMath>
-                  </m:oMathPara>
-                </a14:m>
-                <a:endParaRPr lang="en-US" dirty="0"/>
-              </a:p>
-            </p:txBody>
-          </p:sp>
-        </mc:Choice>
-        <mc:Fallback xmlns="">
-          <p:sp>
-            <p:nvSpPr>
-              <p:cNvPr id="18" name="TextBox 17">
-                <a:extLst>
-                  <a:ext uri="{FF2B5EF4-FFF2-40B4-BE49-F238E27FC236}">
-                    <a16:creationId xmlns:a16="http://schemas.microsoft.com/office/drawing/2014/main" id="{5D77E69E-9C8B-A856-9753-39943AC56ED6}"/>
-                  </a:ext>
-                </a:extLst>
-              </p:cNvPr>
-              <p:cNvSpPr txBox="1">
-                <a:spLocks noRot="1" noChangeAspect="1" noMove="1" noResize="1" noEditPoints="1" noAdjustHandles="1" noChangeArrowheads="1" noChangeShapeType="1" noTextEdit="1"/>
-              </p:cNvSpPr>
-              <p:nvPr/>
-            </p:nvSpPr>
-            <p:spPr>
-              <a:xfrm>
-                <a:off x="6369664" y="3021888"/>
-                <a:ext cx="468573" cy="391646"/>
-              </a:xfrm>
-              <a:prstGeom prst="rect">
-                <a:avLst/>
-              </a:prstGeom>
-              <a:blipFill>
-                <a:blip r:embed="rId5"/>
-                <a:stretch>
-                  <a:fillRect b="-7813"/>
-                </a:stretch>
-              </a:blipFill>
-            </p:spPr>
-            <p:txBody>
-              <a:bodyPr/>
-              <a:lstStyle/>
-              <a:p>
-                <a:r>
-                  <a:rPr lang="en-US">
-                    <a:noFill/>
-                  </a:rPr>
-                  <a:t> </a:t>
-                </a:r>
-              </a:p>
-            </p:txBody>
-          </p:sp>
-        </mc:Fallback>
-      </mc:AlternateContent>
-      <mc:AlternateContent xmlns:mc="http://schemas.openxmlformats.org/markup-compatibility/2006" xmlns:a14="http://schemas.microsoft.com/office/drawing/2010/main">
-        <mc:Choice Requires="a14">
-          <p:sp>
-            <p:nvSpPr>
-              <p:cNvPr id="19" name="TextBox 18">
-                <a:extLst>
-                  <a:ext uri="{FF2B5EF4-FFF2-40B4-BE49-F238E27FC236}">
-                    <a16:creationId xmlns:a16="http://schemas.microsoft.com/office/drawing/2014/main" id="{0C42DB23-9755-27CF-FB75-3F9115E34465}"/>
-                  </a:ext>
-                </a:extLst>
-              </p:cNvPr>
-              <p:cNvSpPr txBox="1"/>
-              <p:nvPr/>
-            </p:nvSpPr>
-            <p:spPr>
-              <a:xfrm>
-                <a:off x="6746574" y="2955070"/>
-                <a:ext cx="468573" cy="369332"/>
-              </a:xfrm>
-              <a:prstGeom prst="rect">
-                <a:avLst/>
-              </a:prstGeom>
-              <a:noFill/>
-            </p:spPr>
-            <p:txBody>
-              <a:bodyPr wrap="square">
-                <a:spAutoFit/>
-              </a:bodyPr>
-              <a:lstStyle/>
-              <a:p>
-                <a:pPr/>
-                <a14:m>
-                  <m:oMathPara xmlns:m="http://schemas.openxmlformats.org/officeDocument/2006/math">
-                    <m:oMathParaPr>
-                      <m:jc m:val="centerGroup"/>
-                    </m:oMathParaPr>
-                    <m:oMath xmlns:m="http://schemas.openxmlformats.org/officeDocument/2006/math">
-                      <m:r>
-                        <a:rPr lang="en-US" b="0" i="1" smtClean="0">
-                          <a:latin typeface="Cambria Math" panose="02040503050406030204" pitchFamily="18" charset="0"/>
-                        </a:rPr>
-                        <m:t>𝑑</m:t>
-                      </m:r>
-                    </m:oMath>
-                  </m:oMathPara>
-                </a14:m>
-                <a:endParaRPr lang="en-US" dirty="0"/>
-              </a:p>
-            </p:txBody>
-          </p:sp>
-        </mc:Choice>
-        <mc:Fallback xmlns="">
-          <p:sp>
-            <p:nvSpPr>
-              <p:cNvPr id="19" name="TextBox 18">
-                <a:extLst>
-                  <a:ext uri="{FF2B5EF4-FFF2-40B4-BE49-F238E27FC236}">
-                    <a16:creationId xmlns:a16="http://schemas.microsoft.com/office/drawing/2014/main" id="{0C42DB23-9755-27CF-FB75-3F9115E34465}"/>
-                  </a:ext>
-                </a:extLst>
-              </p:cNvPr>
-              <p:cNvSpPr txBox="1">
-                <a:spLocks noRot="1" noChangeAspect="1" noMove="1" noResize="1" noEditPoints="1" noAdjustHandles="1" noChangeArrowheads="1" noChangeShapeType="1" noTextEdit="1"/>
-              </p:cNvSpPr>
-              <p:nvPr/>
-            </p:nvSpPr>
-            <p:spPr>
-              <a:xfrm>
-                <a:off x="6746574" y="2955070"/>
-                <a:ext cx="468573" cy="369332"/>
-              </a:xfrm>
-              <a:prstGeom prst="rect">
-                <a:avLst/>
-              </a:prstGeom>
-              <a:blipFill>
-                <a:blip r:embed="rId6"/>
-                <a:stretch>
-                  <a:fillRect/>
-                </a:stretch>
-              </a:blipFill>
-            </p:spPr>
-            <p:txBody>
-              <a:bodyPr/>
-              <a:lstStyle/>
-              <a:p>
-                <a:r>
-                  <a:rPr lang="en-US">
-                    <a:noFill/>
-                  </a:rPr>
-                  <a:t> </a:t>
-                </a:r>
-              </a:p>
-            </p:txBody>
-          </p:sp>
-        </mc:Fallback>
-      </mc:AlternateContent>
+      </p:pic>
     </p:spTree>
     <p:extLst>
       <p:ext uri="{BB962C8B-B14F-4D97-AF65-F5344CB8AC3E}">
-        <p14:creationId xmlns:p14="http://schemas.microsoft.com/office/powerpoint/2010/main" val="1760538069"/>
+        <p14:creationId xmlns:p14="http://schemas.microsoft.com/office/powerpoint/2010/main" val="1782756671"/>
       </p:ext>
     </p:extLst>
   </p:cSld>
@@ -15620,12 +16249,18 @@
 </p:sld>
 </file>
 
-<file path=ppt/slides/slide3.xml><?xml version="1.0" encoding="utf-8"?>
+<file path=ppt/slides/slide32.xml><?xml version="1.0" encoding="utf-8"?>
 <p:sld xmlns:a="http://schemas.openxmlformats.org/drawingml/2006/main" xmlns:r="http://schemas.openxmlformats.org/officeDocument/2006/relationships" xmlns:p="http://schemas.openxmlformats.org/presentationml/2006/main">
   <p:cSld>
     <p:spTree>
       <p:nvGrpSpPr>
-        <p:cNvPr id="1" name=""/>
+        <p:cNvPr id="1" name="">
+          <a:extLst>
+            <a:ext uri="{FF2B5EF4-FFF2-40B4-BE49-F238E27FC236}">
+              <a16:creationId xmlns:a16="http://schemas.microsoft.com/office/drawing/2014/main" id="{434B47B7-A3B9-0B69-485F-BD711BD487B2}"/>
+            </a:ext>
+          </a:extLst>
+        </p:cNvPr>
         <p:cNvGrpSpPr/>
         <p:nvPr/>
       </p:nvGrpSpPr>
@@ -15642,7 +16277,7 @@
           <p:cNvPr id="2" name="Title 1">
             <a:extLst>
               <a:ext uri="{FF2B5EF4-FFF2-40B4-BE49-F238E27FC236}">
-                <a16:creationId xmlns:a16="http://schemas.microsoft.com/office/drawing/2014/main" id="{F61BB289-6F7D-4E26-9549-A418B0B98DBB}"/>
+                <a16:creationId xmlns:a16="http://schemas.microsoft.com/office/drawing/2014/main" id="{79916BA4-BEE8-4016-C252-0BDDC29CB0FC}"/>
               </a:ext>
             </a:extLst>
           </p:cNvPr>
@@ -15656,603 +16291,88 @@
         <p:spPr/>
         <p:txBody>
           <a:bodyPr>
-            <a:normAutofit/>
+            <a:noAutofit/>
           </a:bodyPr>
           <a:lstStyle/>
           <a:p>
             <a:r>
-              <a:rPr lang="en-US" dirty="0"/>
-              <a:t>Each function uses a class-specific argument check function</a:t>
+              <a:rPr lang="en-US" sz="3600" dirty="0"/>
+              <a:t>Step 3: This is implemented by simply finding the smallest radius among all fitted spheres</a:t>
             </a:r>
           </a:p>
         </p:txBody>
       </p:sp>
       <p:sp>
         <p:nvSpPr>
-          <p:cNvPr id="5" name="Rectangle 4">
+          <p:cNvPr id="4" name="Content Placeholder 3">
             <a:extLst>
               <a:ext uri="{FF2B5EF4-FFF2-40B4-BE49-F238E27FC236}">
-                <a16:creationId xmlns:a16="http://schemas.microsoft.com/office/drawing/2014/main" id="{F0CB9B29-E4C5-4A4F-9118-99BC76FA2AD9}"/>
+                <a16:creationId xmlns:a16="http://schemas.microsoft.com/office/drawing/2014/main" id="{D141612E-C4A5-ACC5-72CF-CF73F2A788B6}"/>
               </a:ext>
             </a:extLst>
           </p:cNvPr>
-          <p:cNvSpPr/>
-          <p:nvPr/>
+          <p:cNvSpPr>
+            <a:spLocks noGrp="1"/>
+          </p:cNvSpPr>
+          <p:nvPr>
+            <p:ph idx="1"/>
+          </p:nvPr>
         </p:nvSpPr>
         <p:spPr>
           <a:xfrm>
-            <a:off x="374433" y="2022133"/>
-            <a:ext cx="5909136" cy="3554819"/>
+            <a:off x="838200" y="1825625"/>
+            <a:ext cx="4552666" cy="4351338"/>
           </a:xfrm>
-          <a:prstGeom prst="rect">
-            <a:avLst/>
-          </a:prstGeom>
-          <a:solidFill>
-            <a:schemeClr val="accent4">
-              <a:lumMod val="20000"/>
-              <a:lumOff val="80000"/>
-            </a:schemeClr>
-          </a:solidFill>
         </p:spPr>
         <p:txBody>
-          <a:bodyPr wrap="square">
-            <a:spAutoFit/>
+          <a:bodyPr>
+            <a:normAutofit fontScale="92500" lnSpcReduction="10000"/>
           </a:bodyPr>
           <a:lstStyle/>
           <a:p>
-            <a:r>
-              <a:rPr lang="en-US" sz="900" dirty="0">
-                <a:solidFill>
-                  <a:srgbClr val="0E00FF"/>
-                </a:solidFill>
-                <a:latin typeface="Courier New" panose="02070309020205020404" pitchFamily="49" charset="0"/>
-              </a:rPr>
-              <a:t>function</a:t>
-            </a:r>
-            <a:r>
-              <a:rPr lang="en-US" sz="900" dirty="0">
-                <a:solidFill>
-                  <a:srgbClr val="000000"/>
-                </a:solidFill>
-                <a:latin typeface="Courier New" panose="02070309020205020404" pitchFamily="49" charset="0"/>
-              </a:rPr>
-              <a:t> </a:t>
-            </a:r>
-            <a:r>
-              <a:rPr lang="en-US" sz="900" dirty="0" err="1">
-                <a:solidFill>
-                  <a:srgbClr val="000000"/>
-                </a:solidFill>
-                <a:latin typeface="Courier New" panose="02070309020205020404" pitchFamily="49" charset="0"/>
-              </a:rPr>
-              <a:t>fcn_MapGen_checkInputsToFunctions</a:t>
-            </a:r>
-            <a:r>
-              <a:rPr lang="en-US" sz="900" dirty="0">
-                <a:solidFill>
-                  <a:srgbClr val="000000"/>
-                </a:solidFill>
-                <a:latin typeface="Courier New" panose="02070309020205020404" pitchFamily="49" charset="0"/>
-              </a:rPr>
-              <a:t>(</a:t>
-            </a:r>
-            <a:r>
-              <a:rPr lang="en-US" sz="900" dirty="0">
-                <a:solidFill>
-                  <a:srgbClr val="0E00FF"/>
-                </a:solidFill>
-                <a:latin typeface="Courier New" panose="02070309020205020404" pitchFamily="49" charset="0"/>
-              </a:rPr>
-              <a:t>...</a:t>
-            </a:r>
-          </a:p>
-          <a:p>
-            <a:r>
-              <a:rPr lang="en-US" sz="900" dirty="0">
-                <a:solidFill>
-                  <a:srgbClr val="000000"/>
-                </a:solidFill>
-                <a:latin typeface="Courier New" panose="02070309020205020404" pitchFamily="49" charset="0"/>
-              </a:rPr>
-              <a:t>    </a:t>
-            </a:r>
-            <a:r>
-              <a:rPr lang="en-US" sz="900" dirty="0" err="1">
-                <a:solidFill>
-                  <a:srgbClr val="000000"/>
-                </a:solidFill>
-                <a:latin typeface="Courier New" panose="02070309020205020404" pitchFamily="49" charset="0"/>
-              </a:rPr>
-              <a:t>variable,variable_type_string,varargin</a:t>
-            </a:r>
-            <a:r>
-              <a:rPr lang="en-US" sz="900" dirty="0">
-                <a:solidFill>
-                  <a:srgbClr val="000000"/>
-                </a:solidFill>
-                <a:latin typeface="Courier New" panose="02070309020205020404" pitchFamily="49" charset="0"/>
-              </a:rPr>
-              <a:t>)</a:t>
-            </a:r>
-          </a:p>
-          <a:p>
-            <a:r>
-              <a:rPr lang="en-US" sz="900" dirty="0">
-                <a:solidFill>
-                  <a:srgbClr val="000000"/>
-                </a:solidFill>
-                <a:latin typeface="Courier New" panose="02070309020205020404" pitchFamily="49" charset="0"/>
-              </a:rPr>
-              <a:t> </a:t>
-            </a:r>
-          </a:p>
-          <a:p>
-            <a:r>
-              <a:rPr lang="en-US" sz="900" dirty="0">
-                <a:solidFill>
-                  <a:srgbClr val="028009"/>
-                </a:solidFill>
-                <a:latin typeface="Courier New" panose="02070309020205020404" pitchFamily="49" charset="0"/>
-              </a:rPr>
-              <a:t>% </a:t>
-            </a:r>
-            <a:r>
-              <a:rPr lang="en-US" sz="900" dirty="0" err="1">
-                <a:solidFill>
-                  <a:srgbClr val="028009"/>
-                </a:solidFill>
-                <a:latin typeface="Courier New" panose="02070309020205020404" pitchFamily="49" charset="0"/>
-              </a:rPr>
-              <a:t>fcn_MapGen_checkInputsToFunctions</a:t>
-            </a:r>
-            <a:endParaRPr lang="en-US" sz="900" dirty="0">
-              <a:solidFill>
-                <a:srgbClr val="028009"/>
-              </a:solidFill>
-              <a:latin typeface="Courier New" panose="02070309020205020404" pitchFamily="49" charset="0"/>
-            </a:endParaRPr>
-          </a:p>
-          <a:p>
-            <a:r>
-              <a:rPr lang="en-US" sz="900" dirty="0">
-                <a:solidFill>
-                  <a:srgbClr val="028009"/>
-                </a:solidFill>
-                <a:latin typeface="Courier New" panose="02070309020205020404" pitchFamily="49" charset="0"/>
-              </a:rPr>
-              <a:t>% Checks the variable types commonly used in the </a:t>
-            </a:r>
-            <a:r>
-              <a:rPr lang="en-US" sz="900" dirty="0" err="1">
-                <a:solidFill>
-                  <a:srgbClr val="028009"/>
-                </a:solidFill>
-                <a:latin typeface="Courier New" panose="02070309020205020404" pitchFamily="49" charset="0"/>
-              </a:rPr>
-              <a:t>MapGen</a:t>
-            </a:r>
-            <a:r>
-              <a:rPr lang="en-US" sz="900" dirty="0">
-                <a:solidFill>
-                  <a:srgbClr val="028009"/>
-                </a:solidFill>
-                <a:latin typeface="Courier New" panose="02070309020205020404" pitchFamily="49" charset="0"/>
-              </a:rPr>
-              <a:t> codes to</a:t>
-            </a:r>
-          </a:p>
-          <a:p>
-            <a:r>
-              <a:rPr lang="en-US" sz="900" dirty="0">
-                <a:solidFill>
-                  <a:srgbClr val="028009"/>
-                </a:solidFill>
-                <a:latin typeface="Courier New" panose="02070309020205020404" pitchFamily="49" charset="0"/>
-              </a:rPr>
-              <a:t>% ensure they are correctly formed.</a:t>
-            </a:r>
-          </a:p>
-          <a:p>
-            <a:r>
-              <a:rPr lang="en-US" sz="900" dirty="0">
-                <a:solidFill>
-                  <a:srgbClr val="028009"/>
-                </a:solidFill>
-                <a:latin typeface="Courier New" panose="02070309020205020404" pitchFamily="49" charset="0"/>
-              </a:rPr>
-              <a:t>%</a:t>
-            </a:r>
-          </a:p>
-          <a:p>
-            <a:r>
-              <a:rPr lang="en-US" sz="900" dirty="0">
-                <a:solidFill>
-                  <a:srgbClr val="028009"/>
-                </a:solidFill>
-                <a:latin typeface="Courier New" panose="02070309020205020404" pitchFamily="49" charset="0"/>
-              </a:rPr>
-              <a:t>% This function is typically called at the top of most functions. The input</a:t>
-            </a:r>
-          </a:p>
-          <a:p>
-            <a:r>
-              <a:rPr lang="en-US" sz="900" dirty="0">
-                <a:solidFill>
-                  <a:srgbClr val="028009"/>
-                </a:solidFill>
-                <a:latin typeface="Courier New" panose="02070309020205020404" pitchFamily="49" charset="0"/>
-              </a:rPr>
-              <a:t>% is a variable and a string defining the "type" of the variable. This</a:t>
-            </a:r>
-          </a:p>
-          <a:p>
-            <a:r>
-              <a:rPr lang="en-US" sz="900" dirty="0">
-                <a:solidFill>
-                  <a:srgbClr val="028009"/>
-                </a:solidFill>
-                <a:latin typeface="Courier New" panose="02070309020205020404" pitchFamily="49" charset="0"/>
-              </a:rPr>
-              <a:t>% function checks to see that they are compatible. For example, say there</a:t>
-            </a:r>
-          </a:p>
-          <a:p>
-            <a:r>
-              <a:rPr lang="en-US" sz="900" dirty="0">
-                <a:solidFill>
-                  <a:srgbClr val="028009"/>
-                </a:solidFill>
-                <a:latin typeface="Courier New" panose="02070309020205020404" pitchFamily="49" charset="0"/>
-              </a:rPr>
-              <a:t>% '</a:t>
-            </a:r>
-            <a:r>
-              <a:rPr lang="en-US" sz="900" dirty="0" err="1">
-                <a:solidFill>
-                  <a:srgbClr val="028009"/>
-                </a:solidFill>
-                <a:latin typeface="Courier New" panose="02070309020205020404" pitchFamily="49" charset="0"/>
-              </a:rPr>
-              <a:t>column_vector</a:t>
-            </a:r>
-            <a:r>
-              <a:rPr lang="en-US" sz="900" dirty="0">
-                <a:solidFill>
-                  <a:srgbClr val="028009"/>
-                </a:solidFill>
-                <a:latin typeface="Courier New" panose="02070309020205020404" pitchFamily="49" charset="0"/>
-              </a:rPr>
-              <a:t>' type of variables used in the function that is always a N</a:t>
-            </a:r>
-          </a:p>
-          <a:p>
-            <a:r>
-              <a:rPr lang="en-US" sz="900" dirty="0">
-                <a:solidFill>
-                  <a:srgbClr val="028009"/>
-                </a:solidFill>
-                <a:latin typeface="Courier New" panose="02070309020205020404" pitchFamily="49" charset="0"/>
-              </a:rPr>
-              <a:t>% x 1 array; if someone had a variable called "</a:t>
-            </a:r>
-            <a:r>
-              <a:rPr lang="en-US" sz="900" dirty="0" err="1">
-                <a:solidFill>
-                  <a:srgbClr val="028009"/>
-                </a:solidFill>
-                <a:latin typeface="Courier New" panose="02070309020205020404" pitchFamily="49" charset="0"/>
-              </a:rPr>
-              <a:t>test_example</a:t>
-            </a:r>
-            <a:r>
-              <a:rPr lang="en-US" sz="900" dirty="0">
-                <a:solidFill>
-                  <a:srgbClr val="028009"/>
-                </a:solidFill>
-                <a:latin typeface="Courier New" panose="02070309020205020404" pitchFamily="49" charset="0"/>
-              </a:rPr>
-              <a:t>", they could</a:t>
-            </a:r>
-          </a:p>
-          <a:p>
-            <a:r>
-              <a:rPr lang="en-US" sz="900" dirty="0">
-                <a:solidFill>
-                  <a:srgbClr val="028009"/>
-                </a:solidFill>
-                <a:latin typeface="Courier New" panose="02070309020205020404" pitchFamily="49" charset="0"/>
-              </a:rPr>
-              <a:t>% check that this fit the '</a:t>
-            </a:r>
-            <a:r>
-              <a:rPr lang="en-US" sz="900" dirty="0" err="1">
-                <a:solidFill>
-                  <a:srgbClr val="028009"/>
-                </a:solidFill>
-                <a:latin typeface="Courier New" panose="02070309020205020404" pitchFamily="49" charset="0"/>
-              </a:rPr>
-              <a:t>column_vector</a:t>
-            </a:r>
-            <a:r>
-              <a:rPr lang="en-US" sz="900" dirty="0">
-                <a:solidFill>
-                  <a:srgbClr val="028009"/>
-                </a:solidFill>
-                <a:latin typeface="Courier New" panose="02070309020205020404" pitchFamily="49" charset="0"/>
-              </a:rPr>
-              <a:t>' type by calling</a:t>
-            </a:r>
-          </a:p>
-          <a:p>
-            <a:r>
-              <a:rPr lang="en-US" sz="900" dirty="0">
-                <a:solidFill>
-                  <a:srgbClr val="028009"/>
-                </a:solidFill>
-                <a:latin typeface="Courier New" panose="02070309020205020404" pitchFamily="49" charset="0"/>
-              </a:rPr>
-              <a:t>% </a:t>
-            </a:r>
-            <a:r>
-              <a:rPr lang="en-US" sz="900" dirty="0" err="1">
-                <a:solidFill>
-                  <a:srgbClr val="028009"/>
-                </a:solidFill>
-                <a:latin typeface="Courier New" panose="02070309020205020404" pitchFamily="49" charset="0"/>
-              </a:rPr>
-              <a:t>fcn_MapGen_checkInputsToFunctions</a:t>
-            </a:r>
-            <a:r>
-              <a:rPr lang="en-US" sz="900" dirty="0">
-                <a:solidFill>
-                  <a:srgbClr val="028009"/>
-                </a:solidFill>
-                <a:latin typeface="Courier New" panose="02070309020205020404" pitchFamily="49" charset="0"/>
-              </a:rPr>
-              <a:t>(test_example,'</a:t>
-            </a:r>
-            <a:r>
-              <a:rPr lang="en-US" sz="900" dirty="0" err="1">
-                <a:solidFill>
-                  <a:srgbClr val="028009"/>
-                </a:solidFill>
-                <a:latin typeface="Courier New" panose="02070309020205020404" pitchFamily="49" charset="0"/>
-              </a:rPr>
-              <a:t>column_vector</a:t>
-            </a:r>
-            <a:r>
-              <a:rPr lang="en-US" sz="900" dirty="0">
-                <a:solidFill>
-                  <a:srgbClr val="028009"/>
-                </a:solidFill>
-                <a:latin typeface="Courier New" panose="02070309020205020404" pitchFamily="49" charset="0"/>
-              </a:rPr>
-              <a:t>').</a:t>
-            </a:r>
-          </a:p>
-          <a:p>
-            <a:r>
-              <a:rPr lang="en-US" sz="900" dirty="0">
-                <a:solidFill>
-                  <a:srgbClr val="028009"/>
-                </a:solidFill>
-                <a:latin typeface="Courier New" panose="02070309020205020404" pitchFamily="49" charset="0"/>
-              </a:rPr>
-              <a:t>% This function would then check that the array was N x 1, and if it was</a:t>
-            </a:r>
-          </a:p>
-          <a:p>
-            <a:r>
-              <a:rPr lang="en-US" sz="900" dirty="0">
-                <a:solidFill>
-                  <a:srgbClr val="028009"/>
-                </a:solidFill>
-                <a:latin typeface="Courier New" panose="02070309020205020404" pitchFamily="49" charset="0"/>
-              </a:rPr>
-              <a:t>% not, it would send out an error warning.</a:t>
-            </a:r>
-          </a:p>
-          <a:p>
-            <a:r>
-              <a:rPr lang="en-US" sz="900" dirty="0">
-                <a:solidFill>
-                  <a:srgbClr val="028009"/>
-                </a:solidFill>
-                <a:latin typeface="Courier New" panose="02070309020205020404" pitchFamily="49" charset="0"/>
-              </a:rPr>
-              <a:t>%</a:t>
-            </a:r>
-          </a:p>
-          <a:p>
-            <a:r>
-              <a:rPr lang="en-US" sz="900" dirty="0">
-                <a:solidFill>
-                  <a:srgbClr val="028009"/>
-                </a:solidFill>
-                <a:latin typeface="Courier New" panose="02070309020205020404" pitchFamily="49" charset="0"/>
-              </a:rPr>
-              <a:t>% FORMAT:</a:t>
-            </a:r>
-          </a:p>
-          <a:p>
-            <a:r>
-              <a:rPr lang="en-US" sz="900" dirty="0">
-                <a:solidFill>
-                  <a:srgbClr val="028009"/>
-                </a:solidFill>
-                <a:latin typeface="Courier New" panose="02070309020205020404" pitchFamily="49" charset="0"/>
-              </a:rPr>
-              <a:t>%</a:t>
-            </a:r>
-          </a:p>
-          <a:p>
-            <a:r>
-              <a:rPr lang="en-US" sz="900" dirty="0">
-                <a:solidFill>
-                  <a:srgbClr val="028009"/>
-                </a:solidFill>
-                <a:latin typeface="Courier New" panose="02070309020205020404" pitchFamily="49" charset="0"/>
-              </a:rPr>
-              <a:t>%      </a:t>
-            </a:r>
-            <a:r>
-              <a:rPr lang="en-US" sz="900" dirty="0" err="1">
-                <a:solidFill>
-                  <a:srgbClr val="028009"/>
-                </a:solidFill>
-                <a:latin typeface="Courier New" panose="02070309020205020404" pitchFamily="49" charset="0"/>
-              </a:rPr>
-              <a:t>fcn_MapGen_checkInputsToFunctions</a:t>
-            </a:r>
-            <a:r>
-              <a:rPr lang="en-US" sz="900" dirty="0">
-                <a:solidFill>
-                  <a:srgbClr val="028009"/>
-                </a:solidFill>
-                <a:latin typeface="Courier New" panose="02070309020205020404" pitchFamily="49" charset="0"/>
-              </a:rPr>
-              <a:t>(...</a:t>
-            </a:r>
-          </a:p>
-          <a:p>
-            <a:r>
-              <a:rPr lang="en-US" sz="900" dirty="0">
-                <a:solidFill>
-                  <a:srgbClr val="028009"/>
-                </a:solidFill>
-                <a:latin typeface="Courier New" panose="02070309020205020404" pitchFamily="49" charset="0"/>
-              </a:rPr>
-              <a:t>%      </a:t>
-            </a:r>
-            <a:r>
-              <a:rPr lang="en-US" sz="900" dirty="0" err="1">
-                <a:solidFill>
-                  <a:srgbClr val="028009"/>
-                </a:solidFill>
-                <a:latin typeface="Courier New" panose="02070309020205020404" pitchFamily="49" charset="0"/>
-              </a:rPr>
-              <a:t>variable,variable_type_string</a:t>
-            </a:r>
-            <a:r>
-              <a:rPr lang="en-US" sz="900" dirty="0">
-                <a:solidFill>
-                  <a:srgbClr val="028009"/>
-                </a:solidFill>
-                <a:latin typeface="Courier New" panose="02070309020205020404" pitchFamily="49" charset="0"/>
-              </a:rPr>
-              <a:t>,(</a:t>
-            </a:r>
-            <a:r>
-              <a:rPr lang="en-US" sz="900" dirty="0" err="1">
-                <a:solidFill>
-                  <a:srgbClr val="028009"/>
-                </a:solidFill>
-                <a:latin typeface="Courier New" panose="02070309020205020404" pitchFamily="49" charset="0"/>
-              </a:rPr>
-              <a:t>optional_arguments</a:t>
-            </a:r>
-            <a:r>
-              <a:rPr lang="en-US" sz="900" dirty="0">
-                <a:solidFill>
-                  <a:srgbClr val="028009"/>
-                </a:solidFill>
-                <a:latin typeface="Courier New" panose="02070309020205020404" pitchFamily="49" charset="0"/>
-              </a:rPr>
-              <a:t>))</a:t>
-            </a:r>
-          </a:p>
-          <a:p>
-            <a:r>
-              <a:rPr lang="en-US" sz="900" dirty="0">
-                <a:solidFill>
-                  <a:srgbClr val="028009"/>
-                </a:solidFill>
-                <a:latin typeface="Courier New" panose="02070309020205020404" pitchFamily="49" charset="0"/>
-              </a:rPr>
-              <a:t>%</a:t>
-            </a:r>
-          </a:p>
-          <a:p>
-            <a:r>
-              <a:rPr lang="en-US" sz="900" dirty="0">
-                <a:solidFill>
-                  <a:srgbClr val="028009"/>
-                </a:solidFill>
-                <a:latin typeface="Courier New" panose="02070309020205020404" pitchFamily="49" charset="0"/>
-              </a:rPr>
-              <a:t>% INPUTS:</a:t>
-            </a:r>
-          </a:p>
-          <a:p>
-            <a:r>
-              <a:rPr lang="en-US" sz="900" dirty="0">
-                <a:solidFill>
-                  <a:srgbClr val="028009"/>
-                </a:solidFill>
-                <a:latin typeface="Courier New" panose="02070309020205020404" pitchFamily="49" charset="0"/>
-              </a:rPr>
-              <a:t>%</a:t>
-            </a:r>
-          </a:p>
-          <a:p>
-            <a:r>
-              <a:rPr lang="en-US" sz="900" dirty="0">
-                <a:solidFill>
-                  <a:srgbClr val="028009"/>
-                </a:solidFill>
-                <a:latin typeface="Courier New" panose="02070309020205020404" pitchFamily="49" charset="0"/>
-              </a:rPr>
-              <a:t>%      variable: the variable to check</a:t>
-            </a:r>
-          </a:p>
-        </p:txBody>
-      </p:sp>
-      <p:sp>
-        <p:nvSpPr>
-          <p:cNvPr id="3" name="Rectangle 2">
-            <a:extLst>
-              <a:ext uri="{FF2B5EF4-FFF2-40B4-BE49-F238E27FC236}">
-                <a16:creationId xmlns:a16="http://schemas.microsoft.com/office/drawing/2014/main" id="{75616B01-3EEF-43F9-B062-A030413183B5}"/>
-              </a:ext>
-            </a:extLst>
-          </p:cNvPr>
-          <p:cNvSpPr/>
-          <p:nvPr/>
-        </p:nvSpPr>
-        <p:spPr>
-          <a:xfrm>
-            <a:off x="3692063" y="6308209"/>
-            <a:ext cx="7414594" cy="369332"/>
-          </a:xfrm>
-          <a:prstGeom prst="rect">
-            <a:avLst/>
-          </a:prstGeom>
-        </p:spPr>
-        <p:txBody>
-          <a:bodyPr wrap="none">
-            <a:spAutoFit/>
-          </a:bodyPr>
-          <a:lstStyle/>
-          <a:p>
-            <a:r>
-              <a:rPr lang="en-US" dirty="0"/>
-              <a:t>See: </a:t>
+            <a:pPr marL="0" indent="0">
+              <a:buNone/>
+            </a:pPr>
+            <a:r>
+              <a:rPr lang="en-US" sz="2800" dirty="0"/>
+              <a:t>Given a unit vertex projection, </a:t>
+            </a:r>
+            <a:r>
+              <a:rPr lang="en-US" sz="2800" dirty="0" err="1"/>
+              <a:t>v_i</a:t>
+            </a:r>
+            <a:r>
+              <a:rPr lang="en-US" sz="2800" dirty="0"/>
+              <a:t>, this vertex will always be on the centerline of any circle center that is tangent to edges to the right and left, </a:t>
             </a:r>
             <a:r>
               <a:rPr lang="en-US" dirty="0" err="1"/>
-              <a:t>script_test_fcn_MapGen_checkInputsToFunctions.m</a:t>
-            </a:r>
-            <a:r>
-              <a:rPr lang="en-US" dirty="0"/>
-              <a:t> for example usages</a:t>
-            </a:r>
+              <a:t>e</a:t>
+            </a:r>
+            <a:r>
+              <a:rPr lang="en-US" sz="2800" dirty="0" err="1"/>
+              <a:t>_i</a:t>
+            </a:r>
+            <a:r>
+              <a:rPr lang="en-US" sz="2800" dirty="0"/>
+              <a:t> and e_i-1. So a projection from another edge must intersect </a:t>
+            </a:r>
+            <a:r>
+              <a:rPr lang="en-US" sz="2800" dirty="0" err="1"/>
+              <a:t>v_j</a:t>
+            </a:r>
+            <a:r>
+              <a:rPr lang="en-US" sz="2800" dirty="0"/>
+              <a:t> such that the orthogonal distance between both are equal. Note that this method works for any dimension (2D, 3D, and maybe 4+ D)</a:t>
+            </a:r>
+            <a:endParaRPr lang="en-US" dirty="0"/>
           </a:p>
         </p:txBody>
       </p:sp>
     </p:spTree>
     <p:extLst>
       <p:ext uri="{BB962C8B-B14F-4D97-AF65-F5344CB8AC3E}">
-        <p14:creationId xmlns:p14="http://schemas.microsoft.com/office/powerpoint/2010/main" val="3283178281"/>
+        <p14:creationId xmlns:p14="http://schemas.microsoft.com/office/powerpoint/2010/main" val="3165881572"/>
       </p:ext>
     </p:extLst>
   </p:cSld>
@@ -16262,7 +16382,7 @@
 </p:sld>
 </file>
 
-<file path=ppt/slides/slide30.xml><?xml version="1.0" encoding="utf-8"?>
+<file path=ppt/slides/slide33.xml><?xml version="1.0" encoding="utf-8"?>
 <p:sld xmlns:a="http://schemas.openxmlformats.org/drawingml/2006/main" xmlns:r="http://schemas.openxmlformats.org/officeDocument/2006/relationships" xmlns:p="http://schemas.openxmlformats.org/presentationml/2006/main">
   <p:cSld>
     <p:spTree>

</xml_diff>

<commit_message>
BROKEN: Step 3 finished, moving to step 4 next.
</commit_message>
<xml_diff>
--- a/Documents/VertexSkeletonClassLibrary.pptx
+++ b/Documents/VertexSkeletonClassLibrary.pptx
@@ -31,13 +31,15 @@
     <p:sldId id="523" r:id="rId25"/>
     <p:sldId id="545" r:id="rId26"/>
     <p:sldId id="546" r:id="rId27"/>
-    <p:sldId id="538" r:id="rId28"/>
-    <p:sldId id="544" r:id="rId29"/>
-    <p:sldId id="539" r:id="rId30"/>
-    <p:sldId id="541" r:id="rId31"/>
-    <p:sldId id="547" r:id="rId32"/>
-    <p:sldId id="548" r:id="rId33"/>
-    <p:sldId id="540" r:id="rId34"/>
+    <p:sldId id="550" r:id="rId28"/>
+    <p:sldId id="538" r:id="rId29"/>
+    <p:sldId id="544" r:id="rId30"/>
+    <p:sldId id="549" r:id="rId31"/>
+    <p:sldId id="541" r:id="rId32"/>
+    <p:sldId id="547" r:id="rId33"/>
+    <p:sldId id="551" r:id="rId34"/>
+    <p:sldId id="548" r:id="rId35"/>
+    <p:sldId id="540" r:id="rId36"/>
   </p:sldIdLst>
   <p:sldSz cx="12192000" cy="6858000"/>
   <p:notesSz cx="6858000" cy="9144000"/>
@@ -179,11 +181,13 @@
             <p14:sldId id="523"/>
             <p14:sldId id="545"/>
             <p14:sldId id="546"/>
+            <p14:sldId id="550"/>
             <p14:sldId id="538"/>
             <p14:sldId id="544"/>
-            <p14:sldId id="539"/>
+            <p14:sldId id="549"/>
             <p14:sldId id="541"/>
             <p14:sldId id="547"/>
+            <p14:sldId id="551"/>
             <p14:sldId id="548"/>
             <p14:sldId id="540"/>
           </p14:sldIdLst>
@@ -203,114 +207,6 @@
     <p1510:client id="{951D1DCD-C2F6-3274-E915-1D7099145DCA}" v="895" dt="2021-09-10T02:19:31.036"/>
   </p1510:revLst>
 </p1510:revInfo>
-</file>
-
-<file path=ppt/ink/ink1.xml><?xml version="1.0" encoding="utf-8"?>
-<inkml:ink xmlns:inkml="http://www.w3.org/2003/InkML">
-  <inkml:definitions>
-    <inkml:context xml:id="ctx0">
-      <inkml:inkSource xml:id="inkSrc0">
-        <inkml:traceFormat>
-          <inkml:channel name="X" type="integer" min="-2.14748E9" max="2.14748E9" units="cm"/>
-          <inkml:channel name="Y" type="integer" min="-2.14748E9" max="2.14748E9" units="cm"/>
-          <inkml:channel name="F" type="integer" max="32767" units="dev"/>
-        </inkml:traceFormat>
-        <inkml:channelProperties>
-          <inkml:channelProperty channel="X" name="resolution" value="1000" units="1/cm"/>
-          <inkml:channelProperty channel="Y" name="resolution" value="1000" units="1/cm"/>
-          <inkml:channelProperty channel="F" name="resolution" value="0" units="1/dev"/>
-        </inkml:channelProperties>
-      </inkml:inkSource>
-      <inkml:timestamp xml:id="ts0" timeString="2025-04-20T05:31:08.587"/>
-    </inkml:context>
-    <inkml:brush xml:id="br0">
-      <inkml:brushProperty name="width" value="0.035" units="cm"/>
-      <inkml:brushProperty name="height" value="0.035" units="cm"/>
-    </inkml:brush>
-  </inkml:definitions>
-  <inkml:trace contextRef="#ctx0" brushRef="#br0">0 3666 24119,'76'-3665'0</inkml:trace>
-</inkml:ink>
-</file>
-
-<file path=ppt/ink/ink2.xml><?xml version="1.0" encoding="utf-8"?>
-<inkml:ink xmlns:inkml="http://www.w3.org/2003/InkML">
-  <inkml:definitions>
-    <inkml:context xml:id="ctx0">
-      <inkml:inkSource xml:id="inkSrc0">
-        <inkml:traceFormat>
-          <inkml:channel name="X" type="integer" min="-2.14748E9" max="2.14748E9" units="cm"/>
-          <inkml:channel name="Y" type="integer" min="-2.14748E9" max="2.14748E9" units="cm"/>
-          <inkml:channel name="F" type="integer" max="32767" units="dev"/>
-        </inkml:traceFormat>
-        <inkml:channelProperties>
-          <inkml:channelProperty channel="X" name="resolution" value="1000" units="1/cm"/>
-          <inkml:channelProperty channel="Y" name="resolution" value="1000" units="1/cm"/>
-          <inkml:channelProperty channel="F" name="resolution" value="0" units="1/dev"/>
-        </inkml:channelProperties>
-      </inkml:inkSource>
-      <inkml:timestamp xml:id="ts0" timeString="2025-04-20T05:31:12.286"/>
-    </inkml:context>
-    <inkml:brush xml:id="br0">
-      <inkml:brushProperty name="width" value="0.035" units="cm"/>
-      <inkml:brushProperty name="height" value="0.035" units="cm"/>
-    </inkml:brush>
-  </inkml:definitions>
-  <inkml:trace contextRef="#ctx0" brushRef="#br0">0 122 24415,'7843'0'0</inkml:trace>
-</inkml:ink>
-</file>
-
-<file path=ppt/ink/ink3.xml><?xml version="1.0" encoding="utf-8"?>
-<inkml:ink xmlns:inkml="http://www.w3.org/2003/InkML">
-  <inkml:definitions>
-    <inkml:context xml:id="ctx0">
-      <inkml:inkSource xml:id="inkSrc0">
-        <inkml:traceFormat>
-          <inkml:channel name="X" type="integer" min="-2.14748E9" max="2.14748E9" units="cm"/>
-          <inkml:channel name="Y" type="integer" min="-2.14748E9" max="2.14748E9" units="cm"/>
-          <inkml:channel name="F" type="integer" max="32767" units="dev"/>
-        </inkml:traceFormat>
-        <inkml:channelProperties>
-          <inkml:channelProperty channel="X" name="resolution" value="1000" units="1/cm"/>
-          <inkml:channelProperty channel="Y" name="resolution" value="1000" units="1/cm"/>
-          <inkml:channelProperty channel="F" name="resolution" value="0" units="1/dev"/>
-        </inkml:channelProperties>
-      </inkml:inkSource>
-      <inkml:timestamp xml:id="ts0" timeString="2025-04-20T05:31:17.551"/>
-    </inkml:context>
-    <inkml:brush xml:id="br0">
-      <inkml:brushProperty name="width" value="0.035" units="cm"/>
-      <inkml:brushProperty name="height" value="0.035" units="cm"/>
-    </inkml:brush>
-  </inkml:definitions>
-  <inkml:trace contextRef="#ctx0" brushRef="#br0">1 1 24251,'7228'3589'0</inkml:trace>
-</inkml:ink>
-</file>
-
-<file path=ppt/ink/ink4.xml><?xml version="1.0" encoding="utf-8"?>
-<inkml:ink xmlns:inkml="http://www.w3.org/2003/InkML">
-  <inkml:definitions>
-    <inkml:context xml:id="ctx0">
-      <inkml:inkSource xml:id="inkSrc0">
-        <inkml:traceFormat>
-          <inkml:channel name="X" type="integer" min="-2.14748E9" max="2.14748E9" units="cm"/>
-          <inkml:channel name="Y" type="integer" min="-2.14748E9" max="2.14748E9" units="cm"/>
-          <inkml:channel name="F" type="integer" max="32767" units="dev"/>
-        </inkml:traceFormat>
-        <inkml:channelProperties>
-          <inkml:channelProperty channel="X" name="resolution" value="1000" units="1/cm"/>
-          <inkml:channelProperty channel="Y" name="resolution" value="1000" units="1/cm"/>
-          <inkml:channelProperty channel="F" name="resolution" value="0" units="1/dev"/>
-        </inkml:channelProperties>
-      </inkml:inkSource>
-      <inkml:timestamp xml:id="ts0" timeString="2025-04-20T05:31:30.623"/>
-    </inkml:context>
-    <inkml:brush xml:id="br0">
-      <inkml:brushProperty name="width" value="0.035" units="cm"/>
-      <inkml:brushProperty name="height" value="0.035" units="cm"/>
-    </inkml:brush>
-  </inkml:definitions>
-  <inkml:trace contextRef="#ctx0" brushRef="#br0">1 1074 24436,'1352'-1073'0</inkml:trace>
-</inkml:ink>
 </file>
 
 <file path=ppt/slideLayouts/slideLayout1.xml><?xml version="1.0" encoding="utf-8"?>
@@ -7969,8 +7865,8 @@
               <a:buNone/>
             </a:pPr>
             <a:r>
-              <a:rPr lang="en-US"/>
-              <a:t>Namely, in step 2, the intersections may include other sides</a:t>
+              <a:rPr lang="en-US" dirty="0"/>
+              <a:t>Namely, for non-convex polytopes, vertex intersections may include non-adjacent sides</a:t>
             </a:r>
           </a:p>
           <a:p>
@@ -7979,8 +7875,16 @@
               <a:buAutoNum type="arabicPeriod"/>
             </a:pPr>
             <a:r>
-              <a:rPr lang="en-US"/>
-              <a:t>Calculates the vectors pointing inward, and angles they make relative to next segment (“half angles”)</a:t>
+              <a:rPr lang="en-US" dirty="0"/>
+              <a:t>Calculates the vectors pointing inward,</a:t>
+            </a:r>
+            <a:r>
+              <a:rPr lang="en-US" dirty="0">
+                <a:solidFill>
+                  <a:srgbClr val="FF0000"/>
+                </a:solidFill>
+              </a:rPr>
+              <a:t> vectors normal, vector projections from each vertex per unit cut, and maximum cut distances for each edge</a:t>
             </a:r>
           </a:p>
           <a:p>
@@ -7989,7 +7893,7 @@
               <a:buAutoNum type="arabicPeriod"/>
             </a:pPr>
             <a:r>
-              <a:rPr lang="en-US">
+              <a:rPr lang="en-US" dirty="0">
                 <a:solidFill>
                   <a:srgbClr val="FF0000"/>
                 </a:solidFill>
@@ -8003,7 +7907,7 @@
               <a:buAutoNum type="arabicPeriod"/>
             </a:pPr>
             <a:r>
-              <a:rPr lang="en-US"/>
+              <a:rPr lang="en-US" dirty="0"/>
               <a:t>Finds the minimum distance of intersection</a:t>
             </a:r>
           </a:p>
@@ -8013,7 +7917,7 @@
               <a:buAutoNum type="arabicPeriod"/>
             </a:pPr>
             <a:r>
-              <a:rPr lang="en-US"/>
+              <a:rPr lang="en-US" dirty="0"/>
               <a:t>Merges vertices that come together</a:t>
             </a:r>
           </a:p>
@@ -8023,7 +7927,7 @@
               <a:buAutoNum type="arabicPeriod"/>
             </a:pPr>
             <a:r>
-              <a:rPr lang="en-US"/>
+              <a:rPr lang="en-US" dirty="0"/>
               <a:t>Repeats</a:t>
             </a:r>
           </a:p>
@@ -8032,7 +7936,7 @@
               <a:buFont typeface="+mj-lt"/>
               <a:buAutoNum type="arabicPeriod"/>
             </a:pPr>
-            <a:endParaRPr lang="en-US"/>
+            <a:endParaRPr lang="en-US" dirty="0"/>
           </a:p>
           <a:p>
             <a:pPr marL="514350" indent="-514350">
@@ -9823,6 +9727,439 @@
   <p:cSld>
     <p:spTree>
       <p:nvGrpSpPr>
+        <p:cNvPr id="1" name=""/>
+        <p:cNvGrpSpPr/>
+        <p:nvPr/>
+      </p:nvGrpSpPr>
+      <p:grpSpPr>
+        <a:xfrm>
+          <a:off x="0" y="0"/>
+          <a:ext cx="0" cy="0"/>
+          <a:chOff x="0" y="0"/>
+          <a:chExt cx="0" cy="0"/>
+        </a:xfrm>
+      </p:grpSpPr>
+      <p:sp>
+        <p:nvSpPr>
+          <p:cNvPr id="2" name="Title 1">
+            <a:extLst>
+              <a:ext uri="{FF2B5EF4-FFF2-40B4-BE49-F238E27FC236}">
+                <a16:creationId xmlns:a16="http://schemas.microsoft.com/office/drawing/2014/main" id="{21A534AD-D0CF-C17D-B214-2D3F674269E1}"/>
+              </a:ext>
+            </a:extLst>
+          </p:cNvPr>
+          <p:cNvSpPr>
+            <a:spLocks noGrp="1"/>
+          </p:cNvSpPr>
+          <p:nvPr>
+            <p:ph type="title"/>
+          </p:nvPr>
+        </p:nvSpPr>
+        <p:spPr/>
+        <p:txBody>
+          <a:bodyPr/>
+          <a:lstStyle/>
+          <a:p>
+            <a:r>
+              <a:rPr lang="en-US" dirty="0"/>
+              <a:t>For each edge, the vertex projections at each end can limit the allowable cut distances</a:t>
+            </a:r>
+          </a:p>
+        </p:txBody>
+      </p:sp>
+      <p:sp>
+        <p:nvSpPr>
+          <p:cNvPr id="3" name="Content Placeholder 2">
+            <a:extLst>
+              <a:ext uri="{FF2B5EF4-FFF2-40B4-BE49-F238E27FC236}">
+                <a16:creationId xmlns:a16="http://schemas.microsoft.com/office/drawing/2014/main" id="{BF0079C1-AD91-323F-1F0B-D5EE57DE6047}"/>
+              </a:ext>
+            </a:extLst>
+          </p:cNvPr>
+          <p:cNvSpPr>
+            <a:spLocks noGrp="1"/>
+          </p:cNvSpPr>
+          <p:nvPr>
+            <p:ph idx="1"/>
+          </p:nvPr>
+        </p:nvSpPr>
+        <p:spPr>
+          <a:xfrm>
+            <a:off x="838200" y="1825625"/>
+            <a:ext cx="5053084" cy="4351338"/>
+          </a:xfrm>
+        </p:spPr>
+        <p:txBody>
+          <a:bodyPr/>
+          <a:lstStyle/>
+          <a:p>
+            <a:pPr marL="0" indent="0">
+              <a:buNone/>
+            </a:pPr>
+            <a:r>
+              <a:rPr lang="en-US" dirty="0"/>
+              <a:t>Most vertices will have a finite cut distance. For polytopes that are convex, all vertices have finite cut distances.</a:t>
+            </a:r>
+          </a:p>
+        </p:txBody>
+      </p:sp>
+      <p:pic>
+        <p:nvPicPr>
+          <p:cNvPr id="5" name="Picture 4">
+            <a:extLst>
+              <a:ext uri="{FF2B5EF4-FFF2-40B4-BE49-F238E27FC236}">
+                <a16:creationId xmlns:a16="http://schemas.microsoft.com/office/drawing/2014/main" id="{1CFB7792-2D48-FA53-5437-7EA92F9B508A}"/>
+              </a:ext>
+            </a:extLst>
+          </p:cNvPr>
+          <p:cNvPicPr>
+            <a:picLocks noChangeAspect="1"/>
+          </p:cNvPicPr>
+          <p:nvPr/>
+        </p:nvPicPr>
+        <p:blipFill>
+          <a:blip r:embed="rId2"/>
+          <a:stretch>
+            <a:fillRect/>
+          </a:stretch>
+        </p:blipFill>
+        <p:spPr>
+          <a:xfrm>
+            <a:off x="6019800" y="2131484"/>
+            <a:ext cx="5334000" cy="4000500"/>
+          </a:xfrm>
+          <a:prstGeom prst="rect">
+            <a:avLst/>
+          </a:prstGeom>
+        </p:spPr>
+      </p:pic>
+      <p:sp>
+        <p:nvSpPr>
+          <p:cNvPr id="6" name="Rectangle 5">
+            <a:extLst>
+              <a:ext uri="{FF2B5EF4-FFF2-40B4-BE49-F238E27FC236}">
+                <a16:creationId xmlns:a16="http://schemas.microsoft.com/office/drawing/2014/main" id="{B811982B-157D-20D3-7B21-5F5DDEEFC738}"/>
+              </a:ext>
+            </a:extLst>
+          </p:cNvPr>
+          <p:cNvSpPr/>
+          <p:nvPr/>
+        </p:nvSpPr>
+        <p:spPr>
+          <a:xfrm>
+            <a:off x="294607" y="4001294"/>
+            <a:ext cx="6569962" cy="1869743"/>
+          </a:xfrm>
+          <a:prstGeom prst="rect">
+            <a:avLst/>
+          </a:prstGeom>
+          <a:solidFill>
+            <a:schemeClr val="accent4">
+              <a:lumMod val="20000"/>
+              <a:lumOff val="80000"/>
+            </a:schemeClr>
+          </a:solidFill>
+        </p:spPr>
+        <p:txBody>
+          <a:bodyPr wrap="square" lIns="91440" tIns="45720" rIns="91440" bIns="45720" anchor="t">
+            <a:spAutoFit/>
+          </a:bodyPr>
+          <a:lstStyle/>
+          <a:p>
+            <a:r>
+              <a:rPr lang="en-US" sz="1050" b="0" i="0" u="none" strike="noStrike" baseline="0" dirty="0" err="1">
+                <a:solidFill>
+                  <a:srgbClr val="000000"/>
+                </a:solidFill>
+                <a:latin typeface="Courier New" panose="02070309020205020404" pitchFamily="49" charset="0"/>
+              </a:rPr>
+              <a:t>fig_num</a:t>
+            </a:r>
+            <a:r>
+              <a:rPr lang="en-US" sz="1050" b="0" i="0" u="none" strike="noStrike" baseline="0" dirty="0">
+                <a:solidFill>
+                  <a:srgbClr val="000000"/>
+                </a:solidFill>
+                <a:latin typeface="Courier New" panose="02070309020205020404" pitchFamily="49" charset="0"/>
+              </a:rPr>
+              <a:t> = 0001;</a:t>
+            </a:r>
+          </a:p>
+          <a:p>
+            <a:r>
+              <a:rPr lang="en-US" sz="1050" b="0" i="0" u="none" strike="noStrike" baseline="0" dirty="0">
+                <a:solidFill>
+                  <a:srgbClr val="000000"/>
+                </a:solidFill>
+                <a:latin typeface="Courier New" panose="02070309020205020404" pitchFamily="49" charset="0"/>
+              </a:rPr>
+              <a:t>figure(</a:t>
+            </a:r>
+            <a:r>
+              <a:rPr lang="en-US" sz="1050" b="0" i="0" u="none" strike="noStrike" baseline="0" dirty="0" err="1">
+                <a:solidFill>
+                  <a:srgbClr val="000000"/>
+                </a:solidFill>
+                <a:latin typeface="Courier New" panose="02070309020205020404" pitchFamily="49" charset="0"/>
+              </a:rPr>
+              <a:t>fig_num</a:t>
+            </a:r>
+            <a:r>
+              <a:rPr lang="en-US" sz="1050" b="0" i="0" u="none" strike="noStrike" baseline="0" dirty="0">
+                <a:solidFill>
+                  <a:srgbClr val="000000"/>
+                </a:solidFill>
+                <a:latin typeface="Courier New" panose="02070309020205020404" pitchFamily="49" charset="0"/>
+              </a:rPr>
+              <a:t>);</a:t>
+            </a:r>
+          </a:p>
+          <a:p>
+            <a:r>
+              <a:rPr lang="en-US" sz="1050" b="0" i="0" u="none" strike="noStrike" baseline="0" dirty="0" err="1">
+                <a:solidFill>
+                  <a:srgbClr val="000000"/>
+                </a:solidFill>
+                <a:latin typeface="Courier New" panose="02070309020205020404" pitchFamily="49" charset="0"/>
+              </a:rPr>
+              <a:t>clf</a:t>
+            </a:r>
+            <a:r>
+              <a:rPr lang="en-US" sz="1050" b="0" i="0" u="none" strike="noStrike" baseline="0" dirty="0">
+                <a:solidFill>
+                  <a:srgbClr val="000000"/>
+                </a:solidFill>
+                <a:latin typeface="Courier New" panose="02070309020205020404" pitchFamily="49" charset="0"/>
+              </a:rPr>
+              <a:t>;</a:t>
+            </a:r>
+          </a:p>
+          <a:p>
+            <a:endParaRPr lang="en-US" sz="1050" b="0" i="0" u="none" strike="noStrike" baseline="0" dirty="0">
+              <a:solidFill>
+                <a:srgbClr val="000000"/>
+              </a:solidFill>
+              <a:latin typeface="Courier New" panose="02070309020205020404" pitchFamily="49" charset="0"/>
+            </a:endParaRPr>
+          </a:p>
+          <a:p>
+            <a:r>
+              <a:rPr lang="en-US" sz="1050" b="0" i="0" u="none" strike="noStrike" baseline="0" dirty="0">
+                <a:solidFill>
+                  <a:srgbClr val="000000"/>
+                </a:solidFill>
+                <a:latin typeface="Courier New" panose="02070309020205020404" pitchFamily="49" charset="0"/>
+              </a:rPr>
+              <a:t>% this polytope has two nonconvex vertices facing each other</a:t>
+            </a:r>
+          </a:p>
+          <a:p>
+            <a:r>
+              <a:rPr lang="en-US" sz="1050" b="0" i="0" u="none" strike="noStrike" baseline="0" dirty="0">
+                <a:solidFill>
+                  <a:srgbClr val="000000"/>
+                </a:solidFill>
+                <a:latin typeface="Courier New" panose="02070309020205020404" pitchFamily="49" charset="0"/>
+              </a:rPr>
+              <a:t>vertices = [5 4; 6 0; 10 0; 10 7; 8 8; 10 9; 10 10; 0 10; 0 0; 4 0; 5 4];</a:t>
+            </a:r>
+          </a:p>
+          <a:p>
+            <a:r>
+              <a:rPr lang="en-US" sz="1050" b="0" i="0" u="none" strike="noStrike" baseline="0" dirty="0">
+                <a:solidFill>
+                  <a:srgbClr val="000000"/>
+                </a:solidFill>
+                <a:latin typeface="Courier New" panose="02070309020205020404" pitchFamily="49" charset="0"/>
+              </a:rPr>
+              <a:t>[</a:t>
+            </a:r>
+            <a:r>
+              <a:rPr lang="en-US" sz="1050" b="0" i="0" u="none" strike="noStrike" baseline="0" dirty="0" err="1">
+                <a:solidFill>
+                  <a:srgbClr val="000000"/>
+                </a:solidFill>
+                <a:latin typeface="Courier New" panose="02070309020205020404" pitchFamily="49" charset="0"/>
+              </a:rPr>
+              <a:t>unit_normal_vectors</a:t>
+            </a:r>
+            <a:r>
+              <a:rPr lang="en-US" sz="1050" b="0" i="0" u="none" strike="noStrike" baseline="0" dirty="0">
+                <a:solidFill>
+                  <a:srgbClr val="000000"/>
+                </a:solidFill>
+                <a:latin typeface="Courier New" panose="02070309020205020404" pitchFamily="49" charset="0"/>
+              </a:rPr>
+              <a:t>, </a:t>
+            </a:r>
+            <a:r>
+              <a:rPr lang="en-US" sz="1050" b="0" i="0" u="none" strike="noStrike" baseline="0" dirty="0" err="1">
+                <a:solidFill>
+                  <a:srgbClr val="000000"/>
+                </a:solidFill>
+                <a:latin typeface="Courier New" panose="02070309020205020404" pitchFamily="49" charset="0"/>
+              </a:rPr>
+              <a:t>unit_vertex_projection_vectors</a:t>
+            </a:r>
+            <a:r>
+              <a:rPr lang="en-US" sz="1050" b="0" i="0" u="none" strike="noStrike" baseline="0" dirty="0">
+                <a:solidFill>
+                  <a:srgbClr val="000000"/>
+                </a:solidFill>
+                <a:latin typeface="Courier New" panose="02070309020205020404" pitchFamily="49" charset="0"/>
+              </a:rPr>
+              <a:t>, ~, ~] = ...</a:t>
+            </a:r>
+          </a:p>
+          <a:p>
+            <a:r>
+              <a:rPr lang="en-US" sz="1050" b="0" i="0" u="none" strike="noStrike" baseline="0" dirty="0">
+                <a:solidFill>
+                  <a:srgbClr val="000000"/>
+                </a:solidFill>
+                <a:latin typeface="Courier New" panose="02070309020205020404" pitchFamily="49" charset="0"/>
+              </a:rPr>
+              <a:t>    </a:t>
+            </a:r>
+            <a:r>
+              <a:rPr lang="en-US" sz="1050" b="0" i="0" u="none" strike="noStrike" baseline="0" dirty="0" err="1">
+                <a:solidFill>
+                  <a:srgbClr val="000000"/>
+                </a:solidFill>
+                <a:latin typeface="Courier New" panose="02070309020205020404" pitchFamily="49" charset="0"/>
+              </a:rPr>
+              <a:t>fcn_VSkel_polytopeFindUnitDirectionVectors</a:t>
+            </a:r>
+            <a:r>
+              <a:rPr lang="en-US" sz="1050" b="0" i="0" u="none" strike="noStrike" baseline="0" dirty="0">
+                <a:solidFill>
+                  <a:srgbClr val="000000"/>
+                </a:solidFill>
+                <a:latin typeface="Courier New" panose="02070309020205020404" pitchFamily="49" charset="0"/>
+              </a:rPr>
+              <a:t>(vertices,-1);</a:t>
+            </a:r>
+          </a:p>
+          <a:p>
+            <a:endParaRPr lang="en-US" sz="1050" b="0" i="0" u="none" strike="noStrike" baseline="0" dirty="0">
+              <a:solidFill>
+                <a:srgbClr val="000000"/>
+              </a:solidFill>
+              <a:latin typeface="Courier New" panose="02070309020205020404" pitchFamily="49" charset="0"/>
+            </a:endParaRPr>
+          </a:p>
+          <a:p>
+            <a:r>
+              <a:rPr lang="en-US" sz="1050" b="0" i="0" u="none" strike="noStrike" baseline="0" dirty="0" err="1">
+                <a:solidFill>
+                  <a:srgbClr val="000000"/>
+                </a:solidFill>
+                <a:latin typeface="Courier New" panose="02070309020205020404" pitchFamily="49" charset="0"/>
+              </a:rPr>
+              <a:t>max_edge_cuts</a:t>
+            </a:r>
+            <a:r>
+              <a:rPr lang="en-US" sz="1050" b="0" i="0" u="none" strike="noStrike" baseline="0" dirty="0">
+                <a:solidFill>
+                  <a:srgbClr val="000000"/>
+                </a:solidFill>
+                <a:latin typeface="Courier New" panose="02070309020205020404" pitchFamily="49" charset="0"/>
+              </a:rPr>
+              <a:t> = </a:t>
+            </a:r>
+            <a:r>
+              <a:rPr lang="en-US" sz="1050" b="0" i="0" u="none" strike="noStrike" baseline="0" dirty="0" err="1">
+                <a:solidFill>
+                  <a:srgbClr val="000000"/>
+                </a:solidFill>
+                <a:latin typeface="Courier New" panose="02070309020205020404" pitchFamily="49" charset="0"/>
+              </a:rPr>
+              <a:t>fcn_VSkel_polytopeFindMaxEdgeCut</a:t>
+            </a:r>
+            <a:r>
+              <a:rPr lang="en-US" sz="1050" b="0" i="0" u="none" strike="noStrike" baseline="0" dirty="0">
+                <a:solidFill>
+                  <a:srgbClr val="000000"/>
+                </a:solidFill>
+                <a:latin typeface="Courier New" panose="02070309020205020404" pitchFamily="49" charset="0"/>
+              </a:rPr>
+              <a:t>(vertices, </a:t>
+            </a:r>
+            <a:r>
+              <a:rPr lang="en-US" sz="1050" b="0" i="0" u="none" strike="noStrike" baseline="0" dirty="0" err="1">
+                <a:solidFill>
+                  <a:srgbClr val="000000"/>
+                </a:solidFill>
+                <a:latin typeface="Courier New" panose="02070309020205020404" pitchFamily="49" charset="0"/>
+              </a:rPr>
+              <a:t>unit_normal_vectors</a:t>
+            </a:r>
+            <a:r>
+              <a:rPr lang="en-US" sz="1050" b="0" i="0" u="none" strike="noStrike" baseline="0" dirty="0">
+                <a:solidFill>
+                  <a:srgbClr val="000000"/>
+                </a:solidFill>
+                <a:latin typeface="Courier New" panose="02070309020205020404" pitchFamily="49" charset="0"/>
+              </a:rPr>
+              <a:t>, </a:t>
+            </a:r>
+            <a:r>
+              <a:rPr lang="en-US" sz="1050" b="0" i="0" u="none" strike="noStrike" baseline="0" dirty="0" err="1">
+                <a:solidFill>
+                  <a:srgbClr val="000000"/>
+                </a:solidFill>
+                <a:latin typeface="Courier New" panose="02070309020205020404" pitchFamily="49" charset="0"/>
+              </a:rPr>
+              <a:t>unit_vertex_projection_vectors</a:t>
+            </a:r>
+            <a:r>
+              <a:rPr lang="en-US" sz="1050" b="0" i="0" u="none" strike="noStrike" baseline="0" dirty="0">
+                <a:solidFill>
+                  <a:srgbClr val="000000"/>
+                </a:solidFill>
+                <a:latin typeface="Courier New" panose="02070309020205020404" pitchFamily="49" charset="0"/>
+              </a:rPr>
+              <a:t>, (</a:t>
+            </a:r>
+            <a:r>
+              <a:rPr lang="en-US" sz="1050" b="0" i="0" u="none" strike="noStrike" baseline="0" dirty="0" err="1">
+                <a:solidFill>
+                  <a:srgbClr val="000000"/>
+                </a:solidFill>
+                <a:latin typeface="Courier New" panose="02070309020205020404" pitchFamily="49" charset="0"/>
+              </a:rPr>
+              <a:t>fig_num</a:t>
+            </a:r>
+            <a:r>
+              <a:rPr lang="en-US" sz="1050" b="0" i="0" u="none" strike="noStrike" baseline="0" dirty="0">
+                <a:solidFill>
+                  <a:srgbClr val="000000"/>
+                </a:solidFill>
+                <a:latin typeface="Courier New" panose="02070309020205020404" pitchFamily="49" charset="0"/>
+              </a:rPr>
+              <a:t>));</a:t>
+            </a:r>
+          </a:p>
+        </p:txBody>
+      </p:sp>
+    </p:spTree>
+    <p:extLst>
+      <p:ext uri="{BB962C8B-B14F-4D97-AF65-F5344CB8AC3E}">
+        <p14:creationId xmlns:p14="http://schemas.microsoft.com/office/powerpoint/2010/main" val="3310269684"/>
+      </p:ext>
+    </p:extLst>
+  </p:cSld>
+  <p:clrMapOvr>
+    <a:masterClrMapping/>
+  </p:clrMapOvr>
+</p:sld>
+</file>
+
+<file path=ppt/slides/slide28.xml><?xml version="1.0" encoding="utf-8"?>
+<p:sld xmlns:a="http://schemas.openxmlformats.org/drawingml/2006/main" xmlns:r="http://schemas.openxmlformats.org/officeDocument/2006/relationships" xmlns:p="http://schemas.openxmlformats.org/presentationml/2006/main">
+  <p:cSld>
+    <p:spTree>
+      <p:nvGrpSpPr>
         <p:cNvPr id="1" name="">
           <a:extLst>
             <a:ext uri="{FF2B5EF4-FFF2-40B4-BE49-F238E27FC236}">
@@ -9949,8 +10286,12 @@
               <a:buNone/>
             </a:pPr>
             <a:r>
+              <a:rPr lang="en-US" dirty="0"/>
+              <a:t>For vertex to edge intersections, g</a:t>
+            </a:r>
+            <a:r>
               <a:rPr lang="en-US" sz="2800" dirty="0"/>
-              <a:t>Given a unit vertex projection, </a:t>
+              <a:t>iven a unit vertex projection, </a:t>
             </a:r>
             <a:r>
               <a:rPr lang="en-US" sz="2800" dirty="0" err="1"/>
@@ -10267,7 +10608,7 @@
             </p:nvSpPr>
             <p:spPr>
               <a:xfrm>
-                <a:off x="7153701" y="4425444"/>
+                <a:off x="7153701" y="4457918"/>
                 <a:ext cx="248465" cy="276999"/>
               </a:xfrm>
               <a:prstGeom prst="rect">
@@ -10338,7 +10679,7 @@
             </p:nvSpPr>
             <p:spPr>
               <a:xfrm>
-                <a:off x="7153701" y="4425444"/>
+                <a:off x="7153701" y="4457918"/>
                 <a:ext cx="248465" cy="276999"/>
               </a:xfrm>
               <a:prstGeom prst="rect">
@@ -10347,7 +10688,7 @@
               <a:blipFill>
                 <a:blip r:embed="rId3"/>
                 <a:stretch>
-                  <a:fillRect l="-25000" r="-10000" b="-26667"/>
+                  <a:fillRect l="-25000" r="-10000" b="-23913"/>
                 </a:stretch>
               </a:blipFill>
             </p:spPr>
@@ -10778,7 +11119,7 @@
             </p:nvSpPr>
             <p:spPr>
               <a:xfrm>
-                <a:off x="8652680" y="3387722"/>
+                <a:off x="8652680" y="3420196"/>
                 <a:ext cx="248465" cy="299313"/>
               </a:xfrm>
               <a:prstGeom prst="rect">
@@ -10849,7 +11190,7 @@
             </p:nvSpPr>
             <p:spPr>
               <a:xfrm>
-                <a:off x="8652680" y="3387722"/>
+                <a:off x="8652680" y="3420196"/>
                 <a:ext cx="248465" cy="299313"/>
               </a:xfrm>
               <a:prstGeom prst="rect">
@@ -10893,7 +11234,7 @@
             </p:nvSpPr>
             <p:spPr>
               <a:xfrm>
-                <a:off x="7665027" y="3996508"/>
+                <a:off x="7665027" y="4028982"/>
                 <a:ext cx="4693228" cy="783869"/>
               </a:xfrm>
               <a:prstGeom prst="rect">
@@ -11216,7 +11557,7 @@
             </p:nvSpPr>
             <p:spPr>
               <a:xfrm>
-                <a:off x="7665027" y="3996508"/>
+                <a:off x="7665027" y="4028982"/>
                 <a:ext cx="4693228" cy="783869"/>
               </a:xfrm>
               <a:prstGeom prst="rect">
@@ -11339,7 +11680,7 @@
 </p:sld>
 </file>
 
-<file path=ppt/slides/slide28.xml><?xml version="1.0" encoding="utf-8"?>
+<file path=ppt/slides/slide29.xml><?xml version="1.0" encoding="utf-8"?>
 <p:sld xmlns:a="http://schemas.openxmlformats.org/drawingml/2006/main" xmlns:r="http://schemas.openxmlformats.org/officeDocument/2006/relationships" xmlns:p="http://schemas.openxmlformats.org/presentationml/2006/main">
   <p:cSld>
     <p:spTree>
@@ -11389,7 +11730,7 @@
             </a:r>
             <a:r>
               <a:rPr lang="en-US" dirty="0"/>
-              <a:t> to edge j</a:t>
+              <a:t> to edge j. </a:t>
             </a:r>
           </a:p>
         </p:txBody>
@@ -11410,7 +11751,12 @@
             <p:ph idx="1"/>
           </p:nvPr>
         </p:nvSpPr>
-        <p:spPr/>
+        <p:spPr>
+          <a:xfrm>
+            <a:off x="838200" y="2499359"/>
+            <a:ext cx="10515600" cy="3677603"/>
+          </a:xfrm>
+        </p:spPr>
         <p:txBody>
           <a:bodyPr/>
           <a:lstStyle/>
@@ -13572,1045 +13918,6 @@
 </p:sld>
 </file>
 
-<file path=ppt/slides/slide29.xml><?xml version="1.0" encoding="utf-8"?>
-<p:sld xmlns:a="http://schemas.openxmlformats.org/drawingml/2006/main" xmlns:r="http://schemas.openxmlformats.org/officeDocument/2006/relationships" xmlns:p="http://schemas.openxmlformats.org/presentationml/2006/main">
-  <p:cSld>
-    <p:spTree>
-      <p:nvGrpSpPr>
-        <p:cNvPr id="1" name=""/>
-        <p:cNvGrpSpPr/>
-        <p:nvPr/>
-      </p:nvGrpSpPr>
-      <p:grpSpPr>
-        <a:xfrm>
-          <a:off x="0" y="0"/>
-          <a:ext cx="0" cy="0"/>
-          <a:chOff x="0" y="0"/>
-          <a:chExt cx="0" cy="0"/>
-        </a:xfrm>
-      </p:grpSpPr>
-      <p:sp>
-        <p:nvSpPr>
-          <p:cNvPr id="2" name="Title 1">
-            <a:extLst>
-              <a:ext uri="{FF2B5EF4-FFF2-40B4-BE49-F238E27FC236}">
-                <a16:creationId xmlns:a16="http://schemas.microsoft.com/office/drawing/2014/main" id="{574BEF0D-68CB-EC75-4557-65310F26DC0F}"/>
-              </a:ext>
-            </a:extLst>
-          </p:cNvPr>
-          <p:cNvSpPr>
-            <a:spLocks noGrp="1"/>
-          </p:cNvSpPr>
-          <p:nvPr>
-            <p:ph type="title"/>
-          </p:nvPr>
-        </p:nvSpPr>
-        <p:spPr/>
-        <p:txBody>
-          <a:bodyPr/>
-          <a:lstStyle/>
-          <a:p>
-            <a:r>
-              <a:rPr lang="en-US" dirty="0"/>
-              <a:t>Not all edges participate in this calculation</a:t>
-            </a:r>
-          </a:p>
-        </p:txBody>
-      </p:sp>
-      <p:sp>
-        <p:nvSpPr>
-          <p:cNvPr id="3" name="Content Placeholder 2">
-            <a:extLst>
-              <a:ext uri="{FF2B5EF4-FFF2-40B4-BE49-F238E27FC236}">
-                <a16:creationId xmlns:a16="http://schemas.microsoft.com/office/drawing/2014/main" id="{49F522CE-64B1-FC5F-5A40-6D0BDDA3EBB3}"/>
-              </a:ext>
-            </a:extLst>
-          </p:cNvPr>
-          <p:cNvSpPr>
-            <a:spLocks noGrp="1"/>
-          </p:cNvSpPr>
-          <p:nvPr>
-            <p:ph idx="1"/>
-          </p:nvPr>
-        </p:nvSpPr>
-        <p:spPr>
-          <a:xfrm>
-            <a:off x="838200" y="1825625"/>
-            <a:ext cx="3183340" cy="4351338"/>
-          </a:xfrm>
-        </p:spPr>
-        <p:txBody>
-          <a:bodyPr>
-            <a:normAutofit fontScale="92500" lnSpcReduction="10000"/>
-          </a:bodyPr>
-          <a:lstStyle/>
-          <a:p>
-            <a:pPr marL="0" indent="0">
-              <a:buNone/>
-            </a:pPr>
-            <a:r>
-              <a:rPr lang="en-US" dirty="0"/>
-              <a:t>The center of the resulting circle must be “within” the shrink envelope of the test edge. For example, the circle shown here is “inscribed” by 3 edges, but the top-left edge would not actually project enough to contact the circle at this radius.</a:t>
-            </a:r>
-          </a:p>
-        </p:txBody>
-      </p:sp>
-      <mc:AlternateContent xmlns:mc="http://schemas.openxmlformats.org/markup-compatibility/2006" xmlns:p14="http://schemas.microsoft.com/office/powerpoint/2010/main">
-        <mc:Choice Requires="p14">
-          <p:contentPart p14:bwMode="auto" r:id="rId2">
-            <p14:nvContentPartPr>
-              <p14:cNvPr id="22" name="Ink 21">
-                <a:extLst>
-                  <a:ext uri="{FF2B5EF4-FFF2-40B4-BE49-F238E27FC236}">
-                    <a16:creationId xmlns:a16="http://schemas.microsoft.com/office/drawing/2014/main" id="{6191A9C2-6780-4794-B41F-4E7304F51037}"/>
-                  </a:ext>
-                </a:extLst>
-              </p14:cNvPr>
-              <p14:cNvContentPartPr/>
-              <p14:nvPr/>
-            </p14:nvContentPartPr>
-            <p14:xfrm>
-              <a:off x="5923010" y="2569787"/>
-              <a:ext cx="27720" cy="1319760"/>
-            </p14:xfrm>
-          </p:contentPart>
-        </mc:Choice>
-        <mc:Fallback xmlns="">
-          <p:pic>
-            <p:nvPicPr>
-              <p:cNvPr id="22" name="Ink 21">
-                <a:extLst>
-                  <a:ext uri="{FF2B5EF4-FFF2-40B4-BE49-F238E27FC236}">
-                    <a16:creationId xmlns:a16="http://schemas.microsoft.com/office/drawing/2014/main" id="{6191A9C2-6780-4794-B41F-4E7304F51037}"/>
-                  </a:ext>
-                </a:extLst>
-              </p:cNvPr>
-              <p:cNvPicPr/>
-              <p:nvPr/>
-            </p:nvPicPr>
-            <p:blipFill>
-              <a:blip r:embed="rId3"/>
-              <a:stretch>
-                <a:fillRect/>
-              </a:stretch>
-            </p:blipFill>
-            <p:spPr>
-              <a:xfrm>
-                <a:off x="5916890" y="2563667"/>
-                <a:ext cx="39960" cy="1332000"/>
-              </a:xfrm>
-              <a:prstGeom prst="rect">
-                <a:avLst/>
-              </a:prstGeom>
-            </p:spPr>
-          </p:pic>
-        </mc:Fallback>
-      </mc:AlternateContent>
-      <mc:AlternateContent xmlns:mc="http://schemas.openxmlformats.org/markup-compatibility/2006" xmlns:p14="http://schemas.microsoft.com/office/powerpoint/2010/main">
-        <mc:Choice Requires="p14">
-          <p:contentPart p14:bwMode="auto" r:id="rId4">
-            <p14:nvContentPartPr>
-              <p14:cNvPr id="24" name="Ink 23">
-                <a:extLst>
-                  <a:ext uri="{FF2B5EF4-FFF2-40B4-BE49-F238E27FC236}">
-                    <a16:creationId xmlns:a16="http://schemas.microsoft.com/office/drawing/2014/main" id="{5605DC39-726F-FFCB-0B9B-9E0F9CE975F0}"/>
-                  </a:ext>
-                </a:extLst>
-              </p14:cNvPr>
-              <p14:cNvContentPartPr/>
-              <p14:nvPr/>
-            </p14:nvContentPartPr>
-            <p14:xfrm>
-              <a:off x="5950370" y="2569787"/>
-              <a:ext cx="2823840" cy="720"/>
-            </p14:xfrm>
-          </p:contentPart>
-        </mc:Choice>
-        <mc:Fallback xmlns="">
-          <p:pic>
-            <p:nvPicPr>
-              <p:cNvPr id="24" name="Ink 23">
-                <a:extLst>
-                  <a:ext uri="{FF2B5EF4-FFF2-40B4-BE49-F238E27FC236}">
-                    <a16:creationId xmlns:a16="http://schemas.microsoft.com/office/drawing/2014/main" id="{5605DC39-726F-FFCB-0B9B-9E0F9CE975F0}"/>
-                  </a:ext>
-                </a:extLst>
-              </p:cNvPr>
-              <p:cNvPicPr/>
-              <p:nvPr/>
-            </p:nvPicPr>
-            <p:blipFill>
-              <a:blip r:embed="rId5"/>
-              <a:stretch>
-                <a:fillRect/>
-              </a:stretch>
-            </p:blipFill>
-            <p:spPr>
-              <a:xfrm>
-                <a:off x="5944250" y="2557547"/>
-                <a:ext cx="2836080" cy="25200"/>
-              </a:xfrm>
-              <a:prstGeom prst="rect">
-                <a:avLst/>
-              </a:prstGeom>
-            </p:spPr>
-          </p:pic>
-        </mc:Fallback>
-      </mc:AlternateContent>
-      <mc:AlternateContent xmlns:mc="http://schemas.openxmlformats.org/markup-compatibility/2006" xmlns:p14="http://schemas.microsoft.com/office/powerpoint/2010/main">
-        <mc:Choice Requires="p14">
-          <p:contentPart p14:bwMode="auto" r:id="rId6">
-            <p14:nvContentPartPr>
-              <p14:cNvPr id="26" name="Ink 25">
-                <a:extLst>
-                  <a:ext uri="{FF2B5EF4-FFF2-40B4-BE49-F238E27FC236}">
-                    <a16:creationId xmlns:a16="http://schemas.microsoft.com/office/drawing/2014/main" id="{BCEEE500-717D-AFA0-4774-12A4050317DA}"/>
-                  </a:ext>
-                </a:extLst>
-              </p14:cNvPr>
-              <p14:cNvContentPartPr/>
-              <p14:nvPr/>
-            </p14:nvContentPartPr>
-            <p14:xfrm>
-              <a:off x="8797970" y="2569787"/>
-              <a:ext cx="2602440" cy="1292760"/>
-            </p14:xfrm>
-          </p:contentPart>
-        </mc:Choice>
-        <mc:Fallback xmlns="">
-          <p:pic>
-            <p:nvPicPr>
-              <p:cNvPr id="26" name="Ink 25">
-                <a:extLst>
-                  <a:ext uri="{FF2B5EF4-FFF2-40B4-BE49-F238E27FC236}">
-                    <a16:creationId xmlns:a16="http://schemas.microsoft.com/office/drawing/2014/main" id="{BCEEE500-717D-AFA0-4774-12A4050317DA}"/>
-                  </a:ext>
-                </a:extLst>
-              </p:cNvPr>
-              <p:cNvPicPr/>
-              <p:nvPr/>
-            </p:nvPicPr>
-            <p:blipFill>
-              <a:blip r:embed="rId7"/>
-              <a:stretch>
-                <a:fillRect/>
-              </a:stretch>
-            </p:blipFill>
-            <p:spPr>
-              <a:xfrm>
-                <a:off x="8791850" y="2563667"/>
-                <a:ext cx="2614680" cy="1305000"/>
-              </a:xfrm>
-              <a:prstGeom prst="rect">
-                <a:avLst/>
-              </a:prstGeom>
-            </p:spPr>
-          </p:pic>
-        </mc:Fallback>
-      </mc:AlternateContent>
-      <mc:AlternateContent xmlns:mc="http://schemas.openxmlformats.org/markup-compatibility/2006" xmlns:p14="http://schemas.microsoft.com/office/powerpoint/2010/main">
-        <mc:Choice Requires="p14">
-          <p:contentPart p14:bwMode="auto" r:id="rId8">
-            <p14:nvContentPartPr>
-              <p14:cNvPr id="28" name="Ink 27">
-                <a:extLst>
-                  <a:ext uri="{FF2B5EF4-FFF2-40B4-BE49-F238E27FC236}">
-                    <a16:creationId xmlns:a16="http://schemas.microsoft.com/office/drawing/2014/main" id="{9EA17BEB-956B-425B-73B9-2E511B8FF68D}"/>
-                  </a:ext>
-                </a:extLst>
-              </p14:cNvPr>
-              <p14:cNvContentPartPr/>
-              <p14:nvPr/>
-            </p14:nvContentPartPr>
-            <p14:xfrm>
-              <a:off x="11413730" y="3461867"/>
-              <a:ext cx="487440" cy="386640"/>
-            </p14:xfrm>
-          </p:contentPart>
-        </mc:Choice>
-        <mc:Fallback xmlns="">
-          <p:pic>
-            <p:nvPicPr>
-              <p:cNvPr id="28" name="Ink 27">
-                <a:extLst>
-                  <a:ext uri="{FF2B5EF4-FFF2-40B4-BE49-F238E27FC236}">
-                    <a16:creationId xmlns:a16="http://schemas.microsoft.com/office/drawing/2014/main" id="{9EA17BEB-956B-425B-73B9-2E511B8FF68D}"/>
-                  </a:ext>
-                </a:extLst>
-              </p:cNvPr>
-              <p:cNvPicPr/>
-              <p:nvPr/>
-            </p:nvPicPr>
-            <p:blipFill>
-              <a:blip r:embed="rId9"/>
-              <a:stretch>
-                <a:fillRect/>
-              </a:stretch>
-            </p:blipFill>
-            <p:spPr>
-              <a:xfrm>
-                <a:off x="11407610" y="3455747"/>
-                <a:ext cx="499680" cy="398880"/>
-              </a:xfrm>
-              <a:prstGeom prst="rect">
-                <a:avLst/>
-              </a:prstGeom>
-            </p:spPr>
-          </p:pic>
-        </mc:Fallback>
-      </mc:AlternateContent>
-      <p:grpSp>
-        <p:nvGrpSpPr>
-          <p:cNvPr id="36" name="Group 35">
-            <a:extLst>
-              <a:ext uri="{FF2B5EF4-FFF2-40B4-BE49-F238E27FC236}">
-                <a16:creationId xmlns:a16="http://schemas.microsoft.com/office/drawing/2014/main" id="{4A423E9B-A5EE-3173-0465-229EF60C5F30}"/>
-              </a:ext>
-            </a:extLst>
-          </p:cNvPr>
-          <p:cNvGrpSpPr/>
-          <p:nvPr/>
-        </p:nvGrpSpPr>
-        <p:grpSpPr>
-          <a:xfrm>
-            <a:off x="4997856" y="3282080"/>
-            <a:ext cx="3776354" cy="2739999"/>
-            <a:chOff x="4997856" y="3282080"/>
-            <a:chExt cx="3776354" cy="2739999"/>
-          </a:xfrm>
-        </p:grpSpPr>
-        <p:sp>
-          <p:nvSpPr>
-            <p:cNvPr id="30" name="Oval 29">
-              <a:extLst>
-                <a:ext uri="{FF2B5EF4-FFF2-40B4-BE49-F238E27FC236}">
-                  <a16:creationId xmlns:a16="http://schemas.microsoft.com/office/drawing/2014/main" id="{1A52B41F-435E-40CD-31A5-3F0FE1EF786A}"/>
-                </a:ext>
-              </a:extLst>
-            </p:cNvPr>
-            <p:cNvSpPr/>
-            <p:nvPr/>
-          </p:nvSpPr>
-          <p:spPr>
-            <a:xfrm>
-              <a:off x="6738162" y="3889547"/>
-              <a:ext cx="636187" cy="546604"/>
-            </a:xfrm>
-            <a:prstGeom prst="ellipse">
-              <a:avLst/>
-            </a:prstGeom>
-            <a:solidFill>
-              <a:schemeClr val="accent4">
-                <a:lumMod val="20000"/>
-                <a:lumOff val="80000"/>
-              </a:schemeClr>
-            </a:solidFill>
-          </p:spPr>
-          <p:txBody>
-            <a:bodyPr wrap="square" lIns="91440" tIns="45720" rIns="91440" bIns="45720" rtlCol="0" anchor="t">
-              <a:spAutoFit/>
-            </a:bodyPr>
-            <a:lstStyle/>
-            <a:p>
-              <a:pPr algn="l"/>
-              <a:endParaRPr lang="en-US" sz="1200" dirty="0">
-                <a:solidFill>
-                  <a:schemeClr val="accent6">
-                    <a:lumMod val="75000"/>
-                  </a:schemeClr>
-                </a:solidFill>
-                <a:latin typeface="Courier New"/>
-                <a:cs typeface="Calibri"/>
-              </a:endParaRPr>
-            </a:p>
-          </p:txBody>
-        </p:sp>
-        <p:cxnSp>
-          <p:nvCxnSpPr>
-            <p:cNvPr id="4" name="Straight Connector 3">
-              <a:extLst>
-                <a:ext uri="{FF2B5EF4-FFF2-40B4-BE49-F238E27FC236}">
-                  <a16:creationId xmlns:a16="http://schemas.microsoft.com/office/drawing/2014/main" id="{F5B25AC3-02B1-BCB9-F930-520A3A46E17E}"/>
-                </a:ext>
-              </a:extLst>
-            </p:cNvPr>
-            <p:cNvCxnSpPr>
-              <a:cxnSpLocks/>
-            </p:cNvCxnSpPr>
-            <p:nvPr/>
-          </p:nvCxnSpPr>
-          <p:spPr>
-            <a:xfrm flipV="1">
-              <a:off x="5659272" y="4563944"/>
-              <a:ext cx="1426321" cy="1458135"/>
-            </a:xfrm>
-            <a:prstGeom prst="line">
-              <a:avLst/>
-            </a:prstGeom>
-            <a:ln w="38100"/>
-          </p:spPr>
-          <p:style>
-            <a:lnRef idx="1">
-              <a:schemeClr val="accent1"/>
-            </a:lnRef>
-            <a:fillRef idx="0">
-              <a:schemeClr val="accent1"/>
-            </a:fillRef>
-            <a:effectRef idx="0">
-              <a:schemeClr val="accent1"/>
-            </a:effectRef>
-            <a:fontRef idx="minor">
-              <a:schemeClr val="tx1"/>
-            </a:fontRef>
-          </p:style>
-        </p:cxnSp>
-        <p:cxnSp>
-          <p:nvCxnSpPr>
-            <p:cNvPr id="5" name="Straight Connector 4">
-              <a:extLst>
-                <a:ext uri="{FF2B5EF4-FFF2-40B4-BE49-F238E27FC236}">
-                  <a16:creationId xmlns:a16="http://schemas.microsoft.com/office/drawing/2014/main" id="{CAF92664-7AC7-D2BE-BA18-3C97A5A6D4B6}"/>
-                </a:ext>
-              </a:extLst>
-            </p:cNvPr>
-            <p:cNvCxnSpPr>
-              <a:cxnSpLocks/>
-            </p:cNvCxnSpPr>
-            <p:nvPr/>
-          </p:nvCxnSpPr>
-          <p:spPr>
-            <a:xfrm flipH="1" flipV="1">
-              <a:off x="7085593" y="4563944"/>
-              <a:ext cx="1309163" cy="1325275"/>
-            </a:xfrm>
-            <a:prstGeom prst="line">
-              <a:avLst/>
-            </a:prstGeom>
-            <a:ln w="38100"/>
-          </p:spPr>
-          <p:style>
-            <a:lnRef idx="1">
-              <a:schemeClr val="accent1"/>
-            </a:lnRef>
-            <a:fillRef idx="0">
-              <a:schemeClr val="accent1"/>
-            </a:fillRef>
-            <a:effectRef idx="0">
-              <a:schemeClr val="accent1"/>
-            </a:effectRef>
-            <a:fontRef idx="minor">
-              <a:schemeClr val="tx1"/>
-            </a:fontRef>
-          </p:style>
-        </p:cxnSp>
-        <p:grpSp>
-          <p:nvGrpSpPr>
-            <p:cNvPr id="6" name="Group 5">
-              <a:extLst>
-                <a:ext uri="{FF2B5EF4-FFF2-40B4-BE49-F238E27FC236}">
-                  <a16:creationId xmlns:a16="http://schemas.microsoft.com/office/drawing/2014/main" id="{5B5BABE2-A1DF-DC4D-1513-849879A94D73}"/>
-                </a:ext>
-              </a:extLst>
-            </p:cNvPr>
-            <p:cNvGrpSpPr/>
-            <p:nvPr/>
-          </p:nvGrpSpPr>
-          <p:grpSpPr>
-            <a:xfrm>
-              <a:off x="6972766" y="3719509"/>
-              <a:ext cx="250325" cy="844435"/>
-              <a:chOff x="6972766" y="3719509"/>
-              <a:chExt cx="250325" cy="844435"/>
-            </a:xfrm>
-          </p:grpSpPr>
-          <p:cxnSp>
-            <p:nvCxnSpPr>
-              <p:cNvPr id="7" name="Straight Connector 6">
-                <a:extLst>
-                  <a:ext uri="{FF2B5EF4-FFF2-40B4-BE49-F238E27FC236}">
-                    <a16:creationId xmlns:a16="http://schemas.microsoft.com/office/drawing/2014/main" id="{BAE950CA-92F0-53F0-79CE-909EE1D104AF}"/>
-                  </a:ext>
-                </a:extLst>
-              </p:cNvPr>
-              <p:cNvCxnSpPr>
-                <a:cxnSpLocks/>
-              </p:cNvCxnSpPr>
-              <p:nvPr/>
-            </p:nvCxnSpPr>
-            <p:spPr>
-              <a:xfrm flipV="1">
-                <a:off x="7079970" y="4063977"/>
-                <a:ext cx="17959" cy="499967"/>
-              </a:xfrm>
-              <a:prstGeom prst="line">
-                <a:avLst/>
-              </a:prstGeom>
-              <a:ln w="31750">
-                <a:tailEnd type="triangle"/>
-              </a:ln>
-            </p:spPr>
-            <p:style>
-              <a:lnRef idx="1">
-                <a:schemeClr val="accent1"/>
-              </a:lnRef>
-              <a:fillRef idx="0">
-                <a:schemeClr val="accent1"/>
-              </a:fillRef>
-              <a:effectRef idx="0">
-                <a:schemeClr val="accent1"/>
-              </a:effectRef>
-              <a:fontRef idx="minor">
-                <a:schemeClr val="tx1"/>
-              </a:fontRef>
-            </p:style>
-          </p:cxnSp>
-          <mc:AlternateContent xmlns:mc="http://schemas.openxmlformats.org/markup-compatibility/2006" xmlns:a14="http://schemas.microsoft.com/office/drawing/2010/main">
-            <mc:Choice Requires="a14">
-              <p:sp>
-                <p:nvSpPr>
-                  <p:cNvPr id="8" name="TextBox 7">
-                    <a:extLst>
-                      <a:ext uri="{FF2B5EF4-FFF2-40B4-BE49-F238E27FC236}">
-                        <a16:creationId xmlns:a16="http://schemas.microsoft.com/office/drawing/2014/main" id="{32D10848-8DF6-8576-1A2C-29A868A96B1C}"/>
-                      </a:ext>
-                    </a:extLst>
-                  </p:cNvPr>
-                  <p:cNvSpPr txBox="1"/>
-                  <p:nvPr/>
-                </p:nvSpPr>
-                <p:spPr>
-                  <a:xfrm>
-                    <a:off x="6972766" y="3719509"/>
-                    <a:ext cx="250325" cy="276999"/>
-                  </a:xfrm>
-                  <a:prstGeom prst="rect">
-                    <a:avLst/>
-                  </a:prstGeom>
-                  <a:noFill/>
-                </p:spPr>
-                <p:txBody>
-                  <a:bodyPr wrap="none" lIns="0" tIns="0" rIns="0" bIns="0" rtlCol="0">
-                    <a:spAutoFit/>
-                  </a:bodyPr>
-                  <a:lstStyle/>
-                  <a:p>
-                    <a:pPr/>
-                    <a14:m>
-                      <m:oMathPara xmlns:m="http://schemas.openxmlformats.org/officeDocument/2006/math">
-                        <m:oMathParaPr>
-                          <m:jc m:val="centerGroup"/>
-                        </m:oMathParaPr>
-                        <m:oMath xmlns:m="http://schemas.openxmlformats.org/officeDocument/2006/math">
-                          <m:acc>
-                            <m:accPr>
-                              <m:chr m:val="̂"/>
-                              <m:ctrlPr>
-                                <a:rPr lang="en-US" b="0" i="1" smtClean="0">
-                                  <a:latin typeface="Cambria Math" panose="02040503050406030204" pitchFamily="18" charset="0"/>
-                                </a:rPr>
-                              </m:ctrlPr>
-                            </m:accPr>
-                            <m:e>
-                              <m:sSub>
-                                <m:sSubPr>
-                                  <m:ctrlPr>
-                                    <a:rPr lang="en-US" b="0" i="1" smtClean="0">
-                                      <a:latin typeface="Cambria Math" panose="02040503050406030204" pitchFamily="18" charset="0"/>
-                                    </a:rPr>
-                                  </m:ctrlPr>
-                                </m:sSubPr>
-                                <m:e>
-                                  <m:r>
-                                    <a:rPr lang="en-US" b="0" i="1" smtClean="0">
-                                      <a:latin typeface="Cambria Math" panose="02040503050406030204" pitchFamily="18" charset="0"/>
-                                    </a:rPr>
-                                    <m:t>𝑣</m:t>
-                                  </m:r>
-                                </m:e>
-                                <m:sub>
-                                  <m:r>
-                                    <a:rPr lang="en-US" b="0" i="1" smtClean="0">
-                                      <a:latin typeface="Cambria Math" panose="02040503050406030204" pitchFamily="18" charset="0"/>
-                                    </a:rPr>
-                                    <m:t>𝑖</m:t>
-                                  </m:r>
-                                </m:sub>
-                              </m:sSub>
-                            </m:e>
-                          </m:acc>
-                        </m:oMath>
-                      </m:oMathPara>
-                    </a14:m>
-                    <a:endParaRPr lang="en-US" b="0" dirty="0"/>
-                  </a:p>
-                </p:txBody>
-              </p:sp>
-            </mc:Choice>
-            <mc:Fallback xmlns="">
-              <p:sp>
-                <p:nvSpPr>
-                  <p:cNvPr id="8" name="TextBox 7">
-                    <a:extLst>
-                      <a:ext uri="{FF2B5EF4-FFF2-40B4-BE49-F238E27FC236}">
-                        <a16:creationId xmlns:a16="http://schemas.microsoft.com/office/drawing/2014/main" id="{32D10848-8DF6-8576-1A2C-29A868A96B1C}"/>
-                      </a:ext>
-                    </a:extLst>
-                  </p:cNvPr>
-                  <p:cNvSpPr txBox="1">
-                    <a:spLocks noRot="1" noChangeAspect="1" noMove="1" noResize="1" noEditPoints="1" noAdjustHandles="1" noChangeArrowheads="1" noChangeShapeType="1" noTextEdit="1"/>
-                  </p:cNvSpPr>
-                  <p:nvPr/>
-                </p:nvSpPr>
-                <p:spPr>
-                  <a:xfrm>
-                    <a:off x="6972766" y="3719509"/>
-                    <a:ext cx="250325" cy="276999"/>
-                  </a:xfrm>
-                  <a:prstGeom prst="rect">
-                    <a:avLst/>
-                  </a:prstGeom>
-                  <a:blipFill>
-                    <a:blip r:embed="rId10"/>
-                    <a:stretch>
-                      <a:fillRect l="-14634" t="-23913" r="-56098" b="-17391"/>
-                    </a:stretch>
-                  </a:blipFill>
-                </p:spPr>
-                <p:txBody>
-                  <a:bodyPr/>
-                  <a:lstStyle/>
-                  <a:p>
-                    <a:r>
-                      <a:rPr lang="en-US">
-                        <a:noFill/>
-                      </a:rPr>
-                      <a:t> </a:t>
-                    </a:r>
-                  </a:p>
-                </p:txBody>
-              </p:sp>
-            </mc:Fallback>
-          </mc:AlternateContent>
-        </p:grpSp>
-        <p:cxnSp>
-          <p:nvCxnSpPr>
-            <p:cNvPr id="9" name="Straight Connector 8">
-              <a:extLst>
-                <a:ext uri="{FF2B5EF4-FFF2-40B4-BE49-F238E27FC236}">
-                  <a16:creationId xmlns:a16="http://schemas.microsoft.com/office/drawing/2014/main" id="{FBEC0FBF-0B40-CD80-1F3C-711C1E18B419}"/>
-                </a:ext>
-              </a:extLst>
-            </p:cNvPr>
-            <p:cNvCxnSpPr>
-              <a:cxnSpLocks/>
-            </p:cNvCxnSpPr>
-            <p:nvPr/>
-          </p:nvCxnSpPr>
-          <p:spPr>
-            <a:xfrm flipV="1">
-              <a:off x="7810125" y="4981433"/>
-              <a:ext cx="223857" cy="288446"/>
-            </a:xfrm>
-            <a:prstGeom prst="line">
-              <a:avLst/>
-            </a:prstGeom>
-            <a:ln w="31750">
-              <a:tailEnd type="triangle"/>
-            </a:ln>
-          </p:spPr>
-          <p:style>
-            <a:lnRef idx="1">
-              <a:schemeClr val="accent1"/>
-            </a:lnRef>
-            <a:fillRef idx="0">
-              <a:schemeClr val="accent1"/>
-            </a:fillRef>
-            <a:effectRef idx="0">
-              <a:schemeClr val="accent1"/>
-            </a:effectRef>
-            <a:fontRef idx="minor">
-              <a:schemeClr val="tx1"/>
-            </a:fontRef>
-          </p:style>
-        </p:cxnSp>
-        <p:grpSp>
-          <p:nvGrpSpPr>
-            <p:cNvPr id="10" name="Group 9">
-              <a:extLst>
-                <a:ext uri="{FF2B5EF4-FFF2-40B4-BE49-F238E27FC236}">
-                  <a16:creationId xmlns:a16="http://schemas.microsoft.com/office/drawing/2014/main" id="{EF548428-01EC-F833-1F9D-37AB56740BBA}"/>
-                </a:ext>
-              </a:extLst>
-            </p:cNvPr>
-            <p:cNvGrpSpPr/>
-            <p:nvPr/>
-          </p:nvGrpSpPr>
-          <p:grpSpPr>
-            <a:xfrm rot="8193490">
-              <a:off x="5429400" y="3655284"/>
-              <a:ext cx="459744" cy="580060"/>
-              <a:chOff x="7558295" y="1666605"/>
-              <a:chExt cx="1309163" cy="1673737"/>
-            </a:xfrm>
-          </p:grpSpPr>
-          <p:cxnSp>
-            <p:nvCxnSpPr>
-              <p:cNvPr id="11" name="Straight Connector 10">
-                <a:extLst>
-                  <a:ext uri="{FF2B5EF4-FFF2-40B4-BE49-F238E27FC236}">
-                    <a16:creationId xmlns:a16="http://schemas.microsoft.com/office/drawing/2014/main" id="{05A744F2-74DE-A256-B6BE-D0FF496DE699}"/>
-                  </a:ext>
-                </a:extLst>
-              </p:cNvPr>
-              <p:cNvCxnSpPr>
-                <a:cxnSpLocks/>
-              </p:cNvCxnSpPr>
-              <p:nvPr/>
-            </p:nvCxnSpPr>
-            <p:spPr>
-              <a:xfrm flipH="1" flipV="1">
-                <a:off x="7558295" y="2015067"/>
-                <a:ext cx="1309163" cy="1325275"/>
-              </a:xfrm>
-              <a:prstGeom prst="line">
-                <a:avLst/>
-              </a:prstGeom>
-              <a:ln w="38100"/>
-            </p:spPr>
-            <p:style>
-              <a:lnRef idx="1">
-                <a:schemeClr val="accent1"/>
-              </a:lnRef>
-              <a:fillRef idx="0">
-                <a:schemeClr val="accent1"/>
-              </a:fillRef>
-              <a:effectRef idx="0">
-                <a:schemeClr val="accent1"/>
-              </a:effectRef>
-              <a:fontRef idx="minor">
-                <a:schemeClr val="tx1"/>
-              </a:fontRef>
-            </p:style>
-          </p:cxnSp>
-          <p:cxnSp>
-            <p:nvCxnSpPr>
-              <p:cNvPr id="12" name="Straight Connector 11">
-                <a:extLst>
-                  <a:ext uri="{FF2B5EF4-FFF2-40B4-BE49-F238E27FC236}">
-                    <a16:creationId xmlns:a16="http://schemas.microsoft.com/office/drawing/2014/main" id="{4AD45A54-CB17-AAB6-3AE7-A5CFE4F89525}"/>
-                  </a:ext>
-                </a:extLst>
-              </p:cNvPr>
-              <p:cNvCxnSpPr>
-                <a:cxnSpLocks/>
-              </p:cNvCxnSpPr>
-              <p:nvPr/>
-            </p:nvCxnSpPr>
-            <p:spPr>
-              <a:xfrm rot="13406510" flipH="1">
-                <a:off x="8698972" y="1666605"/>
-                <a:ext cx="111648" cy="1266617"/>
-              </a:xfrm>
-              <a:prstGeom prst="line">
-                <a:avLst/>
-              </a:prstGeom>
-              <a:ln w="38100">
-                <a:tailEnd type="triangle"/>
-              </a:ln>
-            </p:spPr>
-            <p:style>
-              <a:lnRef idx="1">
-                <a:schemeClr val="accent1"/>
-              </a:lnRef>
-              <a:fillRef idx="0">
-                <a:schemeClr val="accent1"/>
-              </a:fillRef>
-              <a:effectRef idx="0">
-                <a:schemeClr val="accent1"/>
-              </a:effectRef>
-              <a:fontRef idx="minor">
-                <a:schemeClr val="tx1"/>
-              </a:fontRef>
-            </p:style>
-          </p:cxnSp>
-        </p:grpSp>
-        <p:cxnSp>
-          <p:nvCxnSpPr>
-            <p:cNvPr id="15" name="Straight Connector 14">
-              <a:extLst>
-                <a:ext uri="{FF2B5EF4-FFF2-40B4-BE49-F238E27FC236}">
-                  <a16:creationId xmlns:a16="http://schemas.microsoft.com/office/drawing/2014/main" id="{A36C846B-D7D2-6D3A-EC81-E9DFF3C57BFD}"/>
-                </a:ext>
-              </a:extLst>
-            </p:cNvPr>
-            <p:cNvCxnSpPr>
-              <a:cxnSpLocks/>
-            </p:cNvCxnSpPr>
-            <p:nvPr/>
-          </p:nvCxnSpPr>
-          <p:spPr>
-            <a:xfrm flipH="1" flipV="1">
-              <a:off x="5758471" y="3283329"/>
-              <a:ext cx="1309163" cy="1325275"/>
-            </a:xfrm>
-            <a:prstGeom prst="line">
-              <a:avLst/>
-            </a:prstGeom>
-            <a:ln>
-              <a:prstDash val="sysDot"/>
-            </a:ln>
-          </p:spPr>
-          <p:style>
-            <a:lnRef idx="1">
-              <a:schemeClr val="accent1"/>
-            </a:lnRef>
-            <a:fillRef idx="0">
-              <a:schemeClr val="accent1"/>
-            </a:fillRef>
-            <a:effectRef idx="0">
-              <a:schemeClr val="accent1"/>
-            </a:effectRef>
-            <a:fontRef idx="minor">
-              <a:schemeClr val="tx1"/>
-            </a:fontRef>
-          </p:style>
-        </p:cxnSp>
-        <p:cxnSp>
-          <p:nvCxnSpPr>
-            <p:cNvPr id="16" name="Straight Connector 15">
-              <a:extLst>
-                <a:ext uri="{FF2B5EF4-FFF2-40B4-BE49-F238E27FC236}">
-                  <a16:creationId xmlns:a16="http://schemas.microsoft.com/office/drawing/2014/main" id="{8EC303E8-F7D2-723E-3625-041A4179C969}"/>
-                </a:ext>
-              </a:extLst>
-            </p:cNvPr>
-            <p:cNvCxnSpPr>
-              <a:cxnSpLocks/>
-            </p:cNvCxnSpPr>
-            <p:nvPr/>
-          </p:nvCxnSpPr>
-          <p:spPr>
-            <a:xfrm flipV="1">
-              <a:off x="7088949" y="3282080"/>
-              <a:ext cx="1305807" cy="1271265"/>
-            </a:xfrm>
-            <a:prstGeom prst="line">
-              <a:avLst/>
-            </a:prstGeom>
-            <a:ln>
-              <a:prstDash val="sysDot"/>
-            </a:ln>
-          </p:spPr>
-          <p:style>
-            <a:lnRef idx="1">
-              <a:schemeClr val="accent1"/>
-            </a:lnRef>
-            <a:fillRef idx="0">
-              <a:schemeClr val="accent1"/>
-            </a:fillRef>
-            <a:effectRef idx="0">
-              <a:schemeClr val="accent1"/>
-            </a:effectRef>
-            <a:fontRef idx="minor">
-              <a:schemeClr val="tx1"/>
-            </a:fontRef>
-          </p:style>
-        </p:cxnSp>
-        <p:cxnSp>
-          <p:nvCxnSpPr>
-            <p:cNvPr id="17" name="Straight Connector 16">
-              <a:extLst>
-                <a:ext uri="{FF2B5EF4-FFF2-40B4-BE49-F238E27FC236}">
-                  <a16:creationId xmlns:a16="http://schemas.microsoft.com/office/drawing/2014/main" id="{6F42D957-021B-BF51-C058-37A49CBC963B}"/>
-                </a:ext>
-              </a:extLst>
-            </p:cNvPr>
-            <p:cNvCxnSpPr>
-              <a:cxnSpLocks/>
-            </p:cNvCxnSpPr>
-            <p:nvPr/>
-          </p:nvCxnSpPr>
-          <p:spPr>
-            <a:xfrm flipH="1" flipV="1">
-              <a:off x="5942566" y="3905209"/>
-              <a:ext cx="626986" cy="713994"/>
-            </a:xfrm>
-            <a:prstGeom prst="line">
-              <a:avLst/>
-            </a:prstGeom>
-            <a:ln>
-              <a:prstDash val="sysDot"/>
-            </a:ln>
-          </p:spPr>
-          <p:style>
-            <a:lnRef idx="1">
-              <a:schemeClr val="accent1"/>
-            </a:lnRef>
-            <a:fillRef idx="0">
-              <a:schemeClr val="accent1"/>
-            </a:fillRef>
-            <a:effectRef idx="0">
-              <a:schemeClr val="accent1"/>
-            </a:effectRef>
-            <a:fontRef idx="minor">
-              <a:schemeClr val="tx1"/>
-            </a:fontRef>
-          </p:style>
-        </p:cxnSp>
-        <p:cxnSp>
-          <p:nvCxnSpPr>
-            <p:cNvPr id="19" name="Straight Connector 18">
-              <a:extLst>
-                <a:ext uri="{FF2B5EF4-FFF2-40B4-BE49-F238E27FC236}">
-                  <a16:creationId xmlns:a16="http://schemas.microsoft.com/office/drawing/2014/main" id="{0521A4DB-8F1A-4359-0A90-C16B087878A9}"/>
-                </a:ext>
-              </a:extLst>
-            </p:cNvPr>
-            <p:cNvCxnSpPr>
-              <a:cxnSpLocks/>
-            </p:cNvCxnSpPr>
-            <p:nvPr/>
-          </p:nvCxnSpPr>
-          <p:spPr>
-            <a:xfrm flipV="1">
-              <a:off x="4997856" y="3917712"/>
-              <a:ext cx="312098" cy="836258"/>
-            </a:xfrm>
-            <a:prstGeom prst="line">
-              <a:avLst/>
-            </a:prstGeom>
-            <a:ln>
-              <a:prstDash val="sysDot"/>
-            </a:ln>
-          </p:spPr>
-          <p:style>
-            <a:lnRef idx="1">
-              <a:schemeClr val="accent1"/>
-            </a:lnRef>
-            <a:fillRef idx="0">
-              <a:schemeClr val="accent1"/>
-            </a:fillRef>
-            <a:effectRef idx="0">
-              <a:schemeClr val="accent1"/>
-            </a:effectRef>
-            <a:fontRef idx="minor">
-              <a:schemeClr val="tx1"/>
-            </a:fontRef>
-          </p:style>
-        </p:cxnSp>
-        <p:cxnSp>
-          <p:nvCxnSpPr>
-            <p:cNvPr id="31" name="Straight Connector 30">
-              <a:extLst>
-                <a:ext uri="{FF2B5EF4-FFF2-40B4-BE49-F238E27FC236}">
-                  <a16:creationId xmlns:a16="http://schemas.microsoft.com/office/drawing/2014/main" id="{E9D6F629-C1F0-18E2-A075-D489C2339340}"/>
-                </a:ext>
-              </a:extLst>
-            </p:cNvPr>
-            <p:cNvCxnSpPr>
-              <a:cxnSpLocks/>
-            </p:cNvCxnSpPr>
-            <p:nvPr/>
-          </p:nvCxnSpPr>
-          <p:spPr>
-            <a:xfrm flipH="1" flipV="1">
-              <a:off x="5936870" y="3896007"/>
-              <a:ext cx="2837340" cy="11905"/>
-            </a:xfrm>
-            <a:prstGeom prst="line">
-              <a:avLst/>
-            </a:prstGeom>
-            <a:ln>
-              <a:prstDash val="sysDot"/>
-            </a:ln>
-          </p:spPr>
-          <p:style>
-            <a:lnRef idx="1">
-              <a:schemeClr val="accent1"/>
-            </a:lnRef>
-            <a:fillRef idx="0">
-              <a:schemeClr val="accent1"/>
-            </a:fillRef>
-            <a:effectRef idx="0">
-              <a:schemeClr val="accent1"/>
-            </a:effectRef>
-            <a:fontRef idx="minor">
-              <a:schemeClr val="tx1"/>
-            </a:fontRef>
-          </p:style>
-        </p:cxnSp>
-        <p:sp>
-          <p:nvSpPr>
-            <p:cNvPr id="21" name="Connecteur droit 20">
-              <a:extLst>
-                <a:ext uri="{FF2B5EF4-FFF2-40B4-BE49-F238E27FC236}">
-                  <a16:creationId xmlns:a16="http://schemas.microsoft.com/office/drawing/2014/main" id="{0FEC644D-29C2-4FCA-B552-30A37134F6E7}"/>
-                </a:ext>
-              </a:extLst>
-            </p:cNvPr>
-            <p:cNvSpPr/>
-            <p:nvPr/>
-          </p:nvSpPr>
-          <p:spPr>
-            <a:xfrm rot="2930468">
-              <a:off x="5828965" y="4119120"/>
-              <a:ext cx="548640" cy="0"/>
-            </a:xfrm>
-            <a:prstGeom prst="line">
-              <a:avLst/>
-            </a:prstGeom>
-            <a:solidFill>
-              <a:srgbClr val="000000">
-                <a:alpha val="5000"/>
-              </a:srgbClr>
-            </a:solidFill>
-            <a:ln w="12600">
-              <a:solidFill>
-                <a:srgbClr val="000000"/>
-              </a:solidFill>
-              <a:tailEnd type="triangle"/>
-            </a:ln>
-          </p:spPr>
-          <p:style>
-            <a:lnRef idx="1">
-              <a:schemeClr val="accent1"/>
-            </a:lnRef>
-            <a:fillRef idx="0">
-              <a:schemeClr val="accent1"/>
-            </a:fillRef>
-            <a:effectRef idx="0">
-              <a:schemeClr val="accent1"/>
-            </a:effectRef>
-            <a:fontRef idx="minor">
-              <a:schemeClr val="tx1"/>
-            </a:fontRef>
-          </p:style>
-          <p:txBody>
-            <a:bodyPr wrap="none" rtlCol="0" anchor="ctr" anchorCtr="1"/>
-            <a:lstStyle/>
-            <a:p>
-              <a:endParaRPr lang="en-US">
-                <a:solidFill>
-                  <a:srgbClr val="000000"/>
-                </a:solidFill>
-              </a:endParaRPr>
-            </a:p>
-          </p:txBody>
-        </p:sp>
-      </p:grpSp>
-    </p:spTree>
-    <p:extLst>
-      <p:ext uri="{BB962C8B-B14F-4D97-AF65-F5344CB8AC3E}">
-        <p14:creationId xmlns:p14="http://schemas.microsoft.com/office/powerpoint/2010/main" val="3658574458"/>
-      </p:ext>
-    </p:extLst>
-  </p:cSld>
-  <p:clrMapOvr>
-    <a:masterClrMapping/>
-  </p:clrMapOvr>
-</p:sld>
-</file>
-
 <file path=ppt/slides/slide3.xml><?xml version="1.0" encoding="utf-8"?>
 <p:sld xmlns:a="http://schemas.openxmlformats.org/drawingml/2006/main" xmlns:r="http://schemas.openxmlformats.org/officeDocument/2006/relationships" xmlns:p="http://schemas.openxmlformats.org/presentationml/2006/main">
   <p:cSld>
@@ -15275,6 +14582,101 @@
           <p:cNvPr id="2" name="Title 1">
             <a:extLst>
               <a:ext uri="{FF2B5EF4-FFF2-40B4-BE49-F238E27FC236}">
+                <a16:creationId xmlns:a16="http://schemas.microsoft.com/office/drawing/2014/main" id="{BE2BF8AD-4C4B-BAE5-26CF-B4BF23DECCCF}"/>
+              </a:ext>
+            </a:extLst>
+          </p:cNvPr>
+          <p:cNvSpPr>
+            <a:spLocks noGrp="1"/>
+          </p:cNvSpPr>
+          <p:nvPr>
+            <p:ph type="title"/>
+          </p:nvPr>
+        </p:nvSpPr>
+        <p:spPr>
+          <a:xfrm>
+            <a:off x="413657" y="365125"/>
+            <a:ext cx="10940143" cy="1325563"/>
+          </a:xfrm>
+        </p:spPr>
+        <p:txBody>
+          <a:bodyPr>
+            <a:normAutofit fontScale="90000"/>
+          </a:bodyPr>
+          <a:lstStyle/>
+          <a:p>
+            <a:r>
+              <a:rPr lang="en-US" dirty="0"/>
+              <a:t>Of note, the edge that is tangent may shrink or grow, so we must find tangents not only to the current edge segment, but as well to any extensions</a:t>
+            </a:r>
+          </a:p>
+        </p:txBody>
+      </p:sp>
+      <p:pic>
+        <p:nvPicPr>
+          <p:cNvPr id="5" name="Picture 4">
+            <a:extLst>
+              <a:ext uri="{FF2B5EF4-FFF2-40B4-BE49-F238E27FC236}">
+                <a16:creationId xmlns:a16="http://schemas.microsoft.com/office/drawing/2014/main" id="{9C474C83-8FB6-D96A-D98E-6757E4A4D251}"/>
+              </a:ext>
+            </a:extLst>
+          </p:cNvPr>
+          <p:cNvPicPr>
+            <a:picLocks noChangeAspect="1"/>
+          </p:cNvPicPr>
+          <p:nvPr/>
+        </p:nvPicPr>
+        <p:blipFill>
+          <a:blip r:embed="rId2"/>
+          <a:stretch>
+            <a:fillRect/>
+          </a:stretch>
+        </p:blipFill>
+        <p:spPr>
+          <a:xfrm>
+            <a:off x="2892188" y="2215771"/>
+            <a:ext cx="5334000" cy="4000500"/>
+          </a:xfrm>
+          <a:prstGeom prst="rect">
+            <a:avLst/>
+          </a:prstGeom>
+        </p:spPr>
+      </p:pic>
+    </p:spTree>
+    <p:extLst>
+      <p:ext uri="{BB962C8B-B14F-4D97-AF65-F5344CB8AC3E}">
+        <p14:creationId xmlns:p14="http://schemas.microsoft.com/office/powerpoint/2010/main" val="3766501253"/>
+      </p:ext>
+    </p:extLst>
+  </p:cSld>
+  <p:clrMapOvr>
+    <a:masterClrMapping/>
+  </p:clrMapOvr>
+</p:sld>
+</file>
+
+<file path=ppt/slides/slide31.xml><?xml version="1.0" encoding="utf-8"?>
+<p:sld xmlns:a="http://schemas.openxmlformats.org/drawingml/2006/main" xmlns:r="http://schemas.openxmlformats.org/officeDocument/2006/relationships" xmlns:p="http://schemas.openxmlformats.org/presentationml/2006/main">
+  <p:cSld>
+    <p:spTree>
+      <p:nvGrpSpPr>
+        <p:cNvPr id="1" name=""/>
+        <p:cNvGrpSpPr/>
+        <p:nvPr/>
+      </p:nvGrpSpPr>
+      <p:grpSpPr>
+        <a:xfrm>
+          <a:off x="0" y="0"/>
+          <a:ext cx="0" cy="0"/>
+          <a:chOff x="0" y="0"/>
+          <a:chExt cx="0" cy="0"/>
+        </a:xfrm>
+      </p:grpSpPr>
+      <p:sp>
+        <p:nvSpPr>
+          <p:cNvPr id="2" name="Title 1">
+            <a:extLst>
+              <a:ext uri="{FF2B5EF4-FFF2-40B4-BE49-F238E27FC236}">
                 <a16:creationId xmlns:a16="http://schemas.microsoft.com/office/drawing/2014/main" id="{71E51AC3-5020-3A08-636D-09846795A9A0}"/>
               </a:ext>
             </a:extLst>
@@ -15322,7 +14724,7 @@
         </p:spPr>
         <p:txBody>
           <a:bodyPr>
-            <a:normAutofit lnSpcReduction="10000"/>
+            <a:normAutofit/>
           </a:bodyPr>
           <a:lstStyle/>
           <a:p>
@@ -15331,7 +14733,7 @@
             </a:pPr>
             <a:r>
               <a:rPr lang="en-US" dirty="0"/>
-              <a:t>The circle center, after it is found, can be projected in the opposite direction of the edge’s unit normal vector, by a radius distance. This projection must either be on the edge for the point to be valid, or the projection must be inside of the “apex” triangle created by the vertex.</a:t>
+              <a:t>The circle center, after it is found, can be projected in the opposite direction of the edge’s unit normal vector, by a radius distance. This projection must either be on the edge for the point to be valid intersection with the segment.</a:t>
             </a:r>
           </a:p>
         </p:txBody>
@@ -16105,8 +15507,8 @@
         </p:nvSpPr>
         <p:spPr>
           <a:xfrm flipV="1">
-            <a:off x="7459526" y="3019186"/>
-            <a:ext cx="2245147" cy="11905"/>
+            <a:off x="6745582" y="3230032"/>
+            <a:ext cx="882625" cy="1354"/>
           </a:xfrm>
           <a:prstGeom prst="line">
             <a:avLst/>
@@ -16148,6 +15550,132 @@
           </a:p>
         </p:txBody>
       </p:sp>
+      <p:sp>
+        <p:nvSpPr>
+          <p:cNvPr id="4" name="Rectangle 3">
+            <a:extLst>
+              <a:ext uri="{FF2B5EF4-FFF2-40B4-BE49-F238E27FC236}">
+                <a16:creationId xmlns:a16="http://schemas.microsoft.com/office/drawing/2014/main" id="{3915CFB4-617D-A28A-4E3B-502EEC05F25E}"/>
+              </a:ext>
+            </a:extLst>
+          </p:cNvPr>
+          <p:cNvSpPr/>
+          <p:nvPr/>
+        </p:nvSpPr>
+        <p:spPr>
+          <a:xfrm>
+            <a:off x="4610108" y="5973979"/>
+            <a:ext cx="6569962" cy="577081"/>
+          </a:xfrm>
+          <a:prstGeom prst="rect">
+            <a:avLst/>
+          </a:prstGeom>
+          <a:solidFill>
+            <a:schemeClr val="accent4">
+              <a:lumMod val="20000"/>
+              <a:lumOff val="80000"/>
+            </a:schemeClr>
+          </a:solidFill>
+        </p:spPr>
+        <p:txBody>
+          <a:bodyPr wrap="square" lIns="91440" tIns="45720" rIns="91440" bIns="45720" anchor="t">
+            <a:spAutoFit/>
+          </a:bodyPr>
+          <a:lstStyle/>
+          <a:p>
+            <a:r>
+              <a:rPr lang="en-US" sz="1050" b="0" i="0" u="none" strike="noStrike" baseline="0" dirty="0" err="1">
+                <a:solidFill>
+                  <a:srgbClr val="000000"/>
+                </a:solidFill>
+                <a:latin typeface="Courier New" panose="02070309020205020404" pitchFamily="49" charset="0"/>
+              </a:rPr>
+              <a:t>isOnEdge</a:t>
+            </a:r>
+            <a:r>
+              <a:rPr lang="en-US" sz="1050" b="0" i="0" u="none" strike="noStrike" baseline="0" dirty="0">
+                <a:solidFill>
+                  <a:srgbClr val="000000"/>
+                </a:solidFill>
+                <a:latin typeface="Courier New" panose="02070309020205020404" pitchFamily="49" charset="0"/>
+              </a:rPr>
+              <a:t> = </a:t>
+            </a:r>
+            <a:r>
+              <a:rPr lang="en-US" sz="1050" b="0" i="0" u="none" strike="noStrike" baseline="0" dirty="0" err="1">
+                <a:solidFill>
+                  <a:srgbClr val="000000"/>
+                </a:solidFill>
+                <a:latin typeface="Courier New" panose="02070309020205020404" pitchFamily="49" charset="0"/>
+              </a:rPr>
+              <a:t>fcn_INTERNAL_isPointOnEdge</a:t>
+            </a:r>
+            <a:r>
+              <a:rPr lang="en-US" sz="1050" b="0" i="0" u="none" strike="noStrike" baseline="0" dirty="0">
+                <a:solidFill>
+                  <a:srgbClr val="000000"/>
+                </a:solidFill>
+                <a:latin typeface="Courier New" panose="02070309020205020404" pitchFamily="49" charset="0"/>
+              </a:rPr>
+              <a:t>(</a:t>
+            </a:r>
+            <a:r>
+              <a:rPr lang="en-US" sz="1050" b="0" i="0" u="none" strike="noStrike" baseline="0" dirty="0" err="1">
+                <a:solidFill>
+                  <a:srgbClr val="000000"/>
+                </a:solidFill>
+                <a:latin typeface="Courier New" panose="02070309020205020404" pitchFamily="49" charset="0"/>
+              </a:rPr>
+              <a:t>new_edgePointStart,new_edgePointEnd,sphereCenter</a:t>
+            </a:r>
+            <a:r>
+              <a:rPr lang="en-US" sz="1050" b="0" i="0" u="none" strike="noStrike" baseline="0" dirty="0">
+                <a:solidFill>
+                  <a:srgbClr val="000000"/>
+                </a:solidFill>
+                <a:latin typeface="Courier New" panose="02070309020205020404" pitchFamily="49" charset="0"/>
+              </a:rPr>
+              <a:t>, </a:t>
+            </a:r>
+            <a:r>
+              <a:rPr lang="en-US" sz="1050" b="0" i="0" u="none" strike="noStrike" baseline="0" dirty="0" err="1">
+                <a:solidFill>
+                  <a:srgbClr val="000000"/>
+                </a:solidFill>
+                <a:latin typeface="Courier New" panose="02070309020205020404" pitchFamily="49" charset="0"/>
+              </a:rPr>
+              <a:t>flag_do_debug</a:t>
+            </a:r>
+            <a:r>
+              <a:rPr lang="en-US" sz="1050" b="0" i="0" u="none" strike="noStrike" baseline="0" dirty="0">
+                <a:solidFill>
+                  <a:srgbClr val="000000"/>
+                </a:solidFill>
+                <a:latin typeface="Courier New" panose="02070309020205020404" pitchFamily="49" charset="0"/>
+              </a:rPr>
+              <a:t>, </a:t>
+            </a:r>
+            <a:r>
+              <a:rPr lang="en-US" sz="1050" b="0" i="0" u="none" strike="noStrike" baseline="0" dirty="0" err="1">
+                <a:solidFill>
+                  <a:srgbClr val="000000"/>
+                </a:solidFill>
+                <a:latin typeface="Courier New" panose="02070309020205020404" pitchFamily="49" charset="0"/>
+              </a:rPr>
+              <a:t>debug_fig_num</a:t>
+            </a:r>
+            <a:r>
+              <a:rPr lang="en-US" sz="1050" b="0" i="0" u="none" strike="noStrike" baseline="0" dirty="0">
+                <a:solidFill>
+                  <a:srgbClr val="000000"/>
+                </a:solidFill>
+                <a:latin typeface="Courier New" panose="02070309020205020404" pitchFamily="49" charset="0"/>
+              </a:rPr>
+              <a:t>);</a:t>
+            </a:r>
+          </a:p>
+        </p:txBody>
+      </p:sp>
     </p:spTree>
     <p:extLst>
       <p:ext uri="{BB962C8B-B14F-4D97-AF65-F5344CB8AC3E}">
@@ -16161,7 +15689,7 @@
 </p:sld>
 </file>
 
-<file path=ppt/slides/slide31.xml><?xml version="1.0" encoding="utf-8"?>
+<file path=ppt/slides/slide32.xml><?xml version="1.0" encoding="utf-8"?>
 <p:sld xmlns:a="http://schemas.openxmlformats.org/drawingml/2006/main" xmlns:r="http://schemas.openxmlformats.org/officeDocument/2006/relationships" xmlns:p="http://schemas.openxmlformats.org/presentationml/2006/main">
   <p:cSld>
     <p:spTree>
@@ -16249,7 +15777,95 @@
 </p:sld>
 </file>
 
-<file path=ppt/slides/slide32.xml><?xml version="1.0" encoding="utf-8"?>
+<file path=ppt/slides/slide33.xml><?xml version="1.0" encoding="utf-8"?>
+<p:sld xmlns:a="http://schemas.openxmlformats.org/drawingml/2006/main" xmlns:r="http://schemas.openxmlformats.org/officeDocument/2006/relationships" xmlns:p="http://schemas.openxmlformats.org/presentationml/2006/main">
+  <p:cSld>
+    <p:spTree>
+      <p:nvGrpSpPr>
+        <p:cNvPr id="1" name=""/>
+        <p:cNvGrpSpPr/>
+        <p:nvPr/>
+      </p:nvGrpSpPr>
+      <p:grpSpPr>
+        <a:xfrm>
+          <a:off x="0" y="0"/>
+          <a:ext cx="0" cy="0"/>
+          <a:chOff x="0" y="0"/>
+          <a:chExt cx="0" cy="0"/>
+        </a:xfrm>
+      </p:grpSpPr>
+      <p:sp>
+        <p:nvSpPr>
+          <p:cNvPr id="2" name="Title 1">
+            <a:extLst>
+              <a:ext uri="{FF2B5EF4-FFF2-40B4-BE49-F238E27FC236}">
+                <a16:creationId xmlns:a16="http://schemas.microsoft.com/office/drawing/2014/main" id="{98F1C496-4B8B-E0D7-460E-07A0F3227D10}"/>
+              </a:ext>
+            </a:extLst>
+          </p:cNvPr>
+          <p:cNvSpPr>
+            <a:spLocks noGrp="1"/>
+          </p:cNvSpPr>
+          <p:nvPr>
+            <p:ph type="title"/>
+          </p:nvPr>
+        </p:nvSpPr>
+        <p:spPr/>
+        <p:txBody>
+          <a:bodyPr/>
+          <a:lstStyle/>
+          <a:p>
+            <a:r>
+              <a:rPr lang="en-US" dirty="0"/>
+              <a:t>Non-convex case</a:t>
+            </a:r>
+          </a:p>
+        </p:txBody>
+      </p:sp>
+      <p:pic>
+        <p:nvPicPr>
+          <p:cNvPr id="5" name="Picture 4">
+            <a:extLst>
+              <a:ext uri="{FF2B5EF4-FFF2-40B4-BE49-F238E27FC236}">
+                <a16:creationId xmlns:a16="http://schemas.microsoft.com/office/drawing/2014/main" id="{B542D1F3-388B-C43D-3346-47CBF1855035}"/>
+              </a:ext>
+            </a:extLst>
+          </p:cNvPr>
+          <p:cNvPicPr>
+            <a:picLocks noChangeAspect="1"/>
+          </p:cNvPicPr>
+          <p:nvPr/>
+        </p:nvPicPr>
+        <p:blipFill>
+          <a:blip r:embed="rId2"/>
+          <a:stretch>
+            <a:fillRect/>
+          </a:stretch>
+        </p:blipFill>
+        <p:spPr>
+          <a:xfrm>
+            <a:off x="644540" y="1214303"/>
+            <a:ext cx="11071754" cy="5459451"/>
+          </a:xfrm>
+          <a:prstGeom prst="rect">
+            <a:avLst/>
+          </a:prstGeom>
+        </p:spPr>
+      </p:pic>
+    </p:spTree>
+    <p:extLst>
+      <p:ext uri="{BB962C8B-B14F-4D97-AF65-F5344CB8AC3E}">
+        <p14:creationId xmlns:p14="http://schemas.microsoft.com/office/powerpoint/2010/main" val="746931676"/>
+      </p:ext>
+    </p:extLst>
+  </p:cSld>
+  <p:clrMapOvr>
+    <a:masterClrMapping/>
+  </p:clrMapOvr>
+</p:sld>
+</file>
+
+<file path=ppt/slides/slide34.xml><?xml version="1.0" encoding="utf-8"?>
 <p:sld xmlns:a="http://schemas.openxmlformats.org/drawingml/2006/main" xmlns:r="http://schemas.openxmlformats.org/officeDocument/2006/relationships" xmlns:p="http://schemas.openxmlformats.org/presentationml/2006/main">
   <p:cSld>
     <p:spTree>
@@ -16297,7 +15913,7 @@
           <a:p>
             <a:r>
               <a:rPr lang="en-US" sz="3600" dirty="0"/>
-              <a:t>Step 3: This is implemented by simply finding the smallest radius among all fitted spheres</a:t>
+              <a:t>Step 3: Find the smallest feasible cut. This is implemented by simply finding the smallest radius among all fitted spheres</a:t>
             </a:r>
           </a:p>
         </p:txBody>
@@ -16369,6 +15985,658 @@
           </a:p>
         </p:txBody>
       </p:sp>
+      <p:sp>
+        <p:nvSpPr>
+          <p:cNvPr id="3" name="Rectangle 2">
+            <a:extLst>
+              <a:ext uri="{FF2B5EF4-FFF2-40B4-BE49-F238E27FC236}">
+                <a16:creationId xmlns:a16="http://schemas.microsoft.com/office/drawing/2014/main" id="{BE16825F-B2E8-31FC-4FA0-415D79419DD5}"/>
+              </a:ext>
+            </a:extLst>
+          </p:cNvPr>
+          <p:cNvSpPr/>
+          <p:nvPr/>
+        </p:nvSpPr>
+        <p:spPr>
+          <a:xfrm>
+            <a:off x="5187666" y="3952579"/>
+            <a:ext cx="6569962" cy="2677656"/>
+          </a:xfrm>
+          <a:prstGeom prst="rect">
+            <a:avLst/>
+          </a:prstGeom>
+          <a:solidFill>
+            <a:schemeClr val="accent4">
+              <a:lumMod val="20000"/>
+              <a:lumOff val="80000"/>
+            </a:schemeClr>
+          </a:solidFill>
+        </p:spPr>
+        <p:txBody>
+          <a:bodyPr wrap="square" lIns="91440" tIns="45720" rIns="91440" bIns="45720" anchor="t">
+            <a:spAutoFit/>
+          </a:bodyPr>
+          <a:lstStyle/>
+          <a:p>
+            <a:pPr>
+              <a:buNone/>
+            </a:pPr>
+            <a:r>
+              <a:rPr lang="en-US" sz="1050" b="0" i="0" dirty="0" err="1">
+                <a:effectLst/>
+                <a:latin typeface="Menlo"/>
+              </a:rPr>
+              <a:t>fig_num</a:t>
+            </a:r>
+            <a:r>
+              <a:rPr lang="en-US" sz="1050" b="0" i="0" dirty="0">
+                <a:effectLst/>
+                <a:latin typeface="Menlo"/>
+              </a:rPr>
+              <a:t> = 1006; figure(</a:t>
+            </a:r>
+            <a:r>
+              <a:rPr lang="en-US" sz="1050" b="0" i="0" dirty="0" err="1">
+                <a:effectLst/>
+                <a:latin typeface="Menlo"/>
+              </a:rPr>
+              <a:t>fig_num</a:t>
+            </a:r>
+            <a:r>
+              <a:rPr lang="en-US" sz="1050" b="0" i="0" dirty="0">
+                <a:effectLst/>
+                <a:latin typeface="Menlo"/>
+              </a:rPr>
+              <a:t>); </a:t>
+            </a:r>
+            <a:r>
+              <a:rPr lang="en-US" sz="1050" b="0" i="0" dirty="0" err="1">
+                <a:effectLst/>
+                <a:latin typeface="Menlo"/>
+              </a:rPr>
+              <a:t>clf</a:t>
+            </a:r>
+            <a:r>
+              <a:rPr lang="en-US" sz="1050" b="0" i="0" dirty="0">
+                <a:effectLst/>
+                <a:latin typeface="Menlo"/>
+              </a:rPr>
+              <a:t>;</a:t>
+            </a:r>
+          </a:p>
+          <a:p>
+            <a:pPr>
+              <a:buNone/>
+            </a:pPr>
+            <a:endParaRPr lang="en-US" sz="1050" b="0" i="0" dirty="0">
+              <a:effectLst/>
+              <a:latin typeface="Menlo"/>
+            </a:endParaRPr>
+          </a:p>
+          <a:p>
+            <a:pPr>
+              <a:buNone/>
+            </a:pPr>
+            <a:r>
+              <a:rPr lang="en-US" sz="1050" b="0" i="0" dirty="0">
+                <a:solidFill>
+                  <a:srgbClr val="008013"/>
+                </a:solidFill>
+                <a:effectLst/>
+                <a:latin typeface="Menlo"/>
+              </a:rPr>
+              <a:t>% this polytope has a vertical wall</a:t>
+            </a:r>
+            <a:endParaRPr lang="en-US" sz="1050" b="0" i="0" dirty="0">
+              <a:effectLst/>
+              <a:latin typeface="Menlo"/>
+            </a:endParaRPr>
+          </a:p>
+          <a:p>
+            <a:pPr>
+              <a:buNone/>
+            </a:pPr>
+            <a:r>
+              <a:rPr lang="en-US" sz="1050" b="0" i="0" dirty="0">
+                <a:effectLst/>
+                <a:latin typeface="Menlo"/>
+              </a:rPr>
+              <a:t>vertices = [0 0; 3/5 0; 1 1; 7/5 0; 2 0; 1 2; 0 1; 0 0]*5;</a:t>
+            </a:r>
+          </a:p>
+          <a:p>
+            <a:pPr>
+              <a:buNone/>
+            </a:pPr>
+            <a:r>
+              <a:rPr lang="en-US" sz="1050" b="0" i="0" dirty="0">
+                <a:effectLst/>
+                <a:latin typeface="Menlo"/>
+              </a:rPr>
+              <a:t>[</a:t>
+            </a:r>
+            <a:r>
+              <a:rPr lang="en-US" sz="1050" b="0" i="0" dirty="0" err="1">
+                <a:effectLst/>
+                <a:latin typeface="Menlo"/>
+              </a:rPr>
+              <a:t>unit_normal_vectors</a:t>
+            </a:r>
+            <a:r>
+              <a:rPr lang="en-US" sz="1050" b="0" i="0" dirty="0">
+                <a:effectLst/>
+                <a:latin typeface="Menlo"/>
+              </a:rPr>
+              <a:t>, </a:t>
+            </a:r>
+            <a:r>
+              <a:rPr lang="en-US" sz="1050" b="0" i="0" dirty="0" err="1">
+                <a:effectLst/>
+                <a:latin typeface="Menlo"/>
+              </a:rPr>
+              <a:t>unit_vertex_projection_vectors</a:t>
+            </a:r>
+            <a:r>
+              <a:rPr lang="en-US" sz="1050" b="0" i="0" dirty="0">
+                <a:effectLst/>
+                <a:latin typeface="Menlo"/>
+              </a:rPr>
+              <a:t>, </a:t>
+            </a:r>
+            <a:r>
+              <a:rPr lang="en-US" sz="1050" b="0" i="0" dirty="0" err="1">
+                <a:effectLst/>
+                <a:latin typeface="Menlo"/>
+              </a:rPr>
+              <a:t>vector_direction_of_unit_cut</a:t>
+            </a:r>
+            <a:r>
+              <a:rPr lang="en-US" sz="1050" b="0" i="0" dirty="0">
+                <a:effectLst/>
+                <a:latin typeface="Menlo"/>
+              </a:rPr>
+              <a:t>, </a:t>
+            </a:r>
+            <a:r>
+              <a:rPr lang="en-US" sz="1050" b="0" i="0" dirty="0" err="1">
+                <a:effectLst/>
+                <a:latin typeface="Menlo"/>
+              </a:rPr>
+              <a:t>flag_vertexIsNonConvex</a:t>
+            </a:r>
+            <a:r>
+              <a:rPr lang="en-US" sz="1050" b="0" i="0" dirty="0">
+                <a:effectLst/>
+                <a:latin typeface="Menlo"/>
+              </a:rPr>
+              <a:t>] = </a:t>
+            </a:r>
+            <a:r>
+              <a:rPr lang="en-US" sz="1050" b="0" i="0" dirty="0" err="1">
+                <a:effectLst/>
+                <a:latin typeface="Menlo"/>
+              </a:rPr>
+              <a:t>fcn_VSkel_polytopeFindUnitDirectionVectors</a:t>
+            </a:r>
+            <a:r>
+              <a:rPr lang="en-US" sz="1050" b="0" i="0" dirty="0">
+                <a:effectLst/>
+                <a:latin typeface="Menlo"/>
+              </a:rPr>
+              <a:t>(vertices,-1);</a:t>
+            </a:r>
+          </a:p>
+          <a:p>
+            <a:pPr>
+              <a:buNone/>
+            </a:pPr>
+            <a:r>
+              <a:rPr lang="en-US" sz="1050" b="0" i="0" dirty="0" err="1">
+                <a:effectLst/>
+                <a:latin typeface="Menlo"/>
+              </a:rPr>
+              <a:t>max_edge_cuts</a:t>
+            </a:r>
+            <a:r>
+              <a:rPr lang="en-US" sz="1050" b="0" i="0" dirty="0">
+                <a:effectLst/>
+                <a:latin typeface="Menlo"/>
+              </a:rPr>
+              <a:t> = </a:t>
+            </a:r>
+            <a:r>
+              <a:rPr lang="en-US" sz="1050" b="0" i="0" dirty="0" err="1">
+                <a:effectLst/>
+                <a:latin typeface="Menlo"/>
+              </a:rPr>
+              <a:t>fcn_VSkel_polytopeFindMaxEdgeCut</a:t>
+            </a:r>
+            <a:r>
+              <a:rPr lang="en-US" sz="1050" b="0" i="0" dirty="0">
+                <a:effectLst/>
+                <a:latin typeface="Menlo"/>
+              </a:rPr>
+              <a:t>(vertices, </a:t>
+            </a:r>
+            <a:r>
+              <a:rPr lang="en-US" sz="1050" b="0" i="0" dirty="0" err="1">
+                <a:effectLst/>
+                <a:latin typeface="Menlo"/>
+              </a:rPr>
+              <a:t>unit_normal_vectors</a:t>
+            </a:r>
+            <a:r>
+              <a:rPr lang="en-US" sz="1050" b="0" i="0" dirty="0">
+                <a:effectLst/>
+                <a:latin typeface="Menlo"/>
+              </a:rPr>
+              <a:t>, </a:t>
+            </a:r>
+            <a:r>
+              <a:rPr lang="en-US" sz="1050" b="0" i="0" dirty="0" err="1">
+                <a:effectLst/>
+                <a:latin typeface="Menlo"/>
+              </a:rPr>
+              <a:t>unit_vertex_projection_vectors</a:t>
+            </a:r>
+            <a:r>
+              <a:rPr lang="en-US" sz="1050" b="0" i="0" dirty="0">
+                <a:effectLst/>
+                <a:latin typeface="Menlo"/>
+              </a:rPr>
+              <a:t>, (-1));</a:t>
+            </a:r>
+          </a:p>
+          <a:p>
+            <a:pPr>
+              <a:buNone/>
+            </a:pPr>
+            <a:r>
+              <a:rPr lang="en-US" sz="1050" b="0" i="0" dirty="0">
+                <a:effectLst/>
+                <a:latin typeface="Menlo"/>
+              </a:rPr>
+              <a:t>[</a:t>
+            </a:r>
+            <a:r>
+              <a:rPr lang="en-US" sz="1050" b="0" i="0" dirty="0" err="1">
+                <a:effectLst/>
+                <a:latin typeface="Menlo"/>
+              </a:rPr>
+              <a:t>sphereRadii</a:t>
+            </a:r>
+            <a:r>
+              <a:rPr lang="en-US" sz="1050" b="0" i="0" dirty="0">
+                <a:effectLst/>
+                <a:latin typeface="Menlo"/>
+              </a:rPr>
+              <a:t>, </a:t>
+            </a:r>
+            <a:r>
+              <a:rPr lang="en-US" sz="1050" b="0" i="0" dirty="0" err="1">
+                <a:effectLst/>
+                <a:latin typeface="Menlo"/>
+              </a:rPr>
+              <a:t>definingEdges</a:t>
+            </a:r>
+            <a:r>
+              <a:rPr lang="en-US" sz="1050" b="0" i="0" dirty="0">
+                <a:effectLst/>
+                <a:latin typeface="Menlo"/>
+              </a:rPr>
+              <a:t>] = </a:t>
+            </a:r>
+            <a:r>
+              <a:rPr lang="en-US" sz="1050" b="0" i="0" dirty="0" err="1">
+                <a:effectLst/>
+                <a:latin typeface="Menlo"/>
+              </a:rPr>
+              <a:t>fcn_VSkel_polytopeFindEnclosedSpheres</a:t>
+            </a:r>
+            <a:r>
+              <a:rPr lang="en-US" sz="1050" b="0" i="0" dirty="0">
+                <a:effectLst/>
+                <a:latin typeface="Menlo"/>
+              </a:rPr>
+              <a:t>(vertices, </a:t>
+            </a:r>
+            <a:r>
+              <a:rPr lang="en-US" sz="1050" b="0" i="0" dirty="0" err="1">
+                <a:effectLst/>
+                <a:latin typeface="Menlo"/>
+              </a:rPr>
+              <a:t>unit_normal_vectors</a:t>
+            </a:r>
+            <a:r>
+              <a:rPr lang="en-US" sz="1050" b="0" i="0" dirty="0">
+                <a:effectLst/>
+                <a:latin typeface="Menlo"/>
+              </a:rPr>
+              <a:t>, </a:t>
+            </a:r>
+            <a:r>
+              <a:rPr lang="en-US" sz="1050" b="0" i="0" dirty="0" err="1">
+                <a:effectLst/>
+                <a:latin typeface="Menlo"/>
+              </a:rPr>
+              <a:t>unit_vertex_projection_vectors</a:t>
+            </a:r>
+            <a:r>
+              <a:rPr lang="en-US" sz="1050" b="0" i="0" dirty="0">
+                <a:effectLst/>
+                <a:latin typeface="Menlo"/>
+              </a:rPr>
+              <a:t>, </a:t>
+            </a:r>
+            <a:r>
+              <a:rPr lang="en-US" sz="1050" b="0" i="0" dirty="0" err="1">
+                <a:effectLst/>
+                <a:latin typeface="Menlo"/>
+              </a:rPr>
+              <a:t>vector_direction_of_unit_cut</a:t>
+            </a:r>
+            <a:r>
+              <a:rPr lang="en-US" sz="1050" b="0" i="0" dirty="0">
+                <a:effectLst/>
+                <a:latin typeface="Menlo"/>
+              </a:rPr>
+              <a:t>, </a:t>
+            </a:r>
+            <a:r>
+              <a:rPr lang="en-US" sz="1050" b="0" i="0" dirty="0" err="1">
+                <a:effectLst/>
+                <a:latin typeface="Menlo"/>
+              </a:rPr>
+              <a:t>flag_vertexIsNonConvex</a:t>
+            </a:r>
+            <a:r>
+              <a:rPr lang="en-US" sz="1050" b="0" i="0" dirty="0">
+                <a:effectLst/>
+                <a:latin typeface="Menlo"/>
+              </a:rPr>
+              <a:t>, </a:t>
+            </a:r>
+            <a:r>
+              <a:rPr lang="en-US" sz="1050" b="0" i="0" dirty="0" err="1">
+                <a:effectLst/>
+                <a:latin typeface="Menlo"/>
+              </a:rPr>
+              <a:t>max_edge_cuts</a:t>
+            </a:r>
+            <a:r>
+              <a:rPr lang="en-US" sz="1050" b="0" i="0" dirty="0">
+                <a:effectLst/>
+                <a:latin typeface="Menlo"/>
+              </a:rPr>
+              <a:t>, (-1));</a:t>
+            </a:r>
+          </a:p>
+          <a:p>
+            <a:pPr>
+              <a:buNone/>
+            </a:pPr>
+            <a:endParaRPr lang="en-US" sz="1050" b="0" i="0" dirty="0">
+              <a:effectLst/>
+              <a:latin typeface="Menlo"/>
+            </a:endParaRPr>
+          </a:p>
+          <a:p>
+            <a:pPr>
+              <a:buNone/>
+            </a:pPr>
+            <a:r>
+              <a:rPr lang="en-US" sz="1050" b="0" i="0" dirty="0">
+                <a:effectLst/>
+                <a:latin typeface="Menlo"/>
+              </a:rPr>
+              <a:t>[</a:t>
+            </a:r>
+            <a:r>
+              <a:rPr lang="en-US" sz="1050" b="0" i="0" dirty="0" err="1">
+                <a:effectLst/>
+                <a:latin typeface="Menlo"/>
+              </a:rPr>
+              <a:t>min_cut</a:t>
+            </a:r>
+            <a:r>
+              <a:rPr lang="en-US" sz="1050" b="0" i="0" dirty="0">
+                <a:effectLst/>
+                <a:latin typeface="Menlo"/>
+              </a:rPr>
+              <a:t>, </a:t>
+            </a:r>
+            <a:r>
+              <a:rPr lang="en-US" sz="1050" b="0" i="0" dirty="0">
+                <a:solidFill>
+                  <a:srgbClr val="0E00FF"/>
+                </a:solidFill>
+                <a:effectLst/>
+                <a:latin typeface="Menlo"/>
+              </a:rPr>
+              <a:t>...</a:t>
+            </a:r>
+            <a:endParaRPr lang="en-US" sz="1050" b="0" i="0" dirty="0">
+              <a:effectLst/>
+              <a:latin typeface="Menlo"/>
+            </a:endParaRPr>
+          </a:p>
+          <a:p>
+            <a:pPr>
+              <a:buNone/>
+            </a:pPr>
+            <a:r>
+              <a:rPr lang="en-US" sz="1050" b="0" i="0" dirty="0" err="1">
+                <a:effectLst/>
+                <a:latin typeface="Menlo"/>
+              </a:rPr>
+              <a:t>indices_repeated</a:t>
+            </a:r>
+            <a:r>
+              <a:rPr lang="en-US" sz="1050" b="0" i="0" dirty="0">
+                <a:effectLst/>
+                <a:latin typeface="Menlo"/>
+              </a:rPr>
+              <a:t>, </a:t>
+            </a:r>
+            <a:r>
+              <a:rPr lang="en-US" sz="1050" b="0" i="0" dirty="0" err="1">
+                <a:effectLst/>
+                <a:latin typeface="Menlo"/>
+              </a:rPr>
+              <a:t>intersection_points</a:t>
+            </a:r>
+            <a:r>
+              <a:rPr lang="en-US" sz="1050" b="0" i="0" dirty="0">
+                <a:effectLst/>
+                <a:latin typeface="Menlo"/>
+              </a:rPr>
+              <a:t>] = </a:t>
+            </a:r>
+            <a:r>
+              <a:rPr lang="en-US" sz="1050" b="0" i="0" dirty="0">
+                <a:solidFill>
+                  <a:srgbClr val="0E00FF"/>
+                </a:solidFill>
+                <a:effectLst/>
+                <a:latin typeface="Menlo"/>
+              </a:rPr>
+              <a:t>...</a:t>
+            </a:r>
+            <a:endParaRPr lang="en-US" sz="1050" b="0" i="0" dirty="0">
+              <a:effectLst/>
+              <a:latin typeface="Menlo"/>
+            </a:endParaRPr>
+          </a:p>
+          <a:p>
+            <a:pPr>
+              <a:buNone/>
+            </a:pPr>
+            <a:r>
+              <a:rPr lang="en-US" sz="1050" b="0" i="0" dirty="0" err="1">
+                <a:effectLst/>
+                <a:latin typeface="Menlo"/>
+              </a:rPr>
+              <a:t>fcn_VSkel_polytopeFindMinimumEnclosedSphere</a:t>
+            </a:r>
+            <a:r>
+              <a:rPr lang="en-US" sz="1050" b="0" i="0" dirty="0">
+                <a:effectLst/>
+                <a:latin typeface="Menlo"/>
+              </a:rPr>
+              <a:t>(vertices, </a:t>
+            </a:r>
+            <a:r>
+              <a:rPr lang="en-US" sz="1050" b="0" i="0" dirty="0">
+                <a:solidFill>
+                  <a:srgbClr val="0E00FF"/>
+                </a:solidFill>
+                <a:effectLst/>
+                <a:latin typeface="Menlo"/>
+              </a:rPr>
+              <a:t>...</a:t>
+            </a:r>
+            <a:endParaRPr lang="en-US" sz="1050" b="0" i="0" dirty="0">
+              <a:effectLst/>
+              <a:latin typeface="Menlo"/>
+            </a:endParaRPr>
+          </a:p>
+          <a:p>
+            <a:pPr>
+              <a:buNone/>
+            </a:pPr>
+            <a:r>
+              <a:rPr lang="en-US" sz="1050" b="0" i="0" dirty="0" err="1">
+                <a:effectLst/>
+                <a:latin typeface="Menlo"/>
+              </a:rPr>
+              <a:t>sphereRadii</a:t>
+            </a:r>
+            <a:r>
+              <a:rPr lang="en-US" sz="1050" b="0" i="0" dirty="0">
+                <a:effectLst/>
+                <a:latin typeface="Menlo"/>
+              </a:rPr>
+              <a:t>, </a:t>
+            </a:r>
+            <a:r>
+              <a:rPr lang="en-US" sz="1050" b="0" i="0" dirty="0" err="1">
+                <a:effectLst/>
+                <a:latin typeface="Menlo"/>
+              </a:rPr>
+              <a:t>definingEdges</a:t>
+            </a:r>
+            <a:r>
+              <a:rPr lang="en-US" sz="1050" b="0" i="0" dirty="0">
+                <a:effectLst/>
+                <a:latin typeface="Menlo"/>
+              </a:rPr>
+              <a:t>, </a:t>
+            </a:r>
+            <a:r>
+              <a:rPr lang="en-US" sz="1050" b="0" i="0" dirty="0" err="1">
+                <a:effectLst/>
+                <a:latin typeface="Menlo"/>
+              </a:rPr>
+              <a:t>unit_normal_vectors</a:t>
+            </a:r>
+            <a:r>
+              <a:rPr lang="en-US" sz="1050" b="0" i="0" dirty="0">
+                <a:effectLst/>
+                <a:latin typeface="Menlo"/>
+              </a:rPr>
+              <a:t>, </a:t>
+            </a:r>
+            <a:r>
+              <a:rPr lang="en-US" sz="1050" b="0" i="0" dirty="0" err="1">
+                <a:effectLst/>
+                <a:latin typeface="Menlo"/>
+              </a:rPr>
+              <a:t>unit_vertex_projection_vectors</a:t>
+            </a:r>
+            <a:r>
+              <a:rPr lang="en-US" sz="1050" b="0" i="0" dirty="0">
+                <a:effectLst/>
+                <a:latin typeface="Menlo"/>
+              </a:rPr>
+              <a:t>, </a:t>
+            </a:r>
+            <a:r>
+              <a:rPr lang="en-US" sz="1050" b="0" i="0" dirty="0">
+                <a:solidFill>
+                  <a:srgbClr val="0E00FF"/>
+                </a:solidFill>
+                <a:effectLst/>
+                <a:latin typeface="Menlo"/>
+              </a:rPr>
+              <a:t>...</a:t>
+            </a:r>
+            <a:endParaRPr lang="en-US" sz="1050" b="0" i="0" dirty="0">
+              <a:effectLst/>
+              <a:latin typeface="Menlo"/>
+            </a:endParaRPr>
+          </a:p>
+          <a:p>
+            <a:r>
+              <a:rPr lang="en-US" sz="1050" b="0" i="0" dirty="0" err="1">
+                <a:effectLst/>
+                <a:latin typeface="Menlo"/>
+              </a:rPr>
+              <a:t>vector_direction_of_unit_cut</a:t>
+            </a:r>
+            <a:r>
+              <a:rPr lang="en-US" sz="1050" b="0" i="0" dirty="0">
+                <a:effectLst/>
+                <a:latin typeface="Menlo"/>
+              </a:rPr>
+              <a:t>, (</a:t>
+            </a:r>
+            <a:r>
+              <a:rPr lang="en-US" sz="1050" b="0" i="0" dirty="0" err="1">
+                <a:effectLst/>
+                <a:latin typeface="Menlo"/>
+              </a:rPr>
+              <a:t>fig_num</a:t>
+            </a:r>
+            <a:r>
+              <a:rPr lang="en-US" sz="1050" b="0" i="0" dirty="0">
+                <a:effectLst/>
+                <a:latin typeface="Menlo"/>
+              </a:rPr>
+              <a:t>));</a:t>
+            </a:r>
+          </a:p>
+        </p:txBody>
+      </p:sp>
+      <p:pic>
+        <p:nvPicPr>
+          <p:cNvPr id="6" name="Picture 5">
+            <a:extLst>
+              <a:ext uri="{FF2B5EF4-FFF2-40B4-BE49-F238E27FC236}">
+                <a16:creationId xmlns:a16="http://schemas.microsoft.com/office/drawing/2014/main" id="{9840E2B0-5817-342E-5920-86C47E1E17F5}"/>
+              </a:ext>
+            </a:extLst>
+          </p:cNvPr>
+          <p:cNvPicPr>
+            <a:picLocks noChangeAspect="1"/>
+          </p:cNvPicPr>
+          <p:nvPr/>
+        </p:nvPicPr>
+        <p:blipFill>
+          <a:blip r:embed="rId2"/>
+          <a:stretch>
+            <a:fillRect/>
+          </a:stretch>
+        </p:blipFill>
+        <p:spPr>
+          <a:xfrm>
+            <a:off x="7420402" y="1241277"/>
+            <a:ext cx="4394200" cy="3295650"/>
+          </a:xfrm>
+          <a:prstGeom prst="rect">
+            <a:avLst/>
+          </a:prstGeom>
+        </p:spPr>
+      </p:pic>
     </p:spTree>
     <p:extLst>
       <p:ext uri="{BB962C8B-B14F-4D97-AF65-F5344CB8AC3E}">
@@ -16382,7 +16650,7 @@
 </p:sld>
 </file>
 
-<file path=ppt/slides/slide33.xml><?xml version="1.0" encoding="utf-8"?>
+<file path=ppt/slides/slide35.xml><?xml version="1.0" encoding="utf-8"?>
 <p:sld xmlns:a="http://schemas.openxmlformats.org/drawingml/2006/main" xmlns:r="http://schemas.openxmlformats.org/officeDocument/2006/relationships" xmlns:p="http://schemas.openxmlformats.org/presentationml/2006/main">
   <p:cSld>
     <p:spTree>

</xml_diff>

<commit_message>
BROKEN: working on Step 4 - merging intersecting vertices. Only 20% done.
</commit_message>
<xml_diff>
--- a/Documents/VertexSkeletonClassLibrary.pptx
+++ b/Documents/VertexSkeletonClassLibrary.pptx
@@ -39,7 +39,8 @@
     <p:sldId id="547" r:id="rId33"/>
     <p:sldId id="551" r:id="rId34"/>
     <p:sldId id="548" r:id="rId35"/>
-    <p:sldId id="540" r:id="rId36"/>
+    <p:sldId id="552" r:id="rId36"/>
+    <p:sldId id="540" r:id="rId37"/>
   </p:sldIdLst>
   <p:sldSz cx="12192000" cy="6858000"/>
   <p:notesSz cx="6858000" cy="9144000"/>
@@ -189,6 +190,7 @@
             <p14:sldId id="547"/>
             <p14:sldId id="551"/>
             <p14:sldId id="548"/>
+            <p14:sldId id="552"/>
             <p14:sldId id="540"/>
           </p14:sldIdLst>
         </p14:section>
@@ -356,7 +358,7 @@
           <a:p>
             <a:fld id="{ADCEBF8C-22C0-4323-9BBB-9413232198F8}" type="datetimeFigureOut">
               <a:rPr lang="en-US" smtClean="0"/>
-              <a:t>5/4/2025</a:t>
+              <a:t>5/6/2025</a:t>
             </a:fld>
             <a:endParaRPr lang="en-US"/>
           </a:p>
@@ -554,7 +556,7 @@
           <a:p>
             <a:fld id="{ADCEBF8C-22C0-4323-9BBB-9413232198F8}" type="datetimeFigureOut">
               <a:rPr lang="en-US" smtClean="0"/>
-              <a:t>5/4/2025</a:t>
+              <a:t>5/6/2025</a:t>
             </a:fld>
             <a:endParaRPr lang="en-US"/>
           </a:p>
@@ -762,7 +764,7 @@
           <a:p>
             <a:fld id="{ADCEBF8C-22C0-4323-9BBB-9413232198F8}" type="datetimeFigureOut">
               <a:rPr lang="en-US" smtClean="0"/>
-              <a:t>5/4/2025</a:t>
+              <a:t>5/6/2025</a:t>
             </a:fld>
             <a:endParaRPr lang="en-US"/>
           </a:p>
@@ -960,7 +962,7 @@
           <a:p>
             <a:fld id="{ADCEBF8C-22C0-4323-9BBB-9413232198F8}" type="datetimeFigureOut">
               <a:rPr lang="en-US" smtClean="0"/>
-              <a:t>5/4/2025</a:t>
+              <a:t>5/6/2025</a:t>
             </a:fld>
             <a:endParaRPr lang="en-US"/>
           </a:p>
@@ -1235,7 +1237,7 @@
           <a:p>
             <a:fld id="{ADCEBF8C-22C0-4323-9BBB-9413232198F8}" type="datetimeFigureOut">
               <a:rPr lang="en-US" smtClean="0"/>
-              <a:t>5/4/2025</a:t>
+              <a:t>5/6/2025</a:t>
             </a:fld>
             <a:endParaRPr lang="en-US"/>
           </a:p>
@@ -1500,7 +1502,7 @@
           <a:p>
             <a:fld id="{ADCEBF8C-22C0-4323-9BBB-9413232198F8}" type="datetimeFigureOut">
               <a:rPr lang="en-US" smtClean="0"/>
-              <a:t>5/4/2025</a:t>
+              <a:t>5/6/2025</a:t>
             </a:fld>
             <a:endParaRPr lang="en-US"/>
           </a:p>
@@ -1912,7 +1914,7 @@
           <a:p>
             <a:fld id="{ADCEBF8C-22C0-4323-9BBB-9413232198F8}" type="datetimeFigureOut">
               <a:rPr lang="en-US" smtClean="0"/>
-              <a:t>5/4/2025</a:t>
+              <a:t>5/6/2025</a:t>
             </a:fld>
             <a:endParaRPr lang="en-US"/>
           </a:p>
@@ -2053,7 +2055,7 @@
           <a:p>
             <a:fld id="{ADCEBF8C-22C0-4323-9BBB-9413232198F8}" type="datetimeFigureOut">
               <a:rPr lang="en-US" smtClean="0"/>
-              <a:t>5/4/2025</a:t>
+              <a:t>5/6/2025</a:t>
             </a:fld>
             <a:endParaRPr lang="en-US"/>
           </a:p>
@@ -2166,7 +2168,7 @@
           <a:p>
             <a:fld id="{ADCEBF8C-22C0-4323-9BBB-9413232198F8}" type="datetimeFigureOut">
               <a:rPr lang="en-US" smtClean="0"/>
-              <a:t>5/4/2025</a:t>
+              <a:t>5/6/2025</a:t>
             </a:fld>
             <a:endParaRPr lang="en-US"/>
           </a:p>
@@ -2477,7 +2479,7 @@
           <a:p>
             <a:fld id="{ADCEBF8C-22C0-4323-9BBB-9413232198F8}" type="datetimeFigureOut">
               <a:rPr lang="en-US" smtClean="0"/>
-              <a:t>5/4/2025</a:t>
+              <a:t>5/6/2025</a:t>
             </a:fld>
             <a:endParaRPr lang="en-US"/>
           </a:p>
@@ -2765,7 +2767,7 @@
           <a:p>
             <a:fld id="{ADCEBF8C-22C0-4323-9BBB-9413232198F8}" type="datetimeFigureOut">
               <a:rPr lang="en-US" smtClean="0"/>
-              <a:t>5/4/2025</a:t>
+              <a:t>5/6/2025</a:t>
             </a:fld>
             <a:endParaRPr lang="en-US"/>
           </a:p>
@@ -3006,7 +3008,7 @@
           <a:p>
             <a:fld id="{ADCEBF8C-22C0-4323-9BBB-9413232198F8}" type="datetimeFigureOut">
               <a:rPr lang="en-US" smtClean="0"/>
-              <a:t>5/4/2025</a:t>
+              <a:t>5/6/2025</a:t>
             </a:fld>
             <a:endParaRPr lang="en-US"/>
           </a:p>
@@ -16651,6 +16653,791 @@
 </file>
 
 <file path=ppt/slides/slide35.xml><?xml version="1.0" encoding="utf-8"?>
+<p:sld xmlns:a="http://schemas.openxmlformats.org/drawingml/2006/main" xmlns:r="http://schemas.openxmlformats.org/officeDocument/2006/relationships" xmlns:p="http://schemas.openxmlformats.org/presentationml/2006/main">
+  <p:cSld>
+    <p:spTree>
+      <p:nvGrpSpPr>
+        <p:cNvPr id="1" name="">
+          <a:extLst>
+            <a:ext uri="{FF2B5EF4-FFF2-40B4-BE49-F238E27FC236}">
+              <a16:creationId xmlns:a16="http://schemas.microsoft.com/office/drawing/2014/main" id="{97CF172E-32A5-FA37-F54A-67C8531A8FD7}"/>
+            </a:ext>
+          </a:extLst>
+        </p:cNvPr>
+        <p:cNvGrpSpPr/>
+        <p:nvPr/>
+      </p:nvGrpSpPr>
+      <p:grpSpPr>
+        <a:xfrm>
+          <a:off x="0" y="0"/>
+          <a:ext cx="0" cy="0"/>
+          <a:chOff x="0" y="0"/>
+          <a:chExt cx="0" cy="0"/>
+        </a:xfrm>
+      </p:grpSpPr>
+      <p:sp>
+        <p:nvSpPr>
+          <p:cNvPr id="2" name="Title 1">
+            <a:extLst>
+              <a:ext uri="{FF2B5EF4-FFF2-40B4-BE49-F238E27FC236}">
+                <a16:creationId xmlns:a16="http://schemas.microsoft.com/office/drawing/2014/main" id="{F76E531D-1F94-D823-29AF-038173E1E8D9}"/>
+              </a:ext>
+            </a:extLst>
+          </p:cNvPr>
+          <p:cNvSpPr>
+            <a:spLocks noGrp="1"/>
+          </p:cNvSpPr>
+          <p:nvPr>
+            <p:ph type="title"/>
+          </p:nvPr>
+        </p:nvSpPr>
+        <p:spPr/>
+        <p:txBody>
+          <a:bodyPr>
+            <a:noAutofit/>
+          </a:bodyPr>
+          <a:lstStyle/>
+          <a:p>
+            <a:r>
+              <a:rPr lang="en-US" sz="3600" dirty="0"/>
+              <a:t>Step 4: Merge all the vertices that come together</a:t>
+            </a:r>
+          </a:p>
+        </p:txBody>
+      </p:sp>
+      <p:sp>
+        <p:nvSpPr>
+          <p:cNvPr id="4" name="Content Placeholder 3">
+            <a:extLst>
+              <a:ext uri="{FF2B5EF4-FFF2-40B4-BE49-F238E27FC236}">
+                <a16:creationId xmlns:a16="http://schemas.microsoft.com/office/drawing/2014/main" id="{42832A2E-B849-5A87-7EBB-85ECB8D02C37}"/>
+              </a:ext>
+            </a:extLst>
+          </p:cNvPr>
+          <p:cNvSpPr>
+            <a:spLocks noGrp="1"/>
+          </p:cNvSpPr>
+          <p:nvPr>
+            <p:ph idx="1"/>
+          </p:nvPr>
+        </p:nvSpPr>
+        <p:spPr>
+          <a:xfrm>
+            <a:off x="838200" y="1825625"/>
+            <a:ext cx="4552666" cy="4351338"/>
+          </a:xfrm>
+        </p:spPr>
+        <p:txBody>
+          <a:bodyPr>
+            <a:normAutofit fontScale="92500" lnSpcReduction="10000"/>
+          </a:bodyPr>
+          <a:lstStyle/>
+          <a:p>
+            <a:pPr marL="0" indent="0">
+              <a:buNone/>
+            </a:pPr>
+            <a:r>
+              <a:rPr lang="en-US" sz="2800" dirty="0"/>
+              <a:t>Given a unit vertex projection, </a:t>
+            </a:r>
+            <a:r>
+              <a:rPr lang="en-US" sz="2800" dirty="0" err="1"/>
+              <a:t>v_i</a:t>
+            </a:r>
+            <a:r>
+              <a:rPr lang="en-US" sz="2800" dirty="0"/>
+              <a:t>, this vertex will always be on the centerline of any circle center that is tangent to edges to the right and left, </a:t>
+            </a:r>
+            <a:r>
+              <a:rPr lang="en-US" dirty="0" err="1"/>
+              <a:t>e</a:t>
+            </a:r>
+            <a:r>
+              <a:rPr lang="en-US" sz="2800" dirty="0" err="1"/>
+              <a:t>_i</a:t>
+            </a:r>
+            <a:r>
+              <a:rPr lang="en-US" sz="2800" dirty="0"/>
+              <a:t> and e_i-1. So a projection from another edge must intersect </a:t>
+            </a:r>
+            <a:r>
+              <a:rPr lang="en-US" sz="2800" dirty="0" err="1"/>
+              <a:t>v_j</a:t>
+            </a:r>
+            <a:r>
+              <a:rPr lang="en-US" sz="2800" dirty="0"/>
+              <a:t> such that the orthogonal distance between both are equal. Note that this method works for any dimension (2D, 3D, and maybe 4+ D)</a:t>
+            </a:r>
+            <a:endParaRPr lang="en-US" dirty="0"/>
+          </a:p>
+        </p:txBody>
+      </p:sp>
+      <p:sp>
+        <p:nvSpPr>
+          <p:cNvPr id="3" name="Rectangle 2">
+            <a:extLst>
+              <a:ext uri="{FF2B5EF4-FFF2-40B4-BE49-F238E27FC236}">
+                <a16:creationId xmlns:a16="http://schemas.microsoft.com/office/drawing/2014/main" id="{52BB54A6-F261-A77A-019B-964ABA5CF2A4}"/>
+              </a:ext>
+            </a:extLst>
+          </p:cNvPr>
+          <p:cNvSpPr/>
+          <p:nvPr/>
+        </p:nvSpPr>
+        <p:spPr>
+          <a:xfrm>
+            <a:off x="5187666" y="3952579"/>
+            <a:ext cx="6569962" cy="2677656"/>
+          </a:xfrm>
+          <a:prstGeom prst="rect">
+            <a:avLst/>
+          </a:prstGeom>
+          <a:solidFill>
+            <a:schemeClr val="accent4">
+              <a:lumMod val="20000"/>
+              <a:lumOff val="80000"/>
+            </a:schemeClr>
+          </a:solidFill>
+        </p:spPr>
+        <p:txBody>
+          <a:bodyPr wrap="square" lIns="91440" tIns="45720" rIns="91440" bIns="45720" anchor="t">
+            <a:spAutoFit/>
+          </a:bodyPr>
+          <a:lstStyle/>
+          <a:p>
+            <a:pPr>
+              <a:buNone/>
+            </a:pPr>
+            <a:r>
+              <a:rPr lang="en-US" sz="1050" b="0" i="0" dirty="0" err="1">
+                <a:effectLst/>
+                <a:latin typeface="Menlo"/>
+              </a:rPr>
+              <a:t>fig_num</a:t>
+            </a:r>
+            <a:r>
+              <a:rPr lang="en-US" sz="1050" b="0" i="0" dirty="0">
+                <a:effectLst/>
+                <a:latin typeface="Menlo"/>
+              </a:rPr>
+              <a:t> = 1006; figure(</a:t>
+            </a:r>
+            <a:r>
+              <a:rPr lang="en-US" sz="1050" b="0" i="0" dirty="0" err="1">
+                <a:effectLst/>
+                <a:latin typeface="Menlo"/>
+              </a:rPr>
+              <a:t>fig_num</a:t>
+            </a:r>
+            <a:r>
+              <a:rPr lang="en-US" sz="1050" b="0" i="0" dirty="0">
+                <a:effectLst/>
+                <a:latin typeface="Menlo"/>
+              </a:rPr>
+              <a:t>); </a:t>
+            </a:r>
+            <a:r>
+              <a:rPr lang="en-US" sz="1050" b="0" i="0" dirty="0" err="1">
+                <a:effectLst/>
+                <a:latin typeface="Menlo"/>
+              </a:rPr>
+              <a:t>clf</a:t>
+            </a:r>
+            <a:r>
+              <a:rPr lang="en-US" sz="1050" b="0" i="0" dirty="0">
+                <a:effectLst/>
+                <a:latin typeface="Menlo"/>
+              </a:rPr>
+              <a:t>;</a:t>
+            </a:r>
+          </a:p>
+          <a:p>
+            <a:pPr>
+              <a:buNone/>
+            </a:pPr>
+            <a:endParaRPr lang="en-US" sz="1050" b="0" i="0" dirty="0">
+              <a:effectLst/>
+              <a:latin typeface="Menlo"/>
+            </a:endParaRPr>
+          </a:p>
+          <a:p>
+            <a:pPr>
+              <a:buNone/>
+            </a:pPr>
+            <a:r>
+              <a:rPr lang="en-US" sz="1050" b="0" i="0" dirty="0">
+                <a:solidFill>
+                  <a:srgbClr val="008013"/>
+                </a:solidFill>
+                <a:effectLst/>
+                <a:latin typeface="Menlo"/>
+              </a:rPr>
+              <a:t>% this polytope has a vertical wall</a:t>
+            </a:r>
+            <a:endParaRPr lang="en-US" sz="1050" b="0" i="0" dirty="0">
+              <a:effectLst/>
+              <a:latin typeface="Menlo"/>
+            </a:endParaRPr>
+          </a:p>
+          <a:p>
+            <a:pPr>
+              <a:buNone/>
+            </a:pPr>
+            <a:r>
+              <a:rPr lang="en-US" sz="1050" b="0" i="0" dirty="0">
+                <a:effectLst/>
+                <a:latin typeface="Menlo"/>
+              </a:rPr>
+              <a:t>vertices = [0 0; 3/5 0; 1 1; 7/5 0; 2 0; 1 2; 0 1; 0 0]*5;</a:t>
+            </a:r>
+          </a:p>
+          <a:p>
+            <a:pPr>
+              <a:buNone/>
+            </a:pPr>
+            <a:r>
+              <a:rPr lang="en-US" sz="1050" b="0" i="0" dirty="0">
+                <a:effectLst/>
+                <a:latin typeface="Menlo"/>
+              </a:rPr>
+              <a:t>[</a:t>
+            </a:r>
+            <a:r>
+              <a:rPr lang="en-US" sz="1050" b="0" i="0" dirty="0" err="1">
+                <a:effectLst/>
+                <a:latin typeface="Menlo"/>
+              </a:rPr>
+              <a:t>unit_normal_vectors</a:t>
+            </a:r>
+            <a:r>
+              <a:rPr lang="en-US" sz="1050" b="0" i="0" dirty="0">
+                <a:effectLst/>
+                <a:latin typeface="Menlo"/>
+              </a:rPr>
+              <a:t>, </a:t>
+            </a:r>
+            <a:r>
+              <a:rPr lang="en-US" sz="1050" b="0" i="0" dirty="0" err="1">
+                <a:effectLst/>
+                <a:latin typeface="Menlo"/>
+              </a:rPr>
+              <a:t>unit_vertex_projection_vectors</a:t>
+            </a:r>
+            <a:r>
+              <a:rPr lang="en-US" sz="1050" b="0" i="0" dirty="0">
+                <a:effectLst/>
+                <a:latin typeface="Menlo"/>
+              </a:rPr>
+              <a:t>, </a:t>
+            </a:r>
+            <a:r>
+              <a:rPr lang="en-US" sz="1050" b="0" i="0" dirty="0" err="1">
+                <a:effectLst/>
+                <a:latin typeface="Menlo"/>
+              </a:rPr>
+              <a:t>vector_direction_of_unit_cut</a:t>
+            </a:r>
+            <a:r>
+              <a:rPr lang="en-US" sz="1050" b="0" i="0" dirty="0">
+                <a:effectLst/>
+                <a:latin typeface="Menlo"/>
+              </a:rPr>
+              <a:t>, </a:t>
+            </a:r>
+            <a:r>
+              <a:rPr lang="en-US" sz="1050" b="0" i="0" dirty="0" err="1">
+                <a:effectLst/>
+                <a:latin typeface="Menlo"/>
+              </a:rPr>
+              <a:t>flag_vertexIsNonConvex</a:t>
+            </a:r>
+            <a:r>
+              <a:rPr lang="en-US" sz="1050" b="0" i="0" dirty="0">
+                <a:effectLst/>
+                <a:latin typeface="Menlo"/>
+              </a:rPr>
+              <a:t>] = </a:t>
+            </a:r>
+            <a:r>
+              <a:rPr lang="en-US" sz="1050" b="0" i="0" dirty="0" err="1">
+                <a:effectLst/>
+                <a:latin typeface="Menlo"/>
+              </a:rPr>
+              <a:t>fcn_VSkel_polytopeFindUnitDirectionVectors</a:t>
+            </a:r>
+            <a:r>
+              <a:rPr lang="en-US" sz="1050" b="0" i="0" dirty="0">
+                <a:effectLst/>
+                <a:latin typeface="Menlo"/>
+              </a:rPr>
+              <a:t>(vertices,-1);</a:t>
+            </a:r>
+          </a:p>
+          <a:p>
+            <a:pPr>
+              <a:buNone/>
+            </a:pPr>
+            <a:r>
+              <a:rPr lang="en-US" sz="1050" b="0" i="0" dirty="0" err="1">
+                <a:effectLst/>
+                <a:latin typeface="Menlo"/>
+              </a:rPr>
+              <a:t>max_edge_cuts</a:t>
+            </a:r>
+            <a:r>
+              <a:rPr lang="en-US" sz="1050" b="0" i="0" dirty="0">
+                <a:effectLst/>
+                <a:latin typeface="Menlo"/>
+              </a:rPr>
+              <a:t> = </a:t>
+            </a:r>
+            <a:r>
+              <a:rPr lang="en-US" sz="1050" b="0" i="0" dirty="0" err="1">
+                <a:effectLst/>
+                <a:latin typeface="Menlo"/>
+              </a:rPr>
+              <a:t>fcn_VSkel_polytopeFindMaxEdgeCut</a:t>
+            </a:r>
+            <a:r>
+              <a:rPr lang="en-US" sz="1050" b="0" i="0" dirty="0">
+                <a:effectLst/>
+                <a:latin typeface="Menlo"/>
+              </a:rPr>
+              <a:t>(vertices, </a:t>
+            </a:r>
+            <a:r>
+              <a:rPr lang="en-US" sz="1050" b="0" i="0" dirty="0" err="1">
+                <a:effectLst/>
+                <a:latin typeface="Menlo"/>
+              </a:rPr>
+              <a:t>unit_normal_vectors</a:t>
+            </a:r>
+            <a:r>
+              <a:rPr lang="en-US" sz="1050" b="0" i="0" dirty="0">
+                <a:effectLst/>
+                <a:latin typeface="Menlo"/>
+              </a:rPr>
+              <a:t>, </a:t>
+            </a:r>
+            <a:r>
+              <a:rPr lang="en-US" sz="1050" b="0" i="0" dirty="0" err="1">
+                <a:effectLst/>
+                <a:latin typeface="Menlo"/>
+              </a:rPr>
+              <a:t>unit_vertex_projection_vectors</a:t>
+            </a:r>
+            <a:r>
+              <a:rPr lang="en-US" sz="1050" b="0" i="0" dirty="0">
+                <a:effectLst/>
+                <a:latin typeface="Menlo"/>
+              </a:rPr>
+              <a:t>, (-1));</a:t>
+            </a:r>
+          </a:p>
+          <a:p>
+            <a:pPr>
+              <a:buNone/>
+            </a:pPr>
+            <a:r>
+              <a:rPr lang="en-US" sz="1050" b="0" i="0" dirty="0">
+                <a:effectLst/>
+                <a:latin typeface="Menlo"/>
+              </a:rPr>
+              <a:t>[</a:t>
+            </a:r>
+            <a:r>
+              <a:rPr lang="en-US" sz="1050" b="0" i="0" dirty="0" err="1">
+                <a:effectLst/>
+                <a:latin typeface="Menlo"/>
+              </a:rPr>
+              <a:t>sphereRadii</a:t>
+            </a:r>
+            <a:r>
+              <a:rPr lang="en-US" sz="1050" b="0" i="0" dirty="0">
+                <a:effectLst/>
+                <a:latin typeface="Menlo"/>
+              </a:rPr>
+              <a:t>, </a:t>
+            </a:r>
+            <a:r>
+              <a:rPr lang="en-US" sz="1050" b="0" i="0" dirty="0" err="1">
+                <a:effectLst/>
+                <a:latin typeface="Menlo"/>
+              </a:rPr>
+              <a:t>definingEdges</a:t>
+            </a:r>
+            <a:r>
+              <a:rPr lang="en-US" sz="1050" b="0" i="0" dirty="0">
+                <a:effectLst/>
+                <a:latin typeface="Menlo"/>
+              </a:rPr>
+              <a:t>] = </a:t>
+            </a:r>
+            <a:r>
+              <a:rPr lang="en-US" sz="1050" b="0" i="0" dirty="0" err="1">
+                <a:effectLst/>
+                <a:latin typeface="Menlo"/>
+              </a:rPr>
+              <a:t>fcn_VSkel_polytopeFindEnclosedSpheres</a:t>
+            </a:r>
+            <a:r>
+              <a:rPr lang="en-US" sz="1050" b="0" i="0" dirty="0">
+                <a:effectLst/>
+                <a:latin typeface="Menlo"/>
+              </a:rPr>
+              <a:t>(vertices, </a:t>
+            </a:r>
+            <a:r>
+              <a:rPr lang="en-US" sz="1050" b="0" i="0" dirty="0" err="1">
+                <a:effectLst/>
+                <a:latin typeface="Menlo"/>
+              </a:rPr>
+              <a:t>unit_normal_vectors</a:t>
+            </a:r>
+            <a:r>
+              <a:rPr lang="en-US" sz="1050" b="0" i="0" dirty="0">
+                <a:effectLst/>
+                <a:latin typeface="Menlo"/>
+              </a:rPr>
+              <a:t>, </a:t>
+            </a:r>
+            <a:r>
+              <a:rPr lang="en-US" sz="1050" b="0" i="0" dirty="0" err="1">
+                <a:effectLst/>
+                <a:latin typeface="Menlo"/>
+              </a:rPr>
+              <a:t>unit_vertex_projection_vectors</a:t>
+            </a:r>
+            <a:r>
+              <a:rPr lang="en-US" sz="1050" b="0" i="0" dirty="0">
+                <a:effectLst/>
+                <a:latin typeface="Menlo"/>
+              </a:rPr>
+              <a:t>, </a:t>
+            </a:r>
+            <a:r>
+              <a:rPr lang="en-US" sz="1050" b="0" i="0" dirty="0" err="1">
+                <a:effectLst/>
+                <a:latin typeface="Menlo"/>
+              </a:rPr>
+              <a:t>vector_direction_of_unit_cut</a:t>
+            </a:r>
+            <a:r>
+              <a:rPr lang="en-US" sz="1050" b="0" i="0" dirty="0">
+                <a:effectLst/>
+                <a:latin typeface="Menlo"/>
+              </a:rPr>
+              <a:t>, </a:t>
+            </a:r>
+            <a:r>
+              <a:rPr lang="en-US" sz="1050" b="0" i="0" dirty="0" err="1">
+                <a:effectLst/>
+                <a:latin typeface="Menlo"/>
+              </a:rPr>
+              <a:t>flag_vertexIsNonConvex</a:t>
+            </a:r>
+            <a:r>
+              <a:rPr lang="en-US" sz="1050" b="0" i="0" dirty="0">
+                <a:effectLst/>
+                <a:latin typeface="Menlo"/>
+              </a:rPr>
+              <a:t>, </a:t>
+            </a:r>
+            <a:r>
+              <a:rPr lang="en-US" sz="1050" b="0" i="0" dirty="0" err="1">
+                <a:effectLst/>
+                <a:latin typeface="Menlo"/>
+              </a:rPr>
+              <a:t>max_edge_cuts</a:t>
+            </a:r>
+            <a:r>
+              <a:rPr lang="en-US" sz="1050" b="0" i="0" dirty="0">
+                <a:effectLst/>
+                <a:latin typeface="Menlo"/>
+              </a:rPr>
+              <a:t>, (-1));</a:t>
+            </a:r>
+          </a:p>
+          <a:p>
+            <a:pPr>
+              <a:buNone/>
+            </a:pPr>
+            <a:endParaRPr lang="en-US" sz="1050" b="0" i="0" dirty="0">
+              <a:effectLst/>
+              <a:latin typeface="Menlo"/>
+            </a:endParaRPr>
+          </a:p>
+          <a:p>
+            <a:pPr>
+              <a:buNone/>
+            </a:pPr>
+            <a:r>
+              <a:rPr lang="en-US" sz="1050" b="0" i="0" dirty="0">
+                <a:effectLst/>
+                <a:latin typeface="Menlo"/>
+              </a:rPr>
+              <a:t>[</a:t>
+            </a:r>
+            <a:r>
+              <a:rPr lang="en-US" sz="1050" b="0" i="0" dirty="0" err="1">
+                <a:effectLst/>
+                <a:latin typeface="Menlo"/>
+              </a:rPr>
+              <a:t>min_cut</a:t>
+            </a:r>
+            <a:r>
+              <a:rPr lang="en-US" sz="1050" b="0" i="0" dirty="0">
+                <a:effectLst/>
+                <a:latin typeface="Menlo"/>
+              </a:rPr>
+              <a:t>, </a:t>
+            </a:r>
+            <a:r>
+              <a:rPr lang="en-US" sz="1050" b="0" i="0" dirty="0">
+                <a:solidFill>
+                  <a:srgbClr val="0E00FF"/>
+                </a:solidFill>
+                <a:effectLst/>
+                <a:latin typeface="Menlo"/>
+              </a:rPr>
+              <a:t>...</a:t>
+            </a:r>
+            <a:endParaRPr lang="en-US" sz="1050" b="0" i="0" dirty="0">
+              <a:effectLst/>
+              <a:latin typeface="Menlo"/>
+            </a:endParaRPr>
+          </a:p>
+          <a:p>
+            <a:pPr>
+              <a:buNone/>
+            </a:pPr>
+            <a:r>
+              <a:rPr lang="en-US" sz="1050" b="0" i="0" dirty="0" err="1">
+                <a:effectLst/>
+                <a:latin typeface="Menlo"/>
+              </a:rPr>
+              <a:t>indices_repeated</a:t>
+            </a:r>
+            <a:r>
+              <a:rPr lang="en-US" sz="1050" b="0" i="0" dirty="0">
+                <a:effectLst/>
+                <a:latin typeface="Menlo"/>
+              </a:rPr>
+              <a:t>, </a:t>
+            </a:r>
+            <a:r>
+              <a:rPr lang="en-US" sz="1050" b="0" i="0" dirty="0" err="1">
+                <a:effectLst/>
+                <a:latin typeface="Menlo"/>
+              </a:rPr>
+              <a:t>intersection_points</a:t>
+            </a:r>
+            <a:r>
+              <a:rPr lang="en-US" sz="1050" b="0" i="0" dirty="0">
+                <a:effectLst/>
+                <a:latin typeface="Menlo"/>
+              </a:rPr>
+              <a:t>] = </a:t>
+            </a:r>
+            <a:r>
+              <a:rPr lang="en-US" sz="1050" b="0" i="0" dirty="0">
+                <a:solidFill>
+                  <a:srgbClr val="0E00FF"/>
+                </a:solidFill>
+                <a:effectLst/>
+                <a:latin typeface="Menlo"/>
+              </a:rPr>
+              <a:t>...</a:t>
+            </a:r>
+            <a:endParaRPr lang="en-US" sz="1050" b="0" i="0" dirty="0">
+              <a:effectLst/>
+              <a:latin typeface="Menlo"/>
+            </a:endParaRPr>
+          </a:p>
+          <a:p>
+            <a:pPr>
+              <a:buNone/>
+            </a:pPr>
+            <a:r>
+              <a:rPr lang="en-US" sz="1050" b="0" i="0" dirty="0" err="1">
+                <a:effectLst/>
+                <a:latin typeface="Menlo"/>
+              </a:rPr>
+              <a:t>fcn_VSkel_polytopeFindMinimumEnclosedSphere</a:t>
+            </a:r>
+            <a:r>
+              <a:rPr lang="en-US" sz="1050" b="0" i="0" dirty="0">
+                <a:effectLst/>
+                <a:latin typeface="Menlo"/>
+              </a:rPr>
+              <a:t>(vertices, </a:t>
+            </a:r>
+            <a:r>
+              <a:rPr lang="en-US" sz="1050" b="0" i="0" dirty="0">
+                <a:solidFill>
+                  <a:srgbClr val="0E00FF"/>
+                </a:solidFill>
+                <a:effectLst/>
+                <a:latin typeface="Menlo"/>
+              </a:rPr>
+              <a:t>...</a:t>
+            </a:r>
+            <a:endParaRPr lang="en-US" sz="1050" b="0" i="0" dirty="0">
+              <a:effectLst/>
+              <a:latin typeface="Menlo"/>
+            </a:endParaRPr>
+          </a:p>
+          <a:p>
+            <a:pPr>
+              <a:buNone/>
+            </a:pPr>
+            <a:r>
+              <a:rPr lang="en-US" sz="1050" b="0" i="0" dirty="0" err="1">
+                <a:effectLst/>
+                <a:latin typeface="Menlo"/>
+              </a:rPr>
+              <a:t>sphereRadii</a:t>
+            </a:r>
+            <a:r>
+              <a:rPr lang="en-US" sz="1050" b="0" i="0" dirty="0">
+                <a:effectLst/>
+                <a:latin typeface="Menlo"/>
+              </a:rPr>
+              <a:t>, </a:t>
+            </a:r>
+            <a:r>
+              <a:rPr lang="en-US" sz="1050" b="0" i="0" dirty="0" err="1">
+                <a:effectLst/>
+                <a:latin typeface="Menlo"/>
+              </a:rPr>
+              <a:t>definingEdges</a:t>
+            </a:r>
+            <a:r>
+              <a:rPr lang="en-US" sz="1050" b="0" i="0" dirty="0">
+                <a:effectLst/>
+                <a:latin typeface="Menlo"/>
+              </a:rPr>
+              <a:t>, </a:t>
+            </a:r>
+            <a:r>
+              <a:rPr lang="en-US" sz="1050" b="0" i="0" dirty="0" err="1">
+                <a:effectLst/>
+                <a:latin typeface="Menlo"/>
+              </a:rPr>
+              <a:t>unit_normal_vectors</a:t>
+            </a:r>
+            <a:r>
+              <a:rPr lang="en-US" sz="1050" b="0" i="0" dirty="0">
+                <a:effectLst/>
+                <a:latin typeface="Menlo"/>
+              </a:rPr>
+              <a:t>, </a:t>
+            </a:r>
+            <a:r>
+              <a:rPr lang="en-US" sz="1050" b="0" i="0" dirty="0" err="1">
+                <a:effectLst/>
+                <a:latin typeface="Menlo"/>
+              </a:rPr>
+              <a:t>unit_vertex_projection_vectors</a:t>
+            </a:r>
+            <a:r>
+              <a:rPr lang="en-US" sz="1050" b="0" i="0" dirty="0">
+                <a:effectLst/>
+                <a:latin typeface="Menlo"/>
+              </a:rPr>
+              <a:t>, </a:t>
+            </a:r>
+            <a:r>
+              <a:rPr lang="en-US" sz="1050" b="0" i="0" dirty="0">
+                <a:solidFill>
+                  <a:srgbClr val="0E00FF"/>
+                </a:solidFill>
+                <a:effectLst/>
+                <a:latin typeface="Menlo"/>
+              </a:rPr>
+              <a:t>...</a:t>
+            </a:r>
+            <a:endParaRPr lang="en-US" sz="1050" b="0" i="0" dirty="0">
+              <a:effectLst/>
+              <a:latin typeface="Menlo"/>
+            </a:endParaRPr>
+          </a:p>
+          <a:p>
+            <a:r>
+              <a:rPr lang="en-US" sz="1050" b="0" i="0" dirty="0" err="1">
+                <a:effectLst/>
+                <a:latin typeface="Menlo"/>
+              </a:rPr>
+              <a:t>vector_direction_of_unit_cut</a:t>
+            </a:r>
+            <a:r>
+              <a:rPr lang="en-US" sz="1050" b="0" i="0" dirty="0">
+                <a:effectLst/>
+                <a:latin typeface="Menlo"/>
+              </a:rPr>
+              <a:t>, (</a:t>
+            </a:r>
+            <a:r>
+              <a:rPr lang="en-US" sz="1050" b="0" i="0" dirty="0" err="1">
+                <a:effectLst/>
+                <a:latin typeface="Menlo"/>
+              </a:rPr>
+              <a:t>fig_num</a:t>
+            </a:r>
+            <a:r>
+              <a:rPr lang="en-US" sz="1050" b="0" i="0" dirty="0">
+                <a:effectLst/>
+                <a:latin typeface="Menlo"/>
+              </a:rPr>
+              <a:t>));</a:t>
+            </a:r>
+          </a:p>
+        </p:txBody>
+      </p:sp>
+      <p:pic>
+        <p:nvPicPr>
+          <p:cNvPr id="6" name="Picture 5">
+            <a:extLst>
+              <a:ext uri="{FF2B5EF4-FFF2-40B4-BE49-F238E27FC236}">
+                <a16:creationId xmlns:a16="http://schemas.microsoft.com/office/drawing/2014/main" id="{E7F10906-9F45-C578-E4E6-5D69A329D99E}"/>
+              </a:ext>
+            </a:extLst>
+          </p:cNvPr>
+          <p:cNvPicPr>
+            <a:picLocks noChangeAspect="1"/>
+          </p:cNvPicPr>
+          <p:nvPr/>
+        </p:nvPicPr>
+        <p:blipFill>
+          <a:blip r:embed="rId2"/>
+          <a:stretch>
+            <a:fillRect/>
+          </a:stretch>
+        </p:blipFill>
+        <p:spPr>
+          <a:xfrm>
+            <a:off x="7420402" y="1241277"/>
+            <a:ext cx="4394200" cy="3295650"/>
+          </a:xfrm>
+          <a:prstGeom prst="rect">
+            <a:avLst/>
+          </a:prstGeom>
+        </p:spPr>
+      </p:pic>
+    </p:spTree>
+    <p:extLst>
+      <p:ext uri="{BB962C8B-B14F-4D97-AF65-F5344CB8AC3E}">
+        <p14:creationId xmlns:p14="http://schemas.microsoft.com/office/powerpoint/2010/main" val="225474345"/>
+      </p:ext>
+    </p:extLst>
+  </p:cSld>
+  <p:clrMapOvr>
+    <a:masterClrMapping/>
+  </p:clrMapOvr>
+</p:sld>
+</file>
+
+<file path=ppt/slides/slide36.xml><?xml version="1.0" encoding="utf-8"?>
 <p:sld xmlns:a="http://schemas.openxmlformats.org/drawingml/2006/main" xmlns:r="http://schemas.openxmlformats.org/officeDocument/2006/relationships" xmlns:p="http://schemas.openxmlformats.org/presentationml/2006/main">
   <p:cSld>
     <p:spTree>

</xml_diff>

<commit_message>
BROKEN: working on fcn_VSkel_polytopeFindVertexSkeleton. Finished line segment testing.
</commit_message>
<xml_diff>
--- a/Documents/VertexSkeletonClassLibrary.pptx
+++ b/Documents/VertexSkeletonClassLibrary.pptx
@@ -39,14 +39,15 @@
     <p:sldId id="541" r:id="rId33"/>
     <p:sldId id="547" r:id="rId34"/>
     <p:sldId id="551" r:id="rId35"/>
-    <p:sldId id="548" r:id="rId36"/>
-    <p:sldId id="552" r:id="rId37"/>
-    <p:sldId id="553" r:id="rId38"/>
-    <p:sldId id="554" r:id="rId39"/>
-    <p:sldId id="555" r:id="rId40"/>
-    <p:sldId id="556" r:id="rId41"/>
-    <p:sldId id="557" r:id="rId42"/>
-    <p:sldId id="540" r:id="rId43"/>
+    <p:sldId id="559" r:id="rId36"/>
+    <p:sldId id="548" r:id="rId37"/>
+    <p:sldId id="552" r:id="rId38"/>
+    <p:sldId id="553" r:id="rId39"/>
+    <p:sldId id="554" r:id="rId40"/>
+    <p:sldId id="555" r:id="rId41"/>
+    <p:sldId id="556" r:id="rId42"/>
+    <p:sldId id="557" r:id="rId43"/>
+    <p:sldId id="540" r:id="rId44"/>
   </p:sldIdLst>
   <p:sldSz cx="12192000" cy="6858000"/>
   <p:notesSz cx="6858000" cy="9144000"/>
@@ -196,6 +197,7 @@
             <p14:sldId id="541"/>
             <p14:sldId id="547"/>
             <p14:sldId id="551"/>
+            <p14:sldId id="559"/>
             <p14:sldId id="548"/>
             <p14:sldId id="552"/>
             <p14:sldId id="553"/>
@@ -330,7 +332,7 @@
       <inkml:brushProperty name="color" value="#004F8B"/>
     </inkml:brush>
   </inkml:definitions>
-  <inkml:trace contextRef="#ctx0" brushRef="#br0">1152 1 24058,'-1152'5504'0</inkml:trace>
+  <inkml:trace contextRef="#ctx0" brushRef="#br0">2035 1 24058,'-2035'2264'0</inkml:trace>
 </inkml:ink>
 </file>
 
@@ -386,7 +388,7 @@
       <inkml:brushProperty name="color" value="#004F8B"/>
     </inkml:brush>
   </inkml:definitions>
-  <inkml:trace contextRef="#ctx0" brushRef="#br0">0 4116 24329,'2387'-4115'0</inkml:trace>
+  <inkml:trace contextRef="#ctx0" brushRef="#br0">0 1 24329,'2627'1917'0</inkml:trace>
 </inkml:ink>
 </file>
 
@@ -414,7 +416,7 @@
       <inkml:brushProperty name="color" value="#004F8B"/>
     </inkml:brush>
   </inkml:definitions>
-  <inkml:trace contextRef="#ctx0" brushRef="#br0">1 142 24140,'1823'-142'0</inkml:trace>
+  <inkml:trace contextRef="#ctx0" brushRef="#br0">1 4118 24140,'366'-4110'0</inkml:trace>
 </inkml:ink>
 </file>
 
@@ -442,7 +444,7 @@
       <inkml:brushProperty name="color" value="#004F8B"/>
     </inkml:brush>
   </inkml:definitions>
-  <inkml:trace contextRef="#ctx0" brushRef="#br0">718 0 24284,'-717'2634'0</inkml:trace>
+  <inkml:trace contextRef="#ctx0" brushRef="#br0">3 0 24284,'1525'3774'0</inkml:trace>
 </inkml:ink>
 </file>
 
@@ -498,7 +500,7 @@
       <inkml:brushProperty name="color" value="#004F8B"/>
     </inkml:brush>
   </inkml:definitions>
-  <inkml:trace contextRef="#ctx0" brushRef="#br0">1 1 24357,'1247'3905'0</inkml:trace>
+  <inkml:trace contextRef="#ctx0" brushRef="#br0">1 1 24357,'2151'621'0</inkml:trace>
 </inkml:ink>
 </file>
 
@@ -583,6 +585,34 @@
     </inkml:brush>
   </inkml:definitions>
   <inkml:trace contextRef="#ctx0" brushRef="#br0">219 91 24575,'-6'-1'0,"0"2"0,0-1 0,0 1 0,0-1 0,0 2 0,1-1 0,-1 1 0,-7 3 0,10-4 0,0 1 0,0 0 0,0 0 0,1 0 0,-1 0 0,1 0 0,-1 0 0,1 1 0,0-1 0,0 1 0,0 0 0,1 0 0,-1 0 0,0 0 0,1 0 0,-2 4 0,3-5 0,-1-1 0,1 0 0,-1 1 0,1-1 0,0 1 0,0-1 0,-1 1 0,1-1 0,0 0 0,0 1 0,1-1 0,-1 1 0,0-1 0,0 1 0,1-1 0,-1 0 0,1 1 0,-1-1 0,1 0 0,-1 1 0,3 1 0,-2-1 0,1 0 0,-1-1 0,1 1 0,0-1 0,0 0 0,0 1 0,0-1 0,0 0 0,0 0 0,0 0 0,0-1 0,0 1 0,3 0 0,-1 0 0,0 0 0,1 0 0,0-1 0,-1 0 0,1 0 0,-1 0 0,1 0 0,-1-1 0,1 0 0,-1 1 0,1-2 0,-1 1 0,8-4 0,-7 1 0,0 1 0,-1-2 0,0 1 0,0 0 0,0-1 0,0 0 0,-1 0 0,0 0 0,0 0 0,0 0 0,0-1 0,2-9 0,-2 8 0,-1-1 0,0 1 0,0-1 0,0 0 0,-1 0 0,-1 0 0,1 0 0,-2-15 0,0 21 0,1 0 0,-1 0 0,1 1 0,-1-1 0,1 1 0,-1-1 0,0 1 0,0-1 0,0 1 0,0-1 0,0 1 0,0-1 0,0 1 0,0 0 0,-1 0 0,1 0 0,0 0 0,-1 0 0,1 0 0,-1 0 0,1 0 0,-1 0 0,1 1 0,-1-1 0,0 1 0,1-1 0,-1 1 0,0 0 0,0-1 0,1 1 0,-1 0 0,0 0 0,1 0 0,-3 1 0,-3-1 0,1 1 0,0 0 0,-1 0 0,1 1 0,0 0 0,0 0 0,0 0 0,-7 5 0,-6 4 0,1 0 0,1 2 0,0 0 0,-22 22 0,32-28 0,1 0 0,-1 0 0,1 1 0,1 0 0,0 0 0,0 0 0,0 1 0,1 0 0,0-1 0,1 1 0,0 1 0,-2 13 0,4-20 0,1 1 0,0-1 0,0 1 0,1-1 0,-1 1 0,1-1 0,-1 1 0,1-1 0,0 0 0,0 0 0,1 1 0,-1-1 0,1 0 0,-1 0 0,1 0 0,0 0 0,0-1 0,1 1 0,-1 0 0,0-1 0,1 1 0,0-1 0,4 3 0,-4-3 0,1 0 0,-1 1 0,1-2 0,0 1 0,0 0 0,0-1 0,0 0 0,0 0 0,0 0 0,0 0 0,1-1 0,-1 1 0,0-1 0,0 0 0,0-1 0,1 1 0,-1-1 0,0 1 0,5-3 0,-7 2 0,0 0 0,0 0 0,0 0 0,-1 0 0,1-1 0,0 1 0,0-1 0,-1 0 0,1 1 0,-1-1 0,0 0 0,1 0 0,-1 0 0,0 0 0,0 0 0,0 0 0,0 0 0,0 0 0,-1 0 0,1 0 0,-1-1 0,1 1 0,-1-4 0,1-8 0,0 1 0,-3-26 0,1 21 0,-3-12 0,-2 16 0,5 14 0,1-1 0,0 1 0,0 0 0,-1-1 0,1 1 0,0 0 0,-1 0 0,1 0 0,0-1 0,-1 1 0,1 0 0,-1 0 0,1 0 0,0 0 0,-1 0 0,1 0 0,-1 0 0,1-1 0,0 1 0,-1 0 0,1 0 0,0 1 0,-1-1 0,1 0 0,-1 0 0,1 0 0,0 0 0,-1 0 0,0 0 0,0 1 0,0 0 0,0 0 0,0 0 0,-1 0 0,1 1 0,0-1 0,0 0 0,1 0 0,-1 1 0,0-1 0,0 0 0,1 1 0,-1-1 0,1 1 0,-1-1 0,1 0 0,-1 1 0,1-1 0,0 1 0,0 0 0,0-1 0,0 1 0,0 1 0,0 2 0,0-1 0,1 1 0,-1-1 0,1 1 0,0-1 0,3 8 0,-3-10 0,0 0 0,0 0 0,0 0 0,0 0 0,1 0 0,-1 0 0,1 0 0,-1-1 0,1 1 0,0 0 0,0-1 0,-1 0 0,1 1 0,0-1 0,0 0 0,1 0 0,-1 0 0,3 1 0,-3-2 0,-1 0 0,0 0 0,1 0 0,-1 0 0,0 0 0,0 0 0,1 0 0,-1 0 0,0 0 0,1 0 0,-1-1 0,0 1 0,0-1 0,0 1 0,1-1 0,-1 1 0,0-1 0,0 0 0,0 0 0,0 1 0,0-1 0,0 0 0,0 0 0,0 0 0,-1 0 0,1 0 0,0 0 0,0 0 0,-1 0 0,1-1 0,-1 1 0,1 0 0,0-2 0,0 0-68,0 0 0,0 0-1,0 0 1,0 0 0,0-1 0,-1 1-1,0 0 1,1 0 0,-1 0 0,0 0-1,-1-1 1,1 1 0,-1 0 0,1 0-1,-1 0 1,0 0 0,0 0-1,0 0 1,-2-3 0,-5-4-6758</inkml:trace>
+</inkml:ink>
+</file>
+
+<file path=ppt/ink/ink21.xml><?xml version="1.0" encoding="utf-8"?>
+<inkml:ink xmlns:inkml="http://www.w3.org/2003/InkML">
+  <inkml:definitions>
+    <inkml:context xml:id="ctx0">
+      <inkml:inkSource xml:id="inkSrc0">
+        <inkml:traceFormat>
+          <inkml:channel name="X" type="integer" min="-2.14748E9" max="2.14748E9" units="cm"/>
+          <inkml:channel name="Y" type="integer" min="-2.14748E9" max="2.14748E9" units="cm"/>
+          <inkml:channel name="F" type="integer" max="32767" units="dev"/>
+        </inkml:traceFormat>
+        <inkml:channelProperties>
+          <inkml:channelProperty channel="X" name="resolution" value="1000" units="1/cm"/>
+          <inkml:channelProperty channel="Y" name="resolution" value="1000" units="1/cm"/>
+          <inkml:channelProperty channel="F" name="resolution" value="0" units="1/dev"/>
+        </inkml:channelProperties>
+      </inkml:inkSource>
+      <inkml:timestamp xml:id="ts0" timeString="2025-05-14T20:15:45.395"/>
+    </inkml:context>
+    <inkml:brush xml:id="br0">
+      <inkml:brushProperty name="width" value="0.035" units="cm"/>
+      <inkml:brushProperty name="height" value="0.035" units="cm"/>
+      <inkml:brushProperty name="color" value="#004F8B"/>
+    </inkml:brush>
+  </inkml:definitions>
+  <inkml:trace contextRef="#ctx0" brushRef="#br0">1 3154 24357,'939'-3152'0</inkml:trace>
 </inkml:ink>
 </file>
 
@@ -928,7 +958,7 @@
           <a:p>
             <a:fld id="{ADCEBF8C-22C0-4323-9BBB-9413232198F8}" type="datetimeFigureOut">
               <a:rPr lang="en-US" smtClean="0"/>
-              <a:t>5/13/2025</a:t>
+              <a:t>5/14/2025</a:t>
             </a:fld>
             <a:endParaRPr lang="en-US"/>
           </a:p>
@@ -1126,7 +1156,7 @@
           <a:p>
             <a:fld id="{ADCEBF8C-22C0-4323-9BBB-9413232198F8}" type="datetimeFigureOut">
               <a:rPr lang="en-US" smtClean="0"/>
-              <a:t>5/13/2025</a:t>
+              <a:t>5/14/2025</a:t>
             </a:fld>
             <a:endParaRPr lang="en-US"/>
           </a:p>
@@ -1334,7 +1364,7 @@
           <a:p>
             <a:fld id="{ADCEBF8C-22C0-4323-9BBB-9413232198F8}" type="datetimeFigureOut">
               <a:rPr lang="en-US" smtClean="0"/>
-              <a:t>5/13/2025</a:t>
+              <a:t>5/14/2025</a:t>
             </a:fld>
             <a:endParaRPr lang="en-US"/>
           </a:p>
@@ -1532,7 +1562,7 @@
           <a:p>
             <a:fld id="{ADCEBF8C-22C0-4323-9BBB-9413232198F8}" type="datetimeFigureOut">
               <a:rPr lang="en-US" smtClean="0"/>
-              <a:t>5/13/2025</a:t>
+              <a:t>5/14/2025</a:t>
             </a:fld>
             <a:endParaRPr lang="en-US"/>
           </a:p>
@@ -1807,7 +1837,7 @@
           <a:p>
             <a:fld id="{ADCEBF8C-22C0-4323-9BBB-9413232198F8}" type="datetimeFigureOut">
               <a:rPr lang="en-US" smtClean="0"/>
-              <a:t>5/13/2025</a:t>
+              <a:t>5/14/2025</a:t>
             </a:fld>
             <a:endParaRPr lang="en-US"/>
           </a:p>
@@ -2072,7 +2102,7 @@
           <a:p>
             <a:fld id="{ADCEBF8C-22C0-4323-9BBB-9413232198F8}" type="datetimeFigureOut">
               <a:rPr lang="en-US" smtClean="0"/>
-              <a:t>5/13/2025</a:t>
+              <a:t>5/14/2025</a:t>
             </a:fld>
             <a:endParaRPr lang="en-US"/>
           </a:p>
@@ -2484,7 +2514,7 @@
           <a:p>
             <a:fld id="{ADCEBF8C-22C0-4323-9BBB-9413232198F8}" type="datetimeFigureOut">
               <a:rPr lang="en-US" smtClean="0"/>
-              <a:t>5/13/2025</a:t>
+              <a:t>5/14/2025</a:t>
             </a:fld>
             <a:endParaRPr lang="en-US"/>
           </a:p>
@@ -2625,7 +2655,7 @@
           <a:p>
             <a:fld id="{ADCEBF8C-22C0-4323-9BBB-9413232198F8}" type="datetimeFigureOut">
               <a:rPr lang="en-US" smtClean="0"/>
-              <a:t>5/13/2025</a:t>
+              <a:t>5/14/2025</a:t>
             </a:fld>
             <a:endParaRPr lang="en-US"/>
           </a:p>
@@ -2738,7 +2768,7 @@
           <a:p>
             <a:fld id="{ADCEBF8C-22C0-4323-9BBB-9413232198F8}" type="datetimeFigureOut">
               <a:rPr lang="en-US" smtClean="0"/>
-              <a:t>5/13/2025</a:t>
+              <a:t>5/14/2025</a:t>
             </a:fld>
             <a:endParaRPr lang="en-US"/>
           </a:p>
@@ -3049,7 +3079,7 @@
           <a:p>
             <a:fld id="{ADCEBF8C-22C0-4323-9BBB-9413232198F8}" type="datetimeFigureOut">
               <a:rPr lang="en-US" smtClean="0"/>
-              <a:t>5/13/2025</a:t>
+              <a:t>5/14/2025</a:t>
             </a:fld>
             <a:endParaRPr lang="en-US"/>
           </a:p>
@@ -3337,7 +3367,7 @@
           <a:p>
             <a:fld id="{ADCEBF8C-22C0-4323-9BBB-9413232198F8}" type="datetimeFigureOut">
               <a:rPr lang="en-US" smtClean="0"/>
-              <a:t>5/13/2025</a:t>
+              <a:t>5/14/2025</a:t>
             </a:fld>
             <a:endParaRPr lang="en-US"/>
           </a:p>
@@ -3578,7 +3608,7 @@
           <a:p>
             <a:fld id="{ADCEBF8C-22C0-4323-9BBB-9413232198F8}" type="datetimeFigureOut">
               <a:rPr lang="en-US" smtClean="0"/>
-              <a:t>5/13/2025</a:t>
+              <a:t>5/14/2025</a:t>
             </a:fld>
             <a:endParaRPr lang="en-US"/>
           </a:p>
@@ -15522,8 +15552,8 @@
           </p:style>
         </p:cxnSp>
       </p:grpSp>
-      <mc:AlternateContent xmlns:mc="http://schemas.openxmlformats.org/markup-compatibility/2006">
-        <mc:Choice xmlns:a14="http://schemas.microsoft.com/office/drawing/2010/main" Requires="a14">
+      <mc:AlternateContent xmlns:mc="http://schemas.openxmlformats.org/markup-compatibility/2006" xmlns:a14="http://schemas.microsoft.com/office/drawing/2010/main">
+        <mc:Choice Requires="a14">
           <p:sp>
             <p:nvSpPr>
               <p:cNvPr id="16" name="TextBox 15">
@@ -15604,7 +15634,7 @@
             </p:txBody>
           </p:sp>
         </mc:Choice>
-        <mc:Fallback>
+        <mc:Fallback xmlns="">
           <p:sp>
             <p:nvSpPr>
               <p:cNvPr id="16" name="TextBox 15">
@@ -15649,8 +15679,8 @@
           </p:sp>
         </mc:Fallback>
       </mc:AlternateContent>
-      <mc:AlternateContent xmlns:mc="http://schemas.openxmlformats.org/markup-compatibility/2006">
-        <mc:Choice xmlns:a14="http://schemas.microsoft.com/office/drawing/2010/main" Requires="a14">
+      <mc:AlternateContent xmlns:mc="http://schemas.openxmlformats.org/markup-compatibility/2006" xmlns:a14="http://schemas.microsoft.com/office/drawing/2010/main">
+        <mc:Choice Requires="a14">
           <p:sp>
             <p:nvSpPr>
               <p:cNvPr id="17" name="TextBox 16">
@@ -15719,7 +15749,7 @@
             </p:txBody>
           </p:sp>
         </mc:Choice>
-        <mc:Fallback>
+        <mc:Fallback xmlns="">
           <p:sp>
             <p:nvSpPr>
               <p:cNvPr id="17" name="TextBox 16">
@@ -15846,8 +15876,8 @@
           </a:fontRef>
         </p:style>
       </p:cxnSp>
-      <mc:AlternateContent xmlns:mc="http://schemas.openxmlformats.org/markup-compatibility/2006">
-        <mc:Choice xmlns:a14="http://schemas.microsoft.com/office/drawing/2010/main" Requires="a14">
+      <mc:AlternateContent xmlns:mc="http://schemas.openxmlformats.org/markup-compatibility/2006" xmlns:a14="http://schemas.microsoft.com/office/drawing/2010/main">
+        <mc:Choice Requires="a14">
           <p:sp>
             <p:nvSpPr>
               <p:cNvPr id="22" name="TextBox 21">
@@ -16292,6 +16322,7 @@
                 </a:endParaRPr>
               </a:p>
               <a:p>
+                <a:pPr/>
                 <a14:m>
                   <m:oMathPara xmlns:m="http://schemas.openxmlformats.org/officeDocument/2006/math">
                     <m:oMathParaPr>
@@ -16434,13 +16465,7 @@
                                 <a:rPr lang="en-US" b="0" i="1" smtClean="0">
                                   <a:latin typeface="Cambria Math" panose="02040503050406030204" pitchFamily="18" charset="0"/>
                                 </a:rPr>
-                                <m:t>𝑖</m:t>
-                              </m:r>
-                              <m:r>
-                                <a:rPr lang="en-US" b="0" i="1" smtClean="0">
-                                  <a:latin typeface="Cambria Math" panose="02040503050406030204" pitchFamily="18" charset="0"/>
-                                </a:rPr>
-                                <m:t>𝑥</m:t>
+                                <m:t>𝑖𝑥</m:t>
                               </m:r>
                             </m:sub>
                           </m:sSub>
@@ -16546,13 +16571,12 @@
                 </a:endParaRPr>
               </a:p>
               <a:p>
-                <a:pPr/>
                 <a:endParaRPr lang="en-US" dirty="0"/>
               </a:p>
             </p:txBody>
           </p:sp>
         </mc:Choice>
-        <mc:Fallback>
+        <mc:Fallback xmlns="">
           <p:sp>
             <p:nvSpPr>
               <p:cNvPr id="22" name="TextBox 21">
@@ -16597,8 +16621,8 @@
           </p:sp>
         </mc:Fallback>
       </mc:AlternateContent>
-      <mc:AlternateContent xmlns:mc="http://schemas.openxmlformats.org/markup-compatibility/2006">
-        <mc:Choice xmlns:a14="http://schemas.microsoft.com/office/drawing/2010/main" Requires="a14">
+      <mc:AlternateContent xmlns:mc="http://schemas.openxmlformats.org/markup-compatibility/2006" xmlns:a14="http://schemas.microsoft.com/office/drawing/2010/main">
+        <mc:Choice Requires="a14">
           <p:sp>
             <p:nvSpPr>
               <p:cNvPr id="23" name="TextBox 22">
@@ -16672,7 +16696,7 @@
             </p:txBody>
           </p:sp>
         </mc:Choice>
-        <mc:Fallback>
+        <mc:Fallback xmlns="">
           <p:sp>
             <p:nvSpPr>
               <p:cNvPr id="23" name="TextBox 22">
@@ -16758,8 +16782,8 @@
           </a:fontRef>
         </p:style>
       </p:cxnSp>
-      <mc:AlternateContent xmlns:mc="http://schemas.openxmlformats.org/markup-compatibility/2006">
-        <mc:Choice xmlns:a14="http://schemas.microsoft.com/office/drawing/2010/main" Requires="a14">
+      <mc:AlternateContent xmlns:mc="http://schemas.openxmlformats.org/markup-compatibility/2006" xmlns:a14="http://schemas.microsoft.com/office/drawing/2010/main">
+        <mc:Choice Requires="a14">
           <p:sp>
             <p:nvSpPr>
               <p:cNvPr id="26" name="TextBox 25">
@@ -16834,7 +16858,7 @@
             </p:txBody>
           </p:sp>
         </mc:Choice>
-        <mc:Fallback>
+        <mc:Fallback xmlns="">
           <p:sp>
             <p:nvSpPr>
               <p:cNvPr id="26" name="TextBox 25">
@@ -16920,8 +16944,8 @@
           </a:fontRef>
         </p:style>
       </p:cxnSp>
-      <mc:AlternateContent xmlns:mc="http://schemas.openxmlformats.org/markup-compatibility/2006">
-        <mc:Choice xmlns:a14="http://schemas.microsoft.com/office/drawing/2010/main" Requires="a14">
+      <mc:AlternateContent xmlns:mc="http://schemas.openxmlformats.org/markup-compatibility/2006" xmlns:a14="http://schemas.microsoft.com/office/drawing/2010/main">
+        <mc:Choice Requires="a14">
           <p:sp>
             <p:nvSpPr>
               <p:cNvPr id="28" name="TextBox 27">
@@ -17008,7 +17032,7 @@
             </p:txBody>
           </p:sp>
         </mc:Choice>
-        <mc:Fallback>
+        <mc:Fallback xmlns="">
           <p:sp>
             <p:nvSpPr>
               <p:cNvPr id="28" name="TextBox 27">
@@ -17142,8 +17166,8 @@
           </a:fontRef>
         </p:style>
       </p:cxnSp>
-      <mc:AlternateContent xmlns:mc="http://schemas.openxmlformats.org/markup-compatibility/2006">
-        <mc:Choice xmlns:a14="http://schemas.microsoft.com/office/drawing/2010/main" Requires="a14">
+      <mc:AlternateContent xmlns:mc="http://schemas.openxmlformats.org/markup-compatibility/2006" xmlns:a14="http://schemas.microsoft.com/office/drawing/2010/main">
+        <mc:Choice Requires="a14">
           <p:sp>
             <p:nvSpPr>
               <p:cNvPr id="33" name="TextBox 32">
@@ -17193,7 +17217,7 @@
             </p:txBody>
           </p:sp>
         </mc:Choice>
-        <mc:Fallback>
+        <mc:Fallback xmlns="">
           <p:sp>
             <p:nvSpPr>
               <p:cNvPr id="33" name="TextBox 32">
@@ -17238,8 +17262,8 @@
           </p:sp>
         </mc:Fallback>
       </mc:AlternateContent>
-      <mc:AlternateContent xmlns:mc="http://schemas.openxmlformats.org/markup-compatibility/2006">
-        <mc:Choice xmlns:a14="http://schemas.microsoft.com/office/drawing/2010/main" Requires="a14">
+      <mc:AlternateContent xmlns:mc="http://schemas.openxmlformats.org/markup-compatibility/2006" xmlns:a14="http://schemas.microsoft.com/office/drawing/2010/main">
+        <mc:Choice Requires="a14">
           <p:sp>
             <p:nvSpPr>
               <p:cNvPr id="34" name="TextBox 33">
@@ -17320,7 +17344,7 @@
             </p:txBody>
           </p:sp>
         </mc:Choice>
-        <mc:Fallback>
+        <mc:Fallback xmlns="">
           <p:sp>
             <p:nvSpPr>
               <p:cNvPr id="34" name="TextBox 33">
@@ -17365,8 +17389,8 @@
           </p:sp>
         </mc:Fallback>
       </mc:AlternateContent>
-      <mc:AlternateContent xmlns:mc="http://schemas.openxmlformats.org/markup-compatibility/2006">
-        <mc:Choice xmlns:a14="http://schemas.microsoft.com/office/drawing/2010/main" Requires="a14">
+      <mc:AlternateContent xmlns:mc="http://schemas.openxmlformats.org/markup-compatibility/2006" xmlns:a14="http://schemas.microsoft.com/office/drawing/2010/main">
+        <mc:Choice Requires="a14">
           <p:sp>
             <p:nvSpPr>
               <p:cNvPr id="35" name="TextBox 34">
@@ -17435,7 +17459,7 @@
             </p:txBody>
           </p:sp>
         </mc:Choice>
-        <mc:Fallback>
+        <mc:Fallback xmlns="">
           <p:sp>
             <p:nvSpPr>
               <p:cNvPr id="35" name="TextBox 34">
@@ -17480,8 +17504,8 @@
           </p:sp>
         </mc:Fallback>
       </mc:AlternateContent>
-      <mc:AlternateContent xmlns:mc="http://schemas.openxmlformats.org/markup-compatibility/2006">
-        <mc:Choice xmlns:a14="http://schemas.microsoft.com/office/drawing/2010/main" Requires="a14">
+      <mc:AlternateContent xmlns:mc="http://schemas.openxmlformats.org/markup-compatibility/2006" xmlns:a14="http://schemas.microsoft.com/office/drawing/2010/main">
+        <mc:Choice Requires="a14">
           <p:sp>
             <p:nvSpPr>
               <p:cNvPr id="37" name="TextBox 36">
@@ -18216,7 +18240,6 @@
                 </a:endParaRPr>
               </a:p>
               <a:p>
-                <a:pPr/>
                 <a:endParaRPr lang="en-US" i="1" dirty="0">
                   <a:latin typeface="Cambria Math" panose="02040503050406030204" pitchFamily="18" charset="0"/>
                 </a:endParaRPr>
@@ -18224,7 +18247,7 @@
             </p:txBody>
           </p:sp>
         </mc:Choice>
-        <mc:Fallback>
+        <mc:Fallback xmlns="">
           <p:sp>
             <p:nvSpPr>
               <p:cNvPr id="37" name="TextBox 36">
@@ -19532,7 +19555,12 @@
             <p:ph type="title"/>
           </p:nvPr>
         </p:nvSpPr>
-        <p:spPr/>
+        <p:spPr>
+          <a:xfrm>
+            <a:off x="444500" y="0"/>
+            <a:ext cx="10515600" cy="1325563"/>
+          </a:xfrm>
+        </p:spPr>
         <p:txBody>
           <a:bodyPr/>
           <a:lstStyle/>
@@ -19566,8 +19594,8 @@
         </p:blipFill>
         <p:spPr>
           <a:xfrm>
-            <a:off x="644540" y="1214303"/>
-            <a:ext cx="11071754" cy="5459451"/>
+            <a:off x="-502234" y="884259"/>
+            <a:ext cx="13196467" cy="6507141"/>
           </a:xfrm>
           <a:prstGeom prst="rect">
             <a:avLst/>
@@ -19588,6 +19616,415 @@
 </file>
 
 <file path=ppt/slides/slide35.xml><?xml version="1.0" encoding="utf-8"?>
+<p:sld xmlns:a="http://schemas.openxmlformats.org/drawingml/2006/main" xmlns:r="http://schemas.openxmlformats.org/officeDocument/2006/relationships" xmlns:p="http://schemas.openxmlformats.org/presentationml/2006/main">
+  <p:cSld>
+    <p:spTree>
+      <p:nvGrpSpPr>
+        <p:cNvPr id="1" name=""/>
+        <p:cNvGrpSpPr/>
+        <p:nvPr/>
+      </p:nvGrpSpPr>
+      <p:grpSpPr>
+        <a:xfrm>
+          <a:off x="0" y="0"/>
+          <a:ext cx="0" cy="0"/>
+          <a:chOff x="0" y="0"/>
+          <a:chExt cx="0" cy="0"/>
+        </a:xfrm>
+      </p:grpSpPr>
+      <p:sp>
+        <p:nvSpPr>
+          <p:cNvPr id="2" name="Title 1">
+            <a:extLst>
+              <a:ext uri="{FF2B5EF4-FFF2-40B4-BE49-F238E27FC236}">
+                <a16:creationId xmlns:a16="http://schemas.microsoft.com/office/drawing/2014/main" id="{06F67BFE-40DE-4D4D-AC0F-8369B963C5F6}"/>
+              </a:ext>
+            </a:extLst>
+          </p:cNvPr>
+          <p:cNvSpPr>
+            <a:spLocks noGrp="1"/>
+          </p:cNvSpPr>
+          <p:nvPr>
+            <p:ph type="title"/>
+          </p:nvPr>
+        </p:nvSpPr>
+        <p:spPr>
+          <a:xfrm>
+            <a:off x="838200" y="365125"/>
+            <a:ext cx="10515600" cy="1325563"/>
+          </a:xfrm>
+        </p:spPr>
+        <p:txBody>
+          <a:bodyPr/>
+          <a:lstStyle/>
+          <a:p>
+            <a:r>
+              <a:rPr lang="en-US" dirty="0"/>
+              <a:t>There may be situations where polytopes are nested INSIDE other polytopes</a:t>
+            </a:r>
+          </a:p>
+        </p:txBody>
+      </p:sp>
+      <p:sp>
+        <p:nvSpPr>
+          <p:cNvPr id="3" name="Content Placeholder 2">
+            <a:extLst>
+              <a:ext uri="{FF2B5EF4-FFF2-40B4-BE49-F238E27FC236}">
+                <a16:creationId xmlns:a16="http://schemas.microsoft.com/office/drawing/2014/main" id="{3A1B4974-FA5B-41D6-8216-B0927E7ED20E}"/>
+              </a:ext>
+            </a:extLst>
+          </p:cNvPr>
+          <p:cNvSpPr>
+            <a:spLocks noGrp="1"/>
+          </p:cNvSpPr>
+          <p:nvPr>
+            <p:ph idx="1"/>
+          </p:nvPr>
+        </p:nvSpPr>
+        <p:spPr>
+          <a:xfrm>
+            <a:off x="838200" y="1838425"/>
+            <a:ext cx="7401025" cy="4338538"/>
+          </a:xfrm>
+        </p:spPr>
+        <p:txBody>
+          <a:bodyPr/>
+          <a:lstStyle/>
+          <a:p>
+            <a:pPr marL="0" indent="0">
+              <a:buNone/>
+            </a:pPr>
+            <a:r>
+              <a:rPr lang="en-US" dirty="0"/>
+              <a:t>In this case, the main change is to allow searching of edges that are both on and within the current polytope</a:t>
+            </a:r>
+          </a:p>
+        </p:txBody>
+      </p:sp>
+      <p:cxnSp>
+        <p:nvCxnSpPr>
+          <p:cNvPr id="5" name="Straight Connector 4">
+            <a:extLst>
+              <a:ext uri="{FF2B5EF4-FFF2-40B4-BE49-F238E27FC236}">
+                <a16:creationId xmlns:a16="http://schemas.microsoft.com/office/drawing/2014/main" id="{99204A3B-CAAB-4FA0-8F17-F80A618857BE}"/>
+              </a:ext>
+            </a:extLst>
+          </p:cNvPr>
+          <p:cNvCxnSpPr/>
+          <p:nvPr/>
+        </p:nvCxnSpPr>
+        <p:spPr>
+          <a:xfrm flipV="1">
+            <a:off x="7355841" y="3334618"/>
+            <a:ext cx="981777" cy="1934678"/>
+          </a:xfrm>
+          <a:prstGeom prst="line">
+            <a:avLst/>
+          </a:prstGeom>
+          <a:ln w="47625"/>
+        </p:spPr>
+        <p:style>
+          <a:lnRef idx="1">
+            <a:schemeClr val="accent1"/>
+          </a:lnRef>
+          <a:fillRef idx="0">
+            <a:schemeClr val="accent1"/>
+          </a:fillRef>
+          <a:effectRef idx="0">
+            <a:schemeClr val="accent1"/>
+          </a:effectRef>
+          <a:fontRef idx="minor">
+            <a:schemeClr val="tx1"/>
+          </a:fontRef>
+        </p:style>
+      </p:cxnSp>
+      <p:cxnSp>
+        <p:nvCxnSpPr>
+          <p:cNvPr id="6" name="Straight Connector 5">
+            <a:extLst>
+              <a:ext uri="{FF2B5EF4-FFF2-40B4-BE49-F238E27FC236}">
+                <a16:creationId xmlns:a16="http://schemas.microsoft.com/office/drawing/2014/main" id="{807BE726-0E47-4875-8968-EF31E83DBCFA}"/>
+              </a:ext>
+            </a:extLst>
+          </p:cNvPr>
+          <p:cNvCxnSpPr>
+            <a:cxnSpLocks/>
+          </p:cNvCxnSpPr>
+          <p:nvPr/>
+        </p:nvCxnSpPr>
+        <p:spPr>
+          <a:xfrm flipH="1" flipV="1">
+            <a:off x="8337618" y="3334618"/>
+            <a:ext cx="2521819" cy="269508"/>
+          </a:xfrm>
+          <a:prstGeom prst="line">
+            <a:avLst/>
+          </a:prstGeom>
+          <a:ln w="47625"/>
+        </p:spPr>
+        <p:style>
+          <a:lnRef idx="1">
+            <a:schemeClr val="accent1"/>
+          </a:lnRef>
+          <a:fillRef idx="0">
+            <a:schemeClr val="accent1"/>
+          </a:fillRef>
+          <a:effectRef idx="0">
+            <a:schemeClr val="accent1"/>
+          </a:effectRef>
+          <a:fontRef idx="minor">
+            <a:schemeClr val="tx1"/>
+          </a:fontRef>
+        </p:style>
+      </p:cxnSp>
+      <p:cxnSp>
+        <p:nvCxnSpPr>
+          <p:cNvPr id="9" name="Straight Connector 8">
+            <a:extLst>
+              <a:ext uri="{FF2B5EF4-FFF2-40B4-BE49-F238E27FC236}">
+                <a16:creationId xmlns:a16="http://schemas.microsoft.com/office/drawing/2014/main" id="{517B5938-4E96-4F2D-9CCA-EF8E135CDDF6}"/>
+              </a:ext>
+            </a:extLst>
+          </p:cNvPr>
+          <p:cNvCxnSpPr>
+            <a:cxnSpLocks/>
+          </p:cNvCxnSpPr>
+          <p:nvPr/>
+        </p:nvCxnSpPr>
+        <p:spPr>
+          <a:xfrm>
+            <a:off x="10859437" y="3604126"/>
+            <a:ext cx="683393" cy="1953928"/>
+          </a:xfrm>
+          <a:prstGeom prst="line">
+            <a:avLst/>
+          </a:prstGeom>
+          <a:ln w="47625"/>
+        </p:spPr>
+        <p:style>
+          <a:lnRef idx="1">
+            <a:schemeClr val="accent1"/>
+          </a:lnRef>
+          <a:fillRef idx="0">
+            <a:schemeClr val="accent1"/>
+          </a:fillRef>
+          <a:effectRef idx="0">
+            <a:schemeClr val="accent1"/>
+          </a:effectRef>
+          <a:fontRef idx="minor">
+            <a:schemeClr val="tx1"/>
+          </a:fontRef>
+        </p:style>
+      </p:cxnSp>
+      <p:cxnSp>
+        <p:nvCxnSpPr>
+          <p:cNvPr id="12" name="Straight Connector 11">
+            <a:extLst>
+              <a:ext uri="{FF2B5EF4-FFF2-40B4-BE49-F238E27FC236}">
+                <a16:creationId xmlns:a16="http://schemas.microsoft.com/office/drawing/2014/main" id="{6D3D0135-D28A-41F5-AC2B-8C5E121425C6}"/>
+              </a:ext>
+            </a:extLst>
+          </p:cNvPr>
+          <p:cNvCxnSpPr>
+            <a:cxnSpLocks/>
+          </p:cNvCxnSpPr>
+          <p:nvPr/>
+        </p:nvCxnSpPr>
+        <p:spPr>
+          <a:xfrm>
+            <a:off x="7355841" y="5269296"/>
+            <a:ext cx="4186989" cy="288758"/>
+          </a:xfrm>
+          <a:prstGeom prst="line">
+            <a:avLst/>
+          </a:prstGeom>
+          <a:ln w="47625"/>
+        </p:spPr>
+        <p:style>
+          <a:lnRef idx="1">
+            <a:schemeClr val="accent1"/>
+          </a:lnRef>
+          <a:fillRef idx="0">
+            <a:schemeClr val="accent1"/>
+          </a:fillRef>
+          <a:effectRef idx="0">
+            <a:schemeClr val="accent1"/>
+          </a:effectRef>
+          <a:fontRef idx="minor">
+            <a:schemeClr val="tx1"/>
+          </a:fontRef>
+        </p:style>
+      </p:cxnSp>
+      <p:cxnSp>
+        <p:nvCxnSpPr>
+          <p:cNvPr id="15" name="Straight Connector 14">
+            <a:extLst>
+              <a:ext uri="{FF2B5EF4-FFF2-40B4-BE49-F238E27FC236}">
+                <a16:creationId xmlns:a16="http://schemas.microsoft.com/office/drawing/2014/main" id="{06BACBB1-A0AB-42E4-B501-2577BBE3AC8F}"/>
+              </a:ext>
+            </a:extLst>
+          </p:cNvPr>
+          <p:cNvCxnSpPr>
+            <a:cxnSpLocks/>
+          </p:cNvCxnSpPr>
+          <p:nvPr/>
+        </p:nvCxnSpPr>
+        <p:spPr>
+          <a:xfrm flipH="1">
+            <a:off x="8409272" y="4018012"/>
+            <a:ext cx="467363" cy="632375"/>
+          </a:xfrm>
+          <a:prstGeom prst="line">
+            <a:avLst/>
+          </a:prstGeom>
+          <a:ln w="47625"/>
+        </p:spPr>
+        <p:style>
+          <a:lnRef idx="1">
+            <a:schemeClr val="accent1"/>
+          </a:lnRef>
+          <a:fillRef idx="0">
+            <a:schemeClr val="accent1"/>
+          </a:fillRef>
+          <a:effectRef idx="0">
+            <a:schemeClr val="accent1"/>
+          </a:effectRef>
+          <a:fontRef idx="minor">
+            <a:schemeClr val="tx1"/>
+          </a:fontRef>
+        </p:style>
+      </p:cxnSp>
+      <p:cxnSp>
+        <p:nvCxnSpPr>
+          <p:cNvPr id="18" name="Straight Connector 17">
+            <a:extLst>
+              <a:ext uri="{FF2B5EF4-FFF2-40B4-BE49-F238E27FC236}">
+                <a16:creationId xmlns:a16="http://schemas.microsoft.com/office/drawing/2014/main" id="{9D8F997B-40F5-4D78-84F5-FC9FF773D0A4}"/>
+              </a:ext>
+            </a:extLst>
+          </p:cNvPr>
+          <p:cNvCxnSpPr>
+            <a:cxnSpLocks/>
+          </p:cNvCxnSpPr>
+          <p:nvPr/>
+        </p:nvCxnSpPr>
+        <p:spPr>
+          <a:xfrm flipH="1" flipV="1">
+            <a:off x="8337618" y="4720656"/>
+            <a:ext cx="2117558" cy="163630"/>
+          </a:xfrm>
+          <a:prstGeom prst="line">
+            <a:avLst/>
+          </a:prstGeom>
+          <a:ln w="47625"/>
+        </p:spPr>
+        <p:style>
+          <a:lnRef idx="1">
+            <a:schemeClr val="accent1"/>
+          </a:lnRef>
+          <a:fillRef idx="0">
+            <a:schemeClr val="accent1"/>
+          </a:fillRef>
+          <a:effectRef idx="0">
+            <a:schemeClr val="accent1"/>
+          </a:effectRef>
+          <a:fontRef idx="minor">
+            <a:schemeClr val="tx1"/>
+          </a:fontRef>
+        </p:style>
+      </p:cxnSp>
+      <p:cxnSp>
+        <p:nvCxnSpPr>
+          <p:cNvPr id="21" name="Straight Connector 20">
+            <a:extLst>
+              <a:ext uri="{FF2B5EF4-FFF2-40B4-BE49-F238E27FC236}">
+                <a16:creationId xmlns:a16="http://schemas.microsoft.com/office/drawing/2014/main" id="{BDD8294A-87C9-4F67-86D8-F91BDA4482F7}"/>
+              </a:ext>
+            </a:extLst>
+          </p:cNvPr>
+          <p:cNvCxnSpPr>
+            <a:cxnSpLocks/>
+          </p:cNvCxnSpPr>
+          <p:nvPr/>
+        </p:nvCxnSpPr>
+        <p:spPr>
+          <a:xfrm flipH="1" flipV="1">
+            <a:off x="9964287" y="3806256"/>
+            <a:ext cx="490889" cy="1078030"/>
+          </a:xfrm>
+          <a:prstGeom prst="line">
+            <a:avLst/>
+          </a:prstGeom>
+          <a:ln w="47625"/>
+        </p:spPr>
+        <p:style>
+          <a:lnRef idx="1">
+            <a:schemeClr val="accent1"/>
+          </a:lnRef>
+          <a:fillRef idx="0">
+            <a:schemeClr val="accent1"/>
+          </a:fillRef>
+          <a:effectRef idx="0">
+            <a:schemeClr val="accent1"/>
+          </a:effectRef>
+          <a:fontRef idx="minor">
+            <a:schemeClr val="tx1"/>
+          </a:fontRef>
+        </p:style>
+      </p:cxnSp>
+      <p:cxnSp>
+        <p:nvCxnSpPr>
+          <p:cNvPr id="24" name="Straight Connector 23">
+            <a:extLst>
+              <a:ext uri="{FF2B5EF4-FFF2-40B4-BE49-F238E27FC236}">
+                <a16:creationId xmlns:a16="http://schemas.microsoft.com/office/drawing/2014/main" id="{88A243F0-C029-49F9-80D0-123E1D0F1485}"/>
+              </a:ext>
+            </a:extLst>
+          </p:cNvPr>
+          <p:cNvCxnSpPr>
+            <a:cxnSpLocks/>
+          </p:cNvCxnSpPr>
+          <p:nvPr/>
+        </p:nvCxnSpPr>
+        <p:spPr>
+          <a:xfrm flipV="1">
+            <a:off x="8876633" y="3806256"/>
+            <a:ext cx="1087654" cy="211756"/>
+          </a:xfrm>
+          <a:prstGeom prst="line">
+            <a:avLst/>
+          </a:prstGeom>
+          <a:ln w="47625"/>
+        </p:spPr>
+        <p:style>
+          <a:lnRef idx="1">
+            <a:schemeClr val="accent1"/>
+          </a:lnRef>
+          <a:fillRef idx="0">
+            <a:schemeClr val="accent1"/>
+          </a:fillRef>
+          <a:effectRef idx="0">
+            <a:schemeClr val="accent1"/>
+          </a:effectRef>
+          <a:fontRef idx="minor">
+            <a:schemeClr val="tx1"/>
+          </a:fontRef>
+        </p:style>
+      </p:cxnSp>
+    </p:spTree>
+    <p:extLst>
+      <p:ext uri="{BB962C8B-B14F-4D97-AF65-F5344CB8AC3E}">
+        <p14:creationId xmlns:p14="http://schemas.microsoft.com/office/powerpoint/2010/main" val="3078877824"/>
+      </p:ext>
+    </p:extLst>
+  </p:cSld>
+  <p:clrMapOvr>
+    <a:masterClrMapping/>
+  </p:clrMapOvr>
+</p:sld>
+</file>
+
+<file path=ppt/slides/slide36.xml><?xml version="1.0" encoding="utf-8"?>
 <p:sld xmlns:a="http://schemas.openxmlformats.org/drawingml/2006/main" xmlns:r="http://schemas.openxmlformats.org/officeDocument/2006/relationships" xmlns:p="http://schemas.openxmlformats.org/presentationml/2006/main">
   <p:cSld>
     <p:spTree>
@@ -20372,7 +20809,7 @@
 </p:sld>
 </file>
 
-<file path=ppt/slides/slide36.xml><?xml version="1.0" encoding="utf-8"?>
+<file path=ppt/slides/slide37.xml><?xml version="1.0" encoding="utf-8"?>
 <p:sld xmlns:a="http://schemas.openxmlformats.org/drawingml/2006/main" xmlns:r="http://schemas.openxmlformats.org/officeDocument/2006/relationships" xmlns:p="http://schemas.openxmlformats.org/presentationml/2006/main">
   <p:cSld>
     <p:spTree>
@@ -21157,7 +21594,7 @@
 </p:sld>
 </file>
 
-<file path=ppt/slides/slide37.xml><?xml version="1.0" encoding="utf-8"?>
+<file path=ppt/slides/slide38.xml><?xml version="1.0" encoding="utf-8"?>
 <p:sld xmlns:a="http://schemas.openxmlformats.org/drawingml/2006/main" xmlns:r="http://schemas.openxmlformats.org/officeDocument/2006/relationships" xmlns:p="http://schemas.openxmlformats.org/presentationml/2006/main">
   <p:cSld>
     <p:spTree>
@@ -21267,8 +21704,8 @@
           </a:p>
         </p:txBody>
       </p:sp>
-      <mc:AlternateContent xmlns:mc="http://schemas.openxmlformats.org/markup-compatibility/2006">
-        <mc:Choice xmlns:p14="http://schemas.microsoft.com/office/powerpoint/2010/main" Requires="p14">
+      <mc:AlternateContent xmlns:mc="http://schemas.openxmlformats.org/markup-compatibility/2006" xmlns:p14="http://schemas.microsoft.com/office/powerpoint/2010/main">
+        <mc:Choice Requires="p14">
           <p:contentPart p14:bwMode="auto" r:id="rId2">
             <p14:nvContentPartPr>
               <p14:cNvPr id="4" name="Ink 3">
@@ -21287,7 +21724,7 @@
             </p14:xfrm>
           </p:contentPart>
         </mc:Choice>
-        <mc:Fallback>
+        <mc:Fallback xmlns="">
           <p:pic>
             <p:nvPicPr>
               <p:cNvPr id="4" name="Ink 3">
@@ -21712,8 +22149,8 @@
           </a:p>
         </p:txBody>
       </p:sp>
-      <mc:AlternateContent xmlns:mc="http://schemas.openxmlformats.org/markup-compatibility/2006">
-        <mc:Choice xmlns:p14="http://schemas.microsoft.com/office/powerpoint/2010/main" Requires="p14">
+      <mc:AlternateContent xmlns:mc="http://schemas.openxmlformats.org/markup-compatibility/2006" xmlns:p14="http://schemas.microsoft.com/office/powerpoint/2010/main">
+        <mc:Choice Requires="p14">
           <p:contentPart p14:bwMode="auto" r:id="rId4">
             <p14:nvContentPartPr>
               <p14:cNvPr id="36" name="Ink 35">
@@ -21732,7 +22169,7 @@
             </p14:xfrm>
           </p:contentPart>
         </mc:Choice>
-        <mc:Fallback>
+        <mc:Fallback xmlns="">
           <p:pic>
             <p:nvPicPr>
               <p:cNvPr id="36" name="Ink 35">
@@ -21763,8 +22200,8 @@
           </p:pic>
         </mc:Fallback>
       </mc:AlternateContent>
-      <mc:AlternateContent xmlns:mc="http://schemas.openxmlformats.org/markup-compatibility/2006">
-        <mc:Choice xmlns:p14="http://schemas.microsoft.com/office/powerpoint/2010/main" Requires="p14">
+      <mc:AlternateContent xmlns:mc="http://schemas.openxmlformats.org/markup-compatibility/2006" xmlns:p14="http://schemas.microsoft.com/office/powerpoint/2010/main">
+        <mc:Choice Requires="p14">
           <p:contentPart p14:bwMode="auto" r:id="rId6">
             <p14:nvContentPartPr>
               <p14:cNvPr id="43" name="Ink 42">
@@ -21783,7 +22220,7 @@
             </p14:xfrm>
           </p:contentPart>
         </mc:Choice>
-        <mc:Fallback>
+        <mc:Fallback xmlns="">
           <p:pic>
             <p:nvPicPr>
               <p:cNvPr id="43" name="Ink 42">
@@ -21814,8 +22251,8 @@
           </p:pic>
         </mc:Fallback>
       </mc:AlternateContent>
-      <mc:AlternateContent xmlns:mc="http://schemas.openxmlformats.org/markup-compatibility/2006">
-        <mc:Choice xmlns:p14="http://schemas.microsoft.com/office/powerpoint/2010/main" Requires="p14">
+      <mc:AlternateContent xmlns:mc="http://schemas.openxmlformats.org/markup-compatibility/2006" xmlns:p14="http://schemas.microsoft.com/office/powerpoint/2010/main">
+        <mc:Choice Requires="p14">
           <p:contentPart p14:bwMode="auto" r:id="rId8">
             <p14:nvContentPartPr>
               <p14:cNvPr id="5" name="Ink 4">
@@ -21834,7 +22271,7 @@
             </p14:xfrm>
           </p:contentPart>
         </mc:Choice>
-        <mc:Fallback>
+        <mc:Fallback xmlns="">
           <p:pic>
             <p:nvPicPr>
               <p:cNvPr id="5" name="Ink 4">
@@ -21878,7 +22315,7 @@
 </p:sld>
 </file>
 
-<file path=ppt/slides/slide38.xml><?xml version="1.0" encoding="utf-8"?>
+<file path=ppt/slides/slide39.xml><?xml version="1.0" encoding="utf-8"?>
 <p:sld xmlns:a="http://schemas.openxmlformats.org/drawingml/2006/main" xmlns:r="http://schemas.openxmlformats.org/officeDocument/2006/relationships" xmlns:p="http://schemas.openxmlformats.org/presentationml/2006/main">
   <p:cSld>
     <p:spTree>
@@ -22042,8 +22479,8 @@
           </a:p>
         </p:txBody>
       </p:sp>
-      <mc:AlternateContent xmlns:mc="http://schemas.openxmlformats.org/markup-compatibility/2006">
-        <mc:Choice xmlns:p14="http://schemas.microsoft.com/office/powerpoint/2010/main" Requires="p14">
+      <mc:AlternateContent xmlns:mc="http://schemas.openxmlformats.org/markup-compatibility/2006" xmlns:p14="http://schemas.microsoft.com/office/powerpoint/2010/main">
+        <mc:Choice Requires="p14">
           <p:contentPart p14:bwMode="auto" r:id="rId2">
             <p14:nvContentPartPr>
               <p14:cNvPr id="4" name="Ink 3">
@@ -22062,7 +22499,7 @@
             </p14:xfrm>
           </p:contentPart>
         </mc:Choice>
-        <mc:Fallback>
+        <mc:Fallback xmlns="">
           <p:pic>
             <p:nvPicPr>
               <p:cNvPr id="4" name="Ink 3">
@@ -22487,8 +22924,8 @@
           </a:p>
         </p:txBody>
       </p:sp>
-      <mc:AlternateContent xmlns:mc="http://schemas.openxmlformats.org/markup-compatibility/2006">
-        <mc:Choice xmlns:p14="http://schemas.microsoft.com/office/powerpoint/2010/main" Requires="p14">
+      <mc:AlternateContent xmlns:mc="http://schemas.openxmlformats.org/markup-compatibility/2006" xmlns:p14="http://schemas.microsoft.com/office/powerpoint/2010/main">
+        <mc:Choice Requires="p14">
           <p:contentPart p14:bwMode="auto" r:id="rId4">
             <p14:nvContentPartPr>
               <p14:cNvPr id="36" name="Ink 35">
@@ -22507,7 +22944,7 @@
             </p14:xfrm>
           </p:contentPart>
         </mc:Choice>
-        <mc:Fallback>
+        <mc:Fallback xmlns="">
           <p:pic>
             <p:nvPicPr>
               <p:cNvPr id="36" name="Ink 35">
@@ -22538,8 +22975,8 @@
           </p:pic>
         </mc:Fallback>
       </mc:AlternateContent>
-      <mc:AlternateContent xmlns:mc="http://schemas.openxmlformats.org/markup-compatibility/2006">
-        <mc:Choice xmlns:p14="http://schemas.microsoft.com/office/powerpoint/2010/main" Requires="p14">
+      <mc:AlternateContent xmlns:mc="http://schemas.openxmlformats.org/markup-compatibility/2006" xmlns:p14="http://schemas.microsoft.com/office/powerpoint/2010/main">
+        <mc:Choice Requires="p14">
           <p:contentPart p14:bwMode="auto" r:id="rId6">
             <p14:nvContentPartPr>
               <p14:cNvPr id="43" name="Ink 42">
@@ -22558,7 +22995,7 @@
             </p14:xfrm>
           </p:contentPart>
         </mc:Choice>
-        <mc:Fallback>
+        <mc:Fallback xmlns="">
           <p:pic>
             <p:nvPicPr>
               <p:cNvPr id="43" name="Ink 42">
@@ -22589,8 +23026,8 @@
           </p:pic>
         </mc:Fallback>
       </mc:AlternateContent>
-      <mc:AlternateContent xmlns:mc="http://schemas.openxmlformats.org/markup-compatibility/2006">
-        <mc:Choice xmlns:p14="http://schemas.microsoft.com/office/powerpoint/2010/main" Requires="p14">
+      <mc:AlternateContent xmlns:mc="http://schemas.openxmlformats.org/markup-compatibility/2006" xmlns:p14="http://schemas.microsoft.com/office/powerpoint/2010/main">
+        <mc:Choice Requires="p14">
           <p:contentPart p14:bwMode="auto" r:id="rId8">
             <p14:nvContentPartPr>
               <p14:cNvPr id="5" name="Ink 4">
@@ -22609,7 +23046,7 @@
             </p14:xfrm>
           </p:contentPart>
         </mc:Choice>
-        <mc:Fallback>
+        <mc:Fallback xmlns="">
           <p:pic>
             <p:nvPicPr>
               <p:cNvPr id="5" name="Ink 4">
@@ -22653,7 +23090,576 @@
 </p:sld>
 </file>
 
-<file path=ppt/slides/slide39.xml><?xml version="1.0" encoding="utf-8"?>
+<file path=ppt/slides/slide4.xml><?xml version="1.0" encoding="utf-8"?>
+<p:sld xmlns:a="http://schemas.openxmlformats.org/drawingml/2006/main" xmlns:r="http://schemas.openxmlformats.org/officeDocument/2006/relationships" xmlns:p="http://schemas.openxmlformats.org/presentationml/2006/main">
+  <p:cSld>
+    <p:spTree>
+      <p:nvGrpSpPr>
+        <p:cNvPr id="1" name=""/>
+        <p:cNvGrpSpPr/>
+        <p:nvPr/>
+      </p:nvGrpSpPr>
+      <p:grpSpPr>
+        <a:xfrm>
+          <a:off x="0" y="0"/>
+          <a:ext cx="0" cy="0"/>
+          <a:chOff x="0" y="0"/>
+          <a:chExt cx="0" cy="0"/>
+        </a:xfrm>
+      </p:grpSpPr>
+      <p:sp>
+        <p:nvSpPr>
+          <p:cNvPr id="2" name="Title 1">
+            <a:extLst>
+              <a:ext uri="{FF2B5EF4-FFF2-40B4-BE49-F238E27FC236}">
+                <a16:creationId xmlns:a16="http://schemas.microsoft.com/office/drawing/2014/main" id="{8C7DDBE8-36CC-4927-9870-E0F8CEA9D030}"/>
+              </a:ext>
+            </a:extLst>
+          </p:cNvPr>
+          <p:cNvSpPr>
+            <a:spLocks noGrp="1"/>
+          </p:cNvSpPr>
+          <p:nvPr>
+            <p:ph type="title"/>
+          </p:nvPr>
+        </p:nvSpPr>
+        <p:spPr>
+          <a:xfrm>
+            <a:off x="838200" y="618266"/>
+            <a:ext cx="10515600" cy="1325563"/>
+          </a:xfrm>
+        </p:spPr>
+        <p:txBody>
+          <a:bodyPr>
+            <a:normAutofit fontScale="90000"/>
+          </a:bodyPr>
+          <a:lstStyle/>
+          <a:p>
+            <a:r>
+              <a:rPr lang="en-US" dirty="0"/>
+              <a:t>A demonstration script exists that shows most of the functionality in this document:</a:t>
+            </a:r>
+            <a:br>
+              <a:rPr lang="en-US" dirty="0"/>
+            </a:br>
+            <a:r>
+              <a:rPr lang="en-US" dirty="0" err="1">
+                <a:solidFill>
+                  <a:srgbClr val="028009"/>
+                </a:solidFill>
+                <a:latin typeface="Courier New" panose="02070309020205020404" pitchFamily="49" charset="0"/>
+              </a:rPr>
+              <a:t>script_demo_MapGenLibrary</a:t>
+            </a:r>
+            <a:br>
+              <a:rPr lang="en-US" dirty="0">
+                <a:solidFill>
+                  <a:srgbClr val="028009"/>
+                </a:solidFill>
+                <a:latin typeface="Courier New" panose="02070309020205020404" pitchFamily="49" charset="0"/>
+              </a:rPr>
+            </a:br>
+            <a:endParaRPr lang="en-US" dirty="0"/>
+          </a:p>
+        </p:txBody>
+      </p:sp>
+      <p:sp>
+        <p:nvSpPr>
+          <p:cNvPr id="4" name="Rectangle 3">
+            <a:extLst>
+              <a:ext uri="{FF2B5EF4-FFF2-40B4-BE49-F238E27FC236}">
+                <a16:creationId xmlns:a16="http://schemas.microsoft.com/office/drawing/2014/main" id="{ED6B6C78-C512-4D1D-90D5-01BF838E0A27}"/>
+              </a:ext>
+            </a:extLst>
+          </p:cNvPr>
+          <p:cNvSpPr/>
+          <p:nvPr/>
+        </p:nvSpPr>
+        <p:spPr>
+          <a:xfrm>
+            <a:off x="374433" y="2022133"/>
+            <a:ext cx="5909136" cy="2446824"/>
+          </a:xfrm>
+          <a:prstGeom prst="rect">
+            <a:avLst/>
+          </a:prstGeom>
+          <a:solidFill>
+            <a:schemeClr val="accent4">
+              <a:lumMod val="20000"/>
+              <a:lumOff val="80000"/>
+            </a:schemeClr>
+          </a:solidFill>
+        </p:spPr>
+        <p:txBody>
+          <a:bodyPr wrap="square">
+            <a:spAutoFit/>
+          </a:bodyPr>
+          <a:lstStyle/>
+          <a:p>
+            <a:r>
+              <a:rPr lang="en-US" sz="900" dirty="0">
+                <a:solidFill>
+                  <a:srgbClr val="028009"/>
+                </a:solidFill>
+                <a:latin typeface="Courier New" panose="02070309020205020404" pitchFamily="49" charset="0"/>
+              </a:rPr>
+              <a:t>%% Show how inputs are checked</a:t>
+            </a:r>
+          </a:p>
+          <a:p>
+            <a:r>
+              <a:rPr lang="en-US" sz="900" dirty="0" err="1">
+                <a:solidFill>
+                  <a:srgbClr val="000000"/>
+                </a:solidFill>
+                <a:latin typeface="Courier New" panose="02070309020205020404" pitchFamily="49" charset="0"/>
+              </a:rPr>
+              <a:t>Twocolumn_of_numbers_test</a:t>
+            </a:r>
+            <a:r>
+              <a:rPr lang="en-US" sz="900" dirty="0">
+                <a:solidFill>
+                  <a:srgbClr val="000000"/>
+                </a:solidFill>
+                <a:latin typeface="Courier New" panose="02070309020205020404" pitchFamily="49" charset="0"/>
+              </a:rPr>
+              <a:t> = [4 1; 3 0; 2 5];</a:t>
+            </a:r>
+          </a:p>
+          <a:p>
+            <a:r>
+              <a:rPr lang="en-US" sz="900" dirty="0" err="1">
+                <a:solidFill>
+                  <a:srgbClr val="000000"/>
+                </a:solidFill>
+                <a:latin typeface="Courier New" panose="02070309020205020404" pitchFamily="49" charset="0"/>
+              </a:rPr>
+              <a:t>fcn_MapGen_checkInputsToFunctions</a:t>
+            </a:r>
+            <a:r>
+              <a:rPr lang="en-US" sz="900" dirty="0">
+                <a:solidFill>
+                  <a:srgbClr val="000000"/>
+                </a:solidFill>
+                <a:latin typeface="Courier New" panose="02070309020205020404" pitchFamily="49" charset="0"/>
+              </a:rPr>
+              <a:t>(</a:t>
+            </a:r>
+            <a:r>
+              <a:rPr lang="en-US" sz="900" dirty="0" err="1">
+                <a:solidFill>
+                  <a:srgbClr val="000000"/>
+                </a:solidFill>
+                <a:latin typeface="Courier New" panose="02070309020205020404" pitchFamily="49" charset="0"/>
+              </a:rPr>
+              <a:t>Twocolumn_of_numbers_test</a:t>
+            </a:r>
+            <a:r>
+              <a:rPr lang="en-US" sz="900" dirty="0">
+                <a:solidFill>
+                  <a:srgbClr val="000000"/>
+                </a:solidFill>
+                <a:latin typeface="Courier New" panose="02070309020205020404" pitchFamily="49" charset="0"/>
+              </a:rPr>
+              <a:t>, </a:t>
+            </a:r>
+            <a:r>
+              <a:rPr lang="en-US" sz="900" dirty="0">
+                <a:solidFill>
+                  <a:srgbClr val="AA04F9"/>
+                </a:solidFill>
+                <a:latin typeface="Courier New" panose="02070309020205020404" pitchFamily="49" charset="0"/>
+              </a:rPr>
+              <a:t>'2column_of_numbers'</a:t>
+            </a:r>
+            <a:r>
+              <a:rPr lang="en-US" sz="900" dirty="0">
+                <a:solidFill>
+                  <a:srgbClr val="000000"/>
+                </a:solidFill>
+                <a:latin typeface="Courier New" panose="02070309020205020404" pitchFamily="49" charset="0"/>
+              </a:rPr>
+              <a:t>);</a:t>
+            </a:r>
+          </a:p>
+          <a:p>
+            <a:r>
+              <a:rPr lang="en-US" sz="900" dirty="0">
+                <a:solidFill>
+                  <a:srgbClr val="000000"/>
+                </a:solidFill>
+                <a:latin typeface="Courier New" panose="02070309020205020404" pitchFamily="49" charset="0"/>
+              </a:rPr>
+              <a:t> </a:t>
+            </a:r>
+          </a:p>
+          <a:p>
+            <a:r>
+              <a:rPr lang="en-US" sz="900" dirty="0">
+                <a:solidFill>
+                  <a:srgbClr val="000000"/>
+                </a:solidFill>
+                <a:latin typeface="Courier New" panose="02070309020205020404" pitchFamily="49" charset="0"/>
+              </a:rPr>
+              <a:t> </a:t>
+            </a:r>
+          </a:p>
+          <a:p>
+            <a:r>
+              <a:rPr lang="en-US" sz="900" dirty="0">
+                <a:solidFill>
+                  <a:srgbClr val="028009"/>
+                </a:solidFill>
+                <a:latin typeface="Courier New" panose="02070309020205020404" pitchFamily="49" charset="0"/>
+              </a:rPr>
+              <a:t>%% Generate a set of polytopes from various pseudo-random sources</a:t>
+            </a:r>
+          </a:p>
+          <a:p>
+            <a:r>
+              <a:rPr lang="en-US" sz="900" dirty="0">
+                <a:solidFill>
+                  <a:srgbClr val="028009"/>
+                </a:solidFill>
+                <a:latin typeface="Courier New" panose="02070309020205020404" pitchFamily="49" charset="0"/>
+              </a:rPr>
+              <a:t>% Generate a set of polytopes from the </a:t>
+            </a:r>
+            <a:r>
+              <a:rPr lang="en-US" sz="900" dirty="0" err="1">
+                <a:solidFill>
+                  <a:srgbClr val="028009"/>
+                </a:solidFill>
+                <a:latin typeface="Courier New" panose="02070309020205020404" pitchFamily="49" charset="0"/>
+              </a:rPr>
+              <a:t>Sobol</a:t>
+            </a:r>
+            <a:r>
+              <a:rPr lang="en-US" sz="900" dirty="0">
+                <a:solidFill>
+                  <a:srgbClr val="028009"/>
+                </a:solidFill>
+                <a:latin typeface="Courier New" panose="02070309020205020404" pitchFamily="49" charset="0"/>
+              </a:rPr>
+              <a:t> set</a:t>
+            </a:r>
+          </a:p>
+          <a:p>
+            <a:r>
+              <a:rPr lang="en-US" sz="900" dirty="0" err="1">
+                <a:solidFill>
+                  <a:srgbClr val="000000"/>
+                </a:solidFill>
+                <a:latin typeface="Courier New" panose="02070309020205020404" pitchFamily="49" charset="0"/>
+              </a:rPr>
+              <a:t>fig_num</a:t>
+            </a:r>
+            <a:r>
+              <a:rPr lang="en-US" sz="900" dirty="0">
+                <a:solidFill>
+                  <a:srgbClr val="000000"/>
+                </a:solidFill>
+                <a:latin typeface="Courier New" panose="02070309020205020404" pitchFamily="49" charset="0"/>
+              </a:rPr>
+              <a:t> = 11;</a:t>
+            </a:r>
+          </a:p>
+          <a:p>
+            <a:r>
+              <a:rPr lang="en-US" sz="900" dirty="0" err="1">
+                <a:solidFill>
+                  <a:srgbClr val="000000"/>
+                </a:solidFill>
+                <a:latin typeface="Courier New" panose="02070309020205020404" pitchFamily="49" charset="0"/>
+              </a:rPr>
+              <a:t>Sobol_range</a:t>
+            </a:r>
+            <a:r>
+              <a:rPr lang="en-US" sz="900" dirty="0">
+                <a:solidFill>
+                  <a:srgbClr val="000000"/>
+                </a:solidFill>
+                <a:latin typeface="Courier New" panose="02070309020205020404" pitchFamily="49" charset="0"/>
+              </a:rPr>
+              <a:t> = [1 1000]; </a:t>
+            </a:r>
+            <a:r>
+              <a:rPr lang="en-US" sz="900" dirty="0">
+                <a:solidFill>
+                  <a:srgbClr val="028009"/>
+                </a:solidFill>
+                <a:latin typeface="Courier New" panose="02070309020205020404" pitchFamily="49" charset="0"/>
+              </a:rPr>
+              <a:t>% range of </a:t>
+            </a:r>
+            <a:r>
+              <a:rPr lang="en-US" sz="900" dirty="0" err="1">
+                <a:solidFill>
+                  <a:srgbClr val="028009"/>
+                </a:solidFill>
+                <a:latin typeface="Courier New" panose="02070309020205020404" pitchFamily="49" charset="0"/>
+              </a:rPr>
+              <a:t>Sobol</a:t>
+            </a:r>
+            <a:r>
+              <a:rPr lang="en-US" sz="900" dirty="0">
+                <a:solidFill>
+                  <a:srgbClr val="028009"/>
+                </a:solidFill>
+                <a:latin typeface="Courier New" panose="02070309020205020404" pitchFamily="49" charset="0"/>
+              </a:rPr>
+              <a:t> points to use to generate the tiling</a:t>
+            </a:r>
+          </a:p>
+          <a:p>
+            <a:r>
+              <a:rPr lang="en-US" sz="900" dirty="0" err="1">
+                <a:solidFill>
+                  <a:srgbClr val="000000"/>
+                </a:solidFill>
+                <a:latin typeface="Courier New" panose="02070309020205020404" pitchFamily="49" charset="0"/>
+              </a:rPr>
+              <a:t>tiled_polytopes</a:t>
+            </a:r>
+            <a:r>
+              <a:rPr lang="en-US" sz="900" dirty="0">
+                <a:solidFill>
+                  <a:srgbClr val="000000"/>
+                </a:solidFill>
+                <a:latin typeface="Courier New" panose="02070309020205020404" pitchFamily="49" charset="0"/>
+              </a:rPr>
+              <a:t> = </a:t>
+            </a:r>
+            <a:r>
+              <a:rPr lang="en-US" sz="900" dirty="0" err="1">
+                <a:solidFill>
+                  <a:srgbClr val="000000"/>
+                </a:solidFill>
+                <a:latin typeface="Courier New" panose="02070309020205020404" pitchFamily="49" charset="0"/>
+              </a:rPr>
+              <a:t>fcn_MapGen_sobolVoronoiTiling</a:t>
+            </a:r>
+            <a:r>
+              <a:rPr lang="en-US" sz="900" dirty="0">
+                <a:solidFill>
+                  <a:srgbClr val="000000"/>
+                </a:solidFill>
+                <a:latin typeface="Courier New" panose="02070309020205020404" pitchFamily="49" charset="0"/>
+              </a:rPr>
+              <a:t>(</a:t>
+            </a:r>
+            <a:r>
+              <a:rPr lang="en-US" sz="900" dirty="0" err="1">
+                <a:solidFill>
+                  <a:srgbClr val="000000"/>
+                </a:solidFill>
+                <a:latin typeface="Courier New" panose="02070309020205020404" pitchFamily="49" charset="0"/>
+              </a:rPr>
+              <a:t>Sobol_range</a:t>
+            </a:r>
+            <a:r>
+              <a:rPr lang="en-US" sz="900" dirty="0">
+                <a:solidFill>
+                  <a:srgbClr val="000000"/>
+                </a:solidFill>
+                <a:latin typeface="Courier New" panose="02070309020205020404" pitchFamily="49" charset="0"/>
+              </a:rPr>
+              <a:t>,[1 1],</a:t>
+            </a:r>
+            <a:r>
+              <a:rPr lang="en-US" sz="900" dirty="0" err="1">
+                <a:solidFill>
+                  <a:srgbClr val="000000"/>
+                </a:solidFill>
+                <a:latin typeface="Courier New" panose="02070309020205020404" pitchFamily="49" charset="0"/>
+              </a:rPr>
+              <a:t>fig_num</a:t>
+            </a:r>
+            <a:r>
+              <a:rPr lang="en-US" sz="900" dirty="0">
+                <a:solidFill>
+                  <a:srgbClr val="000000"/>
+                </a:solidFill>
+                <a:latin typeface="Courier New" panose="02070309020205020404" pitchFamily="49" charset="0"/>
+              </a:rPr>
+              <a:t>);</a:t>
+            </a:r>
+          </a:p>
+          <a:p>
+            <a:r>
+              <a:rPr lang="en-US" sz="900" dirty="0">
+                <a:solidFill>
+                  <a:srgbClr val="000000"/>
+                </a:solidFill>
+                <a:latin typeface="Courier New" panose="02070309020205020404" pitchFamily="49" charset="0"/>
+              </a:rPr>
+              <a:t> </a:t>
+            </a:r>
+          </a:p>
+          <a:p>
+            <a:r>
+              <a:rPr lang="en-US" sz="900" dirty="0">
+                <a:solidFill>
+                  <a:srgbClr val="000000"/>
+                </a:solidFill>
+                <a:latin typeface="Courier New" panose="02070309020205020404" pitchFamily="49" charset="0"/>
+              </a:rPr>
+              <a:t> </a:t>
+            </a:r>
+          </a:p>
+          <a:p>
+            <a:r>
+              <a:rPr lang="en-US" sz="900" dirty="0">
+                <a:solidFill>
+                  <a:srgbClr val="028009"/>
+                </a:solidFill>
+                <a:latin typeface="Courier New" panose="02070309020205020404" pitchFamily="49" charset="0"/>
+              </a:rPr>
+              <a:t>% Generate a set of polytopes from the Halton set</a:t>
+            </a:r>
+          </a:p>
+          <a:p>
+            <a:r>
+              <a:rPr lang="en-US" sz="900" dirty="0" err="1">
+                <a:solidFill>
+                  <a:srgbClr val="000000"/>
+                </a:solidFill>
+                <a:latin typeface="Courier New" panose="02070309020205020404" pitchFamily="49" charset="0"/>
+              </a:rPr>
+              <a:t>fig_num</a:t>
+            </a:r>
+            <a:r>
+              <a:rPr lang="en-US" sz="900" dirty="0">
+                <a:solidFill>
+                  <a:srgbClr val="000000"/>
+                </a:solidFill>
+                <a:latin typeface="Courier New" panose="02070309020205020404" pitchFamily="49" charset="0"/>
+              </a:rPr>
+              <a:t> = 12;</a:t>
+            </a:r>
+          </a:p>
+          <a:p>
+            <a:r>
+              <a:rPr lang="en-US" sz="900" dirty="0" err="1">
+                <a:solidFill>
+                  <a:srgbClr val="000000"/>
+                </a:solidFill>
+                <a:latin typeface="Courier New" panose="02070309020205020404" pitchFamily="49" charset="0"/>
+              </a:rPr>
+              <a:t>Halton_range</a:t>
+            </a:r>
+            <a:r>
+              <a:rPr lang="en-US" sz="900" dirty="0">
+                <a:solidFill>
+                  <a:srgbClr val="000000"/>
+                </a:solidFill>
+                <a:latin typeface="Courier New" panose="02070309020205020404" pitchFamily="49" charset="0"/>
+              </a:rPr>
+              <a:t> = [1 1000]; </a:t>
+            </a:r>
+            <a:r>
+              <a:rPr lang="en-US" sz="900" dirty="0">
+                <a:solidFill>
+                  <a:srgbClr val="028009"/>
+                </a:solidFill>
+                <a:latin typeface="Courier New" panose="02070309020205020404" pitchFamily="49" charset="0"/>
+              </a:rPr>
+              <a:t>% range of Halton points to use to generate the tiling</a:t>
+            </a:r>
+          </a:p>
+          <a:p>
+            <a:r>
+              <a:rPr lang="en-US" sz="900" dirty="0" err="1">
+                <a:solidFill>
+                  <a:srgbClr val="000000"/>
+                </a:solidFill>
+                <a:latin typeface="Courier New" panose="02070309020205020404" pitchFamily="49" charset="0"/>
+              </a:rPr>
+              <a:t>tiled_polytopes</a:t>
+            </a:r>
+            <a:r>
+              <a:rPr lang="en-US" sz="900" dirty="0">
+                <a:solidFill>
+                  <a:srgbClr val="000000"/>
+                </a:solidFill>
+                <a:latin typeface="Courier New" panose="02070309020205020404" pitchFamily="49" charset="0"/>
+              </a:rPr>
+              <a:t> = </a:t>
+            </a:r>
+            <a:r>
+              <a:rPr lang="en-US" sz="900" dirty="0" err="1">
+                <a:solidFill>
+                  <a:srgbClr val="000000"/>
+                </a:solidFill>
+                <a:latin typeface="Courier New" panose="02070309020205020404" pitchFamily="49" charset="0"/>
+              </a:rPr>
+              <a:t>fcn_MapGen_haltonVoronoiTiling</a:t>
+            </a:r>
+            <a:r>
+              <a:rPr lang="en-US" sz="900" dirty="0">
+                <a:solidFill>
+                  <a:srgbClr val="000000"/>
+                </a:solidFill>
+                <a:latin typeface="Courier New" panose="02070309020205020404" pitchFamily="49" charset="0"/>
+              </a:rPr>
+              <a:t>(</a:t>
+            </a:r>
+            <a:r>
+              <a:rPr lang="en-US" sz="900" dirty="0" err="1">
+                <a:solidFill>
+                  <a:srgbClr val="000000"/>
+                </a:solidFill>
+                <a:latin typeface="Courier New" panose="02070309020205020404" pitchFamily="49" charset="0"/>
+              </a:rPr>
+              <a:t>Halton_range</a:t>
+            </a:r>
+            <a:r>
+              <a:rPr lang="en-US" sz="900" dirty="0">
+                <a:solidFill>
+                  <a:srgbClr val="000000"/>
+                </a:solidFill>
+                <a:latin typeface="Courier New" panose="02070309020205020404" pitchFamily="49" charset="0"/>
+              </a:rPr>
+              <a:t>,[1 1],</a:t>
+            </a:r>
+            <a:r>
+              <a:rPr lang="en-US" sz="900" dirty="0" err="1">
+                <a:solidFill>
+                  <a:srgbClr val="000000"/>
+                </a:solidFill>
+                <a:latin typeface="Courier New" panose="02070309020205020404" pitchFamily="49" charset="0"/>
+              </a:rPr>
+              <a:t>fig_num</a:t>
+            </a:r>
+            <a:r>
+              <a:rPr lang="en-US" sz="900" dirty="0">
+                <a:solidFill>
+                  <a:srgbClr val="000000"/>
+                </a:solidFill>
+                <a:latin typeface="Courier New" panose="02070309020205020404" pitchFamily="49" charset="0"/>
+              </a:rPr>
+              <a:t>);</a:t>
+            </a:r>
+          </a:p>
+          <a:p>
+            <a:endParaRPr lang="en-US" sz="900" dirty="0"/>
+          </a:p>
+        </p:txBody>
+      </p:sp>
+    </p:spTree>
+    <p:extLst>
+      <p:ext uri="{BB962C8B-B14F-4D97-AF65-F5344CB8AC3E}">
+        <p14:creationId xmlns:p14="http://schemas.microsoft.com/office/powerpoint/2010/main" val="3684799925"/>
+      </p:ext>
+    </p:extLst>
+  </p:cSld>
+  <p:clrMapOvr>
+    <a:masterClrMapping/>
+  </p:clrMapOvr>
+</p:sld>
+</file>
+
+<file path=ppt/slides/slide40.xml><?xml version="1.0" encoding="utf-8"?>
 <p:sld xmlns:a="http://schemas.openxmlformats.org/drawingml/2006/main" xmlns:r="http://schemas.openxmlformats.org/officeDocument/2006/relationships" xmlns:p="http://schemas.openxmlformats.org/presentationml/2006/main">
   <p:cSld>
     <p:spTree>
@@ -22794,7 +23800,7 @@
                 <a:ea typeface="+mn-ea"/>
                 <a:cs typeface="+mn-cs"/>
               </a:rPr>
-              <a:t>The inserted sequence is:</a:t>
+              <a:t>The sequence after insertions is:</a:t>
             </a:r>
           </a:p>
           <a:p>
@@ -22861,8 +23867,8 @@
           </a:p>
         </p:txBody>
       </p:sp>
-      <mc:AlternateContent xmlns:mc="http://schemas.openxmlformats.org/markup-compatibility/2006">
-        <mc:Choice xmlns:p14="http://schemas.microsoft.com/office/powerpoint/2010/main" Requires="p14">
+      <mc:AlternateContent xmlns:mc="http://schemas.openxmlformats.org/markup-compatibility/2006" xmlns:p14="http://schemas.microsoft.com/office/powerpoint/2010/main">
+        <mc:Choice Requires="p14">
           <p:contentPart p14:bwMode="auto" r:id="rId2">
             <p14:nvContentPartPr>
               <p14:cNvPr id="9" name="Ink 8">
@@ -22881,7 +23887,7 @@
             </p14:xfrm>
           </p:contentPart>
         </mc:Choice>
-        <mc:Fallback>
+        <mc:Fallback xmlns="">
           <p:pic>
             <p:nvPicPr>
               <p:cNvPr id="9" name="Ink 8">
@@ -22963,8 +23969,8 @@
           </p:pic>
         </mc:Fallback>
       </mc:AlternateContent>
-      <mc:AlternateContent xmlns:mc="http://schemas.openxmlformats.org/markup-compatibility/2006">
-        <mc:Choice xmlns:p14="http://schemas.microsoft.com/office/powerpoint/2010/main" Requires="p14">
+      <mc:AlternateContent xmlns:mc="http://schemas.openxmlformats.org/markup-compatibility/2006" xmlns:p14="http://schemas.microsoft.com/office/powerpoint/2010/main">
+        <mc:Choice Requires="p14">
           <p:contentPart p14:bwMode="auto" r:id="rId6">
             <p14:nvContentPartPr>
               <p14:cNvPr id="13" name="Ink 12">
@@ -22983,7 +23989,7 @@
             </p14:xfrm>
           </p:contentPart>
         </mc:Choice>
-        <mc:Fallback>
+        <mc:Fallback xmlns="">
           <p:pic>
             <p:nvPicPr>
               <p:cNvPr id="13" name="Ink 12">
@@ -23029,8 +24035,8 @@
               <p14:nvPr/>
             </p14:nvContentPartPr>
             <p14:xfrm>
-              <a:off x="6498555" y="3068760"/>
-              <a:ext cx="415080" cy="1981800"/>
+              <a:off x="6180360" y="3068760"/>
+              <a:ext cx="733275" cy="815183"/>
             </p14:xfrm>
           </p:contentPart>
         </mc:Choice>
@@ -23055,8 +24061,8 @@
             </p:blipFill>
             <p:spPr>
               <a:xfrm>
-                <a:off x="6492435" y="3062640"/>
-                <a:ext cx="427320" cy="1994040"/>
+                <a:off x="6174237" y="3062642"/>
+                <a:ext cx="745520" cy="827420"/>
               </a:xfrm>
               <a:prstGeom prst="rect">
                 <a:avLst/>
@@ -23065,8 +24071,8 @@
           </p:pic>
         </mc:Fallback>
       </mc:AlternateContent>
-      <mc:AlternateContent xmlns:mc="http://schemas.openxmlformats.org/markup-compatibility/2006">
-        <mc:Choice xmlns:p14="http://schemas.microsoft.com/office/powerpoint/2010/main" Requires="p14">
+      <mc:AlternateContent xmlns:mc="http://schemas.openxmlformats.org/markup-compatibility/2006" xmlns:p14="http://schemas.microsoft.com/office/powerpoint/2010/main">
+        <mc:Choice Requires="p14">
           <p:contentPart p14:bwMode="auto" r:id="rId10">
             <p14:nvContentPartPr>
               <p14:cNvPr id="21" name="Ink 20">
@@ -23085,7 +24091,7 @@
             </p14:xfrm>
           </p:contentPart>
         </mc:Choice>
-        <mc:Fallback>
+        <mc:Fallback xmlns="">
           <p:pic>
             <p:nvPicPr>
               <p:cNvPr id="21" name="Ink 20">
@@ -23130,9 +24136,9 @@
               <p14:cNvContentPartPr/>
               <p14:nvPr/>
             </p14:nvContentPartPr>
-            <p14:xfrm>
-              <a:off x="6528075" y="3555840"/>
-              <a:ext cx="859680" cy="1481760"/>
+            <p14:xfrm flipV="1">
+              <a:off x="6180360" y="3883943"/>
+              <a:ext cx="945951" cy="690293"/>
             </p14:xfrm>
           </p:contentPart>
         </mc:Choice>
@@ -23156,9 +24162,9 @@
               </a:stretch>
             </p:blipFill>
             <p:spPr>
-              <a:xfrm>
-                <a:off x="6521955" y="3549720"/>
-                <a:ext cx="871920" cy="1494000"/>
+              <a:xfrm flipV="1">
+                <a:off x="6174241" y="3877825"/>
+                <a:ext cx="958189" cy="702530"/>
               </a:xfrm>
               <a:prstGeom prst="rect">
                 <a:avLst/>
@@ -23182,8 +24188,8 @@
               <p14:nvPr/>
             </p14:nvContentPartPr>
             <p14:xfrm>
-              <a:off x="7416915" y="3500760"/>
-              <a:ext cx="656640" cy="51120"/>
+              <a:off x="7142419" y="3094613"/>
+              <a:ext cx="131660" cy="1479623"/>
             </p14:xfrm>
           </p:contentPart>
         </mc:Choice>
@@ -23208,8 +24214,8 @@
             </p:blipFill>
             <p:spPr>
               <a:xfrm>
-                <a:off x="7410795" y="3494640"/>
-                <a:ext cx="668880" cy="63360"/>
+                <a:off x="7136320" y="3088494"/>
+                <a:ext cx="143857" cy="1491860"/>
               </a:xfrm>
               <a:prstGeom prst="rect">
                 <a:avLst/>
@@ -23232,9 +24238,9 @@
               <p14:cNvContentPartPr/>
               <p14:nvPr/>
             </p14:nvContentPartPr>
-            <p14:xfrm>
-              <a:off x="7831995" y="3505080"/>
-              <a:ext cx="258480" cy="948600"/>
+            <p14:xfrm flipH="1">
+              <a:off x="7282083" y="3094613"/>
+              <a:ext cx="549912" cy="1359067"/>
             </p14:xfrm>
           </p:contentPart>
         </mc:Choice>
@@ -23258,9 +24264,9 @@
               </a:stretch>
             </p:blipFill>
             <p:spPr>
-              <a:xfrm>
-                <a:off x="7825875" y="3498600"/>
-                <a:ext cx="270720" cy="960840"/>
+              <a:xfrm flipH="1">
+                <a:off x="7275957" y="3088493"/>
+                <a:ext cx="562164" cy="1371308"/>
               </a:xfrm>
               <a:prstGeom prst="rect">
                 <a:avLst/>
@@ -23269,8 +24275,8 @@
           </p:pic>
         </mc:Fallback>
       </mc:AlternateContent>
-      <mc:AlternateContent xmlns:mc="http://schemas.openxmlformats.org/markup-compatibility/2006">
-        <mc:Choice xmlns:p14="http://schemas.microsoft.com/office/powerpoint/2010/main" Requires="p14">
+      <mc:AlternateContent xmlns:mc="http://schemas.openxmlformats.org/markup-compatibility/2006" xmlns:p14="http://schemas.microsoft.com/office/powerpoint/2010/main">
+        <mc:Choice Requires="p14">
           <p:contentPart p14:bwMode="auto" r:id="rId18">
             <p14:nvContentPartPr>
               <p14:cNvPr id="52" name="Ink 51">
@@ -23289,7 +24295,7 @@
             </p14:xfrm>
           </p:contentPart>
         </mc:Choice>
-        <mc:Fallback>
+        <mc:Fallback xmlns="">
           <p:pic>
             <p:nvPicPr>
               <p:cNvPr id="52" name="Ink 51">
@@ -23336,7 +24342,7 @@
             </p14:nvContentPartPr>
             <p14:xfrm>
               <a:off x="9241395" y="2785080"/>
-              <a:ext cx="449280" cy="1406160"/>
+              <a:ext cx="775080" cy="223515"/>
             </p14:xfrm>
           </p:contentPart>
         </mc:Choice>
@@ -23361,8 +24367,8 @@
             </p:blipFill>
             <p:spPr>
               <a:xfrm>
-                <a:off x="9235275" y="2778960"/>
-                <a:ext cx="461520" cy="1418400"/>
+                <a:off x="9235272" y="2778971"/>
+                <a:ext cx="787326" cy="235733"/>
               </a:xfrm>
               <a:prstGeom prst="rect">
                 <a:avLst/>
@@ -23386,7 +24392,7 @@
               <p14:nvPr/>
             </p14:nvContentPartPr>
             <p14:xfrm>
-              <a:off x="8090115" y="3406440"/>
+              <a:off x="7217605" y="2940240"/>
               <a:ext cx="96480" cy="84240"/>
             </p14:xfrm>
           </p:contentPart>
@@ -23412,7 +24418,7 @@
             </p:blipFill>
             <p:spPr>
               <a:xfrm>
-                <a:off x="8083995" y="3400320"/>
+                <a:off x="7211485" y="2934120"/>
                 <a:ext cx="108720" cy="96480"/>
               </a:xfrm>
               <a:prstGeom prst="rect">
@@ -23422,8 +24428,8 @@
           </p:pic>
         </mc:Fallback>
       </mc:AlternateContent>
-      <mc:AlternateContent xmlns:mc="http://schemas.openxmlformats.org/markup-compatibility/2006">
-        <mc:Choice xmlns:p14="http://schemas.microsoft.com/office/powerpoint/2010/main" Requires="p14">
+      <mc:AlternateContent xmlns:mc="http://schemas.openxmlformats.org/markup-compatibility/2006" xmlns:p14="http://schemas.microsoft.com/office/powerpoint/2010/main">
+        <mc:Choice Requires="p14">
           <p:contentPart p14:bwMode="auto" r:id="rId24">
             <p14:nvContentPartPr>
               <p14:cNvPr id="61" name="Ink 60">
@@ -23442,7 +24448,7 @@
             </p14:xfrm>
           </p:contentPart>
         </mc:Choice>
-        <mc:Fallback>
+        <mc:Fallback xmlns="">
           <p:pic>
             <p:nvPicPr>
               <p:cNvPr id="61" name="Ink 60">
@@ -23503,7 +24509,7 @@
           <a:p>
             <a:pPr algn="ctr"/>
             <a:r>
-              <a:rPr lang="en-US" sz="2000">
+              <a:rPr lang="en-US" sz="2000" dirty="0">
                 <a:solidFill>
                   <a:srgbClr val="004F8B"/>
                 </a:solidFill>
@@ -23647,7 +24653,7 @@
         </p:nvSpPr>
         <p:spPr>
           <a:xfrm>
-            <a:off x="7206005" y="3210045"/>
+            <a:off x="6926681" y="4543635"/>
             <a:ext cx="314510" cy="400110"/>
           </a:xfrm>
           <a:prstGeom prst="rect">
@@ -23663,7 +24669,7 @@
           <a:p>
             <a:pPr algn="ctr"/>
             <a:r>
-              <a:rPr lang="en-US" sz="2000">
+              <a:rPr lang="en-US" sz="2000" dirty="0">
                 <a:solidFill>
                   <a:srgbClr val="004F8B"/>
                 </a:solidFill>
@@ -23687,7 +24693,7 @@
         </p:nvSpPr>
         <p:spPr>
           <a:xfrm>
-            <a:off x="7782725" y="3460785"/>
+            <a:off x="7142384" y="3288105"/>
             <a:ext cx="314510" cy="400110"/>
           </a:xfrm>
           <a:prstGeom prst="rect">
@@ -23703,7 +24709,7 @@
           <a:p>
             <a:pPr algn="ctr"/>
             <a:r>
-              <a:rPr lang="en-US" sz="2000">
+              <a:rPr lang="en-US" sz="2000" dirty="0">
                 <a:solidFill>
                   <a:srgbClr val="004F8B"/>
                 </a:solidFill>
@@ -23807,7 +24813,7 @@
         </p:nvSpPr>
         <p:spPr>
           <a:xfrm>
-            <a:off x="6285879" y="4937911"/>
+            <a:off x="5802788" y="3468445"/>
             <a:ext cx="320922" cy="415498"/>
           </a:xfrm>
           <a:prstGeom prst="rect">
@@ -23873,6 +24879,97 @@
           </a:p>
         </p:txBody>
       </p:sp>
+      <mc:AlternateContent xmlns:mc="http://schemas.openxmlformats.org/markup-compatibility/2006">
+        <mc:Choice xmlns:p14="http://schemas.microsoft.com/office/powerpoint/2010/main" Requires="p14">
+          <p:contentPart p14:bwMode="auto" r:id="rId26">
+            <p14:nvContentPartPr>
+              <p14:cNvPr id="29" name="Ink 28">
+                <a:extLst>
+                  <a:ext uri="{FF2B5EF4-FFF2-40B4-BE49-F238E27FC236}">
+                    <a16:creationId xmlns:a16="http://schemas.microsoft.com/office/drawing/2014/main" id="{7374774C-C654-4B6F-8F5A-C3A8A74E2F0D}"/>
+                  </a:ext>
+                </a:extLst>
+              </p14:cNvPr>
+              <p14:cNvContentPartPr/>
+              <p14:nvPr/>
+            </p14:nvContentPartPr>
+            <p14:xfrm flipV="1">
+              <a:off x="9678075" y="3008595"/>
+              <a:ext cx="338400" cy="1135022"/>
+            </p14:xfrm>
+          </p:contentPart>
+        </mc:Choice>
+        <mc:Fallback>
+          <p:pic>
+            <p:nvPicPr>
+              <p:cNvPr id="29" name="Ink 28">
+                <a:extLst>
+                  <a:ext uri="{FF2B5EF4-FFF2-40B4-BE49-F238E27FC236}">
+                    <a16:creationId xmlns:a16="http://schemas.microsoft.com/office/drawing/2014/main" id="{7374774C-C654-4B6F-8F5A-C3A8A74E2F0D}"/>
+                  </a:ext>
+                </a:extLst>
+              </p:cNvPr>
+              <p:cNvPicPr/>
+              <p:nvPr/>
+            </p:nvPicPr>
+            <p:blipFill>
+              <a:blip r:embed="rId27"/>
+              <a:stretch>
+                <a:fillRect/>
+              </a:stretch>
+            </p:blipFill>
+            <p:spPr>
+              <a:xfrm flipV="1">
+                <a:off x="9671955" y="3002475"/>
+                <a:ext cx="350640" cy="1147261"/>
+              </a:xfrm>
+              <a:prstGeom prst="rect">
+                <a:avLst/>
+              </a:prstGeom>
+            </p:spPr>
+          </p:pic>
+        </mc:Fallback>
+      </mc:AlternateContent>
+      <p:sp>
+        <p:nvSpPr>
+          <p:cNvPr id="31" name="TextBox 30">
+            <a:extLst>
+              <a:ext uri="{FF2B5EF4-FFF2-40B4-BE49-F238E27FC236}">
+                <a16:creationId xmlns:a16="http://schemas.microsoft.com/office/drawing/2014/main" id="{D5B46122-80E5-4721-8A46-7CABAA9F85AA}"/>
+              </a:ext>
+            </a:extLst>
+          </p:cNvPr>
+          <p:cNvSpPr txBox="1"/>
+          <p:nvPr/>
+        </p:nvSpPr>
+        <p:spPr>
+          <a:xfrm>
+            <a:off x="9923844" y="2793286"/>
+            <a:ext cx="444352" cy="400110"/>
+          </a:xfrm>
+          <a:prstGeom prst="rect">
+            <a:avLst/>
+          </a:prstGeom>
+          <a:noFill/>
+        </p:spPr>
+        <p:txBody>
+          <a:bodyPr wrap="none" rtlCol="0" anchor="ctr" anchorCtr="1">
+            <a:spAutoFit/>
+          </a:bodyPr>
+          <a:lstStyle/>
+          <a:p>
+            <a:pPr algn="ctr"/>
+            <a:r>
+              <a:rPr lang="en-US" sz="2000" dirty="0">
+                <a:solidFill>
+                  <a:srgbClr val="004F8B"/>
+                </a:solidFill>
+              </a:rPr>
+              <a:t>11</a:t>
+            </a:r>
+          </a:p>
+        </p:txBody>
+      </p:sp>
     </p:spTree>
     <p:extLst>
       <p:ext uri="{BB962C8B-B14F-4D97-AF65-F5344CB8AC3E}">
@@ -23886,576 +24983,7 @@
 </p:sld>
 </file>
 
-<file path=ppt/slides/slide4.xml><?xml version="1.0" encoding="utf-8"?>
-<p:sld xmlns:a="http://schemas.openxmlformats.org/drawingml/2006/main" xmlns:r="http://schemas.openxmlformats.org/officeDocument/2006/relationships" xmlns:p="http://schemas.openxmlformats.org/presentationml/2006/main">
-  <p:cSld>
-    <p:spTree>
-      <p:nvGrpSpPr>
-        <p:cNvPr id="1" name=""/>
-        <p:cNvGrpSpPr/>
-        <p:nvPr/>
-      </p:nvGrpSpPr>
-      <p:grpSpPr>
-        <a:xfrm>
-          <a:off x="0" y="0"/>
-          <a:ext cx="0" cy="0"/>
-          <a:chOff x="0" y="0"/>
-          <a:chExt cx="0" cy="0"/>
-        </a:xfrm>
-      </p:grpSpPr>
-      <p:sp>
-        <p:nvSpPr>
-          <p:cNvPr id="2" name="Title 1">
-            <a:extLst>
-              <a:ext uri="{FF2B5EF4-FFF2-40B4-BE49-F238E27FC236}">
-                <a16:creationId xmlns:a16="http://schemas.microsoft.com/office/drawing/2014/main" id="{8C7DDBE8-36CC-4927-9870-E0F8CEA9D030}"/>
-              </a:ext>
-            </a:extLst>
-          </p:cNvPr>
-          <p:cNvSpPr>
-            <a:spLocks noGrp="1"/>
-          </p:cNvSpPr>
-          <p:nvPr>
-            <p:ph type="title"/>
-          </p:nvPr>
-        </p:nvSpPr>
-        <p:spPr>
-          <a:xfrm>
-            <a:off x="838200" y="618266"/>
-            <a:ext cx="10515600" cy="1325563"/>
-          </a:xfrm>
-        </p:spPr>
-        <p:txBody>
-          <a:bodyPr>
-            <a:normAutofit fontScale="90000"/>
-          </a:bodyPr>
-          <a:lstStyle/>
-          <a:p>
-            <a:r>
-              <a:rPr lang="en-US" dirty="0"/>
-              <a:t>A demonstration script exists that shows most of the functionality in this document:</a:t>
-            </a:r>
-            <a:br>
-              <a:rPr lang="en-US" dirty="0"/>
-            </a:br>
-            <a:r>
-              <a:rPr lang="en-US" dirty="0" err="1">
-                <a:solidFill>
-                  <a:srgbClr val="028009"/>
-                </a:solidFill>
-                <a:latin typeface="Courier New" panose="02070309020205020404" pitchFamily="49" charset="0"/>
-              </a:rPr>
-              <a:t>script_demo_MapGenLibrary</a:t>
-            </a:r>
-            <a:br>
-              <a:rPr lang="en-US" dirty="0">
-                <a:solidFill>
-                  <a:srgbClr val="028009"/>
-                </a:solidFill>
-                <a:latin typeface="Courier New" panose="02070309020205020404" pitchFamily="49" charset="0"/>
-              </a:rPr>
-            </a:br>
-            <a:endParaRPr lang="en-US" dirty="0"/>
-          </a:p>
-        </p:txBody>
-      </p:sp>
-      <p:sp>
-        <p:nvSpPr>
-          <p:cNvPr id="4" name="Rectangle 3">
-            <a:extLst>
-              <a:ext uri="{FF2B5EF4-FFF2-40B4-BE49-F238E27FC236}">
-                <a16:creationId xmlns:a16="http://schemas.microsoft.com/office/drawing/2014/main" id="{ED6B6C78-C512-4D1D-90D5-01BF838E0A27}"/>
-              </a:ext>
-            </a:extLst>
-          </p:cNvPr>
-          <p:cNvSpPr/>
-          <p:nvPr/>
-        </p:nvSpPr>
-        <p:spPr>
-          <a:xfrm>
-            <a:off x="374433" y="2022133"/>
-            <a:ext cx="5909136" cy="2446824"/>
-          </a:xfrm>
-          <a:prstGeom prst="rect">
-            <a:avLst/>
-          </a:prstGeom>
-          <a:solidFill>
-            <a:schemeClr val="accent4">
-              <a:lumMod val="20000"/>
-              <a:lumOff val="80000"/>
-            </a:schemeClr>
-          </a:solidFill>
-        </p:spPr>
-        <p:txBody>
-          <a:bodyPr wrap="square">
-            <a:spAutoFit/>
-          </a:bodyPr>
-          <a:lstStyle/>
-          <a:p>
-            <a:r>
-              <a:rPr lang="en-US" sz="900" dirty="0">
-                <a:solidFill>
-                  <a:srgbClr val="028009"/>
-                </a:solidFill>
-                <a:latin typeface="Courier New" panose="02070309020205020404" pitchFamily="49" charset="0"/>
-              </a:rPr>
-              <a:t>%% Show how inputs are checked</a:t>
-            </a:r>
-          </a:p>
-          <a:p>
-            <a:r>
-              <a:rPr lang="en-US" sz="900" dirty="0" err="1">
-                <a:solidFill>
-                  <a:srgbClr val="000000"/>
-                </a:solidFill>
-                <a:latin typeface="Courier New" panose="02070309020205020404" pitchFamily="49" charset="0"/>
-              </a:rPr>
-              <a:t>Twocolumn_of_numbers_test</a:t>
-            </a:r>
-            <a:r>
-              <a:rPr lang="en-US" sz="900" dirty="0">
-                <a:solidFill>
-                  <a:srgbClr val="000000"/>
-                </a:solidFill>
-                <a:latin typeface="Courier New" panose="02070309020205020404" pitchFamily="49" charset="0"/>
-              </a:rPr>
-              <a:t> = [4 1; 3 0; 2 5];</a:t>
-            </a:r>
-          </a:p>
-          <a:p>
-            <a:r>
-              <a:rPr lang="en-US" sz="900" dirty="0" err="1">
-                <a:solidFill>
-                  <a:srgbClr val="000000"/>
-                </a:solidFill>
-                <a:latin typeface="Courier New" panose="02070309020205020404" pitchFamily="49" charset="0"/>
-              </a:rPr>
-              <a:t>fcn_MapGen_checkInputsToFunctions</a:t>
-            </a:r>
-            <a:r>
-              <a:rPr lang="en-US" sz="900" dirty="0">
-                <a:solidFill>
-                  <a:srgbClr val="000000"/>
-                </a:solidFill>
-                <a:latin typeface="Courier New" panose="02070309020205020404" pitchFamily="49" charset="0"/>
-              </a:rPr>
-              <a:t>(</a:t>
-            </a:r>
-            <a:r>
-              <a:rPr lang="en-US" sz="900" dirty="0" err="1">
-                <a:solidFill>
-                  <a:srgbClr val="000000"/>
-                </a:solidFill>
-                <a:latin typeface="Courier New" panose="02070309020205020404" pitchFamily="49" charset="0"/>
-              </a:rPr>
-              <a:t>Twocolumn_of_numbers_test</a:t>
-            </a:r>
-            <a:r>
-              <a:rPr lang="en-US" sz="900" dirty="0">
-                <a:solidFill>
-                  <a:srgbClr val="000000"/>
-                </a:solidFill>
-                <a:latin typeface="Courier New" panose="02070309020205020404" pitchFamily="49" charset="0"/>
-              </a:rPr>
-              <a:t>, </a:t>
-            </a:r>
-            <a:r>
-              <a:rPr lang="en-US" sz="900" dirty="0">
-                <a:solidFill>
-                  <a:srgbClr val="AA04F9"/>
-                </a:solidFill>
-                <a:latin typeface="Courier New" panose="02070309020205020404" pitchFamily="49" charset="0"/>
-              </a:rPr>
-              <a:t>'2column_of_numbers'</a:t>
-            </a:r>
-            <a:r>
-              <a:rPr lang="en-US" sz="900" dirty="0">
-                <a:solidFill>
-                  <a:srgbClr val="000000"/>
-                </a:solidFill>
-                <a:latin typeface="Courier New" panose="02070309020205020404" pitchFamily="49" charset="0"/>
-              </a:rPr>
-              <a:t>);</a:t>
-            </a:r>
-          </a:p>
-          <a:p>
-            <a:r>
-              <a:rPr lang="en-US" sz="900" dirty="0">
-                <a:solidFill>
-                  <a:srgbClr val="000000"/>
-                </a:solidFill>
-                <a:latin typeface="Courier New" panose="02070309020205020404" pitchFamily="49" charset="0"/>
-              </a:rPr>
-              <a:t> </a:t>
-            </a:r>
-          </a:p>
-          <a:p>
-            <a:r>
-              <a:rPr lang="en-US" sz="900" dirty="0">
-                <a:solidFill>
-                  <a:srgbClr val="000000"/>
-                </a:solidFill>
-                <a:latin typeface="Courier New" panose="02070309020205020404" pitchFamily="49" charset="0"/>
-              </a:rPr>
-              <a:t> </a:t>
-            </a:r>
-          </a:p>
-          <a:p>
-            <a:r>
-              <a:rPr lang="en-US" sz="900" dirty="0">
-                <a:solidFill>
-                  <a:srgbClr val="028009"/>
-                </a:solidFill>
-                <a:latin typeface="Courier New" panose="02070309020205020404" pitchFamily="49" charset="0"/>
-              </a:rPr>
-              <a:t>%% Generate a set of polytopes from various pseudo-random sources</a:t>
-            </a:r>
-          </a:p>
-          <a:p>
-            <a:r>
-              <a:rPr lang="en-US" sz="900" dirty="0">
-                <a:solidFill>
-                  <a:srgbClr val="028009"/>
-                </a:solidFill>
-                <a:latin typeface="Courier New" panose="02070309020205020404" pitchFamily="49" charset="0"/>
-              </a:rPr>
-              <a:t>% Generate a set of polytopes from the </a:t>
-            </a:r>
-            <a:r>
-              <a:rPr lang="en-US" sz="900" dirty="0" err="1">
-                <a:solidFill>
-                  <a:srgbClr val="028009"/>
-                </a:solidFill>
-                <a:latin typeface="Courier New" panose="02070309020205020404" pitchFamily="49" charset="0"/>
-              </a:rPr>
-              <a:t>Sobol</a:t>
-            </a:r>
-            <a:r>
-              <a:rPr lang="en-US" sz="900" dirty="0">
-                <a:solidFill>
-                  <a:srgbClr val="028009"/>
-                </a:solidFill>
-                <a:latin typeface="Courier New" panose="02070309020205020404" pitchFamily="49" charset="0"/>
-              </a:rPr>
-              <a:t> set</a:t>
-            </a:r>
-          </a:p>
-          <a:p>
-            <a:r>
-              <a:rPr lang="en-US" sz="900" dirty="0" err="1">
-                <a:solidFill>
-                  <a:srgbClr val="000000"/>
-                </a:solidFill>
-                <a:latin typeface="Courier New" panose="02070309020205020404" pitchFamily="49" charset="0"/>
-              </a:rPr>
-              <a:t>fig_num</a:t>
-            </a:r>
-            <a:r>
-              <a:rPr lang="en-US" sz="900" dirty="0">
-                <a:solidFill>
-                  <a:srgbClr val="000000"/>
-                </a:solidFill>
-                <a:latin typeface="Courier New" panose="02070309020205020404" pitchFamily="49" charset="0"/>
-              </a:rPr>
-              <a:t> = 11;</a:t>
-            </a:r>
-          </a:p>
-          <a:p>
-            <a:r>
-              <a:rPr lang="en-US" sz="900" dirty="0" err="1">
-                <a:solidFill>
-                  <a:srgbClr val="000000"/>
-                </a:solidFill>
-                <a:latin typeface="Courier New" panose="02070309020205020404" pitchFamily="49" charset="0"/>
-              </a:rPr>
-              <a:t>Sobol_range</a:t>
-            </a:r>
-            <a:r>
-              <a:rPr lang="en-US" sz="900" dirty="0">
-                <a:solidFill>
-                  <a:srgbClr val="000000"/>
-                </a:solidFill>
-                <a:latin typeface="Courier New" panose="02070309020205020404" pitchFamily="49" charset="0"/>
-              </a:rPr>
-              <a:t> = [1 1000]; </a:t>
-            </a:r>
-            <a:r>
-              <a:rPr lang="en-US" sz="900" dirty="0">
-                <a:solidFill>
-                  <a:srgbClr val="028009"/>
-                </a:solidFill>
-                <a:latin typeface="Courier New" panose="02070309020205020404" pitchFamily="49" charset="0"/>
-              </a:rPr>
-              <a:t>% range of </a:t>
-            </a:r>
-            <a:r>
-              <a:rPr lang="en-US" sz="900" dirty="0" err="1">
-                <a:solidFill>
-                  <a:srgbClr val="028009"/>
-                </a:solidFill>
-                <a:latin typeface="Courier New" panose="02070309020205020404" pitchFamily="49" charset="0"/>
-              </a:rPr>
-              <a:t>Sobol</a:t>
-            </a:r>
-            <a:r>
-              <a:rPr lang="en-US" sz="900" dirty="0">
-                <a:solidFill>
-                  <a:srgbClr val="028009"/>
-                </a:solidFill>
-                <a:latin typeface="Courier New" panose="02070309020205020404" pitchFamily="49" charset="0"/>
-              </a:rPr>
-              <a:t> points to use to generate the tiling</a:t>
-            </a:r>
-          </a:p>
-          <a:p>
-            <a:r>
-              <a:rPr lang="en-US" sz="900" dirty="0" err="1">
-                <a:solidFill>
-                  <a:srgbClr val="000000"/>
-                </a:solidFill>
-                <a:latin typeface="Courier New" panose="02070309020205020404" pitchFamily="49" charset="0"/>
-              </a:rPr>
-              <a:t>tiled_polytopes</a:t>
-            </a:r>
-            <a:r>
-              <a:rPr lang="en-US" sz="900" dirty="0">
-                <a:solidFill>
-                  <a:srgbClr val="000000"/>
-                </a:solidFill>
-                <a:latin typeface="Courier New" panose="02070309020205020404" pitchFamily="49" charset="0"/>
-              </a:rPr>
-              <a:t> = </a:t>
-            </a:r>
-            <a:r>
-              <a:rPr lang="en-US" sz="900" dirty="0" err="1">
-                <a:solidFill>
-                  <a:srgbClr val="000000"/>
-                </a:solidFill>
-                <a:latin typeface="Courier New" panose="02070309020205020404" pitchFamily="49" charset="0"/>
-              </a:rPr>
-              <a:t>fcn_MapGen_sobolVoronoiTiling</a:t>
-            </a:r>
-            <a:r>
-              <a:rPr lang="en-US" sz="900" dirty="0">
-                <a:solidFill>
-                  <a:srgbClr val="000000"/>
-                </a:solidFill>
-                <a:latin typeface="Courier New" panose="02070309020205020404" pitchFamily="49" charset="0"/>
-              </a:rPr>
-              <a:t>(</a:t>
-            </a:r>
-            <a:r>
-              <a:rPr lang="en-US" sz="900" dirty="0" err="1">
-                <a:solidFill>
-                  <a:srgbClr val="000000"/>
-                </a:solidFill>
-                <a:latin typeface="Courier New" panose="02070309020205020404" pitchFamily="49" charset="0"/>
-              </a:rPr>
-              <a:t>Sobol_range</a:t>
-            </a:r>
-            <a:r>
-              <a:rPr lang="en-US" sz="900" dirty="0">
-                <a:solidFill>
-                  <a:srgbClr val="000000"/>
-                </a:solidFill>
-                <a:latin typeface="Courier New" panose="02070309020205020404" pitchFamily="49" charset="0"/>
-              </a:rPr>
-              <a:t>,[1 1],</a:t>
-            </a:r>
-            <a:r>
-              <a:rPr lang="en-US" sz="900" dirty="0" err="1">
-                <a:solidFill>
-                  <a:srgbClr val="000000"/>
-                </a:solidFill>
-                <a:latin typeface="Courier New" panose="02070309020205020404" pitchFamily="49" charset="0"/>
-              </a:rPr>
-              <a:t>fig_num</a:t>
-            </a:r>
-            <a:r>
-              <a:rPr lang="en-US" sz="900" dirty="0">
-                <a:solidFill>
-                  <a:srgbClr val="000000"/>
-                </a:solidFill>
-                <a:latin typeface="Courier New" panose="02070309020205020404" pitchFamily="49" charset="0"/>
-              </a:rPr>
-              <a:t>);</a:t>
-            </a:r>
-          </a:p>
-          <a:p>
-            <a:r>
-              <a:rPr lang="en-US" sz="900" dirty="0">
-                <a:solidFill>
-                  <a:srgbClr val="000000"/>
-                </a:solidFill>
-                <a:latin typeface="Courier New" panose="02070309020205020404" pitchFamily="49" charset="0"/>
-              </a:rPr>
-              <a:t> </a:t>
-            </a:r>
-          </a:p>
-          <a:p>
-            <a:r>
-              <a:rPr lang="en-US" sz="900" dirty="0">
-                <a:solidFill>
-                  <a:srgbClr val="000000"/>
-                </a:solidFill>
-                <a:latin typeface="Courier New" panose="02070309020205020404" pitchFamily="49" charset="0"/>
-              </a:rPr>
-              <a:t> </a:t>
-            </a:r>
-          </a:p>
-          <a:p>
-            <a:r>
-              <a:rPr lang="en-US" sz="900" dirty="0">
-                <a:solidFill>
-                  <a:srgbClr val="028009"/>
-                </a:solidFill>
-                <a:latin typeface="Courier New" panose="02070309020205020404" pitchFamily="49" charset="0"/>
-              </a:rPr>
-              <a:t>% Generate a set of polytopes from the Halton set</a:t>
-            </a:r>
-          </a:p>
-          <a:p>
-            <a:r>
-              <a:rPr lang="en-US" sz="900" dirty="0" err="1">
-                <a:solidFill>
-                  <a:srgbClr val="000000"/>
-                </a:solidFill>
-                <a:latin typeface="Courier New" panose="02070309020205020404" pitchFamily="49" charset="0"/>
-              </a:rPr>
-              <a:t>fig_num</a:t>
-            </a:r>
-            <a:r>
-              <a:rPr lang="en-US" sz="900" dirty="0">
-                <a:solidFill>
-                  <a:srgbClr val="000000"/>
-                </a:solidFill>
-                <a:latin typeface="Courier New" panose="02070309020205020404" pitchFamily="49" charset="0"/>
-              </a:rPr>
-              <a:t> = 12;</a:t>
-            </a:r>
-          </a:p>
-          <a:p>
-            <a:r>
-              <a:rPr lang="en-US" sz="900" dirty="0" err="1">
-                <a:solidFill>
-                  <a:srgbClr val="000000"/>
-                </a:solidFill>
-                <a:latin typeface="Courier New" panose="02070309020205020404" pitchFamily="49" charset="0"/>
-              </a:rPr>
-              <a:t>Halton_range</a:t>
-            </a:r>
-            <a:r>
-              <a:rPr lang="en-US" sz="900" dirty="0">
-                <a:solidFill>
-                  <a:srgbClr val="000000"/>
-                </a:solidFill>
-                <a:latin typeface="Courier New" panose="02070309020205020404" pitchFamily="49" charset="0"/>
-              </a:rPr>
-              <a:t> = [1 1000]; </a:t>
-            </a:r>
-            <a:r>
-              <a:rPr lang="en-US" sz="900" dirty="0">
-                <a:solidFill>
-                  <a:srgbClr val="028009"/>
-                </a:solidFill>
-                <a:latin typeface="Courier New" panose="02070309020205020404" pitchFamily="49" charset="0"/>
-              </a:rPr>
-              <a:t>% range of Halton points to use to generate the tiling</a:t>
-            </a:r>
-          </a:p>
-          <a:p>
-            <a:r>
-              <a:rPr lang="en-US" sz="900" dirty="0" err="1">
-                <a:solidFill>
-                  <a:srgbClr val="000000"/>
-                </a:solidFill>
-                <a:latin typeface="Courier New" panose="02070309020205020404" pitchFamily="49" charset="0"/>
-              </a:rPr>
-              <a:t>tiled_polytopes</a:t>
-            </a:r>
-            <a:r>
-              <a:rPr lang="en-US" sz="900" dirty="0">
-                <a:solidFill>
-                  <a:srgbClr val="000000"/>
-                </a:solidFill>
-                <a:latin typeface="Courier New" panose="02070309020205020404" pitchFamily="49" charset="0"/>
-              </a:rPr>
-              <a:t> = </a:t>
-            </a:r>
-            <a:r>
-              <a:rPr lang="en-US" sz="900" dirty="0" err="1">
-                <a:solidFill>
-                  <a:srgbClr val="000000"/>
-                </a:solidFill>
-                <a:latin typeface="Courier New" panose="02070309020205020404" pitchFamily="49" charset="0"/>
-              </a:rPr>
-              <a:t>fcn_MapGen_haltonVoronoiTiling</a:t>
-            </a:r>
-            <a:r>
-              <a:rPr lang="en-US" sz="900" dirty="0">
-                <a:solidFill>
-                  <a:srgbClr val="000000"/>
-                </a:solidFill>
-                <a:latin typeface="Courier New" panose="02070309020205020404" pitchFamily="49" charset="0"/>
-              </a:rPr>
-              <a:t>(</a:t>
-            </a:r>
-            <a:r>
-              <a:rPr lang="en-US" sz="900" dirty="0" err="1">
-                <a:solidFill>
-                  <a:srgbClr val="000000"/>
-                </a:solidFill>
-                <a:latin typeface="Courier New" panose="02070309020205020404" pitchFamily="49" charset="0"/>
-              </a:rPr>
-              <a:t>Halton_range</a:t>
-            </a:r>
-            <a:r>
-              <a:rPr lang="en-US" sz="900" dirty="0">
-                <a:solidFill>
-                  <a:srgbClr val="000000"/>
-                </a:solidFill>
-                <a:latin typeface="Courier New" panose="02070309020205020404" pitchFamily="49" charset="0"/>
-              </a:rPr>
-              <a:t>,[1 1],</a:t>
-            </a:r>
-            <a:r>
-              <a:rPr lang="en-US" sz="900" dirty="0" err="1">
-                <a:solidFill>
-                  <a:srgbClr val="000000"/>
-                </a:solidFill>
-                <a:latin typeface="Courier New" panose="02070309020205020404" pitchFamily="49" charset="0"/>
-              </a:rPr>
-              <a:t>fig_num</a:t>
-            </a:r>
-            <a:r>
-              <a:rPr lang="en-US" sz="900" dirty="0">
-                <a:solidFill>
-                  <a:srgbClr val="000000"/>
-                </a:solidFill>
-                <a:latin typeface="Courier New" panose="02070309020205020404" pitchFamily="49" charset="0"/>
-              </a:rPr>
-              <a:t>);</a:t>
-            </a:r>
-          </a:p>
-          <a:p>
-            <a:endParaRPr lang="en-US" sz="900" dirty="0"/>
-          </a:p>
-        </p:txBody>
-      </p:sp>
-    </p:spTree>
-    <p:extLst>
-      <p:ext uri="{BB962C8B-B14F-4D97-AF65-F5344CB8AC3E}">
-        <p14:creationId xmlns:p14="http://schemas.microsoft.com/office/powerpoint/2010/main" val="3684799925"/>
-      </p:ext>
-    </p:extLst>
-  </p:cSld>
-  <p:clrMapOvr>
-    <a:masterClrMapping/>
-  </p:clrMapOvr>
-</p:sld>
-</file>
-
-<file path=ppt/slides/slide40.xml><?xml version="1.0" encoding="utf-8"?>
+<file path=ppt/slides/slide41.xml><?xml version="1.0" encoding="utf-8"?>
 <p:sld xmlns:a="http://schemas.openxmlformats.org/drawingml/2006/main" xmlns:r="http://schemas.openxmlformats.org/officeDocument/2006/relationships" xmlns:p="http://schemas.openxmlformats.org/presentationml/2006/main">
   <p:cSld>
     <p:spTree>
@@ -24559,7 +25087,7 @@
         <p:spPr>
           <a:xfrm>
             <a:off x="6565900" y="2130968"/>
-            <a:ext cx="4902200" cy="3200876"/>
+            <a:ext cx="4902200" cy="3600986"/>
           </a:xfrm>
           <a:prstGeom prst="rect">
             <a:avLst/>
@@ -24611,7 +25139,26 @@
                 <a:effectLst/>
                 <a:latin typeface="Menlo"/>
               </a:rPr>
-              <a:t>Vertex 2:</a:t>
+              <a:t>Vertex 2: </a:t>
+            </a:r>
+            <a:br>
+              <a:rPr lang="en-US" sz="1600" b="0" i="0" dirty="0">
+                <a:solidFill>
+                  <a:srgbClr val="008013"/>
+                </a:solidFill>
+                <a:effectLst/>
+                <a:latin typeface="Menlo"/>
+              </a:rPr>
+            </a:br>
+            <a:r>
+              <a:rPr lang="en-US" sz="1600" b="0" i="0" dirty="0">
+                <a:solidFill>
+                  <a:srgbClr val="008013"/>
+                </a:solidFill>
+                <a:effectLst/>
+                <a:latin typeface="Menlo"/>
+              </a:rPr>
+              <a:t>(start at 2 in forward direction, -2 in negative direction)</a:t>
             </a:r>
             <a:endParaRPr lang="en-US" sz="1600" b="0" i="0" dirty="0">
               <a:effectLst/>
@@ -24670,6 +25217,17 @@
                 <a:latin typeface="Menlo"/>
               </a:rPr>
               <a:t>Vertex 7:</a:t>
+            </a:r>
+          </a:p>
+          <a:p>
+            <a:r>
+              <a:rPr lang="en-US" sz="1600" dirty="0">
+                <a:solidFill>
+                  <a:srgbClr val="008013"/>
+                </a:solidFill>
+                <a:latin typeface="Menlo"/>
+              </a:rPr>
+              <a:t>(start at 7 in forward direction, -7 in negative direction)</a:t>
             </a:r>
             <a:endParaRPr lang="en-US" sz="1600" b="0" i="0" dirty="0">
               <a:effectLst/>
@@ -24758,7 +25316,7 @@
 </p:sld>
 </file>
 
-<file path=ppt/slides/slide41.xml><?xml version="1.0" encoding="utf-8"?>
+<file path=ppt/slides/slide42.xml><?xml version="1.0" encoding="utf-8"?>
 <p:sld xmlns:a="http://schemas.openxmlformats.org/drawingml/2006/main" xmlns:r="http://schemas.openxmlformats.org/officeDocument/2006/relationships" xmlns:p="http://schemas.openxmlformats.org/presentationml/2006/main">
   <p:cSld>
     <p:spTree>
@@ -24955,7 +25513,7 @@
 </p:sld>
 </file>
 
-<file path=ppt/slides/slide42.xml><?xml version="1.0" encoding="utf-8"?>
+<file path=ppt/slides/slide43.xml><?xml version="1.0" encoding="utf-8"?>
 <p:sld xmlns:a="http://schemas.openxmlformats.org/drawingml/2006/main" xmlns:r="http://schemas.openxmlformats.org/officeDocument/2006/relationships" xmlns:p="http://schemas.openxmlformats.org/presentationml/2006/main">
   <p:cSld>
     <p:spTree>

</xml_diff>

<commit_message>
FEAT: worked out rules for projection in 3D using linear algebra. Starting to pre this in fillStructureFromVertices
</commit_message>
<xml_diff>
--- a/Documents/VertexSkeletonClassLibrary.pptx
+++ b/Documents/VertexSkeletonClassLibrary.pptx
@@ -31,23 +31,24 @@
     <p:sldId id="523" r:id="rId25"/>
     <p:sldId id="545" r:id="rId26"/>
     <p:sldId id="546" r:id="rId27"/>
-    <p:sldId id="550" r:id="rId28"/>
-    <p:sldId id="538" r:id="rId29"/>
-    <p:sldId id="544" r:id="rId30"/>
-    <p:sldId id="558" r:id="rId31"/>
-    <p:sldId id="549" r:id="rId32"/>
-    <p:sldId id="541" r:id="rId33"/>
-    <p:sldId id="547" r:id="rId34"/>
-    <p:sldId id="551" r:id="rId35"/>
-    <p:sldId id="559" r:id="rId36"/>
-    <p:sldId id="548" r:id="rId37"/>
-    <p:sldId id="552" r:id="rId38"/>
-    <p:sldId id="553" r:id="rId39"/>
-    <p:sldId id="554" r:id="rId40"/>
-    <p:sldId id="555" r:id="rId41"/>
-    <p:sldId id="556" r:id="rId42"/>
-    <p:sldId id="557" r:id="rId43"/>
-    <p:sldId id="540" r:id="rId44"/>
+    <p:sldId id="560" r:id="rId28"/>
+    <p:sldId id="550" r:id="rId29"/>
+    <p:sldId id="538" r:id="rId30"/>
+    <p:sldId id="544" r:id="rId31"/>
+    <p:sldId id="558" r:id="rId32"/>
+    <p:sldId id="549" r:id="rId33"/>
+    <p:sldId id="541" r:id="rId34"/>
+    <p:sldId id="547" r:id="rId35"/>
+    <p:sldId id="551" r:id="rId36"/>
+    <p:sldId id="559" r:id="rId37"/>
+    <p:sldId id="548" r:id="rId38"/>
+    <p:sldId id="552" r:id="rId39"/>
+    <p:sldId id="553" r:id="rId40"/>
+    <p:sldId id="554" r:id="rId41"/>
+    <p:sldId id="555" r:id="rId42"/>
+    <p:sldId id="556" r:id="rId43"/>
+    <p:sldId id="557" r:id="rId44"/>
+    <p:sldId id="540" r:id="rId45"/>
   </p:sldIdLst>
   <p:sldSz cx="12192000" cy="6858000"/>
   <p:notesSz cx="6858000" cy="9144000"/>
@@ -189,6 +190,7 @@
             <p14:sldId id="523"/>
             <p14:sldId id="545"/>
             <p14:sldId id="546"/>
+            <p14:sldId id="560"/>
             <p14:sldId id="550"/>
             <p14:sldId id="538"/>
             <p14:sldId id="544"/>
@@ -958,7 +960,7 @@
           <a:p>
             <a:fld id="{ADCEBF8C-22C0-4323-9BBB-9413232198F8}" type="datetimeFigureOut">
               <a:rPr lang="en-US" smtClean="0"/>
-              <a:t>5/14/2025</a:t>
+              <a:t>5/25/2025</a:t>
             </a:fld>
             <a:endParaRPr lang="en-US"/>
           </a:p>
@@ -1156,7 +1158,7 @@
           <a:p>
             <a:fld id="{ADCEBF8C-22C0-4323-9BBB-9413232198F8}" type="datetimeFigureOut">
               <a:rPr lang="en-US" smtClean="0"/>
-              <a:t>5/14/2025</a:t>
+              <a:t>5/25/2025</a:t>
             </a:fld>
             <a:endParaRPr lang="en-US"/>
           </a:p>
@@ -1364,7 +1366,7 @@
           <a:p>
             <a:fld id="{ADCEBF8C-22C0-4323-9BBB-9413232198F8}" type="datetimeFigureOut">
               <a:rPr lang="en-US" smtClean="0"/>
-              <a:t>5/14/2025</a:t>
+              <a:t>5/25/2025</a:t>
             </a:fld>
             <a:endParaRPr lang="en-US"/>
           </a:p>
@@ -1562,7 +1564,7 @@
           <a:p>
             <a:fld id="{ADCEBF8C-22C0-4323-9BBB-9413232198F8}" type="datetimeFigureOut">
               <a:rPr lang="en-US" smtClean="0"/>
-              <a:t>5/14/2025</a:t>
+              <a:t>5/25/2025</a:t>
             </a:fld>
             <a:endParaRPr lang="en-US"/>
           </a:p>
@@ -1837,7 +1839,7 @@
           <a:p>
             <a:fld id="{ADCEBF8C-22C0-4323-9BBB-9413232198F8}" type="datetimeFigureOut">
               <a:rPr lang="en-US" smtClean="0"/>
-              <a:t>5/14/2025</a:t>
+              <a:t>5/25/2025</a:t>
             </a:fld>
             <a:endParaRPr lang="en-US"/>
           </a:p>
@@ -2102,7 +2104,7 @@
           <a:p>
             <a:fld id="{ADCEBF8C-22C0-4323-9BBB-9413232198F8}" type="datetimeFigureOut">
               <a:rPr lang="en-US" smtClean="0"/>
-              <a:t>5/14/2025</a:t>
+              <a:t>5/25/2025</a:t>
             </a:fld>
             <a:endParaRPr lang="en-US"/>
           </a:p>
@@ -2514,7 +2516,7 @@
           <a:p>
             <a:fld id="{ADCEBF8C-22C0-4323-9BBB-9413232198F8}" type="datetimeFigureOut">
               <a:rPr lang="en-US" smtClean="0"/>
-              <a:t>5/14/2025</a:t>
+              <a:t>5/25/2025</a:t>
             </a:fld>
             <a:endParaRPr lang="en-US"/>
           </a:p>
@@ -2655,7 +2657,7 @@
           <a:p>
             <a:fld id="{ADCEBF8C-22C0-4323-9BBB-9413232198F8}" type="datetimeFigureOut">
               <a:rPr lang="en-US" smtClean="0"/>
-              <a:t>5/14/2025</a:t>
+              <a:t>5/25/2025</a:t>
             </a:fld>
             <a:endParaRPr lang="en-US"/>
           </a:p>
@@ -2768,7 +2770,7 @@
           <a:p>
             <a:fld id="{ADCEBF8C-22C0-4323-9BBB-9413232198F8}" type="datetimeFigureOut">
               <a:rPr lang="en-US" smtClean="0"/>
-              <a:t>5/14/2025</a:t>
+              <a:t>5/25/2025</a:t>
             </a:fld>
             <a:endParaRPr lang="en-US"/>
           </a:p>
@@ -3079,7 +3081,7 @@
           <a:p>
             <a:fld id="{ADCEBF8C-22C0-4323-9BBB-9413232198F8}" type="datetimeFigureOut">
               <a:rPr lang="en-US" smtClean="0"/>
-              <a:t>5/14/2025</a:t>
+              <a:t>5/25/2025</a:t>
             </a:fld>
             <a:endParaRPr lang="en-US"/>
           </a:p>
@@ -3367,7 +3369,7 @@
           <a:p>
             <a:fld id="{ADCEBF8C-22C0-4323-9BBB-9413232198F8}" type="datetimeFigureOut">
               <a:rPr lang="en-US" smtClean="0"/>
-              <a:t>5/14/2025</a:t>
+              <a:t>5/25/2025</a:t>
             </a:fld>
             <a:endParaRPr lang="en-US"/>
           </a:p>
@@ -3608,7 +3610,7 @@
           <a:p>
             <a:fld id="{ADCEBF8C-22C0-4323-9BBB-9413232198F8}" type="datetimeFigureOut">
               <a:rPr lang="en-US" smtClean="0"/>
-              <a:t>5/14/2025</a:t>
+              <a:t>5/25/2025</a:t>
             </a:fld>
             <a:endParaRPr lang="en-US"/>
           </a:p>
@@ -10329,6 +10331,1949 @@
   <p:cSld>
     <p:spTree>
       <p:nvGrpSpPr>
+        <p:cNvPr id="1" name="">
+          <a:extLst>
+            <a:ext uri="{FF2B5EF4-FFF2-40B4-BE49-F238E27FC236}">
+              <a16:creationId xmlns:a16="http://schemas.microsoft.com/office/drawing/2014/main" id="{1FDD3B11-7694-A4B9-1CE5-E6371002A50B}"/>
+            </a:ext>
+          </a:extLst>
+        </p:cNvPr>
+        <p:cNvGrpSpPr/>
+        <p:nvPr/>
+      </p:nvGrpSpPr>
+      <p:grpSpPr>
+        <a:xfrm>
+          <a:off x="0" y="0"/>
+          <a:ext cx="0" cy="0"/>
+          <a:chOff x="0" y="0"/>
+          <a:chExt cx="0" cy="0"/>
+        </a:xfrm>
+      </p:grpSpPr>
+      <p:sp>
+        <p:nvSpPr>
+          <p:cNvPr id="2" name="Title 1">
+            <a:extLst>
+              <a:ext uri="{FF2B5EF4-FFF2-40B4-BE49-F238E27FC236}">
+                <a16:creationId xmlns:a16="http://schemas.microsoft.com/office/drawing/2014/main" id="{D4CB09AC-296B-B7D5-4B15-A0A478C8ACFD}"/>
+              </a:ext>
+            </a:extLst>
+          </p:cNvPr>
+          <p:cNvSpPr>
+            <a:spLocks noGrp="1"/>
+          </p:cNvSpPr>
+          <p:nvPr>
+            <p:ph type="title"/>
+          </p:nvPr>
+        </p:nvSpPr>
+        <p:spPr/>
+        <p:txBody>
+          <a:bodyPr>
+            <a:normAutofit fontScale="90000"/>
+          </a:bodyPr>
+          <a:lstStyle/>
+          <a:p>
+            <a:r>
+              <a:rPr lang="en-US" dirty="0"/>
+              <a:t>This can be generalized into higher dimensions by noting that the vector projection is a process of solving linear equations</a:t>
+            </a:r>
+          </a:p>
+        </p:txBody>
+      </p:sp>
+      <p:sp>
+        <p:nvSpPr>
+          <p:cNvPr id="20" name="Content Placeholder 19">
+            <a:extLst>
+              <a:ext uri="{FF2B5EF4-FFF2-40B4-BE49-F238E27FC236}">
+                <a16:creationId xmlns:a16="http://schemas.microsoft.com/office/drawing/2014/main" id="{BDFCC5CE-C49F-FD82-1123-E2D83C2856CD}"/>
+              </a:ext>
+            </a:extLst>
+          </p:cNvPr>
+          <p:cNvSpPr>
+            <a:spLocks noGrp="1"/>
+          </p:cNvSpPr>
+          <p:nvPr>
+            <p:ph idx="1"/>
+          </p:nvPr>
+        </p:nvSpPr>
+        <p:spPr>
+          <a:xfrm>
+            <a:off x="838199" y="1825625"/>
+            <a:ext cx="6529639" cy="4351338"/>
+          </a:xfrm>
+        </p:spPr>
+        <p:txBody>
+          <a:bodyPr/>
+          <a:lstStyle/>
+          <a:p>
+            <a:pPr marL="0" indent="0">
+              <a:buNone/>
+            </a:pPr>
+            <a:r>
+              <a:rPr lang="en-US" dirty="0"/>
+              <a:t>The </a:t>
+            </a:r>
+            <a:r>
+              <a:rPr lang="en-US" dirty="0" err="1"/>
+              <a:t>ith</a:t>
+            </a:r>
+            <a:r>
+              <a:rPr lang="en-US" dirty="0"/>
+              <a:t> vertex  projection from vi to the center, P, has length given by:</a:t>
+            </a:r>
+          </a:p>
+          <a:p>
+            <a:pPr marL="0" indent="0">
+              <a:buNone/>
+            </a:pPr>
+            <a:endParaRPr lang="en-US" dirty="0"/>
+          </a:p>
+          <a:p>
+            <a:pPr marL="0" indent="0">
+              <a:buNone/>
+            </a:pPr>
+            <a:r>
+              <a:rPr lang="en-US" dirty="0"/>
+              <a:t>For a unit radius:</a:t>
+            </a:r>
+          </a:p>
+          <a:p>
+            <a:pPr marL="0" indent="0">
+              <a:buNone/>
+            </a:pPr>
+            <a:endParaRPr lang="en-US" dirty="0"/>
+          </a:p>
+          <a:p>
+            <a:pPr marL="0" indent="0">
+              <a:buNone/>
+            </a:pPr>
+            <a:r>
+              <a:rPr lang="en-US" dirty="0"/>
+              <a:t>In vector form, this is not solvable unless there are N questions, where N is the dimension. </a:t>
+            </a:r>
+          </a:p>
+        </p:txBody>
+      </p:sp>
+      <p:sp>
+        <p:nvSpPr>
+          <p:cNvPr id="4" name="Oval 3">
+            <a:extLst>
+              <a:ext uri="{FF2B5EF4-FFF2-40B4-BE49-F238E27FC236}">
+                <a16:creationId xmlns:a16="http://schemas.microsoft.com/office/drawing/2014/main" id="{D9DB24A3-1101-28A7-25D2-2D8E174FB5A1}"/>
+              </a:ext>
+            </a:extLst>
+          </p:cNvPr>
+          <p:cNvSpPr/>
+          <p:nvPr/>
+        </p:nvSpPr>
+        <p:spPr>
+          <a:xfrm>
+            <a:off x="8324791" y="1729004"/>
+            <a:ext cx="2219234" cy="2302570"/>
+          </a:xfrm>
+          <a:prstGeom prst="ellipse">
+            <a:avLst/>
+          </a:prstGeom>
+          <a:solidFill>
+            <a:schemeClr val="accent4">
+              <a:lumMod val="20000"/>
+              <a:lumOff val="80000"/>
+            </a:schemeClr>
+          </a:solidFill>
+        </p:spPr>
+        <p:txBody>
+          <a:bodyPr wrap="square" lIns="91440" tIns="45720" rIns="91440" bIns="45720" rtlCol="0" anchor="t">
+            <a:spAutoFit/>
+          </a:bodyPr>
+          <a:lstStyle/>
+          <a:p>
+            <a:pPr algn="l"/>
+            <a:endParaRPr lang="en-US" sz="1200" dirty="0">
+              <a:solidFill>
+                <a:schemeClr val="accent6">
+                  <a:lumMod val="75000"/>
+                </a:schemeClr>
+              </a:solidFill>
+              <a:latin typeface="Courier New"/>
+              <a:cs typeface="Calibri"/>
+            </a:endParaRPr>
+          </a:p>
+        </p:txBody>
+      </p:sp>
+      <p:cxnSp>
+        <p:nvCxnSpPr>
+          <p:cNvPr id="5" name="Straight Connector 4">
+            <a:extLst>
+              <a:ext uri="{FF2B5EF4-FFF2-40B4-BE49-F238E27FC236}">
+                <a16:creationId xmlns:a16="http://schemas.microsoft.com/office/drawing/2014/main" id="{CFBF7C63-BBAC-F4A7-711D-5C16CED0E082}"/>
+              </a:ext>
+            </a:extLst>
+          </p:cNvPr>
+          <p:cNvCxnSpPr>
+            <a:cxnSpLocks/>
+          </p:cNvCxnSpPr>
+          <p:nvPr/>
+        </p:nvCxnSpPr>
+        <p:spPr>
+          <a:xfrm flipV="1">
+            <a:off x="7995804" y="4458111"/>
+            <a:ext cx="1426321" cy="1458135"/>
+          </a:xfrm>
+          <a:prstGeom prst="line">
+            <a:avLst/>
+          </a:prstGeom>
+          <a:ln w="38100"/>
+        </p:spPr>
+        <p:style>
+          <a:lnRef idx="1">
+            <a:schemeClr val="accent1"/>
+          </a:lnRef>
+          <a:fillRef idx="0">
+            <a:schemeClr val="accent1"/>
+          </a:fillRef>
+          <a:effectRef idx="0">
+            <a:schemeClr val="accent1"/>
+          </a:effectRef>
+          <a:fontRef idx="minor">
+            <a:schemeClr val="tx1"/>
+          </a:fontRef>
+        </p:style>
+      </p:cxnSp>
+      <p:cxnSp>
+        <p:nvCxnSpPr>
+          <p:cNvPr id="6" name="Straight Connector 5">
+            <a:extLst>
+              <a:ext uri="{FF2B5EF4-FFF2-40B4-BE49-F238E27FC236}">
+                <a16:creationId xmlns:a16="http://schemas.microsoft.com/office/drawing/2014/main" id="{D4A791DC-C128-6C92-98CD-008D28DED87C}"/>
+              </a:ext>
+            </a:extLst>
+          </p:cNvPr>
+          <p:cNvCxnSpPr>
+            <a:cxnSpLocks/>
+          </p:cNvCxnSpPr>
+          <p:nvPr/>
+        </p:nvCxnSpPr>
+        <p:spPr>
+          <a:xfrm flipH="1" flipV="1">
+            <a:off x="9422125" y="4458111"/>
+            <a:ext cx="1309163" cy="1325275"/>
+          </a:xfrm>
+          <a:prstGeom prst="line">
+            <a:avLst/>
+          </a:prstGeom>
+          <a:ln w="38100"/>
+        </p:spPr>
+        <p:style>
+          <a:lnRef idx="1">
+            <a:schemeClr val="accent1"/>
+          </a:lnRef>
+          <a:fillRef idx="0">
+            <a:schemeClr val="accent1"/>
+          </a:fillRef>
+          <a:effectRef idx="0">
+            <a:schemeClr val="accent1"/>
+          </a:effectRef>
+          <a:fontRef idx="minor">
+            <a:schemeClr val="tx1"/>
+          </a:fontRef>
+        </p:style>
+      </p:cxnSp>
+      <p:cxnSp>
+        <p:nvCxnSpPr>
+          <p:cNvPr id="11" name="Straight Connector 10">
+            <a:extLst>
+              <a:ext uri="{FF2B5EF4-FFF2-40B4-BE49-F238E27FC236}">
+                <a16:creationId xmlns:a16="http://schemas.microsoft.com/office/drawing/2014/main" id="{7EC75209-2E19-5D34-B466-F95B416B903A}"/>
+              </a:ext>
+            </a:extLst>
+          </p:cNvPr>
+          <p:cNvCxnSpPr>
+            <a:cxnSpLocks/>
+          </p:cNvCxnSpPr>
+          <p:nvPr/>
+        </p:nvCxnSpPr>
+        <p:spPr>
+          <a:xfrm flipV="1">
+            <a:off x="10146657" y="4875600"/>
+            <a:ext cx="223857" cy="288446"/>
+          </a:xfrm>
+          <a:prstGeom prst="line">
+            <a:avLst/>
+          </a:prstGeom>
+          <a:ln w="31750">
+            <a:tailEnd type="triangle"/>
+          </a:ln>
+        </p:spPr>
+        <p:style>
+          <a:lnRef idx="1">
+            <a:schemeClr val="accent1"/>
+          </a:lnRef>
+          <a:fillRef idx="0">
+            <a:schemeClr val="accent1"/>
+          </a:fillRef>
+          <a:effectRef idx="0">
+            <a:schemeClr val="accent1"/>
+          </a:effectRef>
+          <a:fontRef idx="minor">
+            <a:schemeClr val="tx1"/>
+          </a:fontRef>
+        </p:style>
+      </p:cxnSp>
+      <p:cxnSp>
+        <p:nvCxnSpPr>
+          <p:cNvPr id="15" name="Straight Connector 14">
+            <a:extLst>
+              <a:ext uri="{FF2B5EF4-FFF2-40B4-BE49-F238E27FC236}">
+                <a16:creationId xmlns:a16="http://schemas.microsoft.com/office/drawing/2014/main" id="{03207EB0-3F87-421A-5283-77CC4550E402}"/>
+              </a:ext>
+            </a:extLst>
+          </p:cNvPr>
+          <p:cNvCxnSpPr>
+            <a:cxnSpLocks/>
+          </p:cNvCxnSpPr>
+          <p:nvPr/>
+        </p:nvCxnSpPr>
+        <p:spPr>
+          <a:xfrm flipV="1">
+            <a:off x="9421308" y="3044636"/>
+            <a:ext cx="47017" cy="1402877"/>
+          </a:xfrm>
+          <a:prstGeom prst="line">
+            <a:avLst/>
+          </a:prstGeom>
+          <a:ln w="38100">
+            <a:tailEnd type="triangle"/>
+          </a:ln>
+        </p:spPr>
+        <p:style>
+          <a:lnRef idx="1">
+            <a:schemeClr val="accent1"/>
+          </a:lnRef>
+          <a:fillRef idx="0">
+            <a:schemeClr val="accent1"/>
+          </a:fillRef>
+          <a:effectRef idx="0">
+            <a:schemeClr val="accent1"/>
+          </a:effectRef>
+          <a:fontRef idx="minor">
+            <a:schemeClr val="tx1"/>
+          </a:fontRef>
+        </p:style>
+      </p:cxnSp>
+      <p:cxnSp>
+        <p:nvCxnSpPr>
+          <p:cNvPr id="18" name="Straight Connector 17">
+            <a:extLst>
+              <a:ext uri="{FF2B5EF4-FFF2-40B4-BE49-F238E27FC236}">
+                <a16:creationId xmlns:a16="http://schemas.microsoft.com/office/drawing/2014/main" id="{DD606015-A225-8ED2-E210-EF5272A1AFCF}"/>
+              </a:ext>
+            </a:extLst>
+          </p:cNvPr>
+          <p:cNvCxnSpPr>
+            <a:cxnSpLocks/>
+          </p:cNvCxnSpPr>
+          <p:nvPr/>
+        </p:nvCxnSpPr>
+        <p:spPr>
+          <a:xfrm flipH="1" flipV="1">
+            <a:off x="8095003" y="3177496"/>
+            <a:ext cx="1309163" cy="1325275"/>
+          </a:xfrm>
+          <a:prstGeom prst="line">
+            <a:avLst/>
+          </a:prstGeom>
+          <a:ln>
+            <a:prstDash val="sysDot"/>
+          </a:ln>
+        </p:spPr>
+        <p:style>
+          <a:lnRef idx="1">
+            <a:schemeClr val="accent1"/>
+          </a:lnRef>
+          <a:fillRef idx="0">
+            <a:schemeClr val="accent1"/>
+          </a:fillRef>
+          <a:effectRef idx="0">
+            <a:schemeClr val="accent1"/>
+          </a:effectRef>
+          <a:fontRef idx="minor">
+            <a:schemeClr val="tx1"/>
+          </a:fontRef>
+        </p:style>
+      </p:cxnSp>
+      <p:cxnSp>
+        <p:nvCxnSpPr>
+          <p:cNvPr id="19" name="Straight Connector 18">
+            <a:extLst>
+              <a:ext uri="{FF2B5EF4-FFF2-40B4-BE49-F238E27FC236}">
+                <a16:creationId xmlns:a16="http://schemas.microsoft.com/office/drawing/2014/main" id="{EC7F775D-F49C-BD25-BEDD-D2844BFCC14A}"/>
+              </a:ext>
+            </a:extLst>
+          </p:cNvPr>
+          <p:cNvCxnSpPr>
+            <a:cxnSpLocks/>
+          </p:cNvCxnSpPr>
+          <p:nvPr/>
+        </p:nvCxnSpPr>
+        <p:spPr>
+          <a:xfrm flipV="1">
+            <a:off x="9425481" y="3176247"/>
+            <a:ext cx="1305807" cy="1271265"/>
+          </a:xfrm>
+          <a:prstGeom prst="line">
+            <a:avLst/>
+          </a:prstGeom>
+          <a:ln>
+            <a:prstDash val="sysDot"/>
+          </a:ln>
+        </p:spPr>
+        <p:style>
+          <a:lnRef idx="1">
+            <a:schemeClr val="accent1"/>
+          </a:lnRef>
+          <a:fillRef idx="0">
+            <a:schemeClr val="accent1"/>
+          </a:fillRef>
+          <a:effectRef idx="0">
+            <a:schemeClr val="accent1"/>
+          </a:effectRef>
+          <a:fontRef idx="minor">
+            <a:schemeClr val="tx1"/>
+          </a:fontRef>
+        </p:style>
+      </p:cxnSp>
+      <mc:AlternateContent xmlns:mc="http://schemas.openxmlformats.org/markup-compatibility/2006">
+        <mc:Choice xmlns:a14="http://schemas.microsoft.com/office/drawing/2010/main" Requires="a14">
+          <p:sp>
+            <p:nvSpPr>
+              <p:cNvPr id="22" name="TextBox 21">
+                <a:extLst>
+                  <a:ext uri="{FF2B5EF4-FFF2-40B4-BE49-F238E27FC236}">
+                    <a16:creationId xmlns:a16="http://schemas.microsoft.com/office/drawing/2014/main" id="{773E11E3-1853-D748-94F3-A0EF3B00636F}"/>
+                  </a:ext>
+                </a:extLst>
+              </p:cNvPr>
+              <p:cNvSpPr txBox="1"/>
+              <p:nvPr/>
+            </p:nvSpPr>
+            <p:spPr>
+              <a:xfrm>
+                <a:off x="755430" y="2679371"/>
+                <a:ext cx="6096000" cy="402931"/>
+              </a:xfrm>
+              <a:prstGeom prst="rect">
+                <a:avLst/>
+              </a:prstGeom>
+              <a:noFill/>
+            </p:spPr>
+            <p:txBody>
+              <a:bodyPr wrap="square">
+                <a:spAutoFit/>
+              </a:bodyPr>
+              <a:lstStyle/>
+              <a:p>
+                <a:pPr/>
+                <a14:m>
+                  <m:oMathPara xmlns:m="http://schemas.openxmlformats.org/officeDocument/2006/math">
+                    <m:oMathParaPr>
+                      <m:jc m:val="center"/>
+                    </m:oMathParaPr>
+                    <m:oMath xmlns:m="http://schemas.openxmlformats.org/officeDocument/2006/math">
+                      <m:r>
+                        <a:rPr lang="en-US" b="0" i="1" smtClean="0">
+                          <a:latin typeface="Cambria Math" panose="02040503050406030204" pitchFamily="18" charset="0"/>
+                        </a:rPr>
+                        <m:t>𝑟</m:t>
+                      </m:r>
+                      <m:r>
+                        <a:rPr lang="en-US" b="0" i="1" smtClean="0">
+                          <a:latin typeface="Cambria Math" panose="02040503050406030204" pitchFamily="18" charset="0"/>
+                        </a:rPr>
+                        <m:t>=</m:t>
+                      </m:r>
+                      <m:acc>
+                        <m:accPr>
+                          <m:chr m:val="⃑"/>
+                          <m:ctrlPr>
+                            <a:rPr lang="en-US" b="0" i="1" smtClean="0">
+                              <a:latin typeface="Cambria Math" panose="02040503050406030204" pitchFamily="18" charset="0"/>
+                            </a:rPr>
+                          </m:ctrlPr>
+                        </m:accPr>
+                        <m:e>
+                          <m:r>
+                            <a:rPr lang="en-US" b="0" i="1" smtClean="0">
+                              <a:latin typeface="Cambria Math" panose="02040503050406030204" pitchFamily="18" charset="0"/>
+                            </a:rPr>
+                            <m:t>𝑃</m:t>
+                          </m:r>
+                        </m:e>
+                      </m:acc>
+                      <m:r>
+                        <a:rPr lang="en-US" b="0" i="1" smtClean="0">
+                          <a:latin typeface="Cambria Math" panose="02040503050406030204" pitchFamily="18" charset="0"/>
+                        </a:rPr>
+                        <m:t>⋅</m:t>
+                      </m:r>
+                      <m:acc>
+                        <m:accPr>
+                          <m:chr m:val="̂"/>
+                          <m:ctrlPr>
+                            <a:rPr lang="en-US" i="1">
+                              <a:latin typeface="Cambria Math" panose="02040503050406030204" pitchFamily="18" charset="0"/>
+                            </a:rPr>
+                          </m:ctrlPr>
+                        </m:accPr>
+                        <m:e>
+                          <m:sSub>
+                            <m:sSubPr>
+                              <m:ctrlPr>
+                                <a:rPr lang="en-US" i="1">
+                                  <a:latin typeface="Cambria Math" panose="02040503050406030204" pitchFamily="18" charset="0"/>
+                                </a:rPr>
+                              </m:ctrlPr>
+                            </m:sSubPr>
+                            <m:e>
+                              <m:r>
+                                <a:rPr lang="en-US" i="1">
+                                  <a:latin typeface="Cambria Math" panose="02040503050406030204" pitchFamily="18" charset="0"/>
+                                </a:rPr>
+                                <m:t>𝑛</m:t>
+                              </m:r>
+                            </m:e>
+                            <m:sub>
+                              <m:r>
+                                <a:rPr lang="en-US" b="0" i="1" smtClean="0">
+                                  <a:latin typeface="Cambria Math" panose="02040503050406030204" pitchFamily="18" charset="0"/>
+                                </a:rPr>
+                                <m:t>𝑖</m:t>
+                              </m:r>
+                            </m:sub>
+                          </m:sSub>
+                        </m:e>
+                      </m:acc>
+                    </m:oMath>
+                  </m:oMathPara>
+                </a14:m>
+                <a:endParaRPr lang="en-US" b="0" dirty="0"/>
+              </a:p>
+            </p:txBody>
+          </p:sp>
+        </mc:Choice>
+        <mc:Fallback>
+          <p:sp>
+            <p:nvSpPr>
+              <p:cNvPr id="22" name="TextBox 21">
+                <a:extLst>
+                  <a:ext uri="{FF2B5EF4-FFF2-40B4-BE49-F238E27FC236}">
+                    <a16:creationId xmlns:a16="http://schemas.microsoft.com/office/drawing/2014/main" id="{773E11E3-1853-D748-94F3-A0EF3B00636F}"/>
+                  </a:ext>
+                </a:extLst>
+              </p:cNvPr>
+              <p:cNvSpPr txBox="1">
+                <a:spLocks noRot="1" noChangeAspect="1" noMove="1" noResize="1" noEditPoints="1" noAdjustHandles="1" noChangeArrowheads="1" noChangeShapeType="1" noTextEdit="1"/>
+              </p:cNvSpPr>
+              <p:nvPr/>
+            </p:nvSpPr>
+            <p:spPr>
+              <a:xfrm>
+                <a:off x="755430" y="2679371"/>
+                <a:ext cx="6096000" cy="402931"/>
+              </a:xfrm>
+              <a:prstGeom prst="rect">
+                <a:avLst/>
+              </a:prstGeom>
+              <a:blipFill>
+                <a:blip r:embed="rId2"/>
+                <a:stretch>
+                  <a:fillRect b="-1515"/>
+                </a:stretch>
+              </a:blipFill>
+            </p:spPr>
+            <p:txBody>
+              <a:bodyPr/>
+              <a:lstStyle/>
+              <a:p>
+                <a:r>
+                  <a:rPr lang="en-US">
+                    <a:noFill/>
+                  </a:rPr>
+                  <a:t> </a:t>
+                </a:r>
+              </a:p>
+            </p:txBody>
+          </p:sp>
+        </mc:Fallback>
+      </mc:AlternateContent>
+      <mc:AlternateContent xmlns:mc="http://schemas.openxmlformats.org/markup-compatibility/2006" xmlns:a14="http://schemas.microsoft.com/office/drawing/2010/main">
+        <mc:Choice Requires="a14">
+          <p:sp>
+            <p:nvSpPr>
+              <p:cNvPr id="23" name="TextBox 22">
+                <a:extLst>
+                  <a:ext uri="{FF2B5EF4-FFF2-40B4-BE49-F238E27FC236}">
+                    <a16:creationId xmlns:a16="http://schemas.microsoft.com/office/drawing/2014/main" id="{59C71E91-958A-7041-22AF-68E30286FF83}"/>
+                  </a:ext>
+                </a:extLst>
+              </p:cNvPr>
+              <p:cNvSpPr txBox="1"/>
+              <p:nvPr/>
+            </p:nvSpPr>
+            <p:spPr>
+              <a:xfrm>
+                <a:off x="9143713" y="2601302"/>
+                <a:ext cx="248465" cy="276999"/>
+              </a:xfrm>
+              <a:prstGeom prst="rect">
+                <a:avLst/>
+              </a:prstGeom>
+              <a:noFill/>
+            </p:spPr>
+            <p:txBody>
+              <a:bodyPr wrap="square" lIns="0" tIns="0" rIns="0" bIns="0" rtlCol="0">
+                <a:spAutoFit/>
+              </a:bodyPr>
+              <a:lstStyle/>
+              <a:p>
+                <a:pPr/>
+                <a14:m>
+                  <m:oMathPara xmlns:m="http://schemas.openxmlformats.org/officeDocument/2006/math">
+                    <m:oMathParaPr>
+                      <m:jc m:val="centerGroup"/>
+                    </m:oMathParaPr>
+                    <m:oMath xmlns:m="http://schemas.openxmlformats.org/officeDocument/2006/math">
+                      <m:r>
+                        <a:rPr lang="en-US" b="0" i="1" smtClean="0">
+                          <a:latin typeface="Cambria Math" panose="02040503050406030204" pitchFamily="18" charset="0"/>
+                        </a:rPr>
+                        <m:t>(</m:t>
+                      </m:r>
+                      <m:r>
+                        <a:rPr lang="en-US" b="0" i="1" smtClean="0">
+                          <a:latin typeface="Cambria Math" panose="02040503050406030204" pitchFamily="18" charset="0"/>
+                        </a:rPr>
+                        <m:t>𝐶𝑥</m:t>
+                      </m:r>
+                      <m:r>
+                        <a:rPr lang="en-US" b="0" i="1" smtClean="0">
+                          <a:latin typeface="Cambria Math" panose="02040503050406030204" pitchFamily="18" charset="0"/>
+                        </a:rPr>
+                        <m:t>, </m:t>
+                      </m:r>
+                      <m:r>
+                        <a:rPr lang="en-US" b="0" i="1" smtClean="0">
+                          <a:latin typeface="Cambria Math" panose="02040503050406030204" pitchFamily="18" charset="0"/>
+                        </a:rPr>
+                        <m:t>𝐶𝑦</m:t>
+                      </m:r>
+                      <m:r>
+                        <a:rPr lang="en-US" b="0" i="1" smtClean="0">
+                          <a:latin typeface="Cambria Math" panose="02040503050406030204" pitchFamily="18" charset="0"/>
+                        </a:rPr>
+                        <m:t>)</m:t>
+                      </m:r>
+                    </m:oMath>
+                  </m:oMathPara>
+                </a14:m>
+                <a:endParaRPr lang="en-US" dirty="0"/>
+              </a:p>
+            </p:txBody>
+          </p:sp>
+        </mc:Choice>
+        <mc:Fallback xmlns="">
+          <p:sp>
+            <p:nvSpPr>
+              <p:cNvPr id="23" name="TextBox 22">
+                <a:extLst>
+                  <a:ext uri="{FF2B5EF4-FFF2-40B4-BE49-F238E27FC236}">
+                    <a16:creationId xmlns:a16="http://schemas.microsoft.com/office/drawing/2014/main" id="{C269AD5C-D53B-0705-4BFC-F6542823E55B}"/>
+                  </a:ext>
+                </a:extLst>
+              </p:cNvPr>
+              <p:cNvSpPr txBox="1">
+                <a:spLocks noRot="1" noChangeAspect="1" noMove="1" noResize="1" noEditPoints="1" noAdjustHandles="1" noChangeArrowheads="1" noChangeShapeType="1" noTextEdit="1"/>
+              </p:cNvSpPr>
+              <p:nvPr/>
+            </p:nvSpPr>
+            <p:spPr>
+              <a:xfrm>
+                <a:off x="9143713" y="2601302"/>
+                <a:ext cx="248465" cy="276999"/>
+              </a:xfrm>
+              <a:prstGeom prst="rect">
+                <a:avLst/>
+              </a:prstGeom>
+              <a:blipFill>
+                <a:blip r:embed="rId5"/>
+                <a:stretch>
+                  <a:fillRect l="-43902" t="-4444" r="-268293" b="-35556"/>
+                </a:stretch>
+              </a:blipFill>
+            </p:spPr>
+            <p:txBody>
+              <a:bodyPr/>
+              <a:lstStyle/>
+              <a:p>
+                <a:r>
+                  <a:rPr lang="en-US">
+                    <a:noFill/>
+                  </a:rPr>
+                  <a:t> </a:t>
+                </a:r>
+              </a:p>
+            </p:txBody>
+          </p:sp>
+        </mc:Fallback>
+      </mc:AlternateContent>
+      <p:cxnSp>
+        <p:nvCxnSpPr>
+          <p:cNvPr id="25" name="Straight Connector 24">
+            <a:extLst>
+              <a:ext uri="{FF2B5EF4-FFF2-40B4-BE49-F238E27FC236}">
+                <a16:creationId xmlns:a16="http://schemas.microsoft.com/office/drawing/2014/main" id="{EA854F5B-0A7B-4713-1489-85184589318D}"/>
+              </a:ext>
+            </a:extLst>
+          </p:cNvPr>
+          <p:cNvCxnSpPr>
+            <a:cxnSpLocks/>
+          </p:cNvCxnSpPr>
+          <p:nvPr/>
+        </p:nvCxnSpPr>
+        <p:spPr>
+          <a:xfrm flipH="1" flipV="1">
+            <a:off x="8376148" y="4929308"/>
+            <a:ext cx="291962" cy="281685"/>
+          </a:xfrm>
+          <a:prstGeom prst="line">
+            <a:avLst/>
+          </a:prstGeom>
+          <a:ln w="31750">
+            <a:tailEnd type="triangle"/>
+          </a:ln>
+        </p:spPr>
+        <p:style>
+          <a:lnRef idx="1">
+            <a:schemeClr val="accent1"/>
+          </a:lnRef>
+          <a:fillRef idx="0">
+            <a:schemeClr val="accent1"/>
+          </a:fillRef>
+          <a:effectRef idx="0">
+            <a:schemeClr val="accent1"/>
+          </a:effectRef>
+          <a:fontRef idx="minor">
+            <a:schemeClr val="tx1"/>
+          </a:fontRef>
+        </p:style>
+      </p:cxnSp>
+      <mc:AlternateContent xmlns:mc="http://schemas.openxmlformats.org/markup-compatibility/2006" xmlns:a14="http://schemas.microsoft.com/office/drawing/2010/main">
+        <mc:Choice Requires="a14">
+          <p:sp>
+            <p:nvSpPr>
+              <p:cNvPr id="26" name="TextBox 25">
+                <a:extLst>
+                  <a:ext uri="{FF2B5EF4-FFF2-40B4-BE49-F238E27FC236}">
+                    <a16:creationId xmlns:a16="http://schemas.microsoft.com/office/drawing/2014/main" id="{32AC285B-E97A-6132-D4F4-4F0F912D0888}"/>
+                  </a:ext>
+                </a:extLst>
+              </p:cNvPr>
+              <p:cNvSpPr txBox="1"/>
+              <p:nvPr/>
+            </p:nvSpPr>
+            <p:spPr>
+              <a:xfrm>
+                <a:off x="7513531" y="5649846"/>
+                <a:ext cx="469937" cy="276999"/>
+              </a:xfrm>
+              <a:prstGeom prst="rect">
+                <a:avLst/>
+              </a:prstGeom>
+              <a:noFill/>
+            </p:spPr>
+            <p:txBody>
+              <a:bodyPr wrap="none" lIns="0" tIns="0" rIns="0" bIns="0" rtlCol="0">
+                <a:spAutoFit/>
+              </a:bodyPr>
+              <a:lstStyle/>
+              <a:p>
+                <a:pPr/>
+                <a14:m>
+                  <m:oMathPara xmlns:m="http://schemas.openxmlformats.org/officeDocument/2006/math">
+                    <m:oMathParaPr>
+                      <m:jc m:val="centerGroup"/>
+                    </m:oMathParaPr>
+                    <m:oMath xmlns:m="http://schemas.openxmlformats.org/officeDocument/2006/math">
+                      <m:sSub>
+                        <m:sSubPr>
+                          <m:ctrlPr>
+                            <a:rPr lang="en-US" b="0" i="1" smtClean="0">
+                              <a:latin typeface="Cambria Math" panose="02040503050406030204" pitchFamily="18" charset="0"/>
+                            </a:rPr>
+                          </m:ctrlPr>
+                        </m:sSubPr>
+                        <m:e>
+                          <m:r>
+                            <a:rPr lang="en-US" b="0" i="1" smtClean="0">
+                              <a:latin typeface="Cambria Math" panose="02040503050406030204" pitchFamily="18" charset="0"/>
+                            </a:rPr>
+                            <m:t>𝑣</m:t>
+                          </m:r>
+                        </m:e>
+                        <m:sub>
+                          <m:r>
+                            <a:rPr lang="en-US" b="0" i="1" smtClean="0">
+                              <a:latin typeface="Cambria Math" panose="02040503050406030204" pitchFamily="18" charset="0"/>
+                            </a:rPr>
+                            <m:t>𝑖</m:t>
+                          </m:r>
+                          <m:r>
+                            <a:rPr lang="en-US" b="0" i="1" smtClean="0">
+                              <a:latin typeface="Cambria Math" panose="02040503050406030204" pitchFamily="18" charset="0"/>
+                            </a:rPr>
+                            <m:t>−1</m:t>
+                          </m:r>
+                        </m:sub>
+                      </m:sSub>
+                    </m:oMath>
+                  </m:oMathPara>
+                </a14:m>
+                <a:endParaRPr lang="en-US" b="0" dirty="0"/>
+              </a:p>
+            </p:txBody>
+          </p:sp>
+        </mc:Choice>
+        <mc:Fallback xmlns="">
+          <p:sp>
+            <p:nvSpPr>
+              <p:cNvPr id="26" name="TextBox 25">
+                <a:extLst>
+                  <a:ext uri="{FF2B5EF4-FFF2-40B4-BE49-F238E27FC236}">
+                    <a16:creationId xmlns:a16="http://schemas.microsoft.com/office/drawing/2014/main" id="{7C9CE853-BEA9-0610-9D25-217ECD478C16}"/>
+                  </a:ext>
+                </a:extLst>
+              </p:cNvPr>
+              <p:cNvSpPr txBox="1">
+                <a:spLocks noRot="1" noChangeAspect="1" noMove="1" noResize="1" noEditPoints="1" noAdjustHandles="1" noChangeArrowheads="1" noChangeShapeType="1" noTextEdit="1"/>
+              </p:cNvSpPr>
+              <p:nvPr/>
+            </p:nvSpPr>
+            <p:spPr>
+              <a:xfrm>
+                <a:off x="7513531" y="5649846"/>
+                <a:ext cx="469937" cy="276999"/>
+              </a:xfrm>
+              <a:prstGeom prst="rect">
+                <a:avLst/>
+              </a:prstGeom>
+              <a:blipFill>
+                <a:blip r:embed="rId6"/>
+                <a:stretch>
+                  <a:fillRect l="-6494" r="-3896" b="-17778"/>
+                </a:stretch>
+              </a:blipFill>
+            </p:spPr>
+            <p:txBody>
+              <a:bodyPr/>
+              <a:lstStyle/>
+              <a:p>
+                <a:r>
+                  <a:rPr lang="en-US">
+                    <a:noFill/>
+                  </a:rPr>
+                  <a:t> </a:t>
+                </a:r>
+              </a:p>
+            </p:txBody>
+          </p:sp>
+        </mc:Fallback>
+      </mc:AlternateContent>
+      <mc:AlternateContent xmlns:mc="http://schemas.openxmlformats.org/markup-compatibility/2006" xmlns:a14="http://schemas.microsoft.com/office/drawing/2010/main">
+        <mc:Choice Requires="a14">
+          <p:sp>
+            <p:nvSpPr>
+              <p:cNvPr id="28" name="TextBox 27">
+                <a:extLst>
+                  <a:ext uri="{FF2B5EF4-FFF2-40B4-BE49-F238E27FC236}">
+                    <a16:creationId xmlns:a16="http://schemas.microsoft.com/office/drawing/2014/main" id="{7F92374F-21B1-DDFC-0D0F-E2006356AF7E}"/>
+                  </a:ext>
+                </a:extLst>
+              </p:cNvPr>
+              <p:cNvSpPr txBox="1"/>
+              <p:nvPr/>
+            </p:nvSpPr>
+            <p:spPr>
+              <a:xfrm>
+                <a:off x="8283402" y="4652309"/>
+                <a:ext cx="480196" cy="276999"/>
+              </a:xfrm>
+              <a:prstGeom prst="rect">
+                <a:avLst/>
+              </a:prstGeom>
+              <a:noFill/>
+            </p:spPr>
+            <p:txBody>
+              <a:bodyPr wrap="none" lIns="0" tIns="0" rIns="0" bIns="0" rtlCol="0">
+                <a:spAutoFit/>
+              </a:bodyPr>
+              <a:lstStyle/>
+              <a:p>
+                <a:pPr/>
+                <a14:m>
+                  <m:oMathPara xmlns:m="http://schemas.openxmlformats.org/officeDocument/2006/math">
+                    <m:oMathParaPr>
+                      <m:jc m:val="centerGroup"/>
+                    </m:oMathParaPr>
+                    <m:oMath xmlns:m="http://schemas.openxmlformats.org/officeDocument/2006/math">
+                      <m:acc>
+                        <m:accPr>
+                          <m:chr m:val="̂"/>
+                          <m:ctrlPr>
+                            <a:rPr lang="en-US" b="0" i="1" smtClean="0">
+                              <a:latin typeface="Cambria Math" panose="02040503050406030204" pitchFamily="18" charset="0"/>
+                            </a:rPr>
+                          </m:ctrlPr>
+                        </m:accPr>
+                        <m:e>
+                          <m:sSub>
+                            <m:sSubPr>
+                              <m:ctrlPr>
+                                <a:rPr lang="en-US" b="0" i="1" smtClean="0">
+                                  <a:latin typeface="Cambria Math" panose="02040503050406030204" pitchFamily="18" charset="0"/>
+                                </a:rPr>
+                              </m:ctrlPr>
+                            </m:sSubPr>
+                            <m:e>
+                              <m:r>
+                                <a:rPr lang="en-US" b="0" i="1" smtClean="0">
+                                  <a:latin typeface="Cambria Math" panose="02040503050406030204" pitchFamily="18" charset="0"/>
+                                </a:rPr>
+                                <m:t>𝑛</m:t>
+                              </m:r>
+                            </m:e>
+                            <m:sub>
+                              <m:r>
+                                <a:rPr lang="en-US" b="0" i="1" smtClean="0">
+                                  <a:latin typeface="Cambria Math" panose="02040503050406030204" pitchFamily="18" charset="0"/>
+                                </a:rPr>
+                                <m:t>𝑖</m:t>
+                              </m:r>
+                              <m:r>
+                                <a:rPr lang="en-US" b="0" i="1" smtClean="0">
+                                  <a:latin typeface="Cambria Math" panose="02040503050406030204" pitchFamily="18" charset="0"/>
+                                </a:rPr>
+                                <m:t>−1</m:t>
+                              </m:r>
+                            </m:sub>
+                          </m:sSub>
+                        </m:e>
+                      </m:acc>
+                    </m:oMath>
+                  </m:oMathPara>
+                </a14:m>
+                <a:endParaRPr lang="en-US" b="0" dirty="0"/>
+              </a:p>
+            </p:txBody>
+          </p:sp>
+        </mc:Choice>
+        <mc:Fallback xmlns="">
+          <p:sp>
+            <p:nvSpPr>
+              <p:cNvPr id="28" name="TextBox 27">
+                <a:extLst>
+                  <a:ext uri="{FF2B5EF4-FFF2-40B4-BE49-F238E27FC236}">
+                    <a16:creationId xmlns:a16="http://schemas.microsoft.com/office/drawing/2014/main" id="{94AE3574-34D2-6B66-0AAF-4FDF13B721A6}"/>
+                  </a:ext>
+                </a:extLst>
+              </p:cNvPr>
+              <p:cNvSpPr txBox="1">
+                <a:spLocks noRot="1" noChangeAspect="1" noMove="1" noResize="1" noEditPoints="1" noAdjustHandles="1" noChangeArrowheads="1" noChangeShapeType="1" noTextEdit="1"/>
+              </p:cNvSpPr>
+              <p:nvPr/>
+            </p:nvSpPr>
+            <p:spPr>
+              <a:xfrm>
+                <a:off x="8283402" y="4652309"/>
+                <a:ext cx="480196" cy="276999"/>
+              </a:xfrm>
+              <a:prstGeom prst="rect">
+                <a:avLst/>
+              </a:prstGeom>
+              <a:blipFill>
+                <a:blip r:embed="rId7"/>
+                <a:stretch>
+                  <a:fillRect l="-11392" t="-23913" r="-25316" b="-17391"/>
+                </a:stretch>
+              </a:blipFill>
+            </p:spPr>
+            <p:txBody>
+              <a:bodyPr/>
+              <a:lstStyle/>
+              <a:p>
+                <a:r>
+                  <a:rPr lang="en-US">
+                    <a:noFill/>
+                  </a:rPr>
+                  <a:t> </a:t>
+                </a:r>
+              </a:p>
+            </p:txBody>
+          </p:sp>
+        </mc:Fallback>
+      </mc:AlternateContent>
+      <p:sp>
+        <p:nvSpPr>
+          <p:cNvPr id="30" name="Oval 29">
+            <a:extLst>
+              <a:ext uri="{FF2B5EF4-FFF2-40B4-BE49-F238E27FC236}">
+                <a16:creationId xmlns:a16="http://schemas.microsoft.com/office/drawing/2014/main" id="{5CD3FF73-A559-0F19-64E7-A46667CAC8AC}"/>
+              </a:ext>
+            </a:extLst>
+          </p:cNvPr>
+          <p:cNvSpPr/>
+          <p:nvPr/>
+        </p:nvSpPr>
+        <p:spPr>
+          <a:xfrm>
+            <a:off x="9468325" y="2915928"/>
+            <a:ext cx="55825" cy="67392"/>
+          </a:xfrm>
+          <a:prstGeom prst="ellipse">
+            <a:avLst/>
+          </a:prstGeom>
+          <a:solidFill>
+            <a:schemeClr val="tx1"/>
+          </a:solidFill>
+          <a:ln>
+            <a:solidFill>
+              <a:schemeClr val="tx1"/>
+            </a:solidFill>
+          </a:ln>
+        </p:spPr>
+        <p:txBody>
+          <a:bodyPr wrap="square" lIns="91440" tIns="45720" rIns="91440" bIns="45720" rtlCol="0" anchor="t">
+            <a:spAutoFit/>
+          </a:bodyPr>
+          <a:lstStyle/>
+          <a:p>
+            <a:pPr algn="l"/>
+            <a:endParaRPr lang="en-US" sz="1200" dirty="0">
+              <a:solidFill>
+                <a:schemeClr val="accent6">
+                  <a:lumMod val="75000"/>
+                </a:schemeClr>
+              </a:solidFill>
+              <a:latin typeface="Courier New"/>
+              <a:cs typeface="Calibri"/>
+            </a:endParaRPr>
+          </a:p>
+        </p:txBody>
+      </p:sp>
+      <p:cxnSp>
+        <p:nvCxnSpPr>
+          <p:cNvPr id="32" name="Straight Arrow Connector 31">
+            <a:extLst>
+              <a:ext uri="{FF2B5EF4-FFF2-40B4-BE49-F238E27FC236}">
+                <a16:creationId xmlns:a16="http://schemas.microsoft.com/office/drawing/2014/main" id="{6679E334-EE1F-9D2C-5861-3CFF23013FA1}"/>
+              </a:ext>
+            </a:extLst>
+          </p:cNvPr>
+          <p:cNvCxnSpPr>
+            <a:stCxn id="4" idx="3"/>
+          </p:cNvCxnSpPr>
+          <p:nvPr/>
+        </p:nvCxnSpPr>
+        <p:spPr>
+          <a:xfrm flipV="1">
+            <a:off x="8649790" y="3037747"/>
+            <a:ext cx="784618" cy="656623"/>
+          </a:xfrm>
+          <a:prstGeom prst="straightConnector1">
+            <a:avLst/>
+          </a:prstGeom>
+          <a:ln>
+            <a:tailEnd type="triangle"/>
+          </a:ln>
+        </p:spPr>
+        <p:style>
+          <a:lnRef idx="1">
+            <a:schemeClr val="accent1"/>
+          </a:lnRef>
+          <a:fillRef idx="0">
+            <a:schemeClr val="accent1"/>
+          </a:fillRef>
+          <a:effectRef idx="0">
+            <a:schemeClr val="accent1"/>
+          </a:effectRef>
+          <a:fontRef idx="minor">
+            <a:schemeClr val="tx1"/>
+          </a:fontRef>
+        </p:style>
+      </p:cxnSp>
+      <mc:AlternateContent xmlns:mc="http://schemas.openxmlformats.org/markup-compatibility/2006" xmlns:a14="http://schemas.microsoft.com/office/drawing/2010/main">
+        <mc:Choice Requires="a14">
+          <p:sp>
+            <p:nvSpPr>
+              <p:cNvPr id="33" name="TextBox 32">
+                <a:extLst>
+                  <a:ext uri="{FF2B5EF4-FFF2-40B4-BE49-F238E27FC236}">
+                    <a16:creationId xmlns:a16="http://schemas.microsoft.com/office/drawing/2014/main" id="{B960FB03-9ACC-445C-024B-7A8EBA0C5DB2}"/>
+                  </a:ext>
+                </a:extLst>
+              </p:cNvPr>
+              <p:cNvSpPr txBox="1"/>
+              <p:nvPr/>
+            </p:nvSpPr>
+            <p:spPr>
+              <a:xfrm>
+                <a:off x="8851695" y="3089059"/>
+                <a:ext cx="166969" cy="276999"/>
+              </a:xfrm>
+              <a:prstGeom prst="rect">
+                <a:avLst/>
+              </a:prstGeom>
+              <a:noFill/>
+            </p:spPr>
+            <p:txBody>
+              <a:bodyPr wrap="none" lIns="0" tIns="0" rIns="0" bIns="0" rtlCol="0">
+                <a:spAutoFit/>
+              </a:bodyPr>
+              <a:lstStyle/>
+              <a:p>
+                <a:pPr/>
+                <a14:m>
+                  <m:oMathPara xmlns:m="http://schemas.openxmlformats.org/officeDocument/2006/math">
+                    <m:oMathParaPr>
+                      <m:jc m:val="centerGroup"/>
+                    </m:oMathParaPr>
+                    <m:oMath xmlns:m="http://schemas.openxmlformats.org/officeDocument/2006/math">
+                      <m:r>
+                        <a:rPr lang="en-US" b="0" i="1" smtClean="0">
+                          <a:latin typeface="Cambria Math" panose="02040503050406030204" pitchFamily="18" charset="0"/>
+                        </a:rPr>
+                        <m:t>𝑟</m:t>
+                      </m:r>
+                    </m:oMath>
+                  </m:oMathPara>
+                </a14:m>
+                <a:endParaRPr lang="en-US" b="0" dirty="0"/>
+              </a:p>
+            </p:txBody>
+          </p:sp>
+        </mc:Choice>
+        <mc:Fallback xmlns="">
+          <p:sp>
+            <p:nvSpPr>
+              <p:cNvPr id="33" name="TextBox 32">
+                <a:extLst>
+                  <a:ext uri="{FF2B5EF4-FFF2-40B4-BE49-F238E27FC236}">
+                    <a16:creationId xmlns:a16="http://schemas.microsoft.com/office/drawing/2014/main" id="{C28817DC-6FFE-1ABB-2D9B-3E1897DA3E59}"/>
+                  </a:ext>
+                </a:extLst>
+              </p:cNvPr>
+              <p:cNvSpPr txBox="1">
+                <a:spLocks noRot="1" noChangeAspect="1" noMove="1" noResize="1" noEditPoints="1" noAdjustHandles="1" noChangeArrowheads="1" noChangeShapeType="1" noTextEdit="1"/>
+              </p:cNvSpPr>
+              <p:nvPr/>
+            </p:nvSpPr>
+            <p:spPr>
+              <a:xfrm>
+                <a:off x="8851695" y="3089059"/>
+                <a:ext cx="166969" cy="276999"/>
+              </a:xfrm>
+              <a:prstGeom prst="rect">
+                <a:avLst/>
+              </a:prstGeom>
+              <a:blipFill>
+                <a:blip r:embed="rId8"/>
+                <a:stretch>
+                  <a:fillRect l="-22222" r="-18519"/>
+                </a:stretch>
+              </a:blipFill>
+            </p:spPr>
+            <p:txBody>
+              <a:bodyPr/>
+              <a:lstStyle/>
+              <a:p>
+                <a:r>
+                  <a:rPr lang="en-US">
+                    <a:noFill/>
+                  </a:rPr>
+                  <a:t> </a:t>
+                </a:r>
+              </a:p>
+            </p:txBody>
+          </p:sp>
+        </mc:Fallback>
+      </mc:AlternateContent>
+      <mc:AlternateContent xmlns:mc="http://schemas.openxmlformats.org/markup-compatibility/2006" xmlns:a14="http://schemas.microsoft.com/office/drawing/2010/main">
+        <mc:Choice Requires="a14">
+          <p:sp>
+            <p:nvSpPr>
+              <p:cNvPr id="34" name="TextBox 33">
+                <a:extLst>
+                  <a:ext uri="{FF2B5EF4-FFF2-40B4-BE49-F238E27FC236}">
+                    <a16:creationId xmlns:a16="http://schemas.microsoft.com/office/drawing/2014/main" id="{095C7B19-B6DC-F95B-AA97-45B248A5FF9D}"/>
+                  </a:ext>
+                </a:extLst>
+              </p:cNvPr>
+              <p:cNvSpPr txBox="1"/>
+              <p:nvPr/>
+            </p:nvSpPr>
+            <p:spPr>
+              <a:xfrm>
+                <a:off x="10191853" y="4472011"/>
+                <a:ext cx="260584" cy="276999"/>
+              </a:xfrm>
+              <a:prstGeom prst="rect">
+                <a:avLst/>
+              </a:prstGeom>
+              <a:noFill/>
+            </p:spPr>
+            <p:txBody>
+              <a:bodyPr wrap="none" lIns="0" tIns="0" rIns="0" bIns="0" rtlCol="0">
+                <a:spAutoFit/>
+              </a:bodyPr>
+              <a:lstStyle/>
+              <a:p>
+                <a:pPr/>
+                <a14:m>
+                  <m:oMathPara xmlns:m="http://schemas.openxmlformats.org/officeDocument/2006/math">
+                    <m:oMathParaPr>
+                      <m:jc m:val="centerGroup"/>
+                    </m:oMathParaPr>
+                    <m:oMath xmlns:m="http://schemas.openxmlformats.org/officeDocument/2006/math">
+                      <m:acc>
+                        <m:accPr>
+                          <m:chr m:val="̂"/>
+                          <m:ctrlPr>
+                            <a:rPr lang="en-US" b="0" i="1" smtClean="0">
+                              <a:latin typeface="Cambria Math" panose="02040503050406030204" pitchFamily="18" charset="0"/>
+                            </a:rPr>
+                          </m:ctrlPr>
+                        </m:accPr>
+                        <m:e>
+                          <m:sSub>
+                            <m:sSubPr>
+                              <m:ctrlPr>
+                                <a:rPr lang="en-US" b="0" i="1" smtClean="0">
+                                  <a:latin typeface="Cambria Math" panose="02040503050406030204" pitchFamily="18" charset="0"/>
+                                </a:rPr>
+                              </m:ctrlPr>
+                            </m:sSubPr>
+                            <m:e>
+                              <m:r>
+                                <a:rPr lang="en-US" b="0" i="1" smtClean="0">
+                                  <a:latin typeface="Cambria Math" panose="02040503050406030204" pitchFamily="18" charset="0"/>
+                                </a:rPr>
+                                <m:t>𝑛</m:t>
+                              </m:r>
+                            </m:e>
+                            <m:sub>
+                              <m:r>
+                                <a:rPr lang="en-US" b="0" i="1" smtClean="0">
+                                  <a:latin typeface="Cambria Math" panose="02040503050406030204" pitchFamily="18" charset="0"/>
+                                </a:rPr>
+                                <m:t>𝑖</m:t>
+                              </m:r>
+                            </m:sub>
+                          </m:sSub>
+                        </m:e>
+                      </m:acc>
+                    </m:oMath>
+                  </m:oMathPara>
+                </a14:m>
+                <a:endParaRPr lang="en-US" b="0" dirty="0"/>
+              </a:p>
+            </p:txBody>
+          </p:sp>
+        </mc:Choice>
+        <mc:Fallback xmlns="">
+          <p:sp>
+            <p:nvSpPr>
+              <p:cNvPr id="34" name="TextBox 33">
+                <a:extLst>
+                  <a:ext uri="{FF2B5EF4-FFF2-40B4-BE49-F238E27FC236}">
+                    <a16:creationId xmlns:a16="http://schemas.microsoft.com/office/drawing/2014/main" id="{22B3F735-3AF2-A7B8-FD3A-94D96D9276EC}"/>
+                  </a:ext>
+                </a:extLst>
+              </p:cNvPr>
+              <p:cNvSpPr txBox="1">
+                <a:spLocks noRot="1" noChangeAspect="1" noMove="1" noResize="1" noEditPoints="1" noAdjustHandles="1" noChangeArrowheads="1" noChangeShapeType="1" noTextEdit="1"/>
+              </p:cNvSpPr>
+              <p:nvPr/>
+            </p:nvSpPr>
+            <p:spPr>
+              <a:xfrm>
+                <a:off x="10191853" y="4472011"/>
+                <a:ext cx="260584" cy="276999"/>
+              </a:xfrm>
+              <a:prstGeom prst="rect">
+                <a:avLst/>
+              </a:prstGeom>
+              <a:blipFill>
+                <a:blip r:embed="rId9"/>
+                <a:stretch>
+                  <a:fillRect l="-13953" t="-26667" r="-55814" b="-17778"/>
+                </a:stretch>
+              </a:blipFill>
+            </p:spPr>
+            <p:txBody>
+              <a:bodyPr/>
+              <a:lstStyle/>
+              <a:p>
+                <a:r>
+                  <a:rPr lang="en-US">
+                    <a:noFill/>
+                  </a:rPr>
+                  <a:t> </a:t>
+                </a:r>
+              </a:p>
+            </p:txBody>
+          </p:sp>
+        </mc:Fallback>
+      </mc:AlternateContent>
+      <mc:AlternateContent xmlns:mc="http://schemas.openxmlformats.org/markup-compatibility/2006" xmlns:a14="http://schemas.microsoft.com/office/drawing/2010/main">
+        <mc:Choice Requires="a14">
+          <p:sp>
+            <p:nvSpPr>
+              <p:cNvPr id="35" name="TextBox 34">
+                <a:extLst>
+                  <a:ext uri="{FF2B5EF4-FFF2-40B4-BE49-F238E27FC236}">
+                    <a16:creationId xmlns:a16="http://schemas.microsoft.com/office/drawing/2014/main" id="{0F546606-4585-8D04-5E37-4C5867A3743A}"/>
+                  </a:ext>
+                </a:extLst>
+              </p:cNvPr>
+              <p:cNvSpPr txBox="1"/>
+              <p:nvPr/>
+            </p:nvSpPr>
+            <p:spPr>
+              <a:xfrm>
+                <a:off x="9243724" y="4583819"/>
+                <a:ext cx="250325" cy="276999"/>
+              </a:xfrm>
+              <a:prstGeom prst="rect">
+                <a:avLst/>
+              </a:prstGeom>
+              <a:noFill/>
+            </p:spPr>
+            <p:txBody>
+              <a:bodyPr wrap="none" lIns="0" tIns="0" rIns="0" bIns="0" rtlCol="0">
+                <a:spAutoFit/>
+              </a:bodyPr>
+              <a:lstStyle/>
+              <a:p>
+                <a:pPr/>
+                <a14:m>
+                  <m:oMathPara xmlns:m="http://schemas.openxmlformats.org/officeDocument/2006/math">
+                    <m:oMathParaPr>
+                      <m:jc m:val="centerGroup"/>
+                    </m:oMathParaPr>
+                    <m:oMath xmlns:m="http://schemas.openxmlformats.org/officeDocument/2006/math">
+                      <m:sSub>
+                        <m:sSubPr>
+                          <m:ctrlPr>
+                            <a:rPr lang="en-US" b="0" i="1" smtClean="0">
+                              <a:latin typeface="Cambria Math" panose="02040503050406030204" pitchFamily="18" charset="0"/>
+                            </a:rPr>
+                          </m:ctrlPr>
+                        </m:sSubPr>
+                        <m:e>
+                          <m:r>
+                            <a:rPr lang="en-US" b="0" i="1" smtClean="0">
+                              <a:latin typeface="Cambria Math" panose="02040503050406030204" pitchFamily="18" charset="0"/>
+                            </a:rPr>
+                            <m:t>𝑣</m:t>
+                          </m:r>
+                        </m:e>
+                        <m:sub>
+                          <m:r>
+                            <a:rPr lang="en-US" b="0" i="1" smtClean="0">
+                              <a:latin typeface="Cambria Math" panose="02040503050406030204" pitchFamily="18" charset="0"/>
+                            </a:rPr>
+                            <m:t>𝑖</m:t>
+                          </m:r>
+                        </m:sub>
+                      </m:sSub>
+                    </m:oMath>
+                  </m:oMathPara>
+                </a14:m>
+                <a:endParaRPr lang="en-US" b="0" dirty="0"/>
+              </a:p>
+            </p:txBody>
+          </p:sp>
+        </mc:Choice>
+        <mc:Fallback xmlns="">
+          <p:sp>
+            <p:nvSpPr>
+              <p:cNvPr id="35" name="TextBox 34">
+                <a:extLst>
+                  <a:ext uri="{FF2B5EF4-FFF2-40B4-BE49-F238E27FC236}">
+                    <a16:creationId xmlns:a16="http://schemas.microsoft.com/office/drawing/2014/main" id="{B4D617CE-B3B9-778B-70AE-8DD8634EE405}"/>
+                  </a:ext>
+                </a:extLst>
+              </p:cNvPr>
+              <p:cNvSpPr txBox="1">
+                <a:spLocks noRot="1" noChangeAspect="1" noMove="1" noResize="1" noEditPoints="1" noAdjustHandles="1" noChangeArrowheads="1" noChangeShapeType="1" noTextEdit="1"/>
+              </p:cNvSpPr>
+              <p:nvPr/>
+            </p:nvSpPr>
+            <p:spPr>
+              <a:xfrm>
+                <a:off x="9243724" y="4583819"/>
+                <a:ext cx="250325" cy="276999"/>
+              </a:xfrm>
+              <a:prstGeom prst="rect">
+                <a:avLst/>
+              </a:prstGeom>
+              <a:blipFill>
+                <a:blip r:embed="rId10"/>
+                <a:stretch>
+                  <a:fillRect l="-14634" r="-12195" b="-17778"/>
+                </a:stretch>
+              </a:blipFill>
+            </p:spPr>
+            <p:txBody>
+              <a:bodyPr/>
+              <a:lstStyle/>
+              <a:p>
+                <a:r>
+                  <a:rPr lang="en-US">
+                    <a:noFill/>
+                  </a:rPr>
+                  <a:t> </a:t>
+                </a:r>
+              </a:p>
+            </p:txBody>
+          </p:sp>
+        </mc:Fallback>
+      </mc:AlternateContent>
+      <mc:AlternateContent xmlns:mc="http://schemas.openxmlformats.org/markup-compatibility/2006">
+        <mc:Choice xmlns:a14="http://schemas.microsoft.com/office/drawing/2010/main" Requires="a14">
+          <p:sp>
+            <p:nvSpPr>
+              <p:cNvPr id="7" name="TextBox 6">
+                <a:extLst>
+                  <a:ext uri="{FF2B5EF4-FFF2-40B4-BE49-F238E27FC236}">
+                    <a16:creationId xmlns:a16="http://schemas.microsoft.com/office/drawing/2014/main" id="{F59C84F8-689F-E729-313B-F8F6B694AB63}"/>
+                  </a:ext>
+                </a:extLst>
+              </p:cNvPr>
+              <p:cNvSpPr txBox="1"/>
+              <p:nvPr/>
+            </p:nvSpPr>
+            <p:spPr>
+              <a:xfrm>
+                <a:off x="816884" y="3651976"/>
+                <a:ext cx="6096000" cy="402931"/>
+              </a:xfrm>
+              <a:prstGeom prst="rect">
+                <a:avLst/>
+              </a:prstGeom>
+              <a:noFill/>
+            </p:spPr>
+            <p:txBody>
+              <a:bodyPr wrap="square">
+                <a:spAutoFit/>
+              </a:bodyPr>
+              <a:lstStyle/>
+              <a:p>
+                <a:pPr/>
+                <a14:m>
+                  <m:oMathPara xmlns:m="http://schemas.openxmlformats.org/officeDocument/2006/math">
+                    <m:oMathParaPr>
+                      <m:jc m:val="center"/>
+                    </m:oMathParaPr>
+                    <m:oMath xmlns:m="http://schemas.openxmlformats.org/officeDocument/2006/math">
+                      <m:r>
+                        <a:rPr lang="en-US" b="0" i="1" smtClean="0">
+                          <a:latin typeface="Cambria Math" panose="02040503050406030204" pitchFamily="18" charset="0"/>
+                        </a:rPr>
+                        <m:t>1</m:t>
+                      </m:r>
+                      <m:r>
+                        <a:rPr lang="en-US" b="0" i="1" smtClean="0">
+                          <a:latin typeface="Cambria Math" panose="02040503050406030204" pitchFamily="18" charset="0"/>
+                        </a:rPr>
+                        <m:t>=</m:t>
+                      </m:r>
+                      <m:acc>
+                        <m:accPr>
+                          <m:chr m:val="⃑"/>
+                          <m:ctrlPr>
+                            <a:rPr lang="en-US" i="1">
+                              <a:latin typeface="Cambria Math" panose="02040503050406030204" pitchFamily="18" charset="0"/>
+                            </a:rPr>
+                          </m:ctrlPr>
+                        </m:accPr>
+                        <m:e>
+                          <m:r>
+                            <a:rPr lang="en-US" i="1">
+                              <a:latin typeface="Cambria Math" panose="02040503050406030204" pitchFamily="18" charset="0"/>
+                            </a:rPr>
+                            <m:t>𝑃</m:t>
+                          </m:r>
+                        </m:e>
+                      </m:acc>
+                      <m:r>
+                        <a:rPr lang="en-US" i="1">
+                          <a:latin typeface="Cambria Math" panose="02040503050406030204" pitchFamily="18" charset="0"/>
+                        </a:rPr>
+                        <m:t>⋅</m:t>
+                      </m:r>
+                      <m:acc>
+                        <m:accPr>
+                          <m:chr m:val="̂"/>
+                          <m:ctrlPr>
+                            <a:rPr lang="en-US" i="1">
+                              <a:latin typeface="Cambria Math" panose="02040503050406030204" pitchFamily="18" charset="0"/>
+                            </a:rPr>
+                          </m:ctrlPr>
+                        </m:accPr>
+                        <m:e>
+                          <m:sSub>
+                            <m:sSubPr>
+                              <m:ctrlPr>
+                                <a:rPr lang="en-US" i="1">
+                                  <a:latin typeface="Cambria Math" panose="02040503050406030204" pitchFamily="18" charset="0"/>
+                                </a:rPr>
+                              </m:ctrlPr>
+                            </m:sSubPr>
+                            <m:e>
+                              <m:r>
+                                <a:rPr lang="en-US" i="1">
+                                  <a:latin typeface="Cambria Math" panose="02040503050406030204" pitchFamily="18" charset="0"/>
+                                </a:rPr>
+                                <m:t>𝑛</m:t>
+                              </m:r>
+                            </m:e>
+                            <m:sub>
+                              <m:r>
+                                <a:rPr lang="en-US" i="1">
+                                  <a:latin typeface="Cambria Math" panose="02040503050406030204" pitchFamily="18" charset="0"/>
+                                </a:rPr>
+                                <m:t>𝑖</m:t>
+                              </m:r>
+                            </m:sub>
+                          </m:sSub>
+                        </m:e>
+                      </m:acc>
+                    </m:oMath>
+                  </m:oMathPara>
+                </a14:m>
+                <a:endParaRPr lang="en-US" i="1" dirty="0">
+                  <a:latin typeface="Cambria Math" panose="02040503050406030204" pitchFamily="18" charset="0"/>
+                </a:endParaRPr>
+              </a:p>
+            </p:txBody>
+          </p:sp>
+        </mc:Choice>
+        <mc:Fallback>
+          <p:sp>
+            <p:nvSpPr>
+              <p:cNvPr id="7" name="TextBox 6">
+                <a:extLst>
+                  <a:ext uri="{FF2B5EF4-FFF2-40B4-BE49-F238E27FC236}">
+                    <a16:creationId xmlns:a16="http://schemas.microsoft.com/office/drawing/2014/main" id="{F59C84F8-689F-E729-313B-F8F6B694AB63}"/>
+                  </a:ext>
+                </a:extLst>
+              </p:cNvPr>
+              <p:cNvSpPr txBox="1">
+                <a:spLocks noRot="1" noChangeAspect="1" noMove="1" noResize="1" noEditPoints="1" noAdjustHandles="1" noChangeArrowheads="1" noChangeShapeType="1" noTextEdit="1"/>
+              </p:cNvSpPr>
+              <p:nvPr/>
+            </p:nvSpPr>
+            <p:spPr>
+              <a:xfrm>
+                <a:off x="816884" y="3651976"/>
+                <a:ext cx="6096000" cy="402931"/>
+              </a:xfrm>
+              <a:prstGeom prst="rect">
+                <a:avLst/>
+              </a:prstGeom>
+              <a:blipFill>
+                <a:blip r:embed="rId11"/>
+                <a:stretch>
+                  <a:fillRect b="-3030"/>
+                </a:stretch>
+              </a:blipFill>
+            </p:spPr>
+            <p:txBody>
+              <a:bodyPr/>
+              <a:lstStyle/>
+              <a:p>
+                <a:r>
+                  <a:rPr lang="en-US">
+                    <a:noFill/>
+                  </a:rPr>
+                  <a:t> </a:t>
+                </a:r>
+              </a:p>
+            </p:txBody>
+          </p:sp>
+        </mc:Fallback>
+      </mc:AlternateContent>
+      <mc:AlternateContent xmlns:mc="http://schemas.openxmlformats.org/markup-compatibility/2006">
+        <mc:Choice xmlns:a14="http://schemas.microsoft.com/office/drawing/2010/main" Requires="a14">
+          <p:sp>
+            <p:nvSpPr>
+              <p:cNvPr id="9" name="TextBox 8">
+                <a:extLst>
+                  <a:ext uri="{FF2B5EF4-FFF2-40B4-BE49-F238E27FC236}">
+                    <a16:creationId xmlns:a16="http://schemas.microsoft.com/office/drawing/2014/main" id="{DB4F4050-7982-0EBD-2B42-698B31022073}"/>
+                  </a:ext>
+                </a:extLst>
+              </p:cNvPr>
+              <p:cNvSpPr txBox="1"/>
+              <p:nvPr/>
+            </p:nvSpPr>
+            <p:spPr>
+              <a:xfrm>
+                <a:off x="1416791" y="4929308"/>
+                <a:ext cx="6096740" cy="1579728"/>
+              </a:xfrm>
+              <a:prstGeom prst="rect">
+                <a:avLst/>
+              </a:prstGeom>
+              <a:noFill/>
+            </p:spPr>
+            <p:txBody>
+              <a:bodyPr wrap="square">
+                <a:spAutoFit/>
+              </a:bodyPr>
+              <a:lstStyle/>
+              <a:p>
+                <a:pPr/>
+                <a:br>
+                  <a:rPr lang="en-US" b="0" i="1" dirty="0">
+                    <a:latin typeface="Cambria Math" panose="02040503050406030204" pitchFamily="18" charset="0"/>
+                  </a:rPr>
+                </a:br>
+                <a14:m>
+                  <m:oMathPara xmlns:m="http://schemas.openxmlformats.org/officeDocument/2006/math">
+                    <m:oMathParaPr>
+                      <m:jc m:val="centerGroup"/>
+                    </m:oMathParaPr>
+                    <m:oMath xmlns:m="http://schemas.openxmlformats.org/officeDocument/2006/math">
+                      <m:d>
+                        <m:dPr>
+                          <m:begChr m:val="["/>
+                          <m:endChr m:val="]"/>
+                          <m:ctrlPr>
+                            <a:rPr lang="en-US" b="0" i="1" smtClean="0">
+                              <a:latin typeface="Cambria Math" panose="02040503050406030204" pitchFamily="18" charset="0"/>
+                            </a:rPr>
+                          </m:ctrlPr>
+                        </m:dPr>
+                        <m:e>
+                          <m:m>
+                            <m:mPr>
+                              <m:mcs>
+                                <m:mc>
+                                  <m:mcPr>
+                                    <m:count m:val="1"/>
+                                    <m:mcJc m:val="center"/>
+                                  </m:mcPr>
+                                </m:mc>
+                              </m:mcs>
+                              <m:ctrlPr>
+                                <a:rPr lang="en-US" b="0" i="1" smtClean="0">
+                                  <a:latin typeface="Cambria Math" panose="02040503050406030204" pitchFamily="18" charset="0"/>
+                                </a:rPr>
+                              </m:ctrlPr>
+                            </m:mPr>
+                            <m:mr>
+                              <m:e>
+                                <m:acc>
+                                  <m:accPr>
+                                    <m:chr m:val="̂"/>
+                                    <m:ctrlPr>
+                                      <a:rPr lang="en-US" i="1" smtClean="0">
+                                        <a:latin typeface="Cambria Math" panose="02040503050406030204" pitchFamily="18" charset="0"/>
+                                      </a:rPr>
+                                    </m:ctrlPr>
+                                  </m:accPr>
+                                  <m:e>
+                                    <m:sSub>
+                                      <m:sSubPr>
+                                        <m:ctrlPr>
+                                          <a:rPr lang="en-US" i="1">
+                                            <a:latin typeface="Cambria Math" panose="02040503050406030204" pitchFamily="18" charset="0"/>
+                                          </a:rPr>
+                                        </m:ctrlPr>
+                                      </m:sSubPr>
+                                      <m:e>
+                                        <m:r>
+                                          <a:rPr lang="en-US" i="1">
+                                            <a:latin typeface="Cambria Math" panose="02040503050406030204" pitchFamily="18" charset="0"/>
+                                          </a:rPr>
+                                          <m:t>𝑛</m:t>
+                                        </m:r>
+                                      </m:e>
+                                      <m:sub>
+                                        <m:r>
+                                          <a:rPr lang="en-US" i="1">
+                                            <a:latin typeface="Cambria Math" panose="02040503050406030204" pitchFamily="18" charset="0"/>
+                                          </a:rPr>
+                                          <m:t>𝑖</m:t>
+                                        </m:r>
+                                      </m:sub>
+                                    </m:sSub>
+                                  </m:e>
+                                </m:acc>
+                              </m:e>
+                            </m:mr>
+                            <m:mr>
+                              <m:e>
+                                <m:acc>
+                                  <m:accPr>
+                                    <m:chr m:val="̂"/>
+                                    <m:ctrlPr>
+                                      <a:rPr lang="en-US" i="1">
+                                        <a:latin typeface="Cambria Math" panose="02040503050406030204" pitchFamily="18" charset="0"/>
+                                      </a:rPr>
+                                    </m:ctrlPr>
+                                  </m:accPr>
+                                  <m:e>
+                                    <m:sSub>
+                                      <m:sSubPr>
+                                        <m:ctrlPr>
+                                          <a:rPr lang="en-US" i="1">
+                                            <a:latin typeface="Cambria Math" panose="02040503050406030204" pitchFamily="18" charset="0"/>
+                                          </a:rPr>
+                                        </m:ctrlPr>
+                                      </m:sSubPr>
+                                      <m:e>
+                                        <m:r>
+                                          <a:rPr lang="en-US" i="1">
+                                            <a:latin typeface="Cambria Math" panose="02040503050406030204" pitchFamily="18" charset="0"/>
+                                          </a:rPr>
+                                          <m:t>𝑛</m:t>
+                                        </m:r>
+                                      </m:e>
+                                      <m:sub>
+                                        <m:r>
+                                          <a:rPr lang="en-US" b="0" i="1" smtClean="0">
+                                            <a:latin typeface="Cambria Math" panose="02040503050406030204" pitchFamily="18" charset="0"/>
+                                          </a:rPr>
+                                          <m:t>𝑗</m:t>
+                                        </m:r>
+                                      </m:sub>
+                                    </m:sSub>
+                                  </m:e>
+                                </m:acc>
+                              </m:e>
+                            </m:mr>
+                            <m:mr>
+                              <m:e>
+                                <m:acc>
+                                  <m:accPr>
+                                    <m:chr m:val="̂"/>
+                                    <m:ctrlPr>
+                                      <a:rPr lang="en-US" i="1">
+                                        <a:latin typeface="Cambria Math" panose="02040503050406030204" pitchFamily="18" charset="0"/>
+                                      </a:rPr>
+                                    </m:ctrlPr>
+                                  </m:accPr>
+                                  <m:e>
+                                    <m:sSub>
+                                      <m:sSubPr>
+                                        <m:ctrlPr>
+                                          <a:rPr lang="en-US" i="1">
+                                            <a:latin typeface="Cambria Math" panose="02040503050406030204" pitchFamily="18" charset="0"/>
+                                          </a:rPr>
+                                        </m:ctrlPr>
+                                      </m:sSubPr>
+                                      <m:e>
+                                        <m:r>
+                                          <a:rPr lang="en-US" i="1">
+                                            <a:latin typeface="Cambria Math" panose="02040503050406030204" pitchFamily="18" charset="0"/>
+                                          </a:rPr>
+                                          <m:t>𝑛</m:t>
+                                        </m:r>
+                                      </m:e>
+                                      <m:sub>
+                                        <m:r>
+                                          <a:rPr lang="en-US" b="0" i="1" smtClean="0">
+                                            <a:latin typeface="Cambria Math" panose="02040503050406030204" pitchFamily="18" charset="0"/>
+                                          </a:rPr>
+                                          <m:t>𝑘</m:t>
+                                        </m:r>
+                                      </m:sub>
+                                    </m:sSub>
+                                  </m:e>
+                                </m:acc>
+                              </m:e>
+                            </m:mr>
+                          </m:m>
+                        </m:e>
+                      </m:d>
+                      <m:r>
+                        <a:rPr lang="en-US" b="0" i="1" smtClean="0">
+                          <a:latin typeface="Cambria Math" panose="02040503050406030204" pitchFamily="18" charset="0"/>
+                        </a:rPr>
+                        <m:t>⋅</m:t>
+                      </m:r>
+                      <m:acc>
+                        <m:accPr>
+                          <m:chr m:val="⃑"/>
+                          <m:ctrlPr>
+                            <a:rPr lang="en-US" i="1">
+                              <a:latin typeface="Cambria Math" panose="02040503050406030204" pitchFamily="18" charset="0"/>
+                            </a:rPr>
+                          </m:ctrlPr>
+                        </m:accPr>
+                        <m:e>
+                          <m:r>
+                            <a:rPr lang="en-US" i="1">
+                              <a:latin typeface="Cambria Math" panose="02040503050406030204" pitchFamily="18" charset="0"/>
+                            </a:rPr>
+                            <m:t>𝑃</m:t>
+                          </m:r>
+                        </m:e>
+                      </m:acc>
+                      <m:r>
+                        <a:rPr lang="en-US" b="0" i="1" smtClean="0">
+                          <a:latin typeface="Cambria Math" panose="02040503050406030204" pitchFamily="18" charset="0"/>
+                        </a:rPr>
+                        <m:t>=</m:t>
+                      </m:r>
+                      <m:d>
+                        <m:dPr>
+                          <m:begChr m:val="["/>
+                          <m:endChr m:val="]"/>
+                          <m:ctrlPr>
+                            <a:rPr lang="en-US" b="0" i="1" smtClean="0">
+                              <a:latin typeface="Cambria Math" panose="02040503050406030204" pitchFamily="18" charset="0"/>
+                            </a:rPr>
+                          </m:ctrlPr>
+                        </m:dPr>
+                        <m:e>
+                          <m:m>
+                            <m:mPr>
+                              <m:mcs>
+                                <m:mc>
+                                  <m:mcPr>
+                                    <m:count m:val="1"/>
+                                    <m:mcJc m:val="center"/>
+                                  </m:mcPr>
+                                </m:mc>
+                              </m:mcs>
+                              <m:ctrlPr>
+                                <a:rPr lang="en-US" b="0" i="1" smtClean="0">
+                                  <a:latin typeface="Cambria Math" panose="02040503050406030204" pitchFamily="18" charset="0"/>
+                                </a:rPr>
+                              </m:ctrlPr>
+                            </m:mPr>
+                            <m:mr>
+                              <m:e>
+                                <m:r>
+                                  <a:rPr lang="en-US" b="0" i="1" smtClean="0">
+                                    <a:latin typeface="Cambria Math" panose="02040503050406030204" pitchFamily="18" charset="0"/>
+                                  </a:rPr>
+                                  <m:t>1</m:t>
+                                </m:r>
+                              </m:e>
+                            </m:mr>
+                            <m:mr>
+                              <m:e>
+                                <m:r>
+                                  <a:rPr lang="en-US" b="0" i="1" smtClean="0">
+                                    <a:latin typeface="Cambria Math" panose="02040503050406030204" pitchFamily="18" charset="0"/>
+                                  </a:rPr>
+                                  <m:t>1</m:t>
+                                </m:r>
+                              </m:e>
+                            </m:mr>
+                            <m:mr>
+                              <m:e>
+                                <m:r>
+                                  <a:rPr lang="en-US" b="0" i="1" smtClean="0">
+                                    <a:latin typeface="Cambria Math" panose="02040503050406030204" pitchFamily="18" charset="0"/>
+                                  </a:rPr>
+                                  <m:t>1</m:t>
+                                </m:r>
+                              </m:e>
+                            </m:mr>
+                          </m:m>
+                        </m:e>
+                      </m:d>
+                    </m:oMath>
+                  </m:oMathPara>
+                </a14:m>
+                <a:endParaRPr lang="en-US" b="0" i="1" dirty="0">
+                  <a:latin typeface="Cambria Math" panose="02040503050406030204" pitchFamily="18" charset="0"/>
+                </a:endParaRPr>
+              </a:p>
+              <a:p>
+                <a:endParaRPr lang="en-US" i="1" dirty="0">
+                  <a:latin typeface="Cambria Math" panose="02040503050406030204" pitchFamily="18" charset="0"/>
+                </a:endParaRPr>
+              </a:p>
+            </p:txBody>
+          </p:sp>
+        </mc:Choice>
+        <mc:Fallback>
+          <p:sp>
+            <p:nvSpPr>
+              <p:cNvPr id="9" name="TextBox 8">
+                <a:extLst>
+                  <a:ext uri="{FF2B5EF4-FFF2-40B4-BE49-F238E27FC236}">
+                    <a16:creationId xmlns:a16="http://schemas.microsoft.com/office/drawing/2014/main" id="{DB4F4050-7982-0EBD-2B42-698B31022073}"/>
+                  </a:ext>
+                </a:extLst>
+              </p:cNvPr>
+              <p:cNvSpPr txBox="1">
+                <a:spLocks noRot="1" noChangeAspect="1" noMove="1" noResize="1" noEditPoints="1" noAdjustHandles="1" noChangeArrowheads="1" noChangeShapeType="1" noTextEdit="1"/>
+              </p:cNvSpPr>
+              <p:nvPr/>
+            </p:nvSpPr>
+            <p:spPr>
+              <a:xfrm>
+                <a:off x="1416791" y="4929308"/>
+                <a:ext cx="6096740" cy="1579728"/>
+              </a:xfrm>
+              <a:prstGeom prst="rect">
+                <a:avLst/>
+              </a:prstGeom>
+              <a:blipFill>
+                <a:blip r:embed="rId12"/>
+                <a:stretch>
+                  <a:fillRect/>
+                </a:stretch>
+              </a:blipFill>
+            </p:spPr>
+            <p:txBody>
+              <a:bodyPr/>
+              <a:lstStyle/>
+              <a:p>
+                <a:r>
+                  <a:rPr lang="en-US">
+                    <a:noFill/>
+                  </a:rPr>
+                  <a:t> </a:t>
+                </a:r>
+              </a:p>
+            </p:txBody>
+          </p:sp>
+        </mc:Fallback>
+      </mc:AlternateContent>
+    </p:spTree>
+    <p:extLst>
+      <p:ext uri="{BB962C8B-B14F-4D97-AF65-F5344CB8AC3E}">
+        <p14:creationId xmlns:p14="http://schemas.microsoft.com/office/powerpoint/2010/main" val="3310379915"/>
+      </p:ext>
+    </p:extLst>
+  </p:cSld>
+  <p:clrMapOvr>
+    <a:masterClrMapping/>
+  </p:clrMapOvr>
+</p:sld>
+</file>
+
+<file path=ppt/slides/slide28.xml><?xml version="1.0" encoding="utf-8"?>
+<p:sld xmlns:a="http://schemas.openxmlformats.org/drawingml/2006/main" xmlns:r="http://schemas.openxmlformats.org/officeDocument/2006/relationships" xmlns:p="http://schemas.openxmlformats.org/presentationml/2006/main">
+  <p:cSld>
+    <p:spTree>
+      <p:nvGrpSpPr>
         <p:cNvPr id="1" name=""/>
         <p:cNvGrpSpPr/>
         <p:nvPr/>
@@ -10757,7 +12702,7 @@
 </p:sld>
 </file>
 
-<file path=ppt/slides/slide28.xml><?xml version="1.0" encoding="utf-8"?>
+<file path=ppt/slides/slide29.xml><?xml version="1.0" encoding="utf-8"?>
 <p:sld xmlns:a="http://schemas.openxmlformats.org/drawingml/2006/main" xmlns:r="http://schemas.openxmlformats.org/officeDocument/2006/relationships" xmlns:p="http://schemas.openxmlformats.org/presentationml/2006/main">
   <p:cSld>
     <p:spTree>
@@ -12282,7 +14227,649 @@
 </p:sld>
 </file>
 
-<file path=ppt/slides/slide29.xml><?xml version="1.0" encoding="utf-8"?>
+<file path=ppt/slides/slide3.xml><?xml version="1.0" encoding="utf-8"?>
+<p:sld xmlns:a="http://schemas.openxmlformats.org/drawingml/2006/main" xmlns:r="http://schemas.openxmlformats.org/officeDocument/2006/relationships" xmlns:p="http://schemas.openxmlformats.org/presentationml/2006/main">
+  <p:cSld>
+    <p:spTree>
+      <p:nvGrpSpPr>
+        <p:cNvPr id="1" name=""/>
+        <p:cNvGrpSpPr/>
+        <p:nvPr/>
+      </p:nvGrpSpPr>
+      <p:grpSpPr>
+        <a:xfrm>
+          <a:off x="0" y="0"/>
+          <a:ext cx="0" cy="0"/>
+          <a:chOff x="0" y="0"/>
+          <a:chExt cx="0" cy="0"/>
+        </a:xfrm>
+      </p:grpSpPr>
+      <p:sp>
+        <p:nvSpPr>
+          <p:cNvPr id="2" name="Title 1">
+            <a:extLst>
+              <a:ext uri="{FF2B5EF4-FFF2-40B4-BE49-F238E27FC236}">
+                <a16:creationId xmlns:a16="http://schemas.microsoft.com/office/drawing/2014/main" id="{F61BB289-6F7D-4E26-9549-A418B0B98DBB}"/>
+              </a:ext>
+            </a:extLst>
+          </p:cNvPr>
+          <p:cNvSpPr>
+            <a:spLocks noGrp="1"/>
+          </p:cNvSpPr>
+          <p:nvPr>
+            <p:ph type="title"/>
+          </p:nvPr>
+        </p:nvSpPr>
+        <p:spPr/>
+        <p:txBody>
+          <a:bodyPr>
+            <a:normAutofit/>
+          </a:bodyPr>
+          <a:lstStyle/>
+          <a:p>
+            <a:r>
+              <a:rPr lang="en-US" dirty="0"/>
+              <a:t>Each function uses a class-specific argument check function</a:t>
+            </a:r>
+          </a:p>
+        </p:txBody>
+      </p:sp>
+      <p:sp>
+        <p:nvSpPr>
+          <p:cNvPr id="5" name="Rectangle 4">
+            <a:extLst>
+              <a:ext uri="{FF2B5EF4-FFF2-40B4-BE49-F238E27FC236}">
+                <a16:creationId xmlns:a16="http://schemas.microsoft.com/office/drawing/2014/main" id="{F0CB9B29-E4C5-4A4F-9118-99BC76FA2AD9}"/>
+              </a:ext>
+            </a:extLst>
+          </p:cNvPr>
+          <p:cNvSpPr/>
+          <p:nvPr/>
+        </p:nvSpPr>
+        <p:spPr>
+          <a:xfrm>
+            <a:off x="374433" y="2022133"/>
+            <a:ext cx="5909136" cy="3554819"/>
+          </a:xfrm>
+          <a:prstGeom prst="rect">
+            <a:avLst/>
+          </a:prstGeom>
+          <a:solidFill>
+            <a:schemeClr val="accent4">
+              <a:lumMod val="20000"/>
+              <a:lumOff val="80000"/>
+            </a:schemeClr>
+          </a:solidFill>
+        </p:spPr>
+        <p:txBody>
+          <a:bodyPr wrap="square">
+            <a:spAutoFit/>
+          </a:bodyPr>
+          <a:lstStyle/>
+          <a:p>
+            <a:r>
+              <a:rPr lang="en-US" sz="900" dirty="0">
+                <a:solidFill>
+                  <a:srgbClr val="0E00FF"/>
+                </a:solidFill>
+                <a:latin typeface="Courier New" panose="02070309020205020404" pitchFamily="49" charset="0"/>
+              </a:rPr>
+              <a:t>function</a:t>
+            </a:r>
+            <a:r>
+              <a:rPr lang="en-US" sz="900" dirty="0">
+                <a:solidFill>
+                  <a:srgbClr val="000000"/>
+                </a:solidFill>
+                <a:latin typeface="Courier New" panose="02070309020205020404" pitchFamily="49" charset="0"/>
+              </a:rPr>
+              <a:t> </a:t>
+            </a:r>
+            <a:r>
+              <a:rPr lang="en-US" sz="900" dirty="0" err="1">
+                <a:solidFill>
+                  <a:srgbClr val="000000"/>
+                </a:solidFill>
+                <a:latin typeface="Courier New" panose="02070309020205020404" pitchFamily="49" charset="0"/>
+              </a:rPr>
+              <a:t>fcn_MapGen_checkInputsToFunctions</a:t>
+            </a:r>
+            <a:r>
+              <a:rPr lang="en-US" sz="900" dirty="0">
+                <a:solidFill>
+                  <a:srgbClr val="000000"/>
+                </a:solidFill>
+                <a:latin typeface="Courier New" panose="02070309020205020404" pitchFamily="49" charset="0"/>
+              </a:rPr>
+              <a:t>(</a:t>
+            </a:r>
+            <a:r>
+              <a:rPr lang="en-US" sz="900" dirty="0">
+                <a:solidFill>
+                  <a:srgbClr val="0E00FF"/>
+                </a:solidFill>
+                <a:latin typeface="Courier New" panose="02070309020205020404" pitchFamily="49" charset="0"/>
+              </a:rPr>
+              <a:t>...</a:t>
+            </a:r>
+          </a:p>
+          <a:p>
+            <a:r>
+              <a:rPr lang="en-US" sz="900" dirty="0">
+                <a:solidFill>
+                  <a:srgbClr val="000000"/>
+                </a:solidFill>
+                <a:latin typeface="Courier New" panose="02070309020205020404" pitchFamily="49" charset="0"/>
+              </a:rPr>
+              <a:t>    </a:t>
+            </a:r>
+            <a:r>
+              <a:rPr lang="en-US" sz="900" dirty="0" err="1">
+                <a:solidFill>
+                  <a:srgbClr val="000000"/>
+                </a:solidFill>
+                <a:latin typeface="Courier New" panose="02070309020205020404" pitchFamily="49" charset="0"/>
+              </a:rPr>
+              <a:t>variable,variable_type_string,varargin</a:t>
+            </a:r>
+            <a:r>
+              <a:rPr lang="en-US" sz="900" dirty="0">
+                <a:solidFill>
+                  <a:srgbClr val="000000"/>
+                </a:solidFill>
+                <a:latin typeface="Courier New" panose="02070309020205020404" pitchFamily="49" charset="0"/>
+              </a:rPr>
+              <a:t>)</a:t>
+            </a:r>
+          </a:p>
+          <a:p>
+            <a:r>
+              <a:rPr lang="en-US" sz="900" dirty="0">
+                <a:solidFill>
+                  <a:srgbClr val="000000"/>
+                </a:solidFill>
+                <a:latin typeface="Courier New" panose="02070309020205020404" pitchFamily="49" charset="0"/>
+              </a:rPr>
+              <a:t> </a:t>
+            </a:r>
+          </a:p>
+          <a:p>
+            <a:r>
+              <a:rPr lang="en-US" sz="900" dirty="0">
+                <a:solidFill>
+                  <a:srgbClr val="028009"/>
+                </a:solidFill>
+                <a:latin typeface="Courier New" panose="02070309020205020404" pitchFamily="49" charset="0"/>
+              </a:rPr>
+              <a:t>% </a:t>
+            </a:r>
+            <a:r>
+              <a:rPr lang="en-US" sz="900" dirty="0" err="1">
+                <a:solidFill>
+                  <a:srgbClr val="028009"/>
+                </a:solidFill>
+                <a:latin typeface="Courier New" panose="02070309020205020404" pitchFamily="49" charset="0"/>
+              </a:rPr>
+              <a:t>fcn_MapGen_checkInputsToFunctions</a:t>
+            </a:r>
+            <a:endParaRPr lang="en-US" sz="900" dirty="0">
+              <a:solidFill>
+                <a:srgbClr val="028009"/>
+              </a:solidFill>
+              <a:latin typeface="Courier New" panose="02070309020205020404" pitchFamily="49" charset="0"/>
+            </a:endParaRPr>
+          </a:p>
+          <a:p>
+            <a:r>
+              <a:rPr lang="en-US" sz="900" dirty="0">
+                <a:solidFill>
+                  <a:srgbClr val="028009"/>
+                </a:solidFill>
+                <a:latin typeface="Courier New" panose="02070309020205020404" pitchFamily="49" charset="0"/>
+              </a:rPr>
+              <a:t>% Checks the variable types commonly used in the </a:t>
+            </a:r>
+            <a:r>
+              <a:rPr lang="en-US" sz="900" dirty="0" err="1">
+                <a:solidFill>
+                  <a:srgbClr val="028009"/>
+                </a:solidFill>
+                <a:latin typeface="Courier New" panose="02070309020205020404" pitchFamily="49" charset="0"/>
+              </a:rPr>
+              <a:t>MapGen</a:t>
+            </a:r>
+            <a:r>
+              <a:rPr lang="en-US" sz="900" dirty="0">
+                <a:solidFill>
+                  <a:srgbClr val="028009"/>
+                </a:solidFill>
+                <a:latin typeface="Courier New" panose="02070309020205020404" pitchFamily="49" charset="0"/>
+              </a:rPr>
+              <a:t> codes to</a:t>
+            </a:r>
+          </a:p>
+          <a:p>
+            <a:r>
+              <a:rPr lang="en-US" sz="900" dirty="0">
+                <a:solidFill>
+                  <a:srgbClr val="028009"/>
+                </a:solidFill>
+                <a:latin typeface="Courier New" panose="02070309020205020404" pitchFamily="49" charset="0"/>
+              </a:rPr>
+              <a:t>% ensure they are correctly formed.</a:t>
+            </a:r>
+          </a:p>
+          <a:p>
+            <a:r>
+              <a:rPr lang="en-US" sz="900" dirty="0">
+                <a:solidFill>
+                  <a:srgbClr val="028009"/>
+                </a:solidFill>
+                <a:latin typeface="Courier New" panose="02070309020205020404" pitchFamily="49" charset="0"/>
+              </a:rPr>
+              <a:t>%</a:t>
+            </a:r>
+          </a:p>
+          <a:p>
+            <a:r>
+              <a:rPr lang="en-US" sz="900" dirty="0">
+                <a:solidFill>
+                  <a:srgbClr val="028009"/>
+                </a:solidFill>
+                <a:latin typeface="Courier New" panose="02070309020205020404" pitchFamily="49" charset="0"/>
+              </a:rPr>
+              <a:t>% This function is typically called at the top of most functions. The input</a:t>
+            </a:r>
+          </a:p>
+          <a:p>
+            <a:r>
+              <a:rPr lang="en-US" sz="900" dirty="0">
+                <a:solidFill>
+                  <a:srgbClr val="028009"/>
+                </a:solidFill>
+                <a:latin typeface="Courier New" panose="02070309020205020404" pitchFamily="49" charset="0"/>
+              </a:rPr>
+              <a:t>% is a variable and a string defining the "type" of the variable. This</a:t>
+            </a:r>
+          </a:p>
+          <a:p>
+            <a:r>
+              <a:rPr lang="en-US" sz="900" dirty="0">
+                <a:solidFill>
+                  <a:srgbClr val="028009"/>
+                </a:solidFill>
+                <a:latin typeface="Courier New" panose="02070309020205020404" pitchFamily="49" charset="0"/>
+              </a:rPr>
+              <a:t>% function checks to see that they are compatible. For example, say there</a:t>
+            </a:r>
+          </a:p>
+          <a:p>
+            <a:r>
+              <a:rPr lang="en-US" sz="900" dirty="0">
+                <a:solidFill>
+                  <a:srgbClr val="028009"/>
+                </a:solidFill>
+                <a:latin typeface="Courier New" panose="02070309020205020404" pitchFamily="49" charset="0"/>
+              </a:rPr>
+              <a:t>% '</a:t>
+            </a:r>
+            <a:r>
+              <a:rPr lang="en-US" sz="900" dirty="0" err="1">
+                <a:solidFill>
+                  <a:srgbClr val="028009"/>
+                </a:solidFill>
+                <a:latin typeface="Courier New" panose="02070309020205020404" pitchFamily="49" charset="0"/>
+              </a:rPr>
+              <a:t>column_vector</a:t>
+            </a:r>
+            <a:r>
+              <a:rPr lang="en-US" sz="900" dirty="0">
+                <a:solidFill>
+                  <a:srgbClr val="028009"/>
+                </a:solidFill>
+                <a:latin typeface="Courier New" panose="02070309020205020404" pitchFamily="49" charset="0"/>
+              </a:rPr>
+              <a:t>' type of variables used in the function that is always a N</a:t>
+            </a:r>
+          </a:p>
+          <a:p>
+            <a:r>
+              <a:rPr lang="en-US" sz="900" dirty="0">
+                <a:solidFill>
+                  <a:srgbClr val="028009"/>
+                </a:solidFill>
+                <a:latin typeface="Courier New" panose="02070309020205020404" pitchFamily="49" charset="0"/>
+              </a:rPr>
+              <a:t>% x 1 array; if someone had a variable called "</a:t>
+            </a:r>
+            <a:r>
+              <a:rPr lang="en-US" sz="900" dirty="0" err="1">
+                <a:solidFill>
+                  <a:srgbClr val="028009"/>
+                </a:solidFill>
+                <a:latin typeface="Courier New" panose="02070309020205020404" pitchFamily="49" charset="0"/>
+              </a:rPr>
+              <a:t>test_example</a:t>
+            </a:r>
+            <a:r>
+              <a:rPr lang="en-US" sz="900" dirty="0">
+                <a:solidFill>
+                  <a:srgbClr val="028009"/>
+                </a:solidFill>
+                <a:latin typeface="Courier New" panose="02070309020205020404" pitchFamily="49" charset="0"/>
+              </a:rPr>
+              <a:t>", they could</a:t>
+            </a:r>
+          </a:p>
+          <a:p>
+            <a:r>
+              <a:rPr lang="en-US" sz="900" dirty="0">
+                <a:solidFill>
+                  <a:srgbClr val="028009"/>
+                </a:solidFill>
+                <a:latin typeface="Courier New" panose="02070309020205020404" pitchFamily="49" charset="0"/>
+              </a:rPr>
+              <a:t>% check that this fit the '</a:t>
+            </a:r>
+            <a:r>
+              <a:rPr lang="en-US" sz="900" dirty="0" err="1">
+                <a:solidFill>
+                  <a:srgbClr val="028009"/>
+                </a:solidFill>
+                <a:latin typeface="Courier New" panose="02070309020205020404" pitchFamily="49" charset="0"/>
+              </a:rPr>
+              <a:t>column_vector</a:t>
+            </a:r>
+            <a:r>
+              <a:rPr lang="en-US" sz="900" dirty="0">
+                <a:solidFill>
+                  <a:srgbClr val="028009"/>
+                </a:solidFill>
+                <a:latin typeface="Courier New" panose="02070309020205020404" pitchFamily="49" charset="0"/>
+              </a:rPr>
+              <a:t>' type by calling</a:t>
+            </a:r>
+          </a:p>
+          <a:p>
+            <a:r>
+              <a:rPr lang="en-US" sz="900" dirty="0">
+                <a:solidFill>
+                  <a:srgbClr val="028009"/>
+                </a:solidFill>
+                <a:latin typeface="Courier New" panose="02070309020205020404" pitchFamily="49" charset="0"/>
+              </a:rPr>
+              <a:t>% </a:t>
+            </a:r>
+            <a:r>
+              <a:rPr lang="en-US" sz="900" dirty="0" err="1">
+                <a:solidFill>
+                  <a:srgbClr val="028009"/>
+                </a:solidFill>
+                <a:latin typeface="Courier New" panose="02070309020205020404" pitchFamily="49" charset="0"/>
+              </a:rPr>
+              <a:t>fcn_MapGen_checkInputsToFunctions</a:t>
+            </a:r>
+            <a:r>
+              <a:rPr lang="en-US" sz="900" dirty="0">
+                <a:solidFill>
+                  <a:srgbClr val="028009"/>
+                </a:solidFill>
+                <a:latin typeface="Courier New" panose="02070309020205020404" pitchFamily="49" charset="0"/>
+              </a:rPr>
+              <a:t>(test_example,'</a:t>
+            </a:r>
+            <a:r>
+              <a:rPr lang="en-US" sz="900" dirty="0" err="1">
+                <a:solidFill>
+                  <a:srgbClr val="028009"/>
+                </a:solidFill>
+                <a:latin typeface="Courier New" panose="02070309020205020404" pitchFamily="49" charset="0"/>
+              </a:rPr>
+              <a:t>column_vector</a:t>
+            </a:r>
+            <a:r>
+              <a:rPr lang="en-US" sz="900" dirty="0">
+                <a:solidFill>
+                  <a:srgbClr val="028009"/>
+                </a:solidFill>
+                <a:latin typeface="Courier New" panose="02070309020205020404" pitchFamily="49" charset="0"/>
+              </a:rPr>
+              <a:t>').</a:t>
+            </a:r>
+          </a:p>
+          <a:p>
+            <a:r>
+              <a:rPr lang="en-US" sz="900" dirty="0">
+                <a:solidFill>
+                  <a:srgbClr val="028009"/>
+                </a:solidFill>
+                <a:latin typeface="Courier New" panose="02070309020205020404" pitchFamily="49" charset="0"/>
+              </a:rPr>
+              <a:t>% This function would then check that the array was N x 1, and if it was</a:t>
+            </a:r>
+          </a:p>
+          <a:p>
+            <a:r>
+              <a:rPr lang="en-US" sz="900" dirty="0">
+                <a:solidFill>
+                  <a:srgbClr val="028009"/>
+                </a:solidFill>
+                <a:latin typeface="Courier New" panose="02070309020205020404" pitchFamily="49" charset="0"/>
+              </a:rPr>
+              <a:t>% not, it would send out an error warning.</a:t>
+            </a:r>
+          </a:p>
+          <a:p>
+            <a:r>
+              <a:rPr lang="en-US" sz="900" dirty="0">
+                <a:solidFill>
+                  <a:srgbClr val="028009"/>
+                </a:solidFill>
+                <a:latin typeface="Courier New" panose="02070309020205020404" pitchFamily="49" charset="0"/>
+              </a:rPr>
+              <a:t>%</a:t>
+            </a:r>
+          </a:p>
+          <a:p>
+            <a:r>
+              <a:rPr lang="en-US" sz="900" dirty="0">
+                <a:solidFill>
+                  <a:srgbClr val="028009"/>
+                </a:solidFill>
+                <a:latin typeface="Courier New" panose="02070309020205020404" pitchFamily="49" charset="0"/>
+              </a:rPr>
+              <a:t>% FORMAT:</a:t>
+            </a:r>
+          </a:p>
+          <a:p>
+            <a:r>
+              <a:rPr lang="en-US" sz="900" dirty="0">
+                <a:solidFill>
+                  <a:srgbClr val="028009"/>
+                </a:solidFill>
+                <a:latin typeface="Courier New" panose="02070309020205020404" pitchFamily="49" charset="0"/>
+              </a:rPr>
+              <a:t>%</a:t>
+            </a:r>
+          </a:p>
+          <a:p>
+            <a:r>
+              <a:rPr lang="en-US" sz="900" dirty="0">
+                <a:solidFill>
+                  <a:srgbClr val="028009"/>
+                </a:solidFill>
+                <a:latin typeface="Courier New" panose="02070309020205020404" pitchFamily="49" charset="0"/>
+              </a:rPr>
+              <a:t>%      </a:t>
+            </a:r>
+            <a:r>
+              <a:rPr lang="en-US" sz="900" dirty="0" err="1">
+                <a:solidFill>
+                  <a:srgbClr val="028009"/>
+                </a:solidFill>
+                <a:latin typeface="Courier New" panose="02070309020205020404" pitchFamily="49" charset="0"/>
+              </a:rPr>
+              <a:t>fcn_MapGen_checkInputsToFunctions</a:t>
+            </a:r>
+            <a:r>
+              <a:rPr lang="en-US" sz="900" dirty="0">
+                <a:solidFill>
+                  <a:srgbClr val="028009"/>
+                </a:solidFill>
+                <a:latin typeface="Courier New" panose="02070309020205020404" pitchFamily="49" charset="0"/>
+              </a:rPr>
+              <a:t>(...</a:t>
+            </a:r>
+          </a:p>
+          <a:p>
+            <a:r>
+              <a:rPr lang="en-US" sz="900" dirty="0">
+                <a:solidFill>
+                  <a:srgbClr val="028009"/>
+                </a:solidFill>
+                <a:latin typeface="Courier New" panose="02070309020205020404" pitchFamily="49" charset="0"/>
+              </a:rPr>
+              <a:t>%      </a:t>
+            </a:r>
+            <a:r>
+              <a:rPr lang="en-US" sz="900" dirty="0" err="1">
+                <a:solidFill>
+                  <a:srgbClr val="028009"/>
+                </a:solidFill>
+                <a:latin typeface="Courier New" panose="02070309020205020404" pitchFamily="49" charset="0"/>
+              </a:rPr>
+              <a:t>variable,variable_type_string</a:t>
+            </a:r>
+            <a:r>
+              <a:rPr lang="en-US" sz="900" dirty="0">
+                <a:solidFill>
+                  <a:srgbClr val="028009"/>
+                </a:solidFill>
+                <a:latin typeface="Courier New" panose="02070309020205020404" pitchFamily="49" charset="0"/>
+              </a:rPr>
+              <a:t>,(</a:t>
+            </a:r>
+            <a:r>
+              <a:rPr lang="en-US" sz="900" dirty="0" err="1">
+                <a:solidFill>
+                  <a:srgbClr val="028009"/>
+                </a:solidFill>
+                <a:latin typeface="Courier New" panose="02070309020205020404" pitchFamily="49" charset="0"/>
+              </a:rPr>
+              <a:t>optional_arguments</a:t>
+            </a:r>
+            <a:r>
+              <a:rPr lang="en-US" sz="900" dirty="0">
+                <a:solidFill>
+                  <a:srgbClr val="028009"/>
+                </a:solidFill>
+                <a:latin typeface="Courier New" panose="02070309020205020404" pitchFamily="49" charset="0"/>
+              </a:rPr>
+              <a:t>))</a:t>
+            </a:r>
+          </a:p>
+          <a:p>
+            <a:r>
+              <a:rPr lang="en-US" sz="900" dirty="0">
+                <a:solidFill>
+                  <a:srgbClr val="028009"/>
+                </a:solidFill>
+                <a:latin typeface="Courier New" panose="02070309020205020404" pitchFamily="49" charset="0"/>
+              </a:rPr>
+              <a:t>%</a:t>
+            </a:r>
+          </a:p>
+          <a:p>
+            <a:r>
+              <a:rPr lang="en-US" sz="900" dirty="0">
+                <a:solidFill>
+                  <a:srgbClr val="028009"/>
+                </a:solidFill>
+                <a:latin typeface="Courier New" panose="02070309020205020404" pitchFamily="49" charset="0"/>
+              </a:rPr>
+              <a:t>% INPUTS:</a:t>
+            </a:r>
+          </a:p>
+          <a:p>
+            <a:r>
+              <a:rPr lang="en-US" sz="900" dirty="0">
+                <a:solidFill>
+                  <a:srgbClr val="028009"/>
+                </a:solidFill>
+                <a:latin typeface="Courier New" panose="02070309020205020404" pitchFamily="49" charset="0"/>
+              </a:rPr>
+              <a:t>%</a:t>
+            </a:r>
+          </a:p>
+          <a:p>
+            <a:r>
+              <a:rPr lang="en-US" sz="900" dirty="0">
+                <a:solidFill>
+                  <a:srgbClr val="028009"/>
+                </a:solidFill>
+                <a:latin typeface="Courier New" panose="02070309020205020404" pitchFamily="49" charset="0"/>
+              </a:rPr>
+              <a:t>%      variable: the variable to check</a:t>
+            </a:r>
+          </a:p>
+        </p:txBody>
+      </p:sp>
+      <p:sp>
+        <p:nvSpPr>
+          <p:cNvPr id="3" name="Rectangle 2">
+            <a:extLst>
+              <a:ext uri="{FF2B5EF4-FFF2-40B4-BE49-F238E27FC236}">
+                <a16:creationId xmlns:a16="http://schemas.microsoft.com/office/drawing/2014/main" id="{75616B01-3EEF-43F9-B062-A030413183B5}"/>
+              </a:ext>
+            </a:extLst>
+          </p:cNvPr>
+          <p:cNvSpPr/>
+          <p:nvPr/>
+        </p:nvSpPr>
+        <p:spPr>
+          <a:xfrm>
+            <a:off x="3692063" y="6308209"/>
+            <a:ext cx="7414594" cy="369332"/>
+          </a:xfrm>
+          <a:prstGeom prst="rect">
+            <a:avLst/>
+          </a:prstGeom>
+        </p:spPr>
+        <p:txBody>
+          <a:bodyPr wrap="none">
+            <a:spAutoFit/>
+          </a:bodyPr>
+          <a:lstStyle/>
+          <a:p>
+            <a:r>
+              <a:rPr lang="en-US" dirty="0"/>
+              <a:t>See: </a:t>
+            </a:r>
+            <a:r>
+              <a:rPr lang="en-US" dirty="0" err="1"/>
+              <a:t>script_test_fcn_MapGen_checkInputsToFunctions.m</a:t>
+            </a:r>
+            <a:r>
+              <a:rPr lang="en-US" dirty="0"/>
+              <a:t> for example usages</a:t>
+            </a:r>
+          </a:p>
+        </p:txBody>
+      </p:sp>
+    </p:spTree>
+    <p:extLst>
+      <p:ext uri="{BB962C8B-B14F-4D97-AF65-F5344CB8AC3E}">
+        <p14:creationId xmlns:p14="http://schemas.microsoft.com/office/powerpoint/2010/main" val="3283178281"/>
+      </p:ext>
+    </p:extLst>
+  </p:cSld>
+  <p:clrMapOvr>
+    <a:masterClrMapping/>
+  </p:clrMapOvr>
+</p:sld>
+</file>
+
+<file path=ppt/slides/slide30.xml><?xml version="1.0" encoding="utf-8"?>
 <p:sld xmlns:a="http://schemas.openxmlformats.org/drawingml/2006/main" xmlns:r="http://schemas.openxmlformats.org/officeDocument/2006/relationships" xmlns:p="http://schemas.openxmlformats.org/presentationml/2006/main">
   <p:cSld>
     <p:spTree>
@@ -14520,649 +17107,7 @@
 </p:sld>
 </file>
 
-<file path=ppt/slides/slide3.xml><?xml version="1.0" encoding="utf-8"?>
-<p:sld xmlns:a="http://schemas.openxmlformats.org/drawingml/2006/main" xmlns:r="http://schemas.openxmlformats.org/officeDocument/2006/relationships" xmlns:p="http://schemas.openxmlformats.org/presentationml/2006/main">
-  <p:cSld>
-    <p:spTree>
-      <p:nvGrpSpPr>
-        <p:cNvPr id="1" name=""/>
-        <p:cNvGrpSpPr/>
-        <p:nvPr/>
-      </p:nvGrpSpPr>
-      <p:grpSpPr>
-        <a:xfrm>
-          <a:off x="0" y="0"/>
-          <a:ext cx="0" cy="0"/>
-          <a:chOff x="0" y="0"/>
-          <a:chExt cx="0" cy="0"/>
-        </a:xfrm>
-      </p:grpSpPr>
-      <p:sp>
-        <p:nvSpPr>
-          <p:cNvPr id="2" name="Title 1">
-            <a:extLst>
-              <a:ext uri="{FF2B5EF4-FFF2-40B4-BE49-F238E27FC236}">
-                <a16:creationId xmlns:a16="http://schemas.microsoft.com/office/drawing/2014/main" id="{F61BB289-6F7D-4E26-9549-A418B0B98DBB}"/>
-              </a:ext>
-            </a:extLst>
-          </p:cNvPr>
-          <p:cNvSpPr>
-            <a:spLocks noGrp="1"/>
-          </p:cNvSpPr>
-          <p:nvPr>
-            <p:ph type="title"/>
-          </p:nvPr>
-        </p:nvSpPr>
-        <p:spPr/>
-        <p:txBody>
-          <a:bodyPr>
-            <a:normAutofit/>
-          </a:bodyPr>
-          <a:lstStyle/>
-          <a:p>
-            <a:r>
-              <a:rPr lang="en-US" dirty="0"/>
-              <a:t>Each function uses a class-specific argument check function</a:t>
-            </a:r>
-          </a:p>
-        </p:txBody>
-      </p:sp>
-      <p:sp>
-        <p:nvSpPr>
-          <p:cNvPr id="5" name="Rectangle 4">
-            <a:extLst>
-              <a:ext uri="{FF2B5EF4-FFF2-40B4-BE49-F238E27FC236}">
-                <a16:creationId xmlns:a16="http://schemas.microsoft.com/office/drawing/2014/main" id="{F0CB9B29-E4C5-4A4F-9118-99BC76FA2AD9}"/>
-              </a:ext>
-            </a:extLst>
-          </p:cNvPr>
-          <p:cNvSpPr/>
-          <p:nvPr/>
-        </p:nvSpPr>
-        <p:spPr>
-          <a:xfrm>
-            <a:off x="374433" y="2022133"/>
-            <a:ext cx="5909136" cy="3554819"/>
-          </a:xfrm>
-          <a:prstGeom prst="rect">
-            <a:avLst/>
-          </a:prstGeom>
-          <a:solidFill>
-            <a:schemeClr val="accent4">
-              <a:lumMod val="20000"/>
-              <a:lumOff val="80000"/>
-            </a:schemeClr>
-          </a:solidFill>
-        </p:spPr>
-        <p:txBody>
-          <a:bodyPr wrap="square">
-            <a:spAutoFit/>
-          </a:bodyPr>
-          <a:lstStyle/>
-          <a:p>
-            <a:r>
-              <a:rPr lang="en-US" sz="900" dirty="0">
-                <a:solidFill>
-                  <a:srgbClr val="0E00FF"/>
-                </a:solidFill>
-                <a:latin typeface="Courier New" panose="02070309020205020404" pitchFamily="49" charset="0"/>
-              </a:rPr>
-              <a:t>function</a:t>
-            </a:r>
-            <a:r>
-              <a:rPr lang="en-US" sz="900" dirty="0">
-                <a:solidFill>
-                  <a:srgbClr val="000000"/>
-                </a:solidFill>
-                <a:latin typeface="Courier New" panose="02070309020205020404" pitchFamily="49" charset="0"/>
-              </a:rPr>
-              <a:t> </a:t>
-            </a:r>
-            <a:r>
-              <a:rPr lang="en-US" sz="900" dirty="0" err="1">
-                <a:solidFill>
-                  <a:srgbClr val="000000"/>
-                </a:solidFill>
-                <a:latin typeface="Courier New" panose="02070309020205020404" pitchFamily="49" charset="0"/>
-              </a:rPr>
-              <a:t>fcn_MapGen_checkInputsToFunctions</a:t>
-            </a:r>
-            <a:r>
-              <a:rPr lang="en-US" sz="900" dirty="0">
-                <a:solidFill>
-                  <a:srgbClr val="000000"/>
-                </a:solidFill>
-                <a:latin typeface="Courier New" panose="02070309020205020404" pitchFamily="49" charset="0"/>
-              </a:rPr>
-              <a:t>(</a:t>
-            </a:r>
-            <a:r>
-              <a:rPr lang="en-US" sz="900" dirty="0">
-                <a:solidFill>
-                  <a:srgbClr val="0E00FF"/>
-                </a:solidFill>
-                <a:latin typeface="Courier New" panose="02070309020205020404" pitchFamily="49" charset="0"/>
-              </a:rPr>
-              <a:t>...</a:t>
-            </a:r>
-          </a:p>
-          <a:p>
-            <a:r>
-              <a:rPr lang="en-US" sz="900" dirty="0">
-                <a:solidFill>
-                  <a:srgbClr val="000000"/>
-                </a:solidFill>
-                <a:latin typeface="Courier New" panose="02070309020205020404" pitchFamily="49" charset="0"/>
-              </a:rPr>
-              <a:t>    </a:t>
-            </a:r>
-            <a:r>
-              <a:rPr lang="en-US" sz="900" dirty="0" err="1">
-                <a:solidFill>
-                  <a:srgbClr val="000000"/>
-                </a:solidFill>
-                <a:latin typeface="Courier New" panose="02070309020205020404" pitchFamily="49" charset="0"/>
-              </a:rPr>
-              <a:t>variable,variable_type_string,varargin</a:t>
-            </a:r>
-            <a:r>
-              <a:rPr lang="en-US" sz="900" dirty="0">
-                <a:solidFill>
-                  <a:srgbClr val="000000"/>
-                </a:solidFill>
-                <a:latin typeface="Courier New" panose="02070309020205020404" pitchFamily="49" charset="0"/>
-              </a:rPr>
-              <a:t>)</a:t>
-            </a:r>
-          </a:p>
-          <a:p>
-            <a:r>
-              <a:rPr lang="en-US" sz="900" dirty="0">
-                <a:solidFill>
-                  <a:srgbClr val="000000"/>
-                </a:solidFill>
-                <a:latin typeface="Courier New" panose="02070309020205020404" pitchFamily="49" charset="0"/>
-              </a:rPr>
-              <a:t> </a:t>
-            </a:r>
-          </a:p>
-          <a:p>
-            <a:r>
-              <a:rPr lang="en-US" sz="900" dirty="0">
-                <a:solidFill>
-                  <a:srgbClr val="028009"/>
-                </a:solidFill>
-                <a:latin typeface="Courier New" panose="02070309020205020404" pitchFamily="49" charset="0"/>
-              </a:rPr>
-              <a:t>% </a:t>
-            </a:r>
-            <a:r>
-              <a:rPr lang="en-US" sz="900" dirty="0" err="1">
-                <a:solidFill>
-                  <a:srgbClr val="028009"/>
-                </a:solidFill>
-                <a:latin typeface="Courier New" panose="02070309020205020404" pitchFamily="49" charset="0"/>
-              </a:rPr>
-              <a:t>fcn_MapGen_checkInputsToFunctions</a:t>
-            </a:r>
-            <a:endParaRPr lang="en-US" sz="900" dirty="0">
-              <a:solidFill>
-                <a:srgbClr val="028009"/>
-              </a:solidFill>
-              <a:latin typeface="Courier New" panose="02070309020205020404" pitchFamily="49" charset="0"/>
-            </a:endParaRPr>
-          </a:p>
-          <a:p>
-            <a:r>
-              <a:rPr lang="en-US" sz="900" dirty="0">
-                <a:solidFill>
-                  <a:srgbClr val="028009"/>
-                </a:solidFill>
-                <a:latin typeface="Courier New" panose="02070309020205020404" pitchFamily="49" charset="0"/>
-              </a:rPr>
-              <a:t>% Checks the variable types commonly used in the </a:t>
-            </a:r>
-            <a:r>
-              <a:rPr lang="en-US" sz="900" dirty="0" err="1">
-                <a:solidFill>
-                  <a:srgbClr val="028009"/>
-                </a:solidFill>
-                <a:latin typeface="Courier New" panose="02070309020205020404" pitchFamily="49" charset="0"/>
-              </a:rPr>
-              <a:t>MapGen</a:t>
-            </a:r>
-            <a:r>
-              <a:rPr lang="en-US" sz="900" dirty="0">
-                <a:solidFill>
-                  <a:srgbClr val="028009"/>
-                </a:solidFill>
-                <a:latin typeface="Courier New" panose="02070309020205020404" pitchFamily="49" charset="0"/>
-              </a:rPr>
-              <a:t> codes to</a:t>
-            </a:r>
-          </a:p>
-          <a:p>
-            <a:r>
-              <a:rPr lang="en-US" sz="900" dirty="0">
-                <a:solidFill>
-                  <a:srgbClr val="028009"/>
-                </a:solidFill>
-                <a:latin typeface="Courier New" panose="02070309020205020404" pitchFamily="49" charset="0"/>
-              </a:rPr>
-              <a:t>% ensure they are correctly formed.</a:t>
-            </a:r>
-          </a:p>
-          <a:p>
-            <a:r>
-              <a:rPr lang="en-US" sz="900" dirty="0">
-                <a:solidFill>
-                  <a:srgbClr val="028009"/>
-                </a:solidFill>
-                <a:latin typeface="Courier New" panose="02070309020205020404" pitchFamily="49" charset="0"/>
-              </a:rPr>
-              <a:t>%</a:t>
-            </a:r>
-          </a:p>
-          <a:p>
-            <a:r>
-              <a:rPr lang="en-US" sz="900" dirty="0">
-                <a:solidFill>
-                  <a:srgbClr val="028009"/>
-                </a:solidFill>
-                <a:latin typeface="Courier New" panose="02070309020205020404" pitchFamily="49" charset="0"/>
-              </a:rPr>
-              <a:t>% This function is typically called at the top of most functions. The input</a:t>
-            </a:r>
-          </a:p>
-          <a:p>
-            <a:r>
-              <a:rPr lang="en-US" sz="900" dirty="0">
-                <a:solidFill>
-                  <a:srgbClr val="028009"/>
-                </a:solidFill>
-                <a:latin typeface="Courier New" panose="02070309020205020404" pitchFamily="49" charset="0"/>
-              </a:rPr>
-              <a:t>% is a variable and a string defining the "type" of the variable. This</a:t>
-            </a:r>
-          </a:p>
-          <a:p>
-            <a:r>
-              <a:rPr lang="en-US" sz="900" dirty="0">
-                <a:solidFill>
-                  <a:srgbClr val="028009"/>
-                </a:solidFill>
-                <a:latin typeface="Courier New" panose="02070309020205020404" pitchFamily="49" charset="0"/>
-              </a:rPr>
-              <a:t>% function checks to see that they are compatible. For example, say there</a:t>
-            </a:r>
-          </a:p>
-          <a:p>
-            <a:r>
-              <a:rPr lang="en-US" sz="900" dirty="0">
-                <a:solidFill>
-                  <a:srgbClr val="028009"/>
-                </a:solidFill>
-                <a:latin typeface="Courier New" panose="02070309020205020404" pitchFamily="49" charset="0"/>
-              </a:rPr>
-              <a:t>% '</a:t>
-            </a:r>
-            <a:r>
-              <a:rPr lang="en-US" sz="900" dirty="0" err="1">
-                <a:solidFill>
-                  <a:srgbClr val="028009"/>
-                </a:solidFill>
-                <a:latin typeface="Courier New" panose="02070309020205020404" pitchFamily="49" charset="0"/>
-              </a:rPr>
-              <a:t>column_vector</a:t>
-            </a:r>
-            <a:r>
-              <a:rPr lang="en-US" sz="900" dirty="0">
-                <a:solidFill>
-                  <a:srgbClr val="028009"/>
-                </a:solidFill>
-                <a:latin typeface="Courier New" panose="02070309020205020404" pitchFamily="49" charset="0"/>
-              </a:rPr>
-              <a:t>' type of variables used in the function that is always a N</a:t>
-            </a:r>
-          </a:p>
-          <a:p>
-            <a:r>
-              <a:rPr lang="en-US" sz="900" dirty="0">
-                <a:solidFill>
-                  <a:srgbClr val="028009"/>
-                </a:solidFill>
-                <a:latin typeface="Courier New" panose="02070309020205020404" pitchFamily="49" charset="0"/>
-              </a:rPr>
-              <a:t>% x 1 array; if someone had a variable called "</a:t>
-            </a:r>
-            <a:r>
-              <a:rPr lang="en-US" sz="900" dirty="0" err="1">
-                <a:solidFill>
-                  <a:srgbClr val="028009"/>
-                </a:solidFill>
-                <a:latin typeface="Courier New" panose="02070309020205020404" pitchFamily="49" charset="0"/>
-              </a:rPr>
-              <a:t>test_example</a:t>
-            </a:r>
-            <a:r>
-              <a:rPr lang="en-US" sz="900" dirty="0">
-                <a:solidFill>
-                  <a:srgbClr val="028009"/>
-                </a:solidFill>
-                <a:latin typeface="Courier New" panose="02070309020205020404" pitchFamily="49" charset="0"/>
-              </a:rPr>
-              <a:t>", they could</a:t>
-            </a:r>
-          </a:p>
-          <a:p>
-            <a:r>
-              <a:rPr lang="en-US" sz="900" dirty="0">
-                <a:solidFill>
-                  <a:srgbClr val="028009"/>
-                </a:solidFill>
-                <a:latin typeface="Courier New" panose="02070309020205020404" pitchFamily="49" charset="0"/>
-              </a:rPr>
-              <a:t>% check that this fit the '</a:t>
-            </a:r>
-            <a:r>
-              <a:rPr lang="en-US" sz="900" dirty="0" err="1">
-                <a:solidFill>
-                  <a:srgbClr val="028009"/>
-                </a:solidFill>
-                <a:latin typeface="Courier New" panose="02070309020205020404" pitchFamily="49" charset="0"/>
-              </a:rPr>
-              <a:t>column_vector</a:t>
-            </a:r>
-            <a:r>
-              <a:rPr lang="en-US" sz="900" dirty="0">
-                <a:solidFill>
-                  <a:srgbClr val="028009"/>
-                </a:solidFill>
-                <a:latin typeface="Courier New" panose="02070309020205020404" pitchFamily="49" charset="0"/>
-              </a:rPr>
-              <a:t>' type by calling</a:t>
-            </a:r>
-          </a:p>
-          <a:p>
-            <a:r>
-              <a:rPr lang="en-US" sz="900" dirty="0">
-                <a:solidFill>
-                  <a:srgbClr val="028009"/>
-                </a:solidFill>
-                <a:latin typeface="Courier New" panose="02070309020205020404" pitchFamily="49" charset="0"/>
-              </a:rPr>
-              <a:t>% </a:t>
-            </a:r>
-            <a:r>
-              <a:rPr lang="en-US" sz="900" dirty="0" err="1">
-                <a:solidFill>
-                  <a:srgbClr val="028009"/>
-                </a:solidFill>
-                <a:latin typeface="Courier New" panose="02070309020205020404" pitchFamily="49" charset="0"/>
-              </a:rPr>
-              <a:t>fcn_MapGen_checkInputsToFunctions</a:t>
-            </a:r>
-            <a:r>
-              <a:rPr lang="en-US" sz="900" dirty="0">
-                <a:solidFill>
-                  <a:srgbClr val="028009"/>
-                </a:solidFill>
-                <a:latin typeface="Courier New" panose="02070309020205020404" pitchFamily="49" charset="0"/>
-              </a:rPr>
-              <a:t>(test_example,'</a:t>
-            </a:r>
-            <a:r>
-              <a:rPr lang="en-US" sz="900" dirty="0" err="1">
-                <a:solidFill>
-                  <a:srgbClr val="028009"/>
-                </a:solidFill>
-                <a:latin typeface="Courier New" panose="02070309020205020404" pitchFamily="49" charset="0"/>
-              </a:rPr>
-              <a:t>column_vector</a:t>
-            </a:r>
-            <a:r>
-              <a:rPr lang="en-US" sz="900" dirty="0">
-                <a:solidFill>
-                  <a:srgbClr val="028009"/>
-                </a:solidFill>
-                <a:latin typeface="Courier New" panose="02070309020205020404" pitchFamily="49" charset="0"/>
-              </a:rPr>
-              <a:t>').</a:t>
-            </a:r>
-          </a:p>
-          <a:p>
-            <a:r>
-              <a:rPr lang="en-US" sz="900" dirty="0">
-                <a:solidFill>
-                  <a:srgbClr val="028009"/>
-                </a:solidFill>
-                <a:latin typeface="Courier New" panose="02070309020205020404" pitchFamily="49" charset="0"/>
-              </a:rPr>
-              <a:t>% This function would then check that the array was N x 1, and if it was</a:t>
-            </a:r>
-          </a:p>
-          <a:p>
-            <a:r>
-              <a:rPr lang="en-US" sz="900" dirty="0">
-                <a:solidFill>
-                  <a:srgbClr val="028009"/>
-                </a:solidFill>
-                <a:latin typeface="Courier New" panose="02070309020205020404" pitchFamily="49" charset="0"/>
-              </a:rPr>
-              <a:t>% not, it would send out an error warning.</a:t>
-            </a:r>
-          </a:p>
-          <a:p>
-            <a:r>
-              <a:rPr lang="en-US" sz="900" dirty="0">
-                <a:solidFill>
-                  <a:srgbClr val="028009"/>
-                </a:solidFill>
-                <a:latin typeface="Courier New" panose="02070309020205020404" pitchFamily="49" charset="0"/>
-              </a:rPr>
-              <a:t>%</a:t>
-            </a:r>
-          </a:p>
-          <a:p>
-            <a:r>
-              <a:rPr lang="en-US" sz="900" dirty="0">
-                <a:solidFill>
-                  <a:srgbClr val="028009"/>
-                </a:solidFill>
-                <a:latin typeface="Courier New" panose="02070309020205020404" pitchFamily="49" charset="0"/>
-              </a:rPr>
-              <a:t>% FORMAT:</a:t>
-            </a:r>
-          </a:p>
-          <a:p>
-            <a:r>
-              <a:rPr lang="en-US" sz="900" dirty="0">
-                <a:solidFill>
-                  <a:srgbClr val="028009"/>
-                </a:solidFill>
-                <a:latin typeface="Courier New" panose="02070309020205020404" pitchFamily="49" charset="0"/>
-              </a:rPr>
-              <a:t>%</a:t>
-            </a:r>
-          </a:p>
-          <a:p>
-            <a:r>
-              <a:rPr lang="en-US" sz="900" dirty="0">
-                <a:solidFill>
-                  <a:srgbClr val="028009"/>
-                </a:solidFill>
-                <a:latin typeface="Courier New" panose="02070309020205020404" pitchFamily="49" charset="0"/>
-              </a:rPr>
-              <a:t>%      </a:t>
-            </a:r>
-            <a:r>
-              <a:rPr lang="en-US" sz="900" dirty="0" err="1">
-                <a:solidFill>
-                  <a:srgbClr val="028009"/>
-                </a:solidFill>
-                <a:latin typeface="Courier New" panose="02070309020205020404" pitchFamily="49" charset="0"/>
-              </a:rPr>
-              <a:t>fcn_MapGen_checkInputsToFunctions</a:t>
-            </a:r>
-            <a:r>
-              <a:rPr lang="en-US" sz="900" dirty="0">
-                <a:solidFill>
-                  <a:srgbClr val="028009"/>
-                </a:solidFill>
-                <a:latin typeface="Courier New" panose="02070309020205020404" pitchFamily="49" charset="0"/>
-              </a:rPr>
-              <a:t>(...</a:t>
-            </a:r>
-          </a:p>
-          <a:p>
-            <a:r>
-              <a:rPr lang="en-US" sz="900" dirty="0">
-                <a:solidFill>
-                  <a:srgbClr val="028009"/>
-                </a:solidFill>
-                <a:latin typeface="Courier New" panose="02070309020205020404" pitchFamily="49" charset="0"/>
-              </a:rPr>
-              <a:t>%      </a:t>
-            </a:r>
-            <a:r>
-              <a:rPr lang="en-US" sz="900" dirty="0" err="1">
-                <a:solidFill>
-                  <a:srgbClr val="028009"/>
-                </a:solidFill>
-                <a:latin typeface="Courier New" panose="02070309020205020404" pitchFamily="49" charset="0"/>
-              </a:rPr>
-              <a:t>variable,variable_type_string</a:t>
-            </a:r>
-            <a:r>
-              <a:rPr lang="en-US" sz="900" dirty="0">
-                <a:solidFill>
-                  <a:srgbClr val="028009"/>
-                </a:solidFill>
-                <a:latin typeface="Courier New" panose="02070309020205020404" pitchFamily="49" charset="0"/>
-              </a:rPr>
-              <a:t>,(</a:t>
-            </a:r>
-            <a:r>
-              <a:rPr lang="en-US" sz="900" dirty="0" err="1">
-                <a:solidFill>
-                  <a:srgbClr val="028009"/>
-                </a:solidFill>
-                <a:latin typeface="Courier New" panose="02070309020205020404" pitchFamily="49" charset="0"/>
-              </a:rPr>
-              <a:t>optional_arguments</a:t>
-            </a:r>
-            <a:r>
-              <a:rPr lang="en-US" sz="900" dirty="0">
-                <a:solidFill>
-                  <a:srgbClr val="028009"/>
-                </a:solidFill>
-                <a:latin typeface="Courier New" panose="02070309020205020404" pitchFamily="49" charset="0"/>
-              </a:rPr>
-              <a:t>))</a:t>
-            </a:r>
-          </a:p>
-          <a:p>
-            <a:r>
-              <a:rPr lang="en-US" sz="900" dirty="0">
-                <a:solidFill>
-                  <a:srgbClr val="028009"/>
-                </a:solidFill>
-                <a:latin typeface="Courier New" panose="02070309020205020404" pitchFamily="49" charset="0"/>
-              </a:rPr>
-              <a:t>%</a:t>
-            </a:r>
-          </a:p>
-          <a:p>
-            <a:r>
-              <a:rPr lang="en-US" sz="900" dirty="0">
-                <a:solidFill>
-                  <a:srgbClr val="028009"/>
-                </a:solidFill>
-                <a:latin typeface="Courier New" panose="02070309020205020404" pitchFamily="49" charset="0"/>
-              </a:rPr>
-              <a:t>% INPUTS:</a:t>
-            </a:r>
-          </a:p>
-          <a:p>
-            <a:r>
-              <a:rPr lang="en-US" sz="900" dirty="0">
-                <a:solidFill>
-                  <a:srgbClr val="028009"/>
-                </a:solidFill>
-                <a:latin typeface="Courier New" panose="02070309020205020404" pitchFamily="49" charset="0"/>
-              </a:rPr>
-              <a:t>%</a:t>
-            </a:r>
-          </a:p>
-          <a:p>
-            <a:r>
-              <a:rPr lang="en-US" sz="900" dirty="0">
-                <a:solidFill>
-                  <a:srgbClr val="028009"/>
-                </a:solidFill>
-                <a:latin typeface="Courier New" panose="02070309020205020404" pitchFamily="49" charset="0"/>
-              </a:rPr>
-              <a:t>%      variable: the variable to check</a:t>
-            </a:r>
-          </a:p>
-        </p:txBody>
-      </p:sp>
-      <p:sp>
-        <p:nvSpPr>
-          <p:cNvPr id="3" name="Rectangle 2">
-            <a:extLst>
-              <a:ext uri="{FF2B5EF4-FFF2-40B4-BE49-F238E27FC236}">
-                <a16:creationId xmlns:a16="http://schemas.microsoft.com/office/drawing/2014/main" id="{75616B01-3EEF-43F9-B062-A030413183B5}"/>
-              </a:ext>
-            </a:extLst>
-          </p:cNvPr>
-          <p:cNvSpPr/>
-          <p:nvPr/>
-        </p:nvSpPr>
-        <p:spPr>
-          <a:xfrm>
-            <a:off x="3692063" y="6308209"/>
-            <a:ext cx="7414594" cy="369332"/>
-          </a:xfrm>
-          <a:prstGeom prst="rect">
-            <a:avLst/>
-          </a:prstGeom>
-        </p:spPr>
-        <p:txBody>
-          <a:bodyPr wrap="none">
-            <a:spAutoFit/>
-          </a:bodyPr>
-          <a:lstStyle/>
-          <a:p>
-            <a:r>
-              <a:rPr lang="en-US" dirty="0"/>
-              <a:t>See: </a:t>
-            </a:r>
-            <a:r>
-              <a:rPr lang="en-US" dirty="0" err="1"/>
-              <a:t>script_test_fcn_MapGen_checkInputsToFunctions.m</a:t>
-            </a:r>
-            <a:r>
-              <a:rPr lang="en-US" dirty="0"/>
-              <a:t> for example usages</a:t>
-            </a:r>
-          </a:p>
-        </p:txBody>
-      </p:sp>
-    </p:spTree>
-    <p:extLst>
-      <p:ext uri="{BB962C8B-B14F-4D97-AF65-F5344CB8AC3E}">
-        <p14:creationId xmlns:p14="http://schemas.microsoft.com/office/powerpoint/2010/main" val="3283178281"/>
-      </p:ext>
-    </p:extLst>
-  </p:cSld>
-  <p:clrMapOvr>
-    <a:masterClrMapping/>
-  </p:clrMapOvr>
-</p:sld>
-</file>
-
-<file path=ppt/slides/slide30.xml><?xml version="1.0" encoding="utf-8"?>
+<file path=ppt/slides/slide31.xml><?xml version="1.0" encoding="utf-8"?>
 <p:sld xmlns:a="http://schemas.openxmlformats.org/drawingml/2006/main" xmlns:r="http://schemas.openxmlformats.org/officeDocument/2006/relationships" xmlns:p="http://schemas.openxmlformats.org/presentationml/2006/main">
   <p:cSld>
     <p:spTree>
@@ -18305,7 +20250,7 @@
 </p:sld>
 </file>
 
-<file path=ppt/slides/slide31.xml><?xml version="1.0" encoding="utf-8"?>
+<file path=ppt/slides/slide32.xml><?xml version="1.0" encoding="utf-8"?>
 <p:sld xmlns:a="http://schemas.openxmlformats.org/drawingml/2006/main" xmlns:r="http://schemas.openxmlformats.org/officeDocument/2006/relationships" xmlns:p="http://schemas.openxmlformats.org/presentationml/2006/main">
   <p:cSld>
     <p:spTree>
@@ -18400,7 +20345,7 @@
 </p:sld>
 </file>
 
-<file path=ppt/slides/slide32.xml><?xml version="1.0" encoding="utf-8"?>
+<file path=ppt/slides/slide33.xml><?xml version="1.0" encoding="utf-8"?>
 <p:sld xmlns:a="http://schemas.openxmlformats.org/drawingml/2006/main" xmlns:r="http://schemas.openxmlformats.org/officeDocument/2006/relationships" xmlns:p="http://schemas.openxmlformats.org/presentationml/2006/main">
   <p:cSld>
     <p:spTree>
@@ -19434,7 +21379,7 @@
 </p:sld>
 </file>
 
-<file path=ppt/slides/slide33.xml><?xml version="1.0" encoding="utf-8"?>
+<file path=ppt/slides/slide34.xml><?xml version="1.0" encoding="utf-8"?>
 <p:sld xmlns:a="http://schemas.openxmlformats.org/drawingml/2006/main" xmlns:r="http://schemas.openxmlformats.org/officeDocument/2006/relationships" xmlns:p="http://schemas.openxmlformats.org/presentationml/2006/main">
   <p:cSld>
     <p:spTree>
@@ -19522,7 +21467,7 @@
 </p:sld>
 </file>
 
-<file path=ppt/slides/slide34.xml><?xml version="1.0" encoding="utf-8"?>
+<file path=ppt/slides/slide35.xml><?xml version="1.0" encoding="utf-8"?>
 <p:sld xmlns:a="http://schemas.openxmlformats.org/drawingml/2006/main" xmlns:r="http://schemas.openxmlformats.org/officeDocument/2006/relationships" xmlns:p="http://schemas.openxmlformats.org/presentationml/2006/main">
   <p:cSld>
     <p:spTree>
@@ -19615,7 +21560,7 @@
 </p:sld>
 </file>
 
-<file path=ppt/slides/slide35.xml><?xml version="1.0" encoding="utf-8"?>
+<file path=ppt/slides/slide36.xml><?xml version="1.0" encoding="utf-8"?>
 <p:sld xmlns:a="http://schemas.openxmlformats.org/drawingml/2006/main" xmlns:r="http://schemas.openxmlformats.org/officeDocument/2006/relationships" xmlns:p="http://schemas.openxmlformats.org/presentationml/2006/main">
   <p:cSld>
     <p:spTree>
@@ -20024,7 +21969,7 @@
 </p:sld>
 </file>
 
-<file path=ppt/slides/slide36.xml><?xml version="1.0" encoding="utf-8"?>
+<file path=ppt/slides/slide37.xml><?xml version="1.0" encoding="utf-8"?>
 <p:sld xmlns:a="http://schemas.openxmlformats.org/drawingml/2006/main" xmlns:r="http://schemas.openxmlformats.org/officeDocument/2006/relationships" xmlns:p="http://schemas.openxmlformats.org/presentationml/2006/main">
   <p:cSld>
     <p:spTree>
@@ -20809,7 +22754,7 @@
 </p:sld>
 </file>
 
-<file path=ppt/slides/slide37.xml><?xml version="1.0" encoding="utf-8"?>
+<file path=ppt/slides/slide38.xml><?xml version="1.0" encoding="utf-8"?>
 <p:sld xmlns:a="http://schemas.openxmlformats.org/drawingml/2006/main" xmlns:r="http://schemas.openxmlformats.org/officeDocument/2006/relationships" xmlns:p="http://schemas.openxmlformats.org/presentationml/2006/main">
   <p:cSld>
     <p:spTree>
@@ -21594,7 +23539,7 @@
 </p:sld>
 </file>
 
-<file path=ppt/slides/slide38.xml><?xml version="1.0" encoding="utf-8"?>
+<file path=ppt/slides/slide39.xml><?xml version="1.0" encoding="utf-8"?>
 <p:sld xmlns:a="http://schemas.openxmlformats.org/drawingml/2006/main" xmlns:r="http://schemas.openxmlformats.org/officeDocument/2006/relationships" xmlns:p="http://schemas.openxmlformats.org/presentationml/2006/main">
   <p:cSld>
     <p:spTree>
@@ -22315,7 +24260,576 @@
 </p:sld>
 </file>
 
-<file path=ppt/slides/slide39.xml><?xml version="1.0" encoding="utf-8"?>
+<file path=ppt/slides/slide4.xml><?xml version="1.0" encoding="utf-8"?>
+<p:sld xmlns:a="http://schemas.openxmlformats.org/drawingml/2006/main" xmlns:r="http://schemas.openxmlformats.org/officeDocument/2006/relationships" xmlns:p="http://schemas.openxmlformats.org/presentationml/2006/main">
+  <p:cSld>
+    <p:spTree>
+      <p:nvGrpSpPr>
+        <p:cNvPr id="1" name=""/>
+        <p:cNvGrpSpPr/>
+        <p:nvPr/>
+      </p:nvGrpSpPr>
+      <p:grpSpPr>
+        <a:xfrm>
+          <a:off x="0" y="0"/>
+          <a:ext cx="0" cy="0"/>
+          <a:chOff x="0" y="0"/>
+          <a:chExt cx="0" cy="0"/>
+        </a:xfrm>
+      </p:grpSpPr>
+      <p:sp>
+        <p:nvSpPr>
+          <p:cNvPr id="2" name="Title 1">
+            <a:extLst>
+              <a:ext uri="{FF2B5EF4-FFF2-40B4-BE49-F238E27FC236}">
+                <a16:creationId xmlns:a16="http://schemas.microsoft.com/office/drawing/2014/main" id="{8C7DDBE8-36CC-4927-9870-E0F8CEA9D030}"/>
+              </a:ext>
+            </a:extLst>
+          </p:cNvPr>
+          <p:cNvSpPr>
+            <a:spLocks noGrp="1"/>
+          </p:cNvSpPr>
+          <p:nvPr>
+            <p:ph type="title"/>
+          </p:nvPr>
+        </p:nvSpPr>
+        <p:spPr>
+          <a:xfrm>
+            <a:off x="838200" y="618266"/>
+            <a:ext cx="10515600" cy="1325563"/>
+          </a:xfrm>
+        </p:spPr>
+        <p:txBody>
+          <a:bodyPr>
+            <a:normAutofit fontScale="90000"/>
+          </a:bodyPr>
+          <a:lstStyle/>
+          <a:p>
+            <a:r>
+              <a:rPr lang="en-US" dirty="0"/>
+              <a:t>A demonstration script exists that shows most of the functionality in this document:</a:t>
+            </a:r>
+            <a:br>
+              <a:rPr lang="en-US" dirty="0"/>
+            </a:br>
+            <a:r>
+              <a:rPr lang="en-US" dirty="0" err="1">
+                <a:solidFill>
+                  <a:srgbClr val="028009"/>
+                </a:solidFill>
+                <a:latin typeface="Courier New" panose="02070309020205020404" pitchFamily="49" charset="0"/>
+              </a:rPr>
+              <a:t>script_demo_MapGenLibrary</a:t>
+            </a:r>
+            <a:br>
+              <a:rPr lang="en-US" dirty="0">
+                <a:solidFill>
+                  <a:srgbClr val="028009"/>
+                </a:solidFill>
+                <a:latin typeface="Courier New" panose="02070309020205020404" pitchFamily="49" charset="0"/>
+              </a:rPr>
+            </a:br>
+            <a:endParaRPr lang="en-US" dirty="0"/>
+          </a:p>
+        </p:txBody>
+      </p:sp>
+      <p:sp>
+        <p:nvSpPr>
+          <p:cNvPr id="4" name="Rectangle 3">
+            <a:extLst>
+              <a:ext uri="{FF2B5EF4-FFF2-40B4-BE49-F238E27FC236}">
+                <a16:creationId xmlns:a16="http://schemas.microsoft.com/office/drawing/2014/main" id="{ED6B6C78-C512-4D1D-90D5-01BF838E0A27}"/>
+              </a:ext>
+            </a:extLst>
+          </p:cNvPr>
+          <p:cNvSpPr/>
+          <p:nvPr/>
+        </p:nvSpPr>
+        <p:spPr>
+          <a:xfrm>
+            <a:off x="374433" y="2022133"/>
+            <a:ext cx="5909136" cy="2446824"/>
+          </a:xfrm>
+          <a:prstGeom prst="rect">
+            <a:avLst/>
+          </a:prstGeom>
+          <a:solidFill>
+            <a:schemeClr val="accent4">
+              <a:lumMod val="20000"/>
+              <a:lumOff val="80000"/>
+            </a:schemeClr>
+          </a:solidFill>
+        </p:spPr>
+        <p:txBody>
+          <a:bodyPr wrap="square">
+            <a:spAutoFit/>
+          </a:bodyPr>
+          <a:lstStyle/>
+          <a:p>
+            <a:r>
+              <a:rPr lang="en-US" sz="900" dirty="0">
+                <a:solidFill>
+                  <a:srgbClr val="028009"/>
+                </a:solidFill>
+                <a:latin typeface="Courier New" panose="02070309020205020404" pitchFamily="49" charset="0"/>
+              </a:rPr>
+              <a:t>%% Show how inputs are checked</a:t>
+            </a:r>
+          </a:p>
+          <a:p>
+            <a:r>
+              <a:rPr lang="en-US" sz="900" dirty="0" err="1">
+                <a:solidFill>
+                  <a:srgbClr val="000000"/>
+                </a:solidFill>
+                <a:latin typeface="Courier New" panose="02070309020205020404" pitchFamily="49" charset="0"/>
+              </a:rPr>
+              <a:t>Twocolumn_of_numbers_test</a:t>
+            </a:r>
+            <a:r>
+              <a:rPr lang="en-US" sz="900" dirty="0">
+                <a:solidFill>
+                  <a:srgbClr val="000000"/>
+                </a:solidFill>
+                <a:latin typeface="Courier New" panose="02070309020205020404" pitchFamily="49" charset="0"/>
+              </a:rPr>
+              <a:t> = [4 1; 3 0; 2 5];</a:t>
+            </a:r>
+          </a:p>
+          <a:p>
+            <a:r>
+              <a:rPr lang="en-US" sz="900" dirty="0" err="1">
+                <a:solidFill>
+                  <a:srgbClr val="000000"/>
+                </a:solidFill>
+                <a:latin typeface="Courier New" panose="02070309020205020404" pitchFamily="49" charset="0"/>
+              </a:rPr>
+              <a:t>fcn_MapGen_checkInputsToFunctions</a:t>
+            </a:r>
+            <a:r>
+              <a:rPr lang="en-US" sz="900" dirty="0">
+                <a:solidFill>
+                  <a:srgbClr val="000000"/>
+                </a:solidFill>
+                <a:latin typeface="Courier New" panose="02070309020205020404" pitchFamily="49" charset="0"/>
+              </a:rPr>
+              <a:t>(</a:t>
+            </a:r>
+            <a:r>
+              <a:rPr lang="en-US" sz="900" dirty="0" err="1">
+                <a:solidFill>
+                  <a:srgbClr val="000000"/>
+                </a:solidFill>
+                <a:latin typeface="Courier New" panose="02070309020205020404" pitchFamily="49" charset="0"/>
+              </a:rPr>
+              <a:t>Twocolumn_of_numbers_test</a:t>
+            </a:r>
+            <a:r>
+              <a:rPr lang="en-US" sz="900" dirty="0">
+                <a:solidFill>
+                  <a:srgbClr val="000000"/>
+                </a:solidFill>
+                <a:latin typeface="Courier New" panose="02070309020205020404" pitchFamily="49" charset="0"/>
+              </a:rPr>
+              <a:t>, </a:t>
+            </a:r>
+            <a:r>
+              <a:rPr lang="en-US" sz="900" dirty="0">
+                <a:solidFill>
+                  <a:srgbClr val="AA04F9"/>
+                </a:solidFill>
+                <a:latin typeface="Courier New" panose="02070309020205020404" pitchFamily="49" charset="0"/>
+              </a:rPr>
+              <a:t>'2column_of_numbers'</a:t>
+            </a:r>
+            <a:r>
+              <a:rPr lang="en-US" sz="900" dirty="0">
+                <a:solidFill>
+                  <a:srgbClr val="000000"/>
+                </a:solidFill>
+                <a:latin typeface="Courier New" panose="02070309020205020404" pitchFamily="49" charset="0"/>
+              </a:rPr>
+              <a:t>);</a:t>
+            </a:r>
+          </a:p>
+          <a:p>
+            <a:r>
+              <a:rPr lang="en-US" sz="900" dirty="0">
+                <a:solidFill>
+                  <a:srgbClr val="000000"/>
+                </a:solidFill>
+                <a:latin typeface="Courier New" panose="02070309020205020404" pitchFamily="49" charset="0"/>
+              </a:rPr>
+              <a:t> </a:t>
+            </a:r>
+          </a:p>
+          <a:p>
+            <a:r>
+              <a:rPr lang="en-US" sz="900" dirty="0">
+                <a:solidFill>
+                  <a:srgbClr val="000000"/>
+                </a:solidFill>
+                <a:latin typeface="Courier New" panose="02070309020205020404" pitchFamily="49" charset="0"/>
+              </a:rPr>
+              <a:t> </a:t>
+            </a:r>
+          </a:p>
+          <a:p>
+            <a:r>
+              <a:rPr lang="en-US" sz="900" dirty="0">
+                <a:solidFill>
+                  <a:srgbClr val="028009"/>
+                </a:solidFill>
+                <a:latin typeface="Courier New" panose="02070309020205020404" pitchFamily="49" charset="0"/>
+              </a:rPr>
+              <a:t>%% Generate a set of polytopes from various pseudo-random sources</a:t>
+            </a:r>
+          </a:p>
+          <a:p>
+            <a:r>
+              <a:rPr lang="en-US" sz="900" dirty="0">
+                <a:solidFill>
+                  <a:srgbClr val="028009"/>
+                </a:solidFill>
+                <a:latin typeface="Courier New" panose="02070309020205020404" pitchFamily="49" charset="0"/>
+              </a:rPr>
+              <a:t>% Generate a set of polytopes from the </a:t>
+            </a:r>
+            <a:r>
+              <a:rPr lang="en-US" sz="900" dirty="0" err="1">
+                <a:solidFill>
+                  <a:srgbClr val="028009"/>
+                </a:solidFill>
+                <a:latin typeface="Courier New" panose="02070309020205020404" pitchFamily="49" charset="0"/>
+              </a:rPr>
+              <a:t>Sobol</a:t>
+            </a:r>
+            <a:r>
+              <a:rPr lang="en-US" sz="900" dirty="0">
+                <a:solidFill>
+                  <a:srgbClr val="028009"/>
+                </a:solidFill>
+                <a:latin typeface="Courier New" panose="02070309020205020404" pitchFamily="49" charset="0"/>
+              </a:rPr>
+              <a:t> set</a:t>
+            </a:r>
+          </a:p>
+          <a:p>
+            <a:r>
+              <a:rPr lang="en-US" sz="900" dirty="0" err="1">
+                <a:solidFill>
+                  <a:srgbClr val="000000"/>
+                </a:solidFill>
+                <a:latin typeface="Courier New" panose="02070309020205020404" pitchFamily="49" charset="0"/>
+              </a:rPr>
+              <a:t>fig_num</a:t>
+            </a:r>
+            <a:r>
+              <a:rPr lang="en-US" sz="900" dirty="0">
+                <a:solidFill>
+                  <a:srgbClr val="000000"/>
+                </a:solidFill>
+                <a:latin typeface="Courier New" panose="02070309020205020404" pitchFamily="49" charset="0"/>
+              </a:rPr>
+              <a:t> = 11;</a:t>
+            </a:r>
+          </a:p>
+          <a:p>
+            <a:r>
+              <a:rPr lang="en-US" sz="900" dirty="0" err="1">
+                <a:solidFill>
+                  <a:srgbClr val="000000"/>
+                </a:solidFill>
+                <a:latin typeface="Courier New" panose="02070309020205020404" pitchFamily="49" charset="0"/>
+              </a:rPr>
+              <a:t>Sobol_range</a:t>
+            </a:r>
+            <a:r>
+              <a:rPr lang="en-US" sz="900" dirty="0">
+                <a:solidFill>
+                  <a:srgbClr val="000000"/>
+                </a:solidFill>
+                <a:latin typeface="Courier New" panose="02070309020205020404" pitchFamily="49" charset="0"/>
+              </a:rPr>
+              <a:t> = [1 1000]; </a:t>
+            </a:r>
+            <a:r>
+              <a:rPr lang="en-US" sz="900" dirty="0">
+                <a:solidFill>
+                  <a:srgbClr val="028009"/>
+                </a:solidFill>
+                <a:latin typeface="Courier New" panose="02070309020205020404" pitchFamily="49" charset="0"/>
+              </a:rPr>
+              <a:t>% range of </a:t>
+            </a:r>
+            <a:r>
+              <a:rPr lang="en-US" sz="900" dirty="0" err="1">
+                <a:solidFill>
+                  <a:srgbClr val="028009"/>
+                </a:solidFill>
+                <a:latin typeface="Courier New" panose="02070309020205020404" pitchFamily="49" charset="0"/>
+              </a:rPr>
+              <a:t>Sobol</a:t>
+            </a:r>
+            <a:r>
+              <a:rPr lang="en-US" sz="900" dirty="0">
+                <a:solidFill>
+                  <a:srgbClr val="028009"/>
+                </a:solidFill>
+                <a:latin typeface="Courier New" panose="02070309020205020404" pitchFamily="49" charset="0"/>
+              </a:rPr>
+              <a:t> points to use to generate the tiling</a:t>
+            </a:r>
+          </a:p>
+          <a:p>
+            <a:r>
+              <a:rPr lang="en-US" sz="900" dirty="0" err="1">
+                <a:solidFill>
+                  <a:srgbClr val="000000"/>
+                </a:solidFill>
+                <a:latin typeface="Courier New" panose="02070309020205020404" pitchFamily="49" charset="0"/>
+              </a:rPr>
+              <a:t>tiled_polytopes</a:t>
+            </a:r>
+            <a:r>
+              <a:rPr lang="en-US" sz="900" dirty="0">
+                <a:solidFill>
+                  <a:srgbClr val="000000"/>
+                </a:solidFill>
+                <a:latin typeface="Courier New" panose="02070309020205020404" pitchFamily="49" charset="0"/>
+              </a:rPr>
+              <a:t> = </a:t>
+            </a:r>
+            <a:r>
+              <a:rPr lang="en-US" sz="900" dirty="0" err="1">
+                <a:solidFill>
+                  <a:srgbClr val="000000"/>
+                </a:solidFill>
+                <a:latin typeface="Courier New" panose="02070309020205020404" pitchFamily="49" charset="0"/>
+              </a:rPr>
+              <a:t>fcn_MapGen_sobolVoronoiTiling</a:t>
+            </a:r>
+            <a:r>
+              <a:rPr lang="en-US" sz="900" dirty="0">
+                <a:solidFill>
+                  <a:srgbClr val="000000"/>
+                </a:solidFill>
+                <a:latin typeface="Courier New" panose="02070309020205020404" pitchFamily="49" charset="0"/>
+              </a:rPr>
+              <a:t>(</a:t>
+            </a:r>
+            <a:r>
+              <a:rPr lang="en-US" sz="900" dirty="0" err="1">
+                <a:solidFill>
+                  <a:srgbClr val="000000"/>
+                </a:solidFill>
+                <a:latin typeface="Courier New" panose="02070309020205020404" pitchFamily="49" charset="0"/>
+              </a:rPr>
+              <a:t>Sobol_range</a:t>
+            </a:r>
+            <a:r>
+              <a:rPr lang="en-US" sz="900" dirty="0">
+                <a:solidFill>
+                  <a:srgbClr val="000000"/>
+                </a:solidFill>
+                <a:latin typeface="Courier New" panose="02070309020205020404" pitchFamily="49" charset="0"/>
+              </a:rPr>
+              <a:t>,[1 1],</a:t>
+            </a:r>
+            <a:r>
+              <a:rPr lang="en-US" sz="900" dirty="0" err="1">
+                <a:solidFill>
+                  <a:srgbClr val="000000"/>
+                </a:solidFill>
+                <a:latin typeface="Courier New" panose="02070309020205020404" pitchFamily="49" charset="0"/>
+              </a:rPr>
+              <a:t>fig_num</a:t>
+            </a:r>
+            <a:r>
+              <a:rPr lang="en-US" sz="900" dirty="0">
+                <a:solidFill>
+                  <a:srgbClr val="000000"/>
+                </a:solidFill>
+                <a:latin typeface="Courier New" panose="02070309020205020404" pitchFamily="49" charset="0"/>
+              </a:rPr>
+              <a:t>);</a:t>
+            </a:r>
+          </a:p>
+          <a:p>
+            <a:r>
+              <a:rPr lang="en-US" sz="900" dirty="0">
+                <a:solidFill>
+                  <a:srgbClr val="000000"/>
+                </a:solidFill>
+                <a:latin typeface="Courier New" panose="02070309020205020404" pitchFamily="49" charset="0"/>
+              </a:rPr>
+              <a:t> </a:t>
+            </a:r>
+          </a:p>
+          <a:p>
+            <a:r>
+              <a:rPr lang="en-US" sz="900" dirty="0">
+                <a:solidFill>
+                  <a:srgbClr val="000000"/>
+                </a:solidFill>
+                <a:latin typeface="Courier New" panose="02070309020205020404" pitchFamily="49" charset="0"/>
+              </a:rPr>
+              <a:t> </a:t>
+            </a:r>
+          </a:p>
+          <a:p>
+            <a:r>
+              <a:rPr lang="en-US" sz="900" dirty="0">
+                <a:solidFill>
+                  <a:srgbClr val="028009"/>
+                </a:solidFill>
+                <a:latin typeface="Courier New" panose="02070309020205020404" pitchFamily="49" charset="0"/>
+              </a:rPr>
+              <a:t>% Generate a set of polytopes from the Halton set</a:t>
+            </a:r>
+          </a:p>
+          <a:p>
+            <a:r>
+              <a:rPr lang="en-US" sz="900" dirty="0" err="1">
+                <a:solidFill>
+                  <a:srgbClr val="000000"/>
+                </a:solidFill>
+                <a:latin typeface="Courier New" panose="02070309020205020404" pitchFamily="49" charset="0"/>
+              </a:rPr>
+              <a:t>fig_num</a:t>
+            </a:r>
+            <a:r>
+              <a:rPr lang="en-US" sz="900" dirty="0">
+                <a:solidFill>
+                  <a:srgbClr val="000000"/>
+                </a:solidFill>
+                <a:latin typeface="Courier New" panose="02070309020205020404" pitchFamily="49" charset="0"/>
+              </a:rPr>
+              <a:t> = 12;</a:t>
+            </a:r>
+          </a:p>
+          <a:p>
+            <a:r>
+              <a:rPr lang="en-US" sz="900" dirty="0" err="1">
+                <a:solidFill>
+                  <a:srgbClr val="000000"/>
+                </a:solidFill>
+                <a:latin typeface="Courier New" panose="02070309020205020404" pitchFamily="49" charset="0"/>
+              </a:rPr>
+              <a:t>Halton_range</a:t>
+            </a:r>
+            <a:r>
+              <a:rPr lang="en-US" sz="900" dirty="0">
+                <a:solidFill>
+                  <a:srgbClr val="000000"/>
+                </a:solidFill>
+                <a:latin typeface="Courier New" panose="02070309020205020404" pitchFamily="49" charset="0"/>
+              </a:rPr>
+              <a:t> = [1 1000]; </a:t>
+            </a:r>
+            <a:r>
+              <a:rPr lang="en-US" sz="900" dirty="0">
+                <a:solidFill>
+                  <a:srgbClr val="028009"/>
+                </a:solidFill>
+                <a:latin typeface="Courier New" panose="02070309020205020404" pitchFamily="49" charset="0"/>
+              </a:rPr>
+              <a:t>% range of Halton points to use to generate the tiling</a:t>
+            </a:r>
+          </a:p>
+          <a:p>
+            <a:r>
+              <a:rPr lang="en-US" sz="900" dirty="0" err="1">
+                <a:solidFill>
+                  <a:srgbClr val="000000"/>
+                </a:solidFill>
+                <a:latin typeface="Courier New" panose="02070309020205020404" pitchFamily="49" charset="0"/>
+              </a:rPr>
+              <a:t>tiled_polytopes</a:t>
+            </a:r>
+            <a:r>
+              <a:rPr lang="en-US" sz="900" dirty="0">
+                <a:solidFill>
+                  <a:srgbClr val="000000"/>
+                </a:solidFill>
+                <a:latin typeface="Courier New" panose="02070309020205020404" pitchFamily="49" charset="0"/>
+              </a:rPr>
+              <a:t> = </a:t>
+            </a:r>
+            <a:r>
+              <a:rPr lang="en-US" sz="900" dirty="0" err="1">
+                <a:solidFill>
+                  <a:srgbClr val="000000"/>
+                </a:solidFill>
+                <a:latin typeface="Courier New" panose="02070309020205020404" pitchFamily="49" charset="0"/>
+              </a:rPr>
+              <a:t>fcn_MapGen_haltonVoronoiTiling</a:t>
+            </a:r>
+            <a:r>
+              <a:rPr lang="en-US" sz="900" dirty="0">
+                <a:solidFill>
+                  <a:srgbClr val="000000"/>
+                </a:solidFill>
+                <a:latin typeface="Courier New" panose="02070309020205020404" pitchFamily="49" charset="0"/>
+              </a:rPr>
+              <a:t>(</a:t>
+            </a:r>
+            <a:r>
+              <a:rPr lang="en-US" sz="900" dirty="0" err="1">
+                <a:solidFill>
+                  <a:srgbClr val="000000"/>
+                </a:solidFill>
+                <a:latin typeface="Courier New" panose="02070309020205020404" pitchFamily="49" charset="0"/>
+              </a:rPr>
+              <a:t>Halton_range</a:t>
+            </a:r>
+            <a:r>
+              <a:rPr lang="en-US" sz="900" dirty="0">
+                <a:solidFill>
+                  <a:srgbClr val="000000"/>
+                </a:solidFill>
+                <a:latin typeface="Courier New" panose="02070309020205020404" pitchFamily="49" charset="0"/>
+              </a:rPr>
+              <a:t>,[1 1],</a:t>
+            </a:r>
+            <a:r>
+              <a:rPr lang="en-US" sz="900" dirty="0" err="1">
+                <a:solidFill>
+                  <a:srgbClr val="000000"/>
+                </a:solidFill>
+                <a:latin typeface="Courier New" panose="02070309020205020404" pitchFamily="49" charset="0"/>
+              </a:rPr>
+              <a:t>fig_num</a:t>
+            </a:r>
+            <a:r>
+              <a:rPr lang="en-US" sz="900" dirty="0">
+                <a:solidFill>
+                  <a:srgbClr val="000000"/>
+                </a:solidFill>
+                <a:latin typeface="Courier New" panose="02070309020205020404" pitchFamily="49" charset="0"/>
+              </a:rPr>
+              <a:t>);</a:t>
+            </a:r>
+          </a:p>
+          <a:p>
+            <a:endParaRPr lang="en-US" sz="900" dirty="0"/>
+          </a:p>
+        </p:txBody>
+      </p:sp>
+    </p:spTree>
+    <p:extLst>
+      <p:ext uri="{BB962C8B-B14F-4D97-AF65-F5344CB8AC3E}">
+        <p14:creationId xmlns:p14="http://schemas.microsoft.com/office/powerpoint/2010/main" val="3684799925"/>
+      </p:ext>
+    </p:extLst>
+  </p:cSld>
+  <p:clrMapOvr>
+    <a:masterClrMapping/>
+  </p:clrMapOvr>
+</p:sld>
+</file>
+
+<file path=ppt/slides/slide40.xml><?xml version="1.0" encoding="utf-8"?>
 <p:sld xmlns:a="http://schemas.openxmlformats.org/drawingml/2006/main" xmlns:r="http://schemas.openxmlformats.org/officeDocument/2006/relationships" xmlns:p="http://schemas.openxmlformats.org/presentationml/2006/main">
   <p:cSld>
     <p:spTree>
@@ -23090,576 +25604,7 @@
 </p:sld>
 </file>
 
-<file path=ppt/slides/slide4.xml><?xml version="1.0" encoding="utf-8"?>
-<p:sld xmlns:a="http://schemas.openxmlformats.org/drawingml/2006/main" xmlns:r="http://schemas.openxmlformats.org/officeDocument/2006/relationships" xmlns:p="http://schemas.openxmlformats.org/presentationml/2006/main">
-  <p:cSld>
-    <p:spTree>
-      <p:nvGrpSpPr>
-        <p:cNvPr id="1" name=""/>
-        <p:cNvGrpSpPr/>
-        <p:nvPr/>
-      </p:nvGrpSpPr>
-      <p:grpSpPr>
-        <a:xfrm>
-          <a:off x="0" y="0"/>
-          <a:ext cx="0" cy="0"/>
-          <a:chOff x="0" y="0"/>
-          <a:chExt cx="0" cy="0"/>
-        </a:xfrm>
-      </p:grpSpPr>
-      <p:sp>
-        <p:nvSpPr>
-          <p:cNvPr id="2" name="Title 1">
-            <a:extLst>
-              <a:ext uri="{FF2B5EF4-FFF2-40B4-BE49-F238E27FC236}">
-                <a16:creationId xmlns:a16="http://schemas.microsoft.com/office/drawing/2014/main" id="{8C7DDBE8-36CC-4927-9870-E0F8CEA9D030}"/>
-              </a:ext>
-            </a:extLst>
-          </p:cNvPr>
-          <p:cNvSpPr>
-            <a:spLocks noGrp="1"/>
-          </p:cNvSpPr>
-          <p:nvPr>
-            <p:ph type="title"/>
-          </p:nvPr>
-        </p:nvSpPr>
-        <p:spPr>
-          <a:xfrm>
-            <a:off x="838200" y="618266"/>
-            <a:ext cx="10515600" cy="1325563"/>
-          </a:xfrm>
-        </p:spPr>
-        <p:txBody>
-          <a:bodyPr>
-            <a:normAutofit fontScale="90000"/>
-          </a:bodyPr>
-          <a:lstStyle/>
-          <a:p>
-            <a:r>
-              <a:rPr lang="en-US" dirty="0"/>
-              <a:t>A demonstration script exists that shows most of the functionality in this document:</a:t>
-            </a:r>
-            <a:br>
-              <a:rPr lang="en-US" dirty="0"/>
-            </a:br>
-            <a:r>
-              <a:rPr lang="en-US" dirty="0" err="1">
-                <a:solidFill>
-                  <a:srgbClr val="028009"/>
-                </a:solidFill>
-                <a:latin typeface="Courier New" panose="02070309020205020404" pitchFamily="49" charset="0"/>
-              </a:rPr>
-              <a:t>script_demo_MapGenLibrary</a:t>
-            </a:r>
-            <a:br>
-              <a:rPr lang="en-US" dirty="0">
-                <a:solidFill>
-                  <a:srgbClr val="028009"/>
-                </a:solidFill>
-                <a:latin typeface="Courier New" panose="02070309020205020404" pitchFamily="49" charset="0"/>
-              </a:rPr>
-            </a:br>
-            <a:endParaRPr lang="en-US" dirty="0"/>
-          </a:p>
-        </p:txBody>
-      </p:sp>
-      <p:sp>
-        <p:nvSpPr>
-          <p:cNvPr id="4" name="Rectangle 3">
-            <a:extLst>
-              <a:ext uri="{FF2B5EF4-FFF2-40B4-BE49-F238E27FC236}">
-                <a16:creationId xmlns:a16="http://schemas.microsoft.com/office/drawing/2014/main" id="{ED6B6C78-C512-4D1D-90D5-01BF838E0A27}"/>
-              </a:ext>
-            </a:extLst>
-          </p:cNvPr>
-          <p:cNvSpPr/>
-          <p:nvPr/>
-        </p:nvSpPr>
-        <p:spPr>
-          <a:xfrm>
-            <a:off x="374433" y="2022133"/>
-            <a:ext cx="5909136" cy="2446824"/>
-          </a:xfrm>
-          <a:prstGeom prst="rect">
-            <a:avLst/>
-          </a:prstGeom>
-          <a:solidFill>
-            <a:schemeClr val="accent4">
-              <a:lumMod val="20000"/>
-              <a:lumOff val="80000"/>
-            </a:schemeClr>
-          </a:solidFill>
-        </p:spPr>
-        <p:txBody>
-          <a:bodyPr wrap="square">
-            <a:spAutoFit/>
-          </a:bodyPr>
-          <a:lstStyle/>
-          <a:p>
-            <a:r>
-              <a:rPr lang="en-US" sz="900" dirty="0">
-                <a:solidFill>
-                  <a:srgbClr val="028009"/>
-                </a:solidFill>
-                <a:latin typeface="Courier New" panose="02070309020205020404" pitchFamily="49" charset="0"/>
-              </a:rPr>
-              <a:t>%% Show how inputs are checked</a:t>
-            </a:r>
-          </a:p>
-          <a:p>
-            <a:r>
-              <a:rPr lang="en-US" sz="900" dirty="0" err="1">
-                <a:solidFill>
-                  <a:srgbClr val="000000"/>
-                </a:solidFill>
-                <a:latin typeface="Courier New" panose="02070309020205020404" pitchFamily="49" charset="0"/>
-              </a:rPr>
-              <a:t>Twocolumn_of_numbers_test</a:t>
-            </a:r>
-            <a:r>
-              <a:rPr lang="en-US" sz="900" dirty="0">
-                <a:solidFill>
-                  <a:srgbClr val="000000"/>
-                </a:solidFill>
-                <a:latin typeface="Courier New" panose="02070309020205020404" pitchFamily="49" charset="0"/>
-              </a:rPr>
-              <a:t> = [4 1; 3 0; 2 5];</a:t>
-            </a:r>
-          </a:p>
-          <a:p>
-            <a:r>
-              <a:rPr lang="en-US" sz="900" dirty="0" err="1">
-                <a:solidFill>
-                  <a:srgbClr val="000000"/>
-                </a:solidFill>
-                <a:latin typeface="Courier New" panose="02070309020205020404" pitchFamily="49" charset="0"/>
-              </a:rPr>
-              <a:t>fcn_MapGen_checkInputsToFunctions</a:t>
-            </a:r>
-            <a:r>
-              <a:rPr lang="en-US" sz="900" dirty="0">
-                <a:solidFill>
-                  <a:srgbClr val="000000"/>
-                </a:solidFill>
-                <a:latin typeface="Courier New" panose="02070309020205020404" pitchFamily="49" charset="0"/>
-              </a:rPr>
-              <a:t>(</a:t>
-            </a:r>
-            <a:r>
-              <a:rPr lang="en-US" sz="900" dirty="0" err="1">
-                <a:solidFill>
-                  <a:srgbClr val="000000"/>
-                </a:solidFill>
-                <a:latin typeface="Courier New" panose="02070309020205020404" pitchFamily="49" charset="0"/>
-              </a:rPr>
-              <a:t>Twocolumn_of_numbers_test</a:t>
-            </a:r>
-            <a:r>
-              <a:rPr lang="en-US" sz="900" dirty="0">
-                <a:solidFill>
-                  <a:srgbClr val="000000"/>
-                </a:solidFill>
-                <a:latin typeface="Courier New" panose="02070309020205020404" pitchFamily="49" charset="0"/>
-              </a:rPr>
-              <a:t>, </a:t>
-            </a:r>
-            <a:r>
-              <a:rPr lang="en-US" sz="900" dirty="0">
-                <a:solidFill>
-                  <a:srgbClr val="AA04F9"/>
-                </a:solidFill>
-                <a:latin typeface="Courier New" panose="02070309020205020404" pitchFamily="49" charset="0"/>
-              </a:rPr>
-              <a:t>'2column_of_numbers'</a:t>
-            </a:r>
-            <a:r>
-              <a:rPr lang="en-US" sz="900" dirty="0">
-                <a:solidFill>
-                  <a:srgbClr val="000000"/>
-                </a:solidFill>
-                <a:latin typeface="Courier New" panose="02070309020205020404" pitchFamily="49" charset="0"/>
-              </a:rPr>
-              <a:t>);</a:t>
-            </a:r>
-          </a:p>
-          <a:p>
-            <a:r>
-              <a:rPr lang="en-US" sz="900" dirty="0">
-                <a:solidFill>
-                  <a:srgbClr val="000000"/>
-                </a:solidFill>
-                <a:latin typeface="Courier New" panose="02070309020205020404" pitchFamily="49" charset="0"/>
-              </a:rPr>
-              <a:t> </a:t>
-            </a:r>
-          </a:p>
-          <a:p>
-            <a:r>
-              <a:rPr lang="en-US" sz="900" dirty="0">
-                <a:solidFill>
-                  <a:srgbClr val="000000"/>
-                </a:solidFill>
-                <a:latin typeface="Courier New" panose="02070309020205020404" pitchFamily="49" charset="0"/>
-              </a:rPr>
-              <a:t> </a:t>
-            </a:r>
-          </a:p>
-          <a:p>
-            <a:r>
-              <a:rPr lang="en-US" sz="900" dirty="0">
-                <a:solidFill>
-                  <a:srgbClr val="028009"/>
-                </a:solidFill>
-                <a:latin typeface="Courier New" panose="02070309020205020404" pitchFamily="49" charset="0"/>
-              </a:rPr>
-              <a:t>%% Generate a set of polytopes from various pseudo-random sources</a:t>
-            </a:r>
-          </a:p>
-          <a:p>
-            <a:r>
-              <a:rPr lang="en-US" sz="900" dirty="0">
-                <a:solidFill>
-                  <a:srgbClr val="028009"/>
-                </a:solidFill>
-                <a:latin typeface="Courier New" panose="02070309020205020404" pitchFamily="49" charset="0"/>
-              </a:rPr>
-              <a:t>% Generate a set of polytopes from the </a:t>
-            </a:r>
-            <a:r>
-              <a:rPr lang="en-US" sz="900" dirty="0" err="1">
-                <a:solidFill>
-                  <a:srgbClr val="028009"/>
-                </a:solidFill>
-                <a:latin typeface="Courier New" panose="02070309020205020404" pitchFamily="49" charset="0"/>
-              </a:rPr>
-              <a:t>Sobol</a:t>
-            </a:r>
-            <a:r>
-              <a:rPr lang="en-US" sz="900" dirty="0">
-                <a:solidFill>
-                  <a:srgbClr val="028009"/>
-                </a:solidFill>
-                <a:latin typeface="Courier New" panose="02070309020205020404" pitchFamily="49" charset="0"/>
-              </a:rPr>
-              <a:t> set</a:t>
-            </a:r>
-          </a:p>
-          <a:p>
-            <a:r>
-              <a:rPr lang="en-US" sz="900" dirty="0" err="1">
-                <a:solidFill>
-                  <a:srgbClr val="000000"/>
-                </a:solidFill>
-                <a:latin typeface="Courier New" panose="02070309020205020404" pitchFamily="49" charset="0"/>
-              </a:rPr>
-              <a:t>fig_num</a:t>
-            </a:r>
-            <a:r>
-              <a:rPr lang="en-US" sz="900" dirty="0">
-                <a:solidFill>
-                  <a:srgbClr val="000000"/>
-                </a:solidFill>
-                <a:latin typeface="Courier New" panose="02070309020205020404" pitchFamily="49" charset="0"/>
-              </a:rPr>
-              <a:t> = 11;</a:t>
-            </a:r>
-          </a:p>
-          <a:p>
-            <a:r>
-              <a:rPr lang="en-US" sz="900" dirty="0" err="1">
-                <a:solidFill>
-                  <a:srgbClr val="000000"/>
-                </a:solidFill>
-                <a:latin typeface="Courier New" panose="02070309020205020404" pitchFamily="49" charset="0"/>
-              </a:rPr>
-              <a:t>Sobol_range</a:t>
-            </a:r>
-            <a:r>
-              <a:rPr lang="en-US" sz="900" dirty="0">
-                <a:solidFill>
-                  <a:srgbClr val="000000"/>
-                </a:solidFill>
-                <a:latin typeface="Courier New" panose="02070309020205020404" pitchFamily="49" charset="0"/>
-              </a:rPr>
-              <a:t> = [1 1000]; </a:t>
-            </a:r>
-            <a:r>
-              <a:rPr lang="en-US" sz="900" dirty="0">
-                <a:solidFill>
-                  <a:srgbClr val="028009"/>
-                </a:solidFill>
-                <a:latin typeface="Courier New" panose="02070309020205020404" pitchFamily="49" charset="0"/>
-              </a:rPr>
-              <a:t>% range of </a:t>
-            </a:r>
-            <a:r>
-              <a:rPr lang="en-US" sz="900" dirty="0" err="1">
-                <a:solidFill>
-                  <a:srgbClr val="028009"/>
-                </a:solidFill>
-                <a:latin typeface="Courier New" panose="02070309020205020404" pitchFamily="49" charset="0"/>
-              </a:rPr>
-              <a:t>Sobol</a:t>
-            </a:r>
-            <a:r>
-              <a:rPr lang="en-US" sz="900" dirty="0">
-                <a:solidFill>
-                  <a:srgbClr val="028009"/>
-                </a:solidFill>
-                <a:latin typeface="Courier New" panose="02070309020205020404" pitchFamily="49" charset="0"/>
-              </a:rPr>
-              <a:t> points to use to generate the tiling</a:t>
-            </a:r>
-          </a:p>
-          <a:p>
-            <a:r>
-              <a:rPr lang="en-US" sz="900" dirty="0" err="1">
-                <a:solidFill>
-                  <a:srgbClr val="000000"/>
-                </a:solidFill>
-                <a:latin typeface="Courier New" panose="02070309020205020404" pitchFamily="49" charset="0"/>
-              </a:rPr>
-              <a:t>tiled_polytopes</a:t>
-            </a:r>
-            <a:r>
-              <a:rPr lang="en-US" sz="900" dirty="0">
-                <a:solidFill>
-                  <a:srgbClr val="000000"/>
-                </a:solidFill>
-                <a:latin typeface="Courier New" panose="02070309020205020404" pitchFamily="49" charset="0"/>
-              </a:rPr>
-              <a:t> = </a:t>
-            </a:r>
-            <a:r>
-              <a:rPr lang="en-US" sz="900" dirty="0" err="1">
-                <a:solidFill>
-                  <a:srgbClr val="000000"/>
-                </a:solidFill>
-                <a:latin typeface="Courier New" panose="02070309020205020404" pitchFamily="49" charset="0"/>
-              </a:rPr>
-              <a:t>fcn_MapGen_sobolVoronoiTiling</a:t>
-            </a:r>
-            <a:r>
-              <a:rPr lang="en-US" sz="900" dirty="0">
-                <a:solidFill>
-                  <a:srgbClr val="000000"/>
-                </a:solidFill>
-                <a:latin typeface="Courier New" panose="02070309020205020404" pitchFamily="49" charset="0"/>
-              </a:rPr>
-              <a:t>(</a:t>
-            </a:r>
-            <a:r>
-              <a:rPr lang="en-US" sz="900" dirty="0" err="1">
-                <a:solidFill>
-                  <a:srgbClr val="000000"/>
-                </a:solidFill>
-                <a:latin typeface="Courier New" panose="02070309020205020404" pitchFamily="49" charset="0"/>
-              </a:rPr>
-              <a:t>Sobol_range</a:t>
-            </a:r>
-            <a:r>
-              <a:rPr lang="en-US" sz="900" dirty="0">
-                <a:solidFill>
-                  <a:srgbClr val="000000"/>
-                </a:solidFill>
-                <a:latin typeface="Courier New" panose="02070309020205020404" pitchFamily="49" charset="0"/>
-              </a:rPr>
-              <a:t>,[1 1],</a:t>
-            </a:r>
-            <a:r>
-              <a:rPr lang="en-US" sz="900" dirty="0" err="1">
-                <a:solidFill>
-                  <a:srgbClr val="000000"/>
-                </a:solidFill>
-                <a:latin typeface="Courier New" panose="02070309020205020404" pitchFamily="49" charset="0"/>
-              </a:rPr>
-              <a:t>fig_num</a:t>
-            </a:r>
-            <a:r>
-              <a:rPr lang="en-US" sz="900" dirty="0">
-                <a:solidFill>
-                  <a:srgbClr val="000000"/>
-                </a:solidFill>
-                <a:latin typeface="Courier New" panose="02070309020205020404" pitchFamily="49" charset="0"/>
-              </a:rPr>
-              <a:t>);</a:t>
-            </a:r>
-          </a:p>
-          <a:p>
-            <a:r>
-              <a:rPr lang="en-US" sz="900" dirty="0">
-                <a:solidFill>
-                  <a:srgbClr val="000000"/>
-                </a:solidFill>
-                <a:latin typeface="Courier New" panose="02070309020205020404" pitchFamily="49" charset="0"/>
-              </a:rPr>
-              <a:t> </a:t>
-            </a:r>
-          </a:p>
-          <a:p>
-            <a:r>
-              <a:rPr lang="en-US" sz="900" dirty="0">
-                <a:solidFill>
-                  <a:srgbClr val="000000"/>
-                </a:solidFill>
-                <a:latin typeface="Courier New" panose="02070309020205020404" pitchFamily="49" charset="0"/>
-              </a:rPr>
-              <a:t> </a:t>
-            </a:r>
-          </a:p>
-          <a:p>
-            <a:r>
-              <a:rPr lang="en-US" sz="900" dirty="0">
-                <a:solidFill>
-                  <a:srgbClr val="028009"/>
-                </a:solidFill>
-                <a:latin typeface="Courier New" panose="02070309020205020404" pitchFamily="49" charset="0"/>
-              </a:rPr>
-              <a:t>% Generate a set of polytopes from the Halton set</a:t>
-            </a:r>
-          </a:p>
-          <a:p>
-            <a:r>
-              <a:rPr lang="en-US" sz="900" dirty="0" err="1">
-                <a:solidFill>
-                  <a:srgbClr val="000000"/>
-                </a:solidFill>
-                <a:latin typeface="Courier New" panose="02070309020205020404" pitchFamily="49" charset="0"/>
-              </a:rPr>
-              <a:t>fig_num</a:t>
-            </a:r>
-            <a:r>
-              <a:rPr lang="en-US" sz="900" dirty="0">
-                <a:solidFill>
-                  <a:srgbClr val="000000"/>
-                </a:solidFill>
-                <a:latin typeface="Courier New" panose="02070309020205020404" pitchFamily="49" charset="0"/>
-              </a:rPr>
-              <a:t> = 12;</a:t>
-            </a:r>
-          </a:p>
-          <a:p>
-            <a:r>
-              <a:rPr lang="en-US" sz="900" dirty="0" err="1">
-                <a:solidFill>
-                  <a:srgbClr val="000000"/>
-                </a:solidFill>
-                <a:latin typeface="Courier New" panose="02070309020205020404" pitchFamily="49" charset="0"/>
-              </a:rPr>
-              <a:t>Halton_range</a:t>
-            </a:r>
-            <a:r>
-              <a:rPr lang="en-US" sz="900" dirty="0">
-                <a:solidFill>
-                  <a:srgbClr val="000000"/>
-                </a:solidFill>
-                <a:latin typeface="Courier New" panose="02070309020205020404" pitchFamily="49" charset="0"/>
-              </a:rPr>
-              <a:t> = [1 1000]; </a:t>
-            </a:r>
-            <a:r>
-              <a:rPr lang="en-US" sz="900" dirty="0">
-                <a:solidFill>
-                  <a:srgbClr val="028009"/>
-                </a:solidFill>
-                <a:latin typeface="Courier New" panose="02070309020205020404" pitchFamily="49" charset="0"/>
-              </a:rPr>
-              <a:t>% range of Halton points to use to generate the tiling</a:t>
-            </a:r>
-          </a:p>
-          <a:p>
-            <a:r>
-              <a:rPr lang="en-US" sz="900" dirty="0" err="1">
-                <a:solidFill>
-                  <a:srgbClr val="000000"/>
-                </a:solidFill>
-                <a:latin typeface="Courier New" panose="02070309020205020404" pitchFamily="49" charset="0"/>
-              </a:rPr>
-              <a:t>tiled_polytopes</a:t>
-            </a:r>
-            <a:r>
-              <a:rPr lang="en-US" sz="900" dirty="0">
-                <a:solidFill>
-                  <a:srgbClr val="000000"/>
-                </a:solidFill>
-                <a:latin typeface="Courier New" panose="02070309020205020404" pitchFamily="49" charset="0"/>
-              </a:rPr>
-              <a:t> = </a:t>
-            </a:r>
-            <a:r>
-              <a:rPr lang="en-US" sz="900" dirty="0" err="1">
-                <a:solidFill>
-                  <a:srgbClr val="000000"/>
-                </a:solidFill>
-                <a:latin typeface="Courier New" panose="02070309020205020404" pitchFamily="49" charset="0"/>
-              </a:rPr>
-              <a:t>fcn_MapGen_haltonVoronoiTiling</a:t>
-            </a:r>
-            <a:r>
-              <a:rPr lang="en-US" sz="900" dirty="0">
-                <a:solidFill>
-                  <a:srgbClr val="000000"/>
-                </a:solidFill>
-                <a:latin typeface="Courier New" panose="02070309020205020404" pitchFamily="49" charset="0"/>
-              </a:rPr>
-              <a:t>(</a:t>
-            </a:r>
-            <a:r>
-              <a:rPr lang="en-US" sz="900" dirty="0" err="1">
-                <a:solidFill>
-                  <a:srgbClr val="000000"/>
-                </a:solidFill>
-                <a:latin typeface="Courier New" panose="02070309020205020404" pitchFamily="49" charset="0"/>
-              </a:rPr>
-              <a:t>Halton_range</a:t>
-            </a:r>
-            <a:r>
-              <a:rPr lang="en-US" sz="900" dirty="0">
-                <a:solidFill>
-                  <a:srgbClr val="000000"/>
-                </a:solidFill>
-                <a:latin typeface="Courier New" panose="02070309020205020404" pitchFamily="49" charset="0"/>
-              </a:rPr>
-              <a:t>,[1 1],</a:t>
-            </a:r>
-            <a:r>
-              <a:rPr lang="en-US" sz="900" dirty="0" err="1">
-                <a:solidFill>
-                  <a:srgbClr val="000000"/>
-                </a:solidFill>
-                <a:latin typeface="Courier New" panose="02070309020205020404" pitchFamily="49" charset="0"/>
-              </a:rPr>
-              <a:t>fig_num</a:t>
-            </a:r>
-            <a:r>
-              <a:rPr lang="en-US" sz="900" dirty="0">
-                <a:solidFill>
-                  <a:srgbClr val="000000"/>
-                </a:solidFill>
-                <a:latin typeface="Courier New" panose="02070309020205020404" pitchFamily="49" charset="0"/>
-              </a:rPr>
-              <a:t>);</a:t>
-            </a:r>
-          </a:p>
-          <a:p>
-            <a:endParaRPr lang="en-US" sz="900" dirty="0"/>
-          </a:p>
-        </p:txBody>
-      </p:sp>
-    </p:spTree>
-    <p:extLst>
-      <p:ext uri="{BB962C8B-B14F-4D97-AF65-F5344CB8AC3E}">
-        <p14:creationId xmlns:p14="http://schemas.microsoft.com/office/powerpoint/2010/main" val="3684799925"/>
-      </p:ext>
-    </p:extLst>
-  </p:cSld>
-  <p:clrMapOvr>
-    <a:masterClrMapping/>
-  </p:clrMapOvr>
-</p:sld>
-</file>
-
-<file path=ppt/slides/slide40.xml><?xml version="1.0" encoding="utf-8"?>
+<file path=ppt/slides/slide41.xml><?xml version="1.0" encoding="utf-8"?>
 <p:sld xmlns:a="http://schemas.openxmlformats.org/drawingml/2006/main" xmlns:r="http://schemas.openxmlformats.org/officeDocument/2006/relationships" xmlns:p="http://schemas.openxmlformats.org/presentationml/2006/main">
   <p:cSld>
     <p:spTree>
@@ -23918,8 +25863,8 @@
           </p:pic>
         </mc:Fallback>
       </mc:AlternateContent>
-      <mc:AlternateContent xmlns:mc="http://schemas.openxmlformats.org/markup-compatibility/2006">
-        <mc:Choice xmlns:p14="http://schemas.microsoft.com/office/powerpoint/2010/main" Requires="p14">
+      <mc:AlternateContent xmlns:mc="http://schemas.openxmlformats.org/markup-compatibility/2006" xmlns:p14="http://schemas.microsoft.com/office/powerpoint/2010/main">
+        <mc:Choice Requires="p14">
           <p:contentPart p14:bwMode="auto" r:id="rId4">
             <p14:nvContentPartPr>
               <p14:cNvPr id="11" name="Ink 10">
@@ -23938,7 +25883,7 @@
             </p14:xfrm>
           </p:contentPart>
         </mc:Choice>
-        <mc:Fallback>
+        <mc:Fallback xmlns="">
           <p:pic>
             <p:nvPicPr>
               <p:cNvPr id="11" name="Ink 10">
@@ -24020,8 +25965,8 @@
           </p:pic>
         </mc:Fallback>
       </mc:AlternateContent>
-      <mc:AlternateContent xmlns:mc="http://schemas.openxmlformats.org/markup-compatibility/2006">
-        <mc:Choice xmlns:p14="http://schemas.microsoft.com/office/powerpoint/2010/main" Requires="p14">
+      <mc:AlternateContent xmlns:mc="http://schemas.openxmlformats.org/markup-compatibility/2006" xmlns:p14="http://schemas.microsoft.com/office/powerpoint/2010/main">
+        <mc:Choice Requires="p14">
           <p:contentPart p14:bwMode="auto" r:id="rId8">
             <p14:nvContentPartPr>
               <p14:cNvPr id="15" name="Ink 14">
@@ -24040,7 +25985,7 @@
             </p14:xfrm>
           </p:contentPart>
         </mc:Choice>
-        <mc:Fallback>
+        <mc:Fallback xmlns="">
           <p:pic>
             <p:nvPicPr>
               <p:cNvPr id="15" name="Ink 14">
@@ -24122,8 +26067,8 @@
           </p:pic>
         </mc:Fallback>
       </mc:AlternateContent>
-      <mc:AlternateContent xmlns:mc="http://schemas.openxmlformats.org/markup-compatibility/2006">
-        <mc:Choice xmlns:p14="http://schemas.microsoft.com/office/powerpoint/2010/main" Requires="p14">
+      <mc:AlternateContent xmlns:mc="http://schemas.openxmlformats.org/markup-compatibility/2006" xmlns:p14="http://schemas.microsoft.com/office/powerpoint/2010/main">
+        <mc:Choice Requires="p14">
           <p:contentPart p14:bwMode="auto" r:id="rId12">
             <p14:nvContentPartPr>
               <p14:cNvPr id="45" name="Ink 44">
@@ -24142,7 +26087,7 @@
             </p14:xfrm>
           </p:contentPart>
         </mc:Choice>
-        <mc:Fallback>
+        <mc:Fallback xmlns="">
           <p:pic>
             <p:nvPicPr>
               <p:cNvPr id="45" name="Ink 44">
@@ -24173,8 +26118,8 @@
           </p:pic>
         </mc:Fallback>
       </mc:AlternateContent>
-      <mc:AlternateContent xmlns:mc="http://schemas.openxmlformats.org/markup-compatibility/2006">
-        <mc:Choice xmlns:p14="http://schemas.microsoft.com/office/powerpoint/2010/main" Requires="p14">
+      <mc:AlternateContent xmlns:mc="http://schemas.openxmlformats.org/markup-compatibility/2006" xmlns:p14="http://schemas.microsoft.com/office/powerpoint/2010/main">
+        <mc:Choice Requires="p14">
           <p:contentPart p14:bwMode="auto" r:id="rId14">
             <p14:nvContentPartPr>
               <p14:cNvPr id="47" name="Ink 46">
@@ -24193,7 +26138,7 @@
             </p14:xfrm>
           </p:contentPart>
         </mc:Choice>
-        <mc:Fallback>
+        <mc:Fallback xmlns="">
           <p:pic>
             <p:nvPicPr>
               <p:cNvPr id="47" name="Ink 46">
@@ -24224,8 +26169,8 @@
           </p:pic>
         </mc:Fallback>
       </mc:AlternateContent>
-      <mc:AlternateContent xmlns:mc="http://schemas.openxmlformats.org/markup-compatibility/2006">
-        <mc:Choice xmlns:p14="http://schemas.microsoft.com/office/powerpoint/2010/main" Requires="p14">
+      <mc:AlternateContent xmlns:mc="http://schemas.openxmlformats.org/markup-compatibility/2006" xmlns:p14="http://schemas.microsoft.com/office/powerpoint/2010/main">
+        <mc:Choice Requires="p14">
           <p:contentPart p14:bwMode="auto" r:id="rId16">
             <p14:nvContentPartPr>
               <p14:cNvPr id="50" name="Ink 49">
@@ -24244,7 +26189,7 @@
             </p14:xfrm>
           </p:contentPart>
         </mc:Choice>
-        <mc:Fallback>
+        <mc:Fallback xmlns="">
           <p:pic>
             <p:nvPicPr>
               <p:cNvPr id="50" name="Ink 49">
@@ -24326,8 +26271,8 @@
           </p:pic>
         </mc:Fallback>
       </mc:AlternateContent>
-      <mc:AlternateContent xmlns:mc="http://schemas.openxmlformats.org/markup-compatibility/2006">
-        <mc:Choice xmlns:p14="http://schemas.microsoft.com/office/powerpoint/2010/main" Requires="p14">
+      <mc:AlternateContent xmlns:mc="http://schemas.openxmlformats.org/markup-compatibility/2006" xmlns:p14="http://schemas.microsoft.com/office/powerpoint/2010/main">
+        <mc:Choice Requires="p14">
           <p:contentPart p14:bwMode="auto" r:id="rId20">
             <p14:nvContentPartPr>
               <p14:cNvPr id="54" name="Ink 53">
@@ -24346,7 +26291,7 @@
             </p14:xfrm>
           </p:contentPart>
         </mc:Choice>
-        <mc:Fallback>
+        <mc:Fallback xmlns="">
           <p:pic>
             <p:nvPicPr>
               <p:cNvPr id="54" name="Ink 53">
@@ -24377,8 +26322,8 @@
           </p:pic>
         </mc:Fallback>
       </mc:AlternateContent>
-      <mc:AlternateContent xmlns:mc="http://schemas.openxmlformats.org/markup-compatibility/2006">
-        <mc:Choice xmlns:p14="http://schemas.microsoft.com/office/powerpoint/2010/main" Requires="p14">
+      <mc:AlternateContent xmlns:mc="http://schemas.openxmlformats.org/markup-compatibility/2006" xmlns:p14="http://schemas.microsoft.com/office/powerpoint/2010/main">
+        <mc:Choice Requires="p14">
           <p:contentPart p14:bwMode="auto" r:id="rId22">
             <p14:nvContentPartPr>
               <p14:cNvPr id="60" name="Ink 59">
@@ -24397,7 +26342,7 @@
             </p14:xfrm>
           </p:contentPart>
         </mc:Choice>
-        <mc:Fallback>
+        <mc:Fallback xmlns="">
           <p:pic>
             <p:nvPicPr>
               <p:cNvPr id="60" name="Ink 59">
@@ -24879,8 +26824,8 @@
           </a:p>
         </p:txBody>
       </p:sp>
-      <mc:AlternateContent xmlns:mc="http://schemas.openxmlformats.org/markup-compatibility/2006">
-        <mc:Choice xmlns:p14="http://schemas.microsoft.com/office/powerpoint/2010/main" Requires="p14">
+      <mc:AlternateContent xmlns:mc="http://schemas.openxmlformats.org/markup-compatibility/2006" xmlns:p14="http://schemas.microsoft.com/office/powerpoint/2010/main">
+        <mc:Choice Requires="p14">
           <p:contentPart p14:bwMode="auto" r:id="rId26">
             <p14:nvContentPartPr>
               <p14:cNvPr id="29" name="Ink 28">
@@ -24899,7 +26844,7 @@
             </p14:xfrm>
           </p:contentPart>
         </mc:Choice>
-        <mc:Fallback>
+        <mc:Fallback xmlns="">
           <p:pic>
             <p:nvPicPr>
               <p:cNvPr id="29" name="Ink 28">
@@ -24983,7 +26928,7 @@
 </p:sld>
 </file>
 
-<file path=ppt/slides/slide41.xml><?xml version="1.0" encoding="utf-8"?>
+<file path=ppt/slides/slide42.xml><?xml version="1.0" encoding="utf-8"?>
 <p:sld xmlns:a="http://schemas.openxmlformats.org/drawingml/2006/main" xmlns:r="http://schemas.openxmlformats.org/officeDocument/2006/relationships" xmlns:p="http://schemas.openxmlformats.org/presentationml/2006/main">
   <p:cSld>
     <p:spTree>
@@ -25316,7 +27261,7 @@
 </p:sld>
 </file>
 
-<file path=ppt/slides/slide42.xml><?xml version="1.0" encoding="utf-8"?>
+<file path=ppt/slides/slide43.xml><?xml version="1.0" encoding="utf-8"?>
 <p:sld xmlns:a="http://schemas.openxmlformats.org/drawingml/2006/main" xmlns:r="http://schemas.openxmlformats.org/officeDocument/2006/relationships" xmlns:p="http://schemas.openxmlformats.org/presentationml/2006/main">
   <p:cSld>
     <p:spTree>
@@ -25513,7 +27458,7 @@
 </p:sld>
 </file>
 
-<file path=ppt/slides/slide43.xml><?xml version="1.0" encoding="utf-8"?>
+<file path=ppt/slides/slide44.xml><?xml version="1.0" encoding="utf-8"?>
 <p:sld xmlns:a="http://schemas.openxmlformats.org/drawingml/2006/main" xmlns:r="http://schemas.openxmlformats.org/officeDocument/2006/relationships" xmlns:p="http://schemas.openxmlformats.org/presentationml/2006/main">
   <p:cSld>
     <p:spTree>

</xml_diff>